<commit_message>
Added slides in MPI images
</commit_message>
<xml_diff>
--- a/Virtualization/singularity.pptx
+++ b/Virtualization/singularity.pptx
@@ -5,7 +5,7 @@
     <p:sldMasterId id="2147483660" r:id="rId1"/>
   </p:sldMasterIdLst>
   <p:notesMasterIdLst>
-    <p:notesMasterId r:id="rId24"/>
+    <p:notesMasterId r:id="rId28"/>
   </p:notesMasterIdLst>
   <p:sldIdLst>
     <p:sldId id="256" r:id="rId2"/>
@@ -25,11 +25,15 @@
     <p:sldId id="268" r:id="rId16"/>
     <p:sldId id="275" r:id="rId17"/>
     <p:sldId id="269" r:id="rId18"/>
-    <p:sldId id="271" r:id="rId19"/>
-    <p:sldId id="272" r:id="rId20"/>
-    <p:sldId id="276" r:id="rId21"/>
-    <p:sldId id="270" r:id="rId22"/>
-    <p:sldId id="277" r:id="rId23"/>
+    <p:sldId id="278" r:id="rId19"/>
+    <p:sldId id="271" r:id="rId20"/>
+    <p:sldId id="279" r:id="rId21"/>
+    <p:sldId id="280" r:id="rId22"/>
+    <p:sldId id="281" r:id="rId23"/>
+    <p:sldId id="272" r:id="rId24"/>
+    <p:sldId id="276" r:id="rId25"/>
+    <p:sldId id="270" r:id="rId26"/>
+    <p:sldId id="277" r:id="rId27"/>
   </p:sldIdLst>
   <p:sldSz cx="9144000" cy="6858000" type="screen4x3"/>
   <p:notesSz cx="6858000" cy="9144000"/>
@@ -3662,14 +3666,10 @@
             </a:r>
             <a:r>
               <a:rPr lang="en-US" dirty="0" smtClean="0"/>
-              <a:t>: 16.04</a:t>
-            </a:r>
-            <a:r>
-              <a:rPr lang="en-US" smtClean="0"/>
-              <a:t>, </a:t>
-            </a:r>
-            <a:r>
-              <a:rPr lang="en-US" smtClean="0"/>
+              <a:t>: 16.04, </a:t>
+            </a:r>
+            <a:r>
+              <a:rPr lang="en-US" dirty="0" smtClean="0"/>
               <a:t>trusty</a:t>
             </a:r>
             <a:r>
@@ -6342,7 +6342,7 @@
           <a:p>
             <a:r>
               <a:rPr lang="en-US" dirty="0" smtClean="0"/>
-              <a:t>Shell image</a:t>
+              <a:t>Integration in workflow</a:t>
             </a:r>
             <a:endParaRPr lang="nl-BE" dirty="0"/>
           </a:p>
@@ -6365,94 +6365,28 @@
           <a:p>
             <a:r>
               <a:rPr lang="en-US" dirty="0" smtClean="0"/>
-              <a:t>To execute run shell in image</a:t>
+              <a:t>Integration into PBS job script</a:t>
             </a:r>
           </a:p>
           <a:p>
             <a:endParaRPr lang="en-US" dirty="0"/>
           </a:p>
           <a:p>
-            <a:r>
-              <a:rPr lang="en-US" dirty="0" smtClean="0"/>
-              <a:t>Defaults to </a:t>
-            </a:r>
-            <a:r>
-              <a:rPr lang="en-US" dirty="0" smtClean="0">
-                <a:latin typeface="Courier New" panose="02070309020205020404" pitchFamily="49" charset="0"/>
-                <a:cs typeface="Courier New" panose="02070309020205020404" pitchFamily="49" charset="0"/>
-              </a:rPr>
-              <a:t>/bin/</a:t>
-            </a:r>
-            <a:r>
-              <a:rPr lang="en-US" dirty="0" err="1" smtClean="0">
-                <a:latin typeface="Courier New" panose="02070309020205020404" pitchFamily="49" charset="0"/>
-                <a:cs typeface="Courier New" panose="02070309020205020404" pitchFamily="49" charset="0"/>
-              </a:rPr>
-              <a:t>sh</a:t>
-            </a:r>
-            <a:r>
-              <a:rPr lang="en-US" dirty="0" smtClean="0"/>
-              <a:t>, not </a:t>
-            </a:r>
-            <a:r>
-              <a:rPr lang="en-US" dirty="0" smtClean="0">
-                <a:latin typeface="Courier New" panose="02070309020205020404" pitchFamily="49" charset="0"/>
-                <a:cs typeface="Courier New" panose="02070309020205020404" pitchFamily="49" charset="0"/>
-              </a:rPr>
-              <a:t>/bin/bash</a:t>
-            </a:r>
-            <a:r>
-              <a:rPr lang="en-US" dirty="0" smtClean="0"/>
-              <a:t>!</a:t>
-            </a:r>
-          </a:p>
-          <a:p>
-            <a:pPr lvl="1"/>
-            <a:r>
-              <a:rPr lang="en-US" dirty="0" smtClean="0"/>
-              <a:t>Take care with </a:t>
-            </a:r>
-            <a:r>
-              <a:rPr lang="en-US" dirty="0" smtClean="0">
-                <a:latin typeface="Courier New" panose="02070309020205020404" pitchFamily="49" charset="0"/>
-                <a:cs typeface="Courier New" panose="02070309020205020404" pitchFamily="49" charset="0"/>
-              </a:rPr>
-              <a:t>.</a:t>
-            </a:r>
-            <a:r>
-              <a:rPr lang="en-US" dirty="0" err="1" smtClean="0">
-                <a:latin typeface="Courier New" panose="02070309020205020404" pitchFamily="49" charset="0"/>
-                <a:cs typeface="Courier New" panose="02070309020205020404" pitchFamily="49" charset="0"/>
-              </a:rPr>
-              <a:t>bash_profile</a:t>
-            </a:r>
-            <a:r>
-              <a:rPr lang="en-US" dirty="0" smtClean="0"/>
-              <a:t>/</a:t>
-            </a:r>
-            <a:r>
-              <a:rPr lang="en-US" dirty="0" smtClean="0">
-                <a:latin typeface="Courier New" panose="02070309020205020404" pitchFamily="49" charset="0"/>
-                <a:cs typeface="Courier New" panose="02070309020205020404" pitchFamily="49" charset="0"/>
-              </a:rPr>
-              <a:t>.</a:t>
-            </a:r>
-            <a:r>
-              <a:rPr lang="en-US" dirty="0" err="1" smtClean="0">
-                <a:latin typeface="Courier New" panose="02070309020205020404" pitchFamily="49" charset="0"/>
-                <a:cs typeface="Courier New" panose="02070309020205020404" pitchFamily="49" charset="0"/>
-              </a:rPr>
-              <a:t>bashrc</a:t>
-            </a:r>
-            <a:r>
-              <a:rPr lang="en-US" dirty="0" smtClean="0"/>
-              <a:t>, might generated errors</a:t>
-            </a:r>
-          </a:p>
-          <a:p>
-            <a:r>
-              <a:rPr lang="en-US" dirty="0" smtClean="0"/>
-              <a:t>Nice to test software, do development</a:t>
+            <a:endParaRPr lang="en-US" dirty="0" smtClean="0"/>
+          </a:p>
+          <a:p>
+            <a:endParaRPr lang="en-US" dirty="0"/>
+          </a:p>
+          <a:p>
+            <a:endParaRPr lang="en-US" dirty="0" smtClean="0"/>
+          </a:p>
+          <a:p>
+            <a:endParaRPr lang="en-US" dirty="0"/>
+          </a:p>
+          <a:p>
+            <a:r>
+              <a:rPr lang="en-US" dirty="0" smtClean="0"/>
+              <a:t>Singularity images can be used in any workflow</a:t>
             </a:r>
             <a:endParaRPr lang="nl-BE" dirty="0"/>
           </a:p>
@@ -6460,21 +6394,51 @@
       </p:sp>
       <p:sp>
         <p:nvSpPr>
-          <p:cNvPr id="4" name="TextBox 3"/>
+          <p:cNvPr id="4" name="Slide Number Placeholder 3"/>
+          <p:cNvSpPr>
+            <a:spLocks noGrp="1"/>
+          </p:cNvSpPr>
+          <p:nvPr>
+            <p:ph type="sldNum" sz="quarter" idx="12"/>
+          </p:nvPr>
+        </p:nvSpPr>
+        <p:spPr/>
+        <p:txBody>
+          <a:bodyPr/>
+          <a:lstStyle/>
+          <a:p>
+            <a:fld id="{AEFF399F-E3B5-4890-BC79-9BC8D4DF3F2D}" type="slidenum">
+              <a:rPr lang="nl-BE" smtClean="0"/>
+              <a:t>18</a:t>
+            </a:fld>
+            <a:endParaRPr lang="nl-BE"/>
+          </a:p>
+        </p:txBody>
+      </p:sp>
+      <p:sp>
+        <p:nvSpPr>
+          <p:cNvPr id="5" name="TextBox 4"/>
           <p:cNvSpPr txBox="1"/>
           <p:nvPr/>
         </p:nvSpPr>
         <p:spPr>
           <a:xfrm>
-            <a:off x="693966" y="2359483"/>
-            <a:ext cx="4182555" cy="369332"/>
+            <a:off x="800101" y="2402029"/>
+            <a:ext cx="7353295" cy="2031325"/>
           </a:xfrm>
           <a:prstGeom prst="rect">
             <a:avLst/>
           </a:prstGeom>
           <a:solidFill>
-            <a:schemeClr val="tx1"/>
+            <a:schemeClr val="bg1">
+              <a:lumMod val="85000"/>
+            </a:schemeClr>
           </a:solidFill>
+          <a:ln>
+            <a:solidFill>
+              <a:schemeClr val="tx1"/>
+            </a:solidFill>
+          </a:ln>
         </p:spPr>
         <p:txBody>
           <a:bodyPr wrap="none" rtlCol="0">
@@ -6483,62 +6447,141 @@
           <a:lstStyle/>
           <a:p>
             <a:r>
-              <a:rPr lang="en-US" b="1" dirty="0" smtClean="0">
-                <a:solidFill>
-                  <a:schemeClr val="bg1"/>
-                </a:solidFill>
-                <a:latin typeface="Courier New" panose="02070309020205020404" pitchFamily="49" charset="0"/>
-                <a:cs typeface="Courier New" panose="02070309020205020404" pitchFamily="49" charset="0"/>
-              </a:rPr>
-              <a:t>$ singularity shell </a:t>
-            </a:r>
-            <a:r>
-              <a:rPr lang="en-US" b="1" dirty="0" err="1" smtClean="0">
-                <a:solidFill>
-                  <a:schemeClr val="bg1"/>
-                </a:solidFill>
-                <a:latin typeface="Courier New" panose="02070309020205020404" pitchFamily="49" charset="0"/>
-                <a:cs typeface="Courier New" panose="02070309020205020404" pitchFamily="49" charset="0"/>
-              </a:rPr>
-              <a:t>grace.img</a:t>
-            </a:r>
-            <a:endParaRPr lang="nl-BE" b="1" dirty="0">
-              <a:solidFill>
-                <a:schemeClr val="bg1"/>
-              </a:solidFill>
+              <a:rPr lang="en-US" dirty="0" smtClean="0">
+                <a:latin typeface="Courier New" panose="02070309020205020404" pitchFamily="49" charset="0"/>
+                <a:cs typeface="Courier New" panose="02070309020205020404" pitchFamily="49" charset="0"/>
+              </a:rPr>
+              <a:t>#!/bin/bash –l</a:t>
+            </a:r>
+          </a:p>
+          <a:p>
+            <a:r>
+              <a:rPr lang="en-US" dirty="0" smtClean="0">
+                <a:latin typeface="Courier New" panose="02070309020205020404" pitchFamily="49" charset="0"/>
+                <a:cs typeface="Courier New" panose="02070309020205020404" pitchFamily="49" charset="0"/>
+              </a:rPr>
+              <a:t>#PBS –l nodes=1:ppn=1</a:t>
+            </a:r>
+          </a:p>
+          <a:p>
+            <a:r>
+              <a:rPr lang="en-US" dirty="0" smtClean="0">
+                <a:latin typeface="Courier New" panose="02070309020205020404" pitchFamily="49" charset="0"/>
+                <a:cs typeface="Courier New" panose="02070309020205020404" pitchFamily="49" charset="0"/>
+              </a:rPr>
+              <a:t>#PBS –l </a:t>
+            </a:r>
+            <a:r>
+              <a:rPr lang="en-US" dirty="0" err="1" smtClean="0">
+                <a:latin typeface="Courier New" panose="02070309020205020404" pitchFamily="49" charset="0"/>
+                <a:cs typeface="Courier New" panose="02070309020205020404" pitchFamily="49" charset="0"/>
+              </a:rPr>
+              <a:t>walltime</a:t>
+            </a:r>
+            <a:r>
+              <a:rPr lang="en-US" dirty="0" smtClean="0">
+                <a:latin typeface="Courier New" panose="02070309020205020404" pitchFamily="49" charset="0"/>
+                <a:cs typeface="Courier New" panose="02070309020205020404" pitchFamily="49" charset="0"/>
+              </a:rPr>
+              <a:t>=00:30:00</a:t>
+            </a:r>
+          </a:p>
+          <a:p>
+            <a:endParaRPr lang="en-US" dirty="0">
               <a:latin typeface="Courier New" panose="02070309020205020404" pitchFamily="49" charset="0"/>
               <a:cs typeface="Courier New" panose="02070309020205020404" pitchFamily="49" charset="0"/>
             </a:endParaRPr>
           </a:p>
-        </p:txBody>
-      </p:sp>
-      <p:sp>
-        <p:nvSpPr>
-          <p:cNvPr id="8" name="Slide Number Placeholder 7"/>
-          <p:cNvSpPr>
-            <a:spLocks noGrp="1"/>
-          </p:cNvSpPr>
-          <p:nvPr>
-            <p:ph type="sldNum" sz="quarter" idx="12"/>
-          </p:nvPr>
-        </p:nvSpPr>
-        <p:spPr/>
-        <p:txBody>
-          <a:bodyPr/>
-          <a:lstStyle/>
-          <a:p>
-            <a:fld id="{AEFF399F-E3B5-4890-BC79-9BC8D4DF3F2D}" type="slidenum">
-              <a:rPr lang="nl-BE" smtClean="0"/>
-              <a:t>18</a:t>
-            </a:fld>
-            <a:endParaRPr lang="nl-BE"/>
+          <a:p>
+            <a:r>
+              <a:rPr lang="en-US" dirty="0" smtClean="0">
+                <a:latin typeface="Courier New" panose="02070309020205020404" pitchFamily="49" charset="0"/>
+                <a:cs typeface="Courier New" panose="02070309020205020404" pitchFamily="49" charset="0"/>
+              </a:rPr>
+              <a:t>cd $PBS_O_WORKDIR</a:t>
+            </a:r>
+          </a:p>
+          <a:p>
+            <a:r>
+              <a:rPr lang="en-US" dirty="0">
+                <a:latin typeface="Courier New" panose="02070309020205020404" pitchFamily="49" charset="0"/>
+                <a:cs typeface="Courier New" panose="02070309020205020404" pitchFamily="49" charset="0"/>
+              </a:rPr>
+              <a:t>singularity exec </a:t>
+            </a:r>
+            <a:r>
+              <a:rPr lang="en-US" dirty="0" err="1">
+                <a:latin typeface="Courier New" panose="02070309020205020404" pitchFamily="49" charset="0"/>
+                <a:cs typeface="Courier New" panose="02070309020205020404" pitchFamily="49" charset="0"/>
+              </a:rPr>
+              <a:t>grace.img</a:t>
+            </a:r>
+            <a:r>
+              <a:rPr lang="en-US" dirty="0">
+                <a:latin typeface="Courier New" panose="02070309020205020404" pitchFamily="49" charset="0"/>
+                <a:cs typeface="Courier New" panose="02070309020205020404" pitchFamily="49" charset="0"/>
+              </a:rPr>
+              <a:t> </a:t>
+            </a:r>
+            <a:r>
+              <a:rPr lang="en-US" dirty="0" err="1">
+                <a:latin typeface="Courier New" panose="02070309020205020404" pitchFamily="49" charset="0"/>
+                <a:cs typeface="Courier New" panose="02070309020205020404" pitchFamily="49" charset="0"/>
+              </a:rPr>
+              <a:t>gracebat</a:t>
+            </a:r>
+            <a:r>
+              <a:rPr lang="en-US" dirty="0">
+                <a:latin typeface="Courier New" panose="02070309020205020404" pitchFamily="49" charset="0"/>
+                <a:cs typeface="Courier New" panose="02070309020205020404" pitchFamily="49" charset="0"/>
+              </a:rPr>
+              <a:t> –data data.dat \</a:t>
+            </a:r>
+            <a:br>
+              <a:rPr lang="en-US" dirty="0">
+                <a:latin typeface="Courier New" panose="02070309020205020404" pitchFamily="49" charset="0"/>
+                <a:cs typeface="Courier New" panose="02070309020205020404" pitchFamily="49" charset="0"/>
+              </a:rPr>
+            </a:br>
+            <a:r>
+              <a:rPr lang="en-US" dirty="0">
+                <a:latin typeface="Courier New" panose="02070309020205020404" pitchFamily="49" charset="0"/>
+                <a:cs typeface="Courier New" panose="02070309020205020404" pitchFamily="49" charset="0"/>
+              </a:rPr>
+              <a:t>     </a:t>
+            </a:r>
+            <a:r>
+              <a:rPr lang="en-US" dirty="0" smtClean="0">
+                <a:latin typeface="Courier New" panose="02070309020205020404" pitchFamily="49" charset="0"/>
+                <a:cs typeface="Courier New" panose="02070309020205020404" pitchFamily="49" charset="0"/>
+              </a:rPr>
+              <a:t>                               </a:t>
+            </a:r>
+            <a:r>
+              <a:rPr lang="en-US" dirty="0">
+                <a:latin typeface="Courier New" panose="02070309020205020404" pitchFamily="49" charset="0"/>
+                <a:cs typeface="Courier New" panose="02070309020205020404" pitchFamily="49" charset="0"/>
+              </a:rPr>
+              <a:t>-batch </a:t>
+            </a:r>
+            <a:r>
+              <a:rPr lang="en-US" dirty="0" smtClean="0">
+                <a:latin typeface="Courier New" panose="02070309020205020404" pitchFamily="49" charset="0"/>
+                <a:cs typeface="Courier New" panose="02070309020205020404" pitchFamily="49" charset="0"/>
+              </a:rPr>
+              <a:t>plot.bat</a:t>
+            </a:r>
+            <a:endParaRPr lang="en-US" dirty="0">
+              <a:latin typeface="Courier New" panose="02070309020205020404" pitchFamily="49" charset="0"/>
+              <a:cs typeface="Courier New" panose="02070309020205020404" pitchFamily="49" charset="0"/>
+            </a:endParaRPr>
           </a:p>
         </p:txBody>
       </p:sp>
     </p:spTree>
     <p:extLst>
       <p:ext uri="{BB962C8B-B14F-4D97-AF65-F5344CB8AC3E}">
-        <p14:creationId xmlns:p14="http://schemas.microsoft.com/office/powerpoint/2010/main" val="3738211075"/>
+        <p14:creationId xmlns:p14="http://schemas.microsoft.com/office/powerpoint/2010/main" val="3291536051"/>
       </p:ext>
     </p:extLst>
   </p:cSld>
@@ -6582,7 +6625,11 @@
           <a:p>
             <a:r>
               <a:rPr lang="en-US" dirty="0" smtClean="0"/>
-              <a:t>Conclusions</a:t>
+              <a:t>I</a:t>
+            </a:r>
+            <a:r>
+              <a:rPr lang="en-US" dirty="0" smtClean="0"/>
+              <a:t>mage shell</a:t>
             </a:r>
             <a:endParaRPr lang="nl-BE" dirty="0"/>
           </a:p>
@@ -6590,26 +6637,171 @@
       </p:sp>
       <p:sp>
         <p:nvSpPr>
-          <p:cNvPr id="3" name="Text Placeholder 2"/>
-          <p:cNvSpPr>
-            <a:spLocks noGrp="1"/>
-          </p:cNvSpPr>
-          <p:nvPr>
-            <p:ph type="body" idx="1"/>
-          </p:nvPr>
-        </p:nvSpPr>
-        <p:spPr/>
-        <p:txBody>
-          <a:bodyPr/>
-          <a:lstStyle/>
-          <a:p>
-            <a:endParaRPr lang="nl-BE"/>
-          </a:p>
-        </p:txBody>
-      </p:sp>
-      <p:sp>
-        <p:nvSpPr>
-          <p:cNvPr id="4" name="Slide Number Placeholder 3"/>
+          <p:cNvPr id="3" name="Content Placeholder 2"/>
+          <p:cNvSpPr>
+            <a:spLocks noGrp="1"/>
+          </p:cNvSpPr>
+          <p:nvPr>
+            <p:ph idx="1"/>
+          </p:nvPr>
+        </p:nvSpPr>
+        <p:spPr/>
+        <p:txBody>
+          <a:bodyPr/>
+          <a:lstStyle/>
+          <a:p>
+            <a:r>
+              <a:rPr lang="en-US" dirty="0" smtClean="0"/>
+              <a:t>To execute run shell in image</a:t>
+            </a:r>
+          </a:p>
+          <a:p>
+            <a:endParaRPr lang="en-US" dirty="0"/>
+          </a:p>
+          <a:p>
+            <a:r>
+              <a:rPr lang="en-US" dirty="0" smtClean="0"/>
+              <a:t>Defaults to </a:t>
+            </a:r>
+            <a:r>
+              <a:rPr lang="en-US" dirty="0" smtClean="0">
+                <a:latin typeface="Courier New" panose="02070309020205020404" pitchFamily="49" charset="0"/>
+                <a:cs typeface="Courier New" panose="02070309020205020404" pitchFamily="49" charset="0"/>
+              </a:rPr>
+              <a:t>/bin/</a:t>
+            </a:r>
+            <a:r>
+              <a:rPr lang="en-US" dirty="0" err="1" smtClean="0">
+                <a:latin typeface="Courier New" panose="02070309020205020404" pitchFamily="49" charset="0"/>
+                <a:cs typeface="Courier New" panose="02070309020205020404" pitchFamily="49" charset="0"/>
+              </a:rPr>
+              <a:t>sh</a:t>
+            </a:r>
+            <a:r>
+              <a:rPr lang="en-US" dirty="0" smtClean="0"/>
+              <a:t>, not </a:t>
+            </a:r>
+            <a:r>
+              <a:rPr lang="en-US" dirty="0" smtClean="0">
+                <a:latin typeface="Courier New" panose="02070309020205020404" pitchFamily="49" charset="0"/>
+                <a:cs typeface="Courier New" panose="02070309020205020404" pitchFamily="49" charset="0"/>
+              </a:rPr>
+              <a:t>/bin/bash</a:t>
+            </a:r>
+            <a:r>
+              <a:rPr lang="en-US" dirty="0" smtClean="0"/>
+              <a:t>!</a:t>
+            </a:r>
+          </a:p>
+          <a:p>
+            <a:pPr lvl="1"/>
+            <a:r>
+              <a:rPr lang="en-US" dirty="0" smtClean="0"/>
+              <a:t>Take care with </a:t>
+            </a:r>
+            <a:r>
+              <a:rPr lang="en-US" dirty="0" smtClean="0">
+                <a:latin typeface="Courier New" panose="02070309020205020404" pitchFamily="49" charset="0"/>
+                <a:cs typeface="Courier New" panose="02070309020205020404" pitchFamily="49" charset="0"/>
+              </a:rPr>
+              <a:t>.</a:t>
+            </a:r>
+            <a:r>
+              <a:rPr lang="en-US" dirty="0" err="1" smtClean="0">
+                <a:latin typeface="Courier New" panose="02070309020205020404" pitchFamily="49" charset="0"/>
+                <a:cs typeface="Courier New" panose="02070309020205020404" pitchFamily="49" charset="0"/>
+              </a:rPr>
+              <a:t>bash_profile</a:t>
+            </a:r>
+            <a:r>
+              <a:rPr lang="en-US" dirty="0" smtClean="0"/>
+              <a:t>/</a:t>
+            </a:r>
+            <a:r>
+              <a:rPr lang="en-US" dirty="0" smtClean="0">
+                <a:latin typeface="Courier New" panose="02070309020205020404" pitchFamily="49" charset="0"/>
+                <a:cs typeface="Courier New" panose="02070309020205020404" pitchFamily="49" charset="0"/>
+              </a:rPr>
+              <a:t>.</a:t>
+            </a:r>
+            <a:r>
+              <a:rPr lang="en-US" dirty="0" err="1" smtClean="0">
+                <a:latin typeface="Courier New" panose="02070309020205020404" pitchFamily="49" charset="0"/>
+                <a:cs typeface="Courier New" panose="02070309020205020404" pitchFamily="49" charset="0"/>
+              </a:rPr>
+              <a:t>bashrc</a:t>
+            </a:r>
+            <a:r>
+              <a:rPr lang="en-US" dirty="0" smtClean="0"/>
+              <a:t>, might generated errors</a:t>
+            </a:r>
+          </a:p>
+          <a:p>
+            <a:r>
+              <a:rPr lang="en-US" dirty="0" smtClean="0"/>
+              <a:t>Nice to test software, do development</a:t>
+            </a:r>
+            <a:endParaRPr lang="nl-BE" dirty="0"/>
+          </a:p>
+        </p:txBody>
+      </p:sp>
+      <p:sp>
+        <p:nvSpPr>
+          <p:cNvPr id="4" name="TextBox 3"/>
+          <p:cNvSpPr txBox="1"/>
+          <p:nvPr/>
+        </p:nvSpPr>
+        <p:spPr>
+          <a:xfrm>
+            <a:off x="693966" y="2359483"/>
+            <a:ext cx="4182555" cy="369332"/>
+          </a:xfrm>
+          <a:prstGeom prst="rect">
+            <a:avLst/>
+          </a:prstGeom>
+          <a:solidFill>
+            <a:schemeClr val="tx1"/>
+          </a:solidFill>
+        </p:spPr>
+        <p:txBody>
+          <a:bodyPr wrap="none" rtlCol="0">
+            <a:spAutoFit/>
+          </a:bodyPr>
+          <a:lstStyle/>
+          <a:p>
+            <a:r>
+              <a:rPr lang="en-US" b="1" dirty="0" smtClean="0">
+                <a:solidFill>
+                  <a:schemeClr val="bg1"/>
+                </a:solidFill>
+                <a:latin typeface="Courier New" panose="02070309020205020404" pitchFamily="49" charset="0"/>
+                <a:cs typeface="Courier New" panose="02070309020205020404" pitchFamily="49" charset="0"/>
+              </a:rPr>
+              <a:t>$ singularity shell </a:t>
+            </a:r>
+            <a:r>
+              <a:rPr lang="en-US" b="1" dirty="0" err="1" smtClean="0">
+                <a:solidFill>
+                  <a:schemeClr val="bg1"/>
+                </a:solidFill>
+                <a:latin typeface="Courier New" panose="02070309020205020404" pitchFamily="49" charset="0"/>
+                <a:cs typeface="Courier New" panose="02070309020205020404" pitchFamily="49" charset="0"/>
+              </a:rPr>
+              <a:t>grace.img</a:t>
+            </a:r>
+            <a:endParaRPr lang="nl-BE" b="1" dirty="0">
+              <a:solidFill>
+                <a:schemeClr val="bg1"/>
+              </a:solidFill>
+              <a:latin typeface="Courier New" panose="02070309020205020404" pitchFamily="49" charset="0"/>
+              <a:cs typeface="Courier New" panose="02070309020205020404" pitchFamily="49" charset="0"/>
+            </a:endParaRPr>
+          </a:p>
+        </p:txBody>
+      </p:sp>
+      <p:sp>
+        <p:nvSpPr>
+          <p:cNvPr id="8" name="Slide Number Placeholder 7"/>
           <p:cNvSpPr>
             <a:spLocks noGrp="1"/>
           </p:cNvSpPr>
@@ -6633,7 +6825,7 @@
     </p:spTree>
     <p:extLst>
       <p:ext uri="{BB962C8B-B14F-4D97-AF65-F5344CB8AC3E}">
-        <p14:creationId xmlns:p14="http://schemas.microsoft.com/office/powerpoint/2010/main" val="2192721825"/>
+        <p14:creationId xmlns:p14="http://schemas.microsoft.com/office/powerpoint/2010/main" val="3738211075"/>
       </p:ext>
     </p:extLst>
   </p:cSld>
@@ -6772,7 +6964,7 @@
           <a:p>
             <a:r>
               <a:rPr lang="en-US" dirty="0" smtClean="0"/>
-              <a:t>Conclusions</a:t>
+              <a:t>Distributed applications</a:t>
             </a:r>
             <a:endParaRPr lang="nl-BE" dirty="0"/>
           </a:p>
@@ -6780,73 +6972,20 @@
       </p:sp>
       <p:sp>
         <p:nvSpPr>
-          <p:cNvPr id="3" name="Content Placeholder 2"/>
-          <p:cNvSpPr>
-            <a:spLocks noGrp="1"/>
-          </p:cNvSpPr>
-          <p:nvPr>
-            <p:ph idx="1"/>
-          </p:nvPr>
-        </p:nvSpPr>
-        <p:spPr/>
-        <p:txBody>
-          <a:bodyPr/>
-          <a:lstStyle/>
-          <a:p>
-            <a:r>
-              <a:rPr lang="en-US" dirty="0" smtClean="0"/>
-              <a:t>Singularity advantages</a:t>
-            </a:r>
-          </a:p>
-          <a:p>
-            <a:pPr lvl="1"/>
-            <a:r>
-              <a:rPr lang="en-US" dirty="0" smtClean="0"/>
-              <a:t>Portability</a:t>
-            </a:r>
-          </a:p>
-          <a:p>
-            <a:pPr lvl="1"/>
-            <a:r>
-              <a:rPr lang="en-US" dirty="0" smtClean="0"/>
-              <a:t>Reproducibility</a:t>
-            </a:r>
-          </a:p>
-          <a:p>
-            <a:pPr lvl="1"/>
-            <a:r>
-              <a:rPr lang="en-US" dirty="0" smtClean="0"/>
-              <a:t>Easily create images</a:t>
-            </a:r>
-          </a:p>
-          <a:p>
-            <a:pPr lvl="1"/>
-            <a:r>
-              <a:rPr lang="en-US" dirty="0" smtClean="0"/>
-              <a:t>Integrate images into existing workflows</a:t>
-            </a:r>
-          </a:p>
-          <a:p>
-            <a:pPr lvl="1"/>
-            <a:r>
-              <a:rPr lang="en-US" dirty="0" smtClean="0"/>
-              <a:t>No privilege escalation</a:t>
-            </a:r>
-          </a:p>
-          <a:p>
-            <a:pPr lvl="2"/>
-            <a:r>
-              <a:rPr lang="en-US" dirty="0" smtClean="0"/>
-              <a:t>Create as root</a:t>
-            </a:r>
-          </a:p>
-          <a:p>
-            <a:pPr lvl="2"/>
-            <a:r>
-              <a:rPr lang="en-US" dirty="0" smtClean="0"/>
-              <a:t>Run as user</a:t>
-            </a:r>
-            <a:endParaRPr lang="nl-BE" dirty="0"/>
+          <p:cNvPr id="3" name="Text Placeholder 2"/>
+          <p:cNvSpPr>
+            <a:spLocks noGrp="1"/>
+          </p:cNvSpPr>
+          <p:nvPr>
+            <p:ph type="body" idx="1"/>
+          </p:nvPr>
+        </p:nvSpPr>
+        <p:spPr/>
+        <p:txBody>
+          <a:bodyPr/>
+          <a:lstStyle/>
+          <a:p>
+            <a:endParaRPr lang="nl-BE"/>
           </a:p>
         </p:txBody>
       </p:sp>
@@ -6876,7 +7015,7 @@
     </p:spTree>
     <p:extLst>
       <p:ext uri="{BB962C8B-B14F-4D97-AF65-F5344CB8AC3E}">
-        <p14:creationId xmlns:p14="http://schemas.microsoft.com/office/powerpoint/2010/main" val="4038801045"/>
+        <p14:creationId xmlns:p14="http://schemas.microsoft.com/office/powerpoint/2010/main" val="3672421668"/>
       </p:ext>
     </p:extLst>
   </p:cSld>
@@ -6920,146 +7059,7 @@
           <a:p>
             <a:r>
               <a:rPr lang="en-US" dirty="0" smtClean="0"/>
-              <a:t>Bootstrap best practices</a:t>
-            </a:r>
-            <a:endParaRPr lang="nl-BE" dirty="0"/>
-          </a:p>
-        </p:txBody>
-      </p:sp>
-      <p:sp>
-        <p:nvSpPr>
-          <p:cNvPr id="3" name="Content Placeholder 2"/>
-          <p:cNvSpPr>
-            <a:spLocks noGrp="1"/>
-          </p:cNvSpPr>
-          <p:nvPr>
-            <p:ph idx="1"/>
-          </p:nvPr>
-        </p:nvSpPr>
-        <p:spPr/>
-        <p:txBody>
-          <a:bodyPr/>
-          <a:lstStyle/>
-          <a:p>
-            <a:r>
-              <a:rPr lang="en-US" dirty="0" smtClean="0"/>
-              <a:t>Install software in default location, not home directory</a:t>
-            </a:r>
-          </a:p>
-          <a:p>
-            <a:r>
-              <a:rPr lang="en-US" dirty="0" smtClean="0"/>
-              <a:t>Define environment variables in image's </a:t>
-            </a:r>
-            <a:r>
-              <a:rPr lang="en-US" dirty="0" smtClean="0">
-                <a:latin typeface="Courier New" panose="02070309020205020404" pitchFamily="49" charset="0"/>
-                <a:cs typeface="Courier New" panose="02070309020205020404" pitchFamily="49" charset="0"/>
-              </a:rPr>
-              <a:t>/environment</a:t>
-            </a:r>
-          </a:p>
-          <a:p>
-            <a:r>
-              <a:rPr lang="en-US" dirty="0" smtClean="0"/>
-              <a:t>Files should be owned by system account, not user</a:t>
-            </a:r>
-          </a:p>
-          <a:p>
-            <a:r>
-              <a:rPr lang="en-US" dirty="0" smtClean="0"/>
-              <a:t>Don’t mess with </a:t>
-            </a:r>
-            <a:r>
-              <a:rPr lang="en-US" dirty="0" smtClean="0">
-                <a:latin typeface="Courier New" panose="02070309020205020404" pitchFamily="49" charset="0"/>
-                <a:cs typeface="Courier New" panose="02070309020205020404" pitchFamily="49" charset="0"/>
-              </a:rPr>
-              <a:t>/</a:t>
-            </a:r>
-            <a:r>
-              <a:rPr lang="en-US" dirty="0" err="1" smtClean="0">
-                <a:latin typeface="Courier New" panose="02070309020205020404" pitchFamily="49" charset="0"/>
-                <a:cs typeface="Courier New" panose="02070309020205020404" pitchFamily="49" charset="0"/>
-              </a:rPr>
-              <a:t>etc</a:t>
-            </a:r>
-            <a:r>
-              <a:rPr lang="en-US" dirty="0" smtClean="0">
-                <a:latin typeface="Courier New" panose="02070309020205020404" pitchFamily="49" charset="0"/>
-                <a:cs typeface="Courier New" panose="02070309020205020404" pitchFamily="49" charset="0"/>
-              </a:rPr>
-              <a:t>/</a:t>
-            </a:r>
-            <a:r>
-              <a:rPr lang="en-US" dirty="0" err="1" smtClean="0">
-                <a:latin typeface="Courier New" panose="02070309020205020404" pitchFamily="49" charset="0"/>
-                <a:cs typeface="Courier New" panose="02070309020205020404" pitchFamily="49" charset="0"/>
-              </a:rPr>
-              <a:t>passwd</a:t>
-            </a:r>
-            <a:r>
-              <a:rPr lang="en-US" dirty="0" smtClean="0"/>
-              <a:t>, </a:t>
-            </a:r>
-            <a:r>
-              <a:rPr lang="en-US" dirty="0" smtClean="0">
-                <a:latin typeface="Courier New" panose="02070309020205020404" pitchFamily="49" charset="0"/>
-                <a:cs typeface="Courier New" panose="02070309020205020404" pitchFamily="49" charset="0"/>
-              </a:rPr>
-              <a:t>/</a:t>
-            </a:r>
-            <a:r>
-              <a:rPr lang="en-US" dirty="0" err="1" smtClean="0">
-                <a:latin typeface="Courier New" panose="02070309020205020404" pitchFamily="49" charset="0"/>
-                <a:cs typeface="Courier New" panose="02070309020205020404" pitchFamily="49" charset="0"/>
-              </a:rPr>
-              <a:t>etc</a:t>
-            </a:r>
-            <a:r>
-              <a:rPr lang="en-US" dirty="0" smtClean="0">
-                <a:latin typeface="Courier New" panose="02070309020205020404" pitchFamily="49" charset="0"/>
-                <a:cs typeface="Courier New" panose="02070309020205020404" pitchFamily="49" charset="0"/>
-              </a:rPr>
-              <a:t>/group</a:t>
-            </a:r>
-            <a:r>
-              <a:rPr lang="en-US" dirty="0" smtClean="0"/>
-              <a:t>, </a:t>
-            </a:r>
-            <a:r>
-              <a:rPr lang="en-US" dirty="0" smtClean="0">
-                <a:latin typeface="Courier New" panose="02070309020205020404" pitchFamily="49" charset="0"/>
-                <a:cs typeface="Courier New" panose="02070309020205020404" pitchFamily="49" charset="0"/>
-              </a:rPr>
-              <a:t>/</a:t>
-            </a:r>
-            <a:r>
-              <a:rPr lang="en-US" dirty="0" err="1" smtClean="0">
-                <a:latin typeface="Courier New" panose="02070309020205020404" pitchFamily="49" charset="0"/>
-                <a:cs typeface="Courier New" panose="02070309020205020404" pitchFamily="49" charset="0"/>
-              </a:rPr>
-              <a:t>etc</a:t>
-            </a:r>
-            <a:r>
-              <a:rPr lang="en-US" dirty="0" smtClean="0">
-                <a:latin typeface="Courier New" panose="02070309020205020404" pitchFamily="49" charset="0"/>
-                <a:cs typeface="Courier New" panose="02070309020205020404" pitchFamily="49" charset="0"/>
-              </a:rPr>
-              <a:t>/shadow</a:t>
-            </a:r>
-          </a:p>
-          <a:p>
-            <a:r>
-              <a:rPr lang="en-US" dirty="0" smtClean="0"/>
-              <a:t>Do installation via definition file, not by hand</a:t>
-            </a:r>
-          </a:p>
-          <a:p>
-            <a:pPr lvl="1"/>
-            <a:r>
-              <a:rPr lang="en-US" dirty="0" smtClean="0"/>
-              <a:t>Better reproducibility</a:t>
+              <a:t>Example definition file</a:t>
             </a:r>
             <a:endParaRPr lang="nl-BE" dirty="0"/>
           </a:p>
@@ -7088,10 +7088,1106 @@
           </a:p>
         </p:txBody>
       </p:sp>
+      <p:sp>
+        <p:nvSpPr>
+          <p:cNvPr id="5" name="TextBox 4"/>
+          <p:cNvSpPr txBox="1"/>
+          <p:nvPr/>
+        </p:nvSpPr>
+        <p:spPr>
+          <a:xfrm>
+            <a:off x="628653" y="1438644"/>
+            <a:ext cx="6628738" cy="5047536"/>
+          </a:xfrm>
+          <a:prstGeom prst="rect">
+            <a:avLst/>
+          </a:prstGeom>
+          <a:solidFill>
+            <a:schemeClr val="bg1">
+              <a:lumMod val="85000"/>
+            </a:schemeClr>
+          </a:solidFill>
+          <a:ln>
+            <a:solidFill>
+              <a:schemeClr val="tx1"/>
+            </a:solidFill>
+          </a:ln>
+        </p:spPr>
+        <p:txBody>
+          <a:bodyPr wrap="none" rtlCol="0">
+            <a:spAutoFit/>
+          </a:bodyPr>
+          <a:lstStyle/>
+          <a:p>
+            <a:r>
+              <a:rPr lang="en-US" sz="1400" dirty="0" err="1">
+                <a:latin typeface="Courier New" panose="02070309020205020404" pitchFamily="49" charset="0"/>
+                <a:cs typeface="Courier New" panose="02070309020205020404" pitchFamily="49" charset="0"/>
+              </a:rPr>
+              <a:t>BootStrap</a:t>
+            </a:r>
+            <a:r>
+              <a:rPr lang="en-US" sz="1400" dirty="0">
+                <a:latin typeface="Courier New" panose="02070309020205020404" pitchFamily="49" charset="0"/>
+                <a:cs typeface="Courier New" panose="02070309020205020404" pitchFamily="49" charset="0"/>
+              </a:rPr>
+              <a:t>: </a:t>
+            </a:r>
+            <a:r>
+              <a:rPr lang="en-US" sz="1400" dirty="0" err="1">
+                <a:latin typeface="Courier New" panose="02070309020205020404" pitchFamily="49" charset="0"/>
+                <a:cs typeface="Courier New" panose="02070309020205020404" pitchFamily="49" charset="0"/>
+              </a:rPr>
+              <a:t>debootstrap</a:t>
+            </a:r>
+            <a:endParaRPr lang="en-US" sz="1400" dirty="0">
+              <a:latin typeface="Courier New" panose="02070309020205020404" pitchFamily="49" charset="0"/>
+              <a:cs typeface="Courier New" panose="02070309020205020404" pitchFamily="49" charset="0"/>
+            </a:endParaRPr>
+          </a:p>
+          <a:p>
+            <a:r>
+              <a:rPr lang="en-US" sz="1400" dirty="0" err="1">
+                <a:latin typeface="Courier New" panose="02070309020205020404" pitchFamily="49" charset="0"/>
+                <a:cs typeface="Courier New" panose="02070309020205020404" pitchFamily="49" charset="0"/>
+              </a:rPr>
+              <a:t>OSVersion</a:t>
+            </a:r>
+            <a:r>
+              <a:rPr lang="en-US" sz="1400" dirty="0">
+                <a:latin typeface="Courier New" panose="02070309020205020404" pitchFamily="49" charset="0"/>
+                <a:cs typeface="Courier New" panose="02070309020205020404" pitchFamily="49" charset="0"/>
+              </a:rPr>
+              <a:t>: </a:t>
+            </a:r>
+            <a:r>
+              <a:rPr lang="en-US" sz="1400" dirty="0" err="1">
+                <a:latin typeface="Courier New" panose="02070309020205020404" pitchFamily="49" charset="0"/>
+                <a:cs typeface="Courier New" panose="02070309020205020404" pitchFamily="49" charset="0"/>
+              </a:rPr>
+              <a:t>xenial</a:t>
+            </a:r>
+            <a:endParaRPr lang="en-US" sz="1400" dirty="0">
+              <a:latin typeface="Courier New" panose="02070309020205020404" pitchFamily="49" charset="0"/>
+              <a:cs typeface="Courier New" panose="02070309020205020404" pitchFamily="49" charset="0"/>
+            </a:endParaRPr>
+          </a:p>
+          <a:p>
+            <a:r>
+              <a:rPr lang="en-US" sz="1400" dirty="0" err="1">
+                <a:latin typeface="Courier New" panose="02070309020205020404" pitchFamily="49" charset="0"/>
+                <a:cs typeface="Courier New" panose="02070309020205020404" pitchFamily="49" charset="0"/>
+              </a:rPr>
+              <a:t>MirrorURL</a:t>
+            </a:r>
+            <a:r>
+              <a:rPr lang="en-US" sz="1400" dirty="0">
+                <a:latin typeface="Courier New" panose="02070309020205020404" pitchFamily="49" charset="0"/>
+                <a:cs typeface="Courier New" panose="02070309020205020404" pitchFamily="49" charset="0"/>
+              </a:rPr>
+              <a:t>: http://us.archive.ubuntu.com/ubuntu/</a:t>
+            </a:r>
+          </a:p>
+          <a:p>
+            <a:endParaRPr lang="en-US" sz="1400" dirty="0">
+              <a:latin typeface="Courier New" panose="02070309020205020404" pitchFamily="49" charset="0"/>
+              <a:cs typeface="Courier New" panose="02070309020205020404" pitchFamily="49" charset="0"/>
+            </a:endParaRPr>
+          </a:p>
+          <a:p>
+            <a:r>
+              <a:rPr lang="en-US" sz="1400" dirty="0" smtClean="0">
+                <a:latin typeface="Courier New" panose="02070309020205020404" pitchFamily="49" charset="0"/>
+                <a:cs typeface="Courier New" panose="02070309020205020404" pitchFamily="49" charset="0"/>
+              </a:rPr>
+              <a:t>%</a:t>
+            </a:r>
+            <a:r>
+              <a:rPr lang="en-US" sz="1400" dirty="0">
+                <a:latin typeface="Courier New" panose="02070309020205020404" pitchFamily="49" charset="0"/>
+                <a:cs typeface="Courier New" panose="02070309020205020404" pitchFamily="49" charset="0"/>
+              </a:rPr>
+              <a:t>post</a:t>
+            </a:r>
+          </a:p>
+          <a:p>
+            <a:r>
+              <a:rPr lang="en-US" sz="1400" dirty="0">
+                <a:latin typeface="Courier New" panose="02070309020205020404" pitchFamily="49" charset="0"/>
+                <a:cs typeface="Courier New" panose="02070309020205020404" pitchFamily="49" charset="0"/>
+              </a:rPr>
+              <a:t>    </a:t>
+            </a:r>
+            <a:r>
+              <a:rPr lang="en-US" sz="1400" dirty="0" err="1">
+                <a:latin typeface="Courier New" panose="02070309020205020404" pitchFamily="49" charset="0"/>
+                <a:cs typeface="Courier New" panose="02070309020205020404" pitchFamily="49" charset="0"/>
+              </a:rPr>
+              <a:t>sed</a:t>
+            </a:r>
+            <a:r>
+              <a:rPr lang="en-US" sz="1400" dirty="0">
+                <a:latin typeface="Courier New" panose="02070309020205020404" pitchFamily="49" charset="0"/>
+                <a:cs typeface="Courier New" panose="02070309020205020404" pitchFamily="49" charset="0"/>
+              </a:rPr>
+              <a:t> -</a:t>
+            </a:r>
+            <a:r>
+              <a:rPr lang="en-US" sz="1400" dirty="0" err="1">
+                <a:latin typeface="Courier New" panose="02070309020205020404" pitchFamily="49" charset="0"/>
+                <a:cs typeface="Courier New" panose="02070309020205020404" pitchFamily="49" charset="0"/>
+              </a:rPr>
+              <a:t>i</a:t>
+            </a:r>
+            <a:r>
+              <a:rPr lang="en-US" sz="1400" dirty="0">
+                <a:latin typeface="Courier New" panose="02070309020205020404" pitchFamily="49" charset="0"/>
+                <a:cs typeface="Courier New" panose="02070309020205020404" pitchFamily="49" charset="0"/>
+              </a:rPr>
+              <a:t> 's/$/ universe/' /</a:t>
+            </a:r>
+            <a:r>
+              <a:rPr lang="en-US" sz="1400" dirty="0" err="1">
+                <a:latin typeface="Courier New" panose="02070309020205020404" pitchFamily="49" charset="0"/>
+                <a:cs typeface="Courier New" panose="02070309020205020404" pitchFamily="49" charset="0"/>
+              </a:rPr>
+              <a:t>etc</a:t>
+            </a:r>
+            <a:r>
+              <a:rPr lang="en-US" sz="1400" dirty="0">
+                <a:latin typeface="Courier New" panose="02070309020205020404" pitchFamily="49" charset="0"/>
+                <a:cs typeface="Courier New" panose="02070309020205020404" pitchFamily="49" charset="0"/>
+              </a:rPr>
+              <a:t>/apt/</a:t>
+            </a:r>
+            <a:r>
+              <a:rPr lang="en-US" sz="1400" dirty="0" err="1">
+                <a:latin typeface="Courier New" panose="02070309020205020404" pitchFamily="49" charset="0"/>
+                <a:cs typeface="Courier New" panose="02070309020205020404" pitchFamily="49" charset="0"/>
+              </a:rPr>
+              <a:t>sources.list</a:t>
+            </a:r>
+            <a:endParaRPr lang="en-US" sz="1400" dirty="0">
+              <a:latin typeface="Courier New" panose="02070309020205020404" pitchFamily="49" charset="0"/>
+              <a:cs typeface="Courier New" panose="02070309020205020404" pitchFamily="49" charset="0"/>
+            </a:endParaRPr>
+          </a:p>
+          <a:p>
+            <a:r>
+              <a:rPr lang="en-US" sz="1400" dirty="0">
+                <a:latin typeface="Courier New" panose="02070309020205020404" pitchFamily="49" charset="0"/>
+                <a:cs typeface="Courier New" panose="02070309020205020404" pitchFamily="49" charset="0"/>
+              </a:rPr>
+              <a:t>    apt-get update</a:t>
+            </a:r>
+          </a:p>
+          <a:p>
+            <a:r>
+              <a:rPr lang="en-US" sz="1400" dirty="0" smtClean="0">
+                <a:latin typeface="Courier New" panose="02070309020205020404" pitchFamily="49" charset="0"/>
+                <a:cs typeface="Courier New" panose="02070309020205020404" pitchFamily="49" charset="0"/>
+              </a:rPr>
+              <a:t>apt-get </a:t>
+            </a:r>
+            <a:r>
+              <a:rPr lang="en-US" sz="1400" dirty="0">
+                <a:latin typeface="Courier New" panose="02070309020205020404" pitchFamily="49" charset="0"/>
+                <a:cs typeface="Courier New" panose="02070309020205020404" pitchFamily="49" charset="0"/>
+              </a:rPr>
+              <a:t>-y install libmlx4-dev</a:t>
+            </a:r>
+          </a:p>
+          <a:p>
+            <a:r>
+              <a:rPr lang="en-US" sz="1400" dirty="0">
+                <a:latin typeface="Courier New" panose="02070309020205020404" pitchFamily="49" charset="0"/>
+                <a:cs typeface="Courier New" panose="02070309020205020404" pitchFamily="49" charset="0"/>
+              </a:rPr>
+              <a:t>    apt-get -y install libmlx5-dev</a:t>
+            </a:r>
+          </a:p>
+          <a:p>
+            <a:r>
+              <a:rPr lang="en-US" sz="1400" dirty="0">
+                <a:latin typeface="Courier New" panose="02070309020205020404" pitchFamily="49" charset="0"/>
+                <a:cs typeface="Courier New" panose="02070309020205020404" pitchFamily="49" charset="0"/>
+              </a:rPr>
+              <a:t>    apt-get -y install </a:t>
+            </a:r>
+            <a:r>
+              <a:rPr lang="en-US" sz="1400" dirty="0" err="1">
+                <a:latin typeface="Courier New" panose="02070309020205020404" pitchFamily="49" charset="0"/>
+                <a:cs typeface="Courier New" panose="02070309020205020404" pitchFamily="49" charset="0"/>
+              </a:rPr>
+              <a:t>libibverbs</a:t>
+            </a:r>
+            <a:r>
+              <a:rPr lang="en-US" sz="1400" dirty="0">
+                <a:latin typeface="Courier New" panose="02070309020205020404" pitchFamily="49" charset="0"/>
+                <a:cs typeface="Courier New" panose="02070309020205020404" pitchFamily="49" charset="0"/>
+              </a:rPr>
+              <a:t>-dev</a:t>
+            </a:r>
+          </a:p>
+          <a:p>
+            <a:r>
+              <a:rPr lang="en-US" sz="1400" dirty="0">
+                <a:latin typeface="Courier New" panose="02070309020205020404" pitchFamily="49" charset="0"/>
+                <a:cs typeface="Courier New" panose="02070309020205020404" pitchFamily="49" charset="0"/>
+              </a:rPr>
+              <a:t>    apt-get -y install </a:t>
+            </a:r>
+            <a:r>
+              <a:rPr lang="en-US" sz="1400" dirty="0" err="1">
+                <a:latin typeface="Courier New" panose="02070309020205020404" pitchFamily="49" charset="0"/>
+                <a:cs typeface="Courier New" panose="02070309020205020404" pitchFamily="49" charset="0"/>
+              </a:rPr>
+              <a:t>ibverbs-utils</a:t>
+            </a:r>
+            <a:endParaRPr lang="en-US" sz="1400" dirty="0">
+              <a:latin typeface="Courier New" panose="02070309020205020404" pitchFamily="49" charset="0"/>
+              <a:cs typeface="Courier New" panose="02070309020205020404" pitchFamily="49" charset="0"/>
+            </a:endParaRPr>
+          </a:p>
+          <a:p>
+            <a:r>
+              <a:rPr lang="en-US" sz="1400" dirty="0">
+                <a:latin typeface="Courier New" panose="02070309020205020404" pitchFamily="49" charset="0"/>
+                <a:cs typeface="Courier New" panose="02070309020205020404" pitchFamily="49" charset="0"/>
+              </a:rPr>
+              <a:t>    apt-get -y install </a:t>
+            </a:r>
+            <a:r>
+              <a:rPr lang="en-US" sz="1400" dirty="0" err="1">
+                <a:latin typeface="Courier New" panose="02070309020205020404" pitchFamily="49" charset="0"/>
+                <a:cs typeface="Courier New" panose="02070309020205020404" pitchFamily="49" charset="0"/>
+              </a:rPr>
+              <a:t>libopenmpi</a:t>
+            </a:r>
+            <a:r>
+              <a:rPr lang="en-US" sz="1400" dirty="0">
+                <a:latin typeface="Courier New" panose="02070309020205020404" pitchFamily="49" charset="0"/>
+                <a:cs typeface="Courier New" panose="02070309020205020404" pitchFamily="49" charset="0"/>
+              </a:rPr>
+              <a:t>-dev</a:t>
+            </a:r>
+          </a:p>
+          <a:p>
+            <a:r>
+              <a:rPr lang="en-US" sz="1400" dirty="0">
+                <a:latin typeface="Courier New" panose="02070309020205020404" pitchFamily="49" charset="0"/>
+                <a:cs typeface="Courier New" panose="02070309020205020404" pitchFamily="49" charset="0"/>
+              </a:rPr>
+              <a:t>    apt-get -y install </a:t>
+            </a:r>
+            <a:r>
+              <a:rPr lang="en-US" sz="1400" dirty="0" err="1">
+                <a:latin typeface="Courier New" panose="02070309020205020404" pitchFamily="49" charset="0"/>
+                <a:cs typeface="Courier New" panose="02070309020205020404" pitchFamily="49" charset="0"/>
+              </a:rPr>
+              <a:t>openmpi</a:t>
+            </a:r>
+            <a:r>
+              <a:rPr lang="en-US" sz="1400" dirty="0">
+                <a:latin typeface="Courier New" panose="02070309020205020404" pitchFamily="49" charset="0"/>
+                <a:cs typeface="Courier New" panose="02070309020205020404" pitchFamily="49" charset="0"/>
+              </a:rPr>
+              <a:t>-bin</a:t>
+            </a:r>
+          </a:p>
+          <a:p>
+            <a:r>
+              <a:rPr lang="en-US" sz="1400" dirty="0">
+                <a:latin typeface="Courier New" panose="02070309020205020404" pitchFamily="49" charset="0"/>
+                <a:cs typeface="Courier New" panose="02070309020205020404" pitchFamily="49" charset="0"/>
+              </a:rPr>
+              <a:t>    apt-get -y install </a:t>
+            </a:r>
+            <a:r>
+              <a:rPr lang="en-US" sz="1400" dirty="0" err="1">
+                <a:latin typeface="Courier New" panose="02070309020205020404" pitchFamily="49" charset="0"/>
+                <a:cs typeface="Courier New" panose="02070309020205020404" pitchFamily="49" charset="0"/>
+              </a:rPr>
+              <a:t>openmpi</a:t>
+            </a:r>
+            <a:r>
+              <a:rPr lang="en-US" sz="1400" dirty="0">
+                <a:latin typeface="Courier New" panose="02070309020205020404" pitchFamily="49" charset="0"/>
+                <a:cs typeface="Courier New" panose="02070309020205020404" pitchFamily="49" charset="0"/>
+              </a:rPr>
+              <a:t>-common</a:t>
+            </a:r>
+          </a:p>
+          <a:p>
+            <a:r>
+              <a:rPr lang="en-US" sz="1400" dirty="0" smtClean="0">
+                <a:latin typeface="Courier New" panose="02070309020205020404" pitchFamily="49" charset="0"/>
+                <a:cs typeface="Courier New" panose="02070309020205020404" pitchFamily="49" charset="0"/>
+              </a:rPr>
+              <a:t>    </a:t>
+            </a:r>
+            <a:r>
+              <a:rPr lang="en-US" sz="1400" dirty="0">
+                <a:latin typeface="Courier New" panose="02070309020205020404" pitchFamily="49" charset="0"/>
+                <a:cs typeface="Courier New" panose="02070309020205020404" pitchFamily="49" charset="0"/>
+              </a:rPr>
+              <a:t>apt-get -y install </a:t>
+            </a:r>
+            <a:r>
+              <a:rPr lang="en-US" sz="1400" dirty="0" smtClean="0">
+                <a:latin typeface="Courier New" panose="02070309020205020404" pitchFamily="49" charset="0"/>
+                <a:cs typeface="Courier New" panose="02070309020205020404" pitchFamily="49" charset="0"/>
+              </a:rPr>
+              <a:t>build-essential</a:t>
+            </a:r>
+            <a:br>
+              <a:rPr lang="en-US" sz="1400" dirty="0" smtClean="0">
+                <a:latin typeface="Courier New" panose="02070309020205020404" pitchFamily="49" charset="0"/>
+                <a:cs typeface="Courier New" panose="02070309020205020404" pitchFamily="49" charset="0"/>
+              </a:rPr>
+            </a:br>
+            <a:r>
+              <a:rPr lang="en-US" sz="1400" dirty="0" smtClean="0">
+                <a:latin typeface="Courier New" panose="02070309020205020404" pitchFamily="49" charset="0"/>
+                <a:cs typeface="Courier New" panose="02070309020205020404" pitchFamily="49" charset="0"/>
+              </a:rPr>
+              <a:t>    </a:t>
+            </a:r>
+            <a:r>
+              <a:rPr lang="en-US" sz="1400" dirty="0">
+                <a:latin typeface="Courier New" panose="02070309020205020404" pitchFamily="49" charset="0"/>
+                <a:cs typeface="Courier New" panose="02070309020205020404" pitchFamily="49" charset="0"/>
+              </a:rPr>
+              <a:t>apt-get -y install </a:t>
+            </a:r>
+            <a:r>
+              <a:rPr lang="en-US" sz="1400" dirty="0" err="1">
+                <a:latin typeface="Courier New" panose="02070309020205020404" pitchFamily="49" charset="0"/>
+                <a:cs typeface="Courier New" panose="02070309020205020404" pitchFamily="49" charset="0"/>
+              </a:rPr>
+              <a:t>git</a:t>
+            </a:r>
+            <a:endParaRPr lang="en-US" sz="1400" dirty="0">
+              <a:latin typeface="Courier New" panose="02070309020205020404" pitchFamily="49" charset="0"/>
+              <a:cs typeface="Courier New" panose="02070309020205020404" pitchFamily="49" charset="0"/>
+            </a:endParaRPr>
+          </a:p>
+          <a:p>
+            <a:r>
+              <a:rPr lang="en-US" sz="1400" dirty="0">
+                <a:latin typeface="Courier New" panose="02070309020205020404" pitchFamily="49" charset="0"/>
+                <a:cs typeface="Courier New" panose="02070309020205020404" pitchFamily="49" charset="0"/>
+              </a:rPr>
+              <a:t>    cd /</a:t>
+            </a:r>
+            <a:r>
+              <a:rPr lang="en-US" sz="1400" dirty="0" err="1">
+                <a:latin typeface="Courier New" panose="02070309020205020404" pitchFamily="49" charset="0"/>
+                <a:cs typeface="Courier New" panose="02070309020205020404" pitchFamily="49" charset="0"/>
+              </a:rPr>
+              <a:t>tmp</a:t>
+            </a:r>
+            <a:endParaRPr lang="en-US" sz="1400" dirty="0">
+              <a:latin typeface="Courier New" panose="02070309020205020404" pitchFamily="49" charset="0"/>
+              <a:cs typeface="Courier New" panose="02070309020205020404" pitchFamily="49" charset="0"/>
+            </a:endParaRPr>
+          </a:p>
+          <a:p>
+            <a:r>
+              <a:rPr lang="en-US" sz="1400" dirty="0">
+                <a:latin typeface="Courier New" panose="02070309020205020404" pitchFamily="49" charset="0"/>
+                <a:cs typeface="Courier New" panose="02070309020205020404" pitchFamily="49" charset="0"/>
+              </a:rPr>
+              <a:t>    </a:t>
+            </a:r>
+            <a:r>
+              <a:rPr lang="en-US" sz="1400" dirty="0" err="1">
+                <a:latin typeface="Courier New" panose="02070309020205020404" pitchFamily="49" charset="0"/>
+                <a:cs typeface="Courier New" panose="02070309020205020404" pitchFamily="49" charset="0"/>
+              </a:rPr>
+              <a:t>git</a:t>
+            </a:r>
+            <a:r>
+              <a:rPr lang="en-US" sz="1400" dirty="0">
+                <a:latin typeface="Courier New" panose="02070309020205020404" pitchFamily="49" charset="0"/>
+                <a:cs typeface="Courier New" panose="02070309020205020404" pitchFamily="49" charset="0"/>
+              </a:rPr>
+              <a:t> clone https://github.com/gjbex/training-material.git</a:t>
+            </a:r>
+          </a:p>
+          <a:p>
+            <a:r>
+              <a:rPr lang="en-US" sz="1400" dirty="0">
+                <a:latin typeface="Courier New" panose="02070309020205020404" pitchFamily="49" charset="0"/>
+                <a:cs typeface="Courier New" panose="02070309020205020404" pitchFamily="49" charset="0"/>
+              </a:rPr>
+              <a:t>    cd training-material/</a:t>
+            </a:r>
+            <a:r>
+              <a:rPr lang="en-US" sz="1400" dirty="0" err="1">
+                <a:latin typeface="Courier New" panose="02070309020205020404" pitchFamily="49" charset="0"/>
+                <a:cs typeface="Courier New" panose="02070309020205020404" pitchFamily="49" charset="0"/>
+              </a:rPr>
+              <a:t>Mpi</a:t>
+            </a:r>
+            <a:r>
+              <a:rPr lang="en-US" sz="1400" dirty="0">
+                <a:latin typeface="Courier New" panose="02070309020205020404" pitchFamily="49" charset="0"/>
+                <a:cs typeface="Courier New" panose="02070309020205020404" pitchFamily="49" charset="0"/>
+              </a:rPr>
+              <a:t>/</a:t>
+            </a:r>
+            <a:r>
+              <a:rPr lang="en-US" sz="1400" dirty="0" err="1">
+                <a:latin typeface="Courier New" panose="02070309020205020404" pitchFamily="49" charset="0"/>
+                <a:cs typeface="Courier New" panose="02070309020205020404" pitchFamily="49" charset="0"/>
+              </a:rPr>
+              <a:t>HybridPi</a:t>
+            </a:r>
+            <a:r>
+              <a:rPr lang="en-US" sz="1400" dirty="0">
+                <a:latin typeface="Courier New" panose="02070309020205020404" pitchFamily="49" charset="0"/>
+                <a:cs typeface="Courier New" panose="02070309020205020404" pitchFamily="49" charset="0"/>
+              </a:rPr>
+              <a:t>/</a:t>
+            </a:r>
+          </a:p>
+          <a:p>
+            <a:r>
+              <a:rPr lang="en-US" sz="1400" dirty="0">
+                <a:latin typeface="Courier New" panose="02070309020205020404" pitchFamily="49" charset="0"/>
+                <a:cs typeface="Courier New" panose="02070309020205020404" pitchFamily="49" charset="0"/>
+              </a:rPr>
+              <a:t>    make clean pi_mpi.exe</a:t>
+            </a:r>
+          </a:p>
+          <a:p>
+            <a:r>
+              <a:rPr lang="en-US" sz="1400" dirty="0">
+                <a:latin typeface="Courier New" panose="02070309020205020404" pitchFamily="49" charset="0"/>
+                <a:cs typeface="Courier New" panose="02070309020205020404" pitchFamily="49" charset="0"/>
+              </a:rPr>
+              <a:t>    </a:t>
+            </a:r>
+            <a:r>
+              <a:rPr lang="en-US" sz="1400" dirty="0" err="1">
+                <a:latin typeface="Courier New" panose="02070309020205020404" pitchFamily="49" charset="0"/>
+                <a:cs typeface="Courier New" panose="02070309020205020404" pitchFamily="49" charset="0"/>
+              </a:rPr>
+              <a:t>cp</a:t>
+            </a:r>
+            <a:r>
+              <a:rPr lang="en-US" sz="1400" dirty="0">
+                <a:latin typeface="Courier New" panose="02070309020205020404" pitchFamily="49" charset="0"/>
+                <a:cs typeface="Courier New" panose="02070309020205020404" pitchFamily="49" charset="0"/>
+              </a:rPr>
+              <a:t> pi_mpi.exe /</a:t>
+            </a:r>
+            <a:r>
+              <a:rPr lang="en-US" sz="1400" dirty="0" err="1">
+                <a:latin typeface="Courier New" panose="02070309020205020404" pitchFamily="49" charset="0"/>
+                <a:cs typeface="Courier New" panose="02070309020205020404" pitchFamily="49" charset="0"/>
+              </a:rPr>
+              <a:t>usr</a:t>
+            </a:r>
+            <a:r>
+              <a:rPr lang="en-US" sz="1400" dirty="0">
+                <a:latin typeface="Courier New" panose="02070309020205020404" pitchFamily="49" charset="0"/>
+                <a:cs typeface="Courier New" panose="02070309020205020404" pitchFamily="49" charset="0"/>
+              </a:rPr>
+              <a:t>/bin/</a:t>
+            </a:r>
+          </a:p>
+          <a:p>
+            <a:r>
+              <a:rPr lang="en-US" sz="1400" dirty="0">
+                <a:latin typeface="Courier New" panose="02070309020205020404" pitchFamily="49" charset="0"/>
+                <a:cs typeface="Courier New" panose="02070309020205020404" pitchFamily="49" charset="0"/>
+              </a:rPr>
+              <a:t>    cd /</a:t>
+            </a:r>
+            <a:r>
+              <a:rPr lang="en-US" sz="1400" dirty="0" err="1">
+                <a:latin typeface="Courier New" panose="02070309020205020404" pitchFamily="49" charset="0"/>
+                <a:cs typeface="Courier New" panose="02070309020205020404" pitchFamily="49" charset="0"/>
+              </a:rPr>
+              <a:t>tmp</a:t>
+            </a:r>
+            <a:endParaRPr lang="en-US" sz="1400" dirty="0">
+              <a:latin typeface="Courier New" panose="02070309020205020404" pitchFamily="49" charset="0"/>
+              <a:cs typeface="Courier New" panose="02070309020205020404" pitchFamily="49" charset="0"/>
+            </a:endParaRPr>
+          </a:p>
+          <a:p>
+            <a:r>
+              <a:rPr lang="en-US" sz="1400" dirty="0">
+                <a:latin typeface="Courier New" panose="02070309020205020404" pitchFamily="49" charset="0"/>
+                <a:cs typeface="Courier New" panose="02070309020205020404" pitchFamily="49" charset="0"/>
+              </a:rPr>
+              <a:t>    </a:t>
+            </a:r>
+            <a:r>
+              <a:rPr lang="en-US" sz="1400" dirty="0" err="1">
+                <a:latin typeface="Courier New" panose="02070309020205020404" pitchFamily="49" charset="0"/>
+                <a:cs typeface="Courier New" panose="02070309020205020404" pitchFamily="49" charset="0"/>
+              </a:rPr>
+              <a:t>rm</a:t>
+            </a:r>
+            <a:r>
+              <a:rPr lang="en-US" sz="1400" dirty="0">
+                <a:latin typeface="Courier New" panose="02070309020205020404" pitchFamily="49" charset="0"/>
+                <a:cs typeface="Courier New" panose="02070309020205020404" pitchFamily="49" charset="0"/>
+              </a:rPr>
+              <a:t> -</a:t>
+            </a:r>
+            <a:r>
+              <a:rPr lang="en-US" sz="1400" dirty="0" err="1">
+                <a:latin typeface="Courier New" panose="02070309020205020404" pitchFamily="49" charset="0"/>
+                <a:cs typeface="Courier New" panose="02070309020205020404" pitchFamily="49" charset="0"/>
+              </a:rPr>
+              <a:t>rf</a:t>
+            </a:r>
+            <a:r>
+              <a:rPr lang="en-US" sz="1400" dirty="0">
+                <a:latin typeface="Courier New" panose="02070309020205020404" pitchFamily="49" charset="0"/>
+                <a:cs typeface="Courier New" panose="02070309020205020404" pitchFamily="49" charset="0"/>
+              </a:rPr>
+              <a:t> training-material/</a:t>
+            </a:r>
+          </a:p>
+        </p:txBody>
+      </p:sp>
+      <p:grpSp>
+        <p:nvGrpSpPr>
+          <p:cNvPr id="13" name="Group 12"/>
+          <p:cNvGrpSpPr/>
+          <p:nvPr/>
+        </p:nvGrpSpPr>
+        <p:grpSpPr>
+          <a:xfrm>
+            <a:off x="5274128" y="2535611"/>
+            <a:ext cx="2780720" cy="1293443"/>
+            <a:chOff x="4923064" y="2764207"/>
+            <a:chExt cx="2780720" cy="1293443"/>
+          </a:xfrm>
+        </p:grpSpPr>
+        <p:sp>
+          <p:nvSpPr>
+            <p:cNvPr id="6" name="Right Brace 5"/>
+            <p:cNvSpPr/>
+            <p:nvPr/>
+          </p:nvSpPr>
+          <p:spPr>
+            <a:xfrm>
+              <a:off x="4923064" y="3241221"/>
+              <a:ext cx="122465" cy="816429"/>
+            </a:xfrm>
+            <a:prstGeom prst="rightBrace">
+              <a:avLst/>
+            </a:prstGeom>
+            <a:ln w="19050">
+              <a:solidFill>
+                <a:schemeClr val="tx1"/>
+              </a:solidFill>
+            </a:ln>
+          </p:spPr>
+          <p:style>
+            <a:lnRef idx="1">
+              <a:schemeClr val="accent1"/>
+            </a:lnRef>
+            <a:fillRef idx="0">
+              <a:schemeClr val="accent1"/>
+            </a:fillRef>
+            <a:effectRef idx="0">
+              <a:schemeClr val="accent1"/>
+            </a:effectRef>
+            <a:fontRef idx="minor">
+              <a:schemeClr val="tx1"/>
+            </a:fontRef>
+          </p:style>
+          <p:txBody>
+            <a:bodyPr rtlCol="0" anchor="ctr"/>
+            <a:lstStyle/>
+            <a:p>
+              <a:pPr algn="ctr"/>
+              <a:endParaRPr lang="nl-BE"/>
+            </a:p>
+          </p:txBody>
+        </p:sp>
+        <p:cxnSp>
+          <p:nvCxnSpPr>
+            <p:cNvPr id="8" name="Straight Connector 7"/>
+            <p:cNvCxnSpPr>
+              <a:endCxn id="11" idx="1"/>
+            </p:cNvCxnSpPr>
+            <p:nvPr/>
+          </p:nvCxnSpPr>
+          <p:spPr>
+            <a:xfrm flipV="1">
+              <a:off x="5110843" y="3087373"/>
+              <a:ext cx="791935" cy="562063"/>
+            </a:xfrm>
+            <a:prstGeom prst="line">
+              <a:avLst/>
+            </a:prstGeom>
+            <a:ln w="12700">
+              <a:solidFill>
+                <a:schemeClr val="tx1"/>
+              </a:solidFill>
+            </a:ln>
+          </p:spPr>
+          <p:style>
+            <a:lnRef idx="1">
+              <a:schemeClr val="accent1"/>
+            </a:lnRef>
+            <a:fillRef idx="0">
+              <a:schemeClr val="accent1"/>
+            </a:fillRef>
+            <a:effectRef idx="0">
+              <a:schemeClr val="accent1"/>
+            </a:effectRef>
+            <a:fontRef idx="minor">
+              <a:schemeClr val="tx1"/>
+            </a:fontRef>
+          </p:style>
+        </p:cxnSp>
+        <p:sp>
+          <p:nvSpPr>
+            <p:cNvPr id="11" name="TextBox 10"/>
+            <p:cNvSpPr txBox="1"/>
+            <p:nvPr/>
+          </p:nvSpPr>
+          <p:spPr>
+            <a:xfrm>
+              <a:off x="5902778" y="2764207"/>
+              <a:ext cx="1801006" cy="646331"/>
+            </a:xfrm>
+            <a:prstGeom prst="rect">
+              <a:avLst/>
+            </a:prstGeom>
+            <a:solidFill>
+              <a:schemeClr val="bg1"/>
+            </a:solidFill>
+            <a:ln>
+              <a:solidFill>
+                <a:schemeClr val="tx1"/>
+              </a:solidFill>
+            </a:ln>
+          </p:spPr>
+          <p:txBody>
+            <a:bodyPr wrap="none" rtlCol="0">
+              <a:spAutoFit/>
+            </a:bodyPr>
+            <a:lstStyle/>
+            <a:p>
+              <a:r>
+                <a:rPr lang="en-US" dirty="0" err="1" smtClean="0"/>
+                <a:t>Mellanox</a:t>
+              </a:r>
+              <a:r>
+                <a:rPr lang="en-US" dirty="0" smtClean="0"/>
+                <a:t> drivers,</a:t>
+              </a:r>
+              <a:br>
+                <a:rPr lang="en-US" dirty="0" smtClean="0"/>
+              </a:br>
+              <a:r>
+                <a:rPr lang="en-US" dirty="0" smtClean="0"/>
+                <a:t>IB verbs</a:t>
+              </a:r>
+              <a:endParaRPr lang="nl-BE" dirty="0"/>
+            </a:p>
+          </p:txBody>
+        </p:sp>
+      </p:grpSp>
+      <p:grpSp>
+        <p:nvGrpSpPr>
+          <p:cNvPr id="14" name="Group 13"/>
+          <p:cNvGrpSpPr/>
+          <p:nvPr/>
+        </p:nvGrpSpPr>
+        <p:grpSpPr>
+          <a:xfrm>
+            <a:off x="5274128" y="3396344"/>
+            <a:ext cx="2763792" cy="987879"/>
+            <a:chOff x="4923064" y="2764207"/>
+            <a:chExt cx="2763792" cy="987879"/>
+          </a:xfrm>
+        </p:grpSpPr>
+        <p:sp>
+          <p:nvSpPr>
+            <p:cNvPr id="15" name="Right Brace 14"/>
+            <p:cNvSpPr/>
+            <p:nvPr/>
+          </p:nvSpPr>
+          <p:spPr>
+            <a:xfrm>
+              <a:off x="4923064" y="3241221"/>
+              <a:ext cx="122465" cy="510865"/>
+            </a:xfrm>
+            <a:prstGeom prst="rightBrace">
+              <a:avLst/>
+            </a:prstGeom>
+            <a:ln w="19050">
+              <a:solidFill>
+                <a:schemeClr val="tx1"/>
+              </a:solidFill>
+            </a:ln>
+          </p:spPr>
+          <p:style>
+            <a:lnRef idx="1">
+              <a:schemeClr val="accent1"/>
+            </a:lnRef>
+            <a:fillRef idx="0">
+              <a:schemeClr val="accent1"/>
+            </a:fillRef>
+            <a:effectRef idx="0">
+              <a:schemeClr val="accent1"/>
+            </a:effectRef>
+            <a:fontRef idx="minor">
+              <a:schemeClr val="tx1"/>
+            </a:fontRef>
+          </p:style>
+          <p:txBody>
+            <a:bodyPr rtlCol="0" anchor="ctr"/>
+            <a:lstStyle/>
+            <a:p>
+              <a:pPr algn="ctr"/>
+              <a:endParaRPr lang="nl-BE"/>
+            </a:p>
+          </p:txBody>
+        </p:sp>
+        <p:cxnSp>
+          <p:nvCxnSpPr>
+            <p:cNvPr id="16" name="Straight Connector 15"/>
+            <p:cNvCxnSpPr>
+              <a:endCxn id="17" idx="1"/>
+            </p:cNvCxnSpPr>
+            <p:nvPr/>
+          </p:nvCxnSpPr>
+          <p:spPr>
+            <a:xfrm flipV="1">
+              <a:off x="5110843" y="3087373"/>
+              <a:ext cx="791935" cy="403456"/>
+            </a:xfrm>
+            <a:prstGeom prst="line">
+              <a:avLst/>
+            </a:prstGeom>
+            <a:ln w="12700">
+              <a:solidFill>
+                <a:schemeClr val="tx1"/>
+              </a:solidFill>
+            </a:ln>
+          </p:spPr>
+          <p:style>
+            <a:lnRef idx="1">
+              <a:schemeClr val="accent1"/>
+            </a:lnRef>
+            <a:fillRef idx="0">
+              <a:schemeClr val="accent1"/>
+            </a:fillRef>
+            <a:effectRef idx="0">
+              <a:schemeClr val="accent1"/>
+            </a:effectRef>
+            <a:fontRef idx="minor">
+              <a:schemeClr val="tx1"/>
+            </a:fontRef>
+          </p:style>
+        </p:cxnSp>
+        <p:sp>
+          <p:nvSpPr>
+            <p:cNvPr id="17" name="TextBox 16"/>
+            <p:cNvSpPr txBox="1"/>
+            <p:nvPr/>
+          </p:nvSpPr>
+          <p:spPr>
+            <a:xfrm>
+              <a:off x="5902778" y="2764207"/>
+              <a:ext cx="1784078" cy="646331"/>
+            </a:xfrm>
+            <a:prstGeom prst="rect">
+              <a:avLst/>
+            </a:prstGeom>
+            <a:solidFill>
+              <a:schemeClr val="bg1"/>
+            </a:solidFill>
+            <a:ln>
+              <a:solidFill>
+                <a:schemeClr val="tx1"/>
+              </a:solidFill>
+            </a:ln>
+          </p:spPr>
+          <p:txBody>
+            <a:bodyPr wrap="none" rtlCol="0">
+              <a:spAutoFit/>
+            </a:bodyPr>
+            <a:lstStyle/>
+            <a:p>
+              <a:r>
+                <a:rPr lang="en-US" dirty="0" err="1" smtClean="0"/>
+                <a:t>OpemMPI</a:t>
+              </a:r>
+              <a:r>
+                <a:rPr lang="en-US" dirty="0" smtClean="0"/>
+                <a:t> library</a:t>
+              </a:r>
+              <a:br>
+                <a:rPr lang="en-US" dirty="0" smtClean="0"/>
+              </a:br>
+              <a:r>
+                <a:rPr lang="en-US" dirty="0" smtClean="0"/>
+                <a:t>and tools</a:t>
+              </a:r>
+              <a:endParaRPr lang="nl-BE" dirty="0"/>
+            </a:p>
+          </p:txBody>
+        </p:sp>
+      </p:grpSp>
+      <p:grpSp>
+        <p:nvGrpSpPr>
+          <p:cNvPr id="21" name="Group 20"/>
+          <p:cNvGrpSpPr/>
+          <p:nvPr/>
+        </p:nvGrpSpPr>
+        <p:grpSpPr>
+          <a:xfrm>
+            <a:off x="963386" y="4898572"/>
+            <a:ext cx="6294005" cy="1563116"/>
+            <a:chOff x="963386" y="4898572"/>
+            <a:chExt cx="6294005" cy="1563116"/>
+          </a:xfrm>
+        </p:grpSpPr>
+        <p:sp>
+          <p:nvSpPr>
+            <p:cNvPr id="19" name="Rounded Rectangle 18"/>
+            <p:cNvSpPr/>
+            <p:nvPr/>
+          </p:nvSpPr>
+          <p:spPr>
+            <a:xfrm>
+              <a:off x="963386" y="4898572"/>
+              <a:ext cx="6294005" cy="1563116"/>
+            </a:xfrm>
+            <a:prstGeom prst="roundRect">
+              <a:avLst/>
+            </a:prstGeom>
+            <a:solidFill>
+              <a:srgbClr val="00B050">
+                <a:alpha val="21176"/>
+              </a:srgbClr>
+            </a:solidFill>
+            <a:ln>
+              <a:solidFill>
+                <a:srgbClr val="00B050"/>
+              </a:solidFill>
+            </a:ln>
+          </p:spPr>
+          <p:style>
+            <a:lnRef idx="2">
+              <a:schemeClr val="accent1">
+                <a:shade val="50000"/>
+              </a:schemeClr>
+            </a:lnRef>
+            <a:fillRef idx="1">
+              <a:schemeClr val="accent1"/>
+            </a:fillRef>
+            <a:effectRef idx="0">
+              <a:schemeClr val="accent1"/>
+            </a:effectRef>
+            <a:fontRef idx="minor">
+              <a:schemeClr val="lt1"/>
+            </a:fontRef>
+          </p:style>
+          <p:txBody>
+            <a:bodyPr rtlCol="0" anchor="ctr"/>
+            <a:lstStyle/>
+            <a:p>
+              <a:pPr algn="ctr"/>
+              <a:endParaRPr lang="nl-BE" dirty="0"/>
+            </a:p>
+          </p:txBody>
+        </p:sp>
+        <p:sp>
+          <p:nvSpPr>
+            <p:cNvPr id="20" name="TextBox 19"/>
+            <p:cNvSpPr txBox="1"/>
+            <p:nvPr/>
+          </p:nvSpPr>
+          <p:spPr>
+            <a:xfrm>
+              <a:off x="4914900" y="5647313"/>
+              <a:ext cx="2075568" cy="646331"/>
+            </a:xfrm>
+            <a:prstGeom prst="rect">
+              <a:avLst/>
+            </a:prstGeom>
+            <a:solidFill>
+              <a:schemeClr val="bg1"/>
+            </a:solidFill>
+            <a:ln>
+              <a:solidFill>
+                <a:schemeClr val="tx1"/>
+              </a:solidFill>
+            </a:ln>
+          </p:spPr>
+          <p:txBody>
+            <a:bodyPr wrap="none" rtlCol="0">
+              <a:spAutoFit/>
+            </a:bodyPr>
+            <a:lstStyle/>
+            <a:p>
+              <a:r>
+                <a:rPr lang="en-US" dirty="0" smtClean="0"/>
+                <a:t>Download, build,</a:t>
+              </a:r>
+              <a:br>
+                <a:rPr lang="en-US" dirty="0" smtClean="0"/>
+              </a:br>
+              <a:r>
+                <a:rPr lang="en-US" dirty="0" smtClean="0"/>
+                <a:t>install own software</a:t>
+              </a:r>
+              <a:endParaRPr lang="nl-BE" dirty="0"/>
+            </a:p>
+          </p:txBody>
+        </p:sp>
+      </p:grpSp>
+      <p:grpSp>
+        <p:nvGrpSpPr>
+          <p:cNvPr id="22" name="Group 21"/>
+          <p:cNvGrpSpPr/>
+          <p:nvPr/>
+        </p:nvGrpSpPr>
+        <p:grpSpPr>
+          <a:xfrm>
+            <a:off x="5274128" y="4240691"/>
+            <a:ext cx="2780720" cy="595175"/>
+            <a:chOff x="4923064" y="3041789"/>
+            <a:chExt cx="2780720" cy="595175"/>
+          </a:xfrm>
+        </p:grpSpPr>
+        <p:sp>
+          <p:nvSpPr>
+            <p:cNvPr id="23" name="Right Brace 22"/>
+            <p:cNvSpPr/>
+            <p:nvPr/>
+          </p:nvSpPr>
+          <p:spPr>
+            <a:xfrm>
+              <a:off x="4923064" y="3241222"/>
+              <a:ext cx="122465" cy="395742"/>
+            </a:xfrm>
+            <a:prstGeom prst="rightBrace">
+              <a:avLst/>
+            </a:prstGeom>
+            <a:ln w="19050">
+              <a:solidFill>
+                <a:schemeClr val="tx1"/>
+              </a:solidFill>
+            </a:ln>
+          </p:spPr>
+          <p:style>
+            <a:lnRef idx="1">
+              <a:schemeClr val="accent1"/>
+            </a:lnRef>
+            <a:fillRef idx="0">
+              <a:schemeClr val="accent1"/>
+            </a:fillRef>
+            <a:effectRef idx="0">
+              <a:schemeClr val="accent1"/>
+            </a:effectRef>
+            <a:fontRef idx="minor">
+              <a:schemeClr val="tx1"/>
+            </a:fontRef>
+          </p:style>
+          <p:txBody>
+            <a:bodyPr rtlCol="0" anchor="ctr"/>
+            <a:lstStyle/>
+            <a:p>
+              <a:pPr algn="ctr"/>
+              <a:endParaRPr lang="nl-BE"/>
+            </a:p>
+          </p:txBody>
+        </p:sp>
+        <p:cxnSp>
+          <p:nvCxnSpPr>
+            <p:cNvPr id="24" name="Straight Connector 23"/>
+            <p:cNvCxnSpPr>
+              <a:endCxn id="25" idx="1"/>
+            </p:cNvCxnSpPr>
+            <p:nvPr/>
+          </p:nvCxnSpPr>
+          <p:spPr>
+            <a:xfrm flipV="1">
+              <a:off x="5110843" y="3226455"/>
+              <a:ext cx="791935" cy="211958"/>
+            </a:xfrm>
+            <a:prstGeom prst="line">
+              <a:avLst/>
+            </a:prstGeom>
+            <a:ln w="12700">
+              <a:solidFill>
+                <a:schemeClr val="tx1"/>
+              </a:solidFill>
+            </a:ln>
+          </p:spPr>
+          <p:style>
+            <a:lnRef idx="1">
+              <a:schemeClr val="accent1"/>
+            </a:lnRef>
+            <a:fillRef idx="0">
+              <a:schemeClr val="accent1"/>
+            </a:fillRef>
+            <a:effectRef idx="0">
+              <a:schemeClr val="accent1"/>
+            </a:effectRef>
+            <a:fontRef idx="minor">
+              <a:schemeClr val="tx1"/>
+            </a:fontRef>
+          </p:style>
+        </p:cxnSp>
+        <p:sp>
+          <p:nvSpPr>
+            <p:cNvPr id="25" name="TextBox 24"/>
+            <p:cNvSpPr txBox="1"/>
+            <p:nvPr/>
+          </p:nvSpPr>
+          <p:spPr>
+            <a:xfrm>
+              <a:off x="5902778" y="3041789"/>
+              <a:ext cx="1801006" cy="369332"/>
+            </a:xfrm>
+            <a:prstGeom prst="rect">
+              <a:avLst/>
+            </a:prstGeom>
+            <a:solidFill>
+              <a:schemeClr val="bg1"/>
+            </a:solidFill>
+            <a:ln>
+              <a:solidFill>
+                <a:schemeClr val="tx1"/>
+              </a:solidFill>
+            </a:ln>
+          </p:spPr>
+          <p:txBody>
+            <a:bodyPr wrap="square" rtlCol="0">
+              <a:spAutoFit/>
+            </a:bodyPr>
+            <a:lstStyle/>
+            <a:p>
+              <a:r>
+                <a:rPr lang="en-US" dirty="0" smtClean="0"/>
+                <a:t>Build tools</a:t>
+              </a:r>
+              <a:endParaRPr lang="nl-BE" dirty="0"/>
+            </a:p>
+          </p:txBody>
+        </p:sp>
+      </p:grpSp>
     </p:spTree>
     <p:extLst>
       <p:ext uri="{BB962C8B-B14F-4D97-AF65-F5344CB8AC3E}">
-        <p14:creationId xmlns:p14="http://schemas.microsoft.com/office/powerpoint/2010/main" val="1728430184"/>
+        <p14:creationId xmlns:p14="http://schemas.microsoft.com/office/powerpoint/2010/main" val="3166880194"/>
       </p:ext>
     </p:extLst>
   </p:cSld>
@@ -7135,6 +8231,815 @@
           <a:p>
             <a:r>
               <a:rPr lang="en-US" dirty="0" smtClean="0"/>
+              <a:t>Running MPI application</a:t>
+            </a:r>
+            <a:endParaRPr lang="nl-BE" dirty="0"/>
+          </a:p>
+        </p:txBody>
+      </p:sp>
+      <p:sp>
+        <p:nvSpPr>
+          <p:cNvPr id="5" name="Content Placeholder 4"/>
+          <p:cNvSpPr>
+            <a:spLocks noGrp="1"/>
+          </p:cNvSpPr>
+          <p:nvPr>
+            <p:ph idx="1"/>
+          </p:nvPr>
+        </p:nvSpPr>
+        <p:spPr/>
+        <p:txBody>
+          <a:bodyPr/>
+          <a:lstStyle/>
+          <a:p>
+            <a:r>
+              <a:rPr lang="en-US" dirty="0" smtClean="0"/>
+              <a:t>PBS job script</a:t>
+            </a:r>
+            <a:endParaRPr lang="nl-BE" dirty="0"/>
+          </a:p>
+        </p:txBody>
+      </p:sp>
+      <p:sp>
+        <p:nvSpPr>
+          <p:cNvPr id="3" name="Slide Number Placeholder 2"/>
+          <p:cNvSpPr>
+            <a:spLocks noGrp="1"/>
+          </p:cNvSpPr>
+          <p:nvPr>
+            <p:ph type="sldNum" sz="quarter" idx="12"/>
+          </p:nvPr>
+        </p:nvSpPr>
+        <p:spPr/>
+        <p:txBody>
+          <a:bodyPr/>
+          <a:lstStyle/>
+          <a:p>
+            <a:fld id="{AEFF399F-E3B5-4890-BC79-9BC8D4DF3F2D}" type="slidenum">
+              <a:rPr lang="nl-BE" smtClean="0"/>
+              <a:t>22</a:t>
+            </a:fld>
+            <a:endParaRPr lang="nl-BE"/>
+          </a:p>
+        </p:txBody>
+      </p:sp>
+      <p:sp>
+        <p:nvSpPr>
+          <p:cNvPr id="4" name="TextBox 3"/>
+          <p:cNvSpPr txBox="1"/>
+          <p:nvPr/>
+        </p:nvSpPr>
+        <p:spPr>
+          <a:xfrm>
+            <a:off x="293917" y="2402029"/>
+            <a:ext cx="8456161" cy="2585323"/>
+          </a:xfrm>
+          <a:prstGeom prst="rect">
+            <a:avLst/>
+          </a:prstGeom>
+          <a:solidFill>
+            <a:schemeClr val="bg1">
+              <a:lumMod val="85000"/>
+            </a:schemeClr>
+          </a:solidFill>
+          <a:ln>
+            <a:solidFill>
+              <a:schemeClr val="tx1"/>
+            </a:solidFill>
+          </a:ln>
+        </p:spPr>
+        <p:txBody>
+          <a:bodyPr wrap="none" rtlCol="0">
+            <a:spAutoFit/>
+          </a:bodyPr>
+          <a:lstStyle/>
+          <a:p>
+            <a:r>
+              <a:rPr lang="en-US" dirty="0" smtClean="0">
+                <a:latin typeface="Courier New" panose="02070309020205020404" pitchFamily="49" charset="0"/>
+                <a:cs typeface="Courier New" panose="02070309020205020404" pitchFamily="49" charset="0"/>
+              </a:rPr>
+              <a:t>#!/bin/bash -l</a:t>
+            </a:r>
+            <a:endParaRPr lang="en-US" dirty="0">
+              <a:latin typeface="Courier New" panose="02070309020205020404" pitchFamily="49" charset="0"/>
+              <a:cs typeface="Courier New" panose="02070309020205020404" pitchFamily="49" charset="0"/>
+            </a:endParaRPr>
+          </a:p>
+          <a:p>
+            <a:r>
+              <a:rPr lang="en-US" dirty="0">
+                <a:latin typeface="Courier New" panose="02070309020205020404" pitchFamily="49" charset="0"/>
+                <a:cs typeface="Courier New" panose="02070309020205020404" pitchFamily="49" charset="0"/>
+              </a:rPr>
+              <a:t>#PBS -l nodes=2:ppn=28</a:t>
+            </a:r>
+          </a:p>
+          <a:p>
+            <a:r>
+              <a:rPr lang="en-US" dirty="0">
+                <a:latin typeface="Courier New" panose="02070309020205020404" pitchFamily="49" charset="0"/>
+                <a:cs typeface="Courier New" panose="02070309020205020404" pitchFamily="49" charset="0"/>
+              </a:rPr>
+              <a:t>#PBS -l </a:t>
+            </a:r>
+            <a:r>
+              <a:rPr lang="en-US" dirty="0" err="1">
+                <a:latin typeface="Courier New" panose="02070309020205020404" pitchFamily="49" charset="0"/>
+                <a:cs typeface="Courier New" panose="02070309020205020404" pitchFamily="49" charset="0"/>
+              </a:rPr>
+              <a:t>walltime</a:t>
+            </a:r>
+            <a:r>
+              <a:rPr lang="en-US" dirty="0">
+                <a:latin typeface="Courier New" panose="02070309020205020404" pitchFamily="49" charset="0"/>
+                <a:cs typeface="Courier New" panose="02070309020205020404" pitchFamily="49" charset="0"/>
+              </a:rPr>
+              <a:t>=00:05:00</a:t>
+            </a:r>
+          </a:p>
+          <a:p>
+            <a:endParaRPr lang="en-US" dirty="0">
+              <a:latin typeface="Courier New" panose="02070309020205020404" pitchFamily="49" charset="0"/>
+              <a:cs typeface="Courier New" panose="02070309020205020404" pitchFamily="49" charset="0"/>
+            </a:endParaRPr>
+          </a:p>
+          <a:p>
+            <a:r>
+              <a:rPr lang="en-US" dirty="0">
+                <a:latin typeface="Courier New" panose="02070309020205020404" pitchFamily="49" charset="0"/>
+                <a:cs typeface="Courier New" panose="02070309020205020404" pitchFamily="49" charset="0"/>
+              </a:rPr>
+              <a:t>cd $PBS_O_WORKDIR</a:t>
+            </a:r>
+          </a:p>
+          <a:p>
+            <a:r>
+              <a:rPr lang="en-US" dirty="0" smtClean="0">
+                <a:latin typeface="Courier New" panose="02070309020205020404" pitchFamily="49" charset="0"/>
+                <a:cs typeface="Courier New" panose="02070309020205020404" pitchFamily="49" charset="0"/>
+              </a:rPr>
+              <a:t>module </a:t>
+            </a:r>
+            <a:r>
+              <a:rPr lang="en-US" dirty="0">
+                <a:latin typeface="Courier New" panose="02070309020205020404" pitchFamily="49" charset="0"/>
+                <a:cs typeface="Courier New" panose="02070309020205020404" pitchFamily="49" charset="0"/>
+              </a:rPr>
+              <a:t>load </a:t>
+            </a:r>
+            <a:r>
+              <a:rPr lang="en-US" dirty="0" err="1">
+                <a:latin typeface="Courier New" panose="02070309020205020404" pitchFamily="49" charset="0"/>
+                <a:cs typeface="Courier New" panose="02070309020205020404" pitchFamily="49" charset="0"/>
+              </a:rPr>
+              <a:t>foss</a:t>
+            </a:r>
+            <a:r>
+              <a:rPr lang="en-US" dirty="0">
+                <a:latin typeface="Courier New" panose="02070309020205020404" pitchFamily="49" charset="0"/>
+                <a:cs typeface="Courier New" panose="02070309020205020404" pitchFamily="49" charset="0"/>
+              </a:rPr>
+              <a:t>/2016a</a:t>
+            </a:r>
+          </a:p>
+          <a:p>
+            <a:endParaRPr lang="en-US" dirty="0">
+              <a:latin typeface="Courier New" panose="02070309020205020404" pitchFamily="49" charset="0"/>
+              <a:cs typeface="Courier New" panose="02070309020205020404" pitchFamily="49" charset="0"/>
+            </a:endParaRPr>
+          </a:p>
+          <a:p>
+            <a:r>
+              <a:rPr lang="en-US" dirty="0" err="1">
+                <a:latin typeface="Courier New" panose="02070309020205020404" pitchFamily="49" charset="0"/>
+                <a:cs typeface="Courier New" panose="02070309020205020404" pitchFamily="49" charset="0"/>
+              </a:rPr>
+              <a:t>mpirun</a:t>
+            </a:r>
+            <a:r>
+              <a:rPr lang="en-US" dirty="0">
+                <a:latin typeface="Courier New" panose="02070309020205020404" pitchFamily="49" charset="0"/>
+                <a:cs typeface="Courier New" panose="02070309020205020404" pitchFamily="49" charset="0"/>
+              </a:rPr>
+              <a:t> -</a:t>
+            </a:r>
+            <a:r>
+              <a:rPr lang="en-US" dirty="0" err="1">
+                <a:latin typeface="Courier New" panose="02070309020205020404" pitchFamily="49" charset="0"/>
+                <a:cs typeface="Courier New" panose="02070309020205020404" pitchFamily="49" charset="0"/>
+              </a:rPr>
+              <a:t>mca</a:t>
+            </a:r>
+            <a:r>
+              <a:rPr lang="en-US" dirty="0">
+                <a:latin typeface="Courier New" panose="02070309020205020404" pitchFamily="49" charset="0"/>
+                <a:cs typeface="Courier New" panose="02070309020205020404" pitchFamily="49" charset="0"/>
+              </a:rPr>
+              <a:t> </a:t>
+            </a:r>
+            <a:r>
+              <a:rPr lang="en-US" dirty="0" err="1">
+                <a:latin typeface="Courier New" panose="02070309020205020404" pitchFamily="49" charset="0"/>
+                <a:cs typeface="Courier New" panose="02070309020205020404" pitchFamily="49" charset="0"/>
+              </a:rPr>
+              <a:t>orte_tmpdir_base</a:t>
+            </a:r>
+            <a:r>
+              <a:rPr lang="en-US" dirty="0">
+                <a:latin typeface="Courier New" panose="02070309020205020404" pitchFamily="49" charset="0"/>
+                <a:cs typeface="Courier New" panose="02070309020205020404" pitchFamily="49" charset="0"/>
+              </a:rPr>
+              <a:t> /</a:t>
+            </a:r>
+            <a:r>
+              <a:rPr lang="en-US" dirty="0" err="1">
+                <a:latin typeface="Courier New" panose="02070309020205020404" pitchFamily="49" charset="0"/>
+                <a:cs typeface="Courier New" panose="02070309020205020404" pitchFamily="49" charset="0"/>
+              </a:rPr>
+              <a:t>tmp</a:t>
+            </a:r>
+            <a:r>
+              <a:rPr lang="en-US" dirty="0">
+                <a:latin typeface="Courier New" panose="02070309020205020404" pitchFamily="49" charset="0"/>
+                <a:cs typeface="Courier New" panose="02070309020205020404" pitchFamily="49" charset="0"/>
+              </a:rPr>
+              <a:t> \</a:t>
+            </a:r>
+          </a:p>
+          <a:p>
+            <a:r>
+              <a:rPr lang="en-US" dirty="0">
+                <a:latin typeface="Courier New" panose="02070309020205020404" pitchFamily="49" charset="0"/>
+                <a:cs typeface="Courier New" panose="02070309020205020404" pitchFamily="49" charset="0"/>
+              </a:rPr>
+              <a:t>    singularity exec </a:t>
+            </a:r>
+            <a:r>
+              <a:rPr lang="en-US" dirty="0" err="1">
+                <a:latin typeface="Courier New" panose="02070309020205020404" pitchFamily="49" charset="0"/>
+                <a:cs typeface="Courier New" panose="02070309020205020404" pitchFamily="49" charset="0"/>
+              </a:rPr>
+              <a:t>xenial_openmpi.img</a:t>
+            </a:r>
+            <a:r>
+              <a:rPr lang="en-US" dirty="0">
+                <a:latin typeface="Courier New" panose="02070309020205020404" pitchFamily="49" charset="0"/>
+                <a:cs typeface="Courier New" panose="02070309020205020404" pitchFamily="49" charset="0"/>
+              </a:rPr>
+              <a:t> pi_mpi.exe 100000000</a:t>
+            </a:r>
+          </a:p>
+        </p:txBody>
+      </p:sp>
+      <p:sp>
+        <p:nvSpPr>
+          <p:cNvPr id="6" name="TextBox 5"/>
+          <p:cNvSpPr txBox="1"/>
+          <p:nvPr/>
+        </p:nvSpPr>
+        <p:spPr>
+          <a:xfrm>
+            <a:off x="849084" y="5429250"/>
+            <a:ext cx="7151638" cy="461665"/>
+          </a:xfrm>
+          <a:prstGeom prst="rect">
+            <a:avLst/>
+          </a:prstGeom>
+          <a:noFill/>
+          <a:ln>
+            <a:solidFill>
+              <a:schemeClr val="tx1"/>
+            </a:solidFill>
+          </a:ln>
+        </p:spPr>
+        <p:txBody>
+          <a:bodyPr wrap="none" rtlCol="0">
+            <a:spAutoFit/>
+          </a:bodyPr>
+          <a:lstStyle/>
+          <a:p>
+            <a:r>
+              <a:rPr lang="en-US" sz="2400" dirty="0" smtClean="0"/>
+              <a:t>Note: </a:t>
+            </a:r>
+            <a:r>
+              <a:rPr lang="en-US" sz="2400" dirty="0" err="1" smtClean="0"/>
+              <a:t>OpenMPI</a:t>
+            </a:r>
+            <a:r>
+              <a:rPr lang="en-US" sz="2400" dirty="0" smtClean="0"/>
+              <a:t> version in image is same as that on host</a:t>
+            </a:r>
+            <a:endParaRPr lang="nl-BE" sz="2400" dirty="0"/>
+          </a:p>
+        </p:txBody>
+      </p:sp>
+    </p:spTree>
+    <p:extLst>
+      <p:ext uri="{BB962C8B-B14F-4D97-AF65-F5344CB8AC3E}">
+        <p14:creationId xmlns:p14="http://schemas.microsoft.com/office/powerpoint/2010/main" val="1960032742"/>
+      </p:ext>
+    </p:extLst>
+  </p:cSld>
+  <p:clrMapOvr>
+    <a:masterClrMapping/>
+  </p:clrMapOvr>
+</p:sld>
+</file>
+
+<file path=ppt/slides/slide23.xml><?xml version="1.0" encoding="utf-8"?>
+<p:sld xmlns:a="http://schemas.openxmlformats.org/drawingml/2006/main" xmlns:r="http://schemas.openxmlformats.org/officeDocument/2006/relationships" xmlns:p="http://schemas.openxmlformats.org/presentationml/2006/main">
+  <p:cSld>
+    <p:spTree>
+      <p:nvGrpSpPr>
+        <p:cNvPr id="1" name=""/>
+        <p:cNvGrpSpPr/>
+        <p:nvPr/>
+      </p:nvGrpSpPr>
+      <p:grpSpPr>
+        <a:xfrm>
+          <a:off x="0" y="0"/>
+          <a:ext cx="0" cy="0"/>
+          <a:chOff x="0" y="0"/>
+          <a:chExt cx="0" cy="0"/>
+        </a:xfrm>
+      </p:grpSpPr>
+      <p:sp>
+        <p:nvSpPr>
+          <p:cNvPr id="2" name="Title 1"/>
+          <p:cNvSpPr>
+            <a:spLocks noGrp="1"/>
+          </p:cNvSpPr>
+          <p:nvPr>
+            <p:ph type="title"/>
+          </p:nvPr>
+        </p:nvSpPr>
+        <p:spPr/>
+        <p:txBody>
+          <a:bodyPr/>
+          <a:lstStyle/>
+          <a:p>
+            <a:r>
+              <a:rPr lang="en-US" dirty="0" smtClean="0"/>
+              <a:t>Conclusions</a:t>
+            </a:r>
+            <a:endParaRPr lang="nl-BE" dirty="0"/>
+          </a:p>
+        </p:txBody>
+      </p:sp>
+      <p:sp>
+        <p:nvSpPr>
+          <p:cNvPr id="3" name="Text Placeholder 2"/>
+          <p:cNvSpPr>
+            <a:spLocks noGrp="1"/>
+          </p:cNvSpPr>
+          <p:nvPr>
+            <p:ph type="body" idx="1"/>
+          </p:nvPr>
+        </p:nvSpPr>
+        <p:spPr/>
+        <p:txBody>
+          <a:bodyPr/>
+          <a:lstStyle/>
+          <a:p>
+            <a:endParaRPr lang="nl-BE"/>
+          </a:p>
+        </p:txBody>
+      </p:sp>
+      <p:sp>
+        <p:nvSpPr>
+          <p:cNvPr id="4" name="Slide Number Placeholder 3"/>
+          <p:cNvSpPr>
+            <a:spLocks noGrp="1"/>
+          </p:cNvSpPr>
+          <p:nvPr>
+            <p:ph type="sldNum" sz="quarter" idx="12"/>
+          </p:nvPr>
+        </p:nvSpPr>
+        <p:spPr/>
+        <p:txBody>
+          <a:bodyPr/>
+          <a:lstStyle/>
+          <a:p>
+            <a:fld id="{AEFF399F-E3B5-4890-BC79-9BC8D4DF3F2D}" type="slidenum">
+              <a:rPr lang="nl-BE" smtClean="0"/>
+              <a:t>23</a:t>
+            </a:fld>
+            <a:endParaRPr lang="nl-BE"/>
+          </a:p>
+        </p:txBody>
+      </p:sp>
+    </p:spTree>
+    <p:extLst>
+      <p:ext uri="{BB962C8B-B14F-4D97-AF65-F5344CB8AC3E}">
+        <p14:creationId xmlns:p14="http://schemas.microsoft.com/office/powerpoint/2010/main" val="2192721825"/>
+      </p:ext>
+    </p:extLst>
+  </p:cSld>
+  <p:clrMapOvr>
+    <a:masterClrMapping/>
+  </p:clrMapOvr>
+</p:sld>
+</file>
+
+<file path=ppt/slides/slide24.xml><?xml version="1.0" encoding="utf-8"?>
+<p:sld xmlns:a="http://schemas.openxmlformats.org/drawingml/2006/main" xmlns:r="http://schemas.openxmlformats.org/officeDocument/2006/relationships" xmlns:p="http://schemas.openxmlformats.org/presentationml/2006/main">
+  <p:cSld>
+    <p:spTree>
+      <p:nvGrpSpPr>
+        <p:cNvPr id="1" name=""/>
+        <p:cNvGrpSpPr/>
+        <p:nvPr/>
+      </p:nvGrpSpPr>
+      <p:grpSpPr>
+        <a:xfrm>
+          <a:off x="0" y="0"/>
+          <a:ext cx="0" cy="0"/>
+          <a:chOff x="0" y="0"/>
+          <a:chExt cx="0" cy="0"/>
+        </a:xfrm>
+      </p:grpSpPr>
+      <p:sp>
+        <p:nvSpPr>
+          <p:cNvPr id="2" name="Title 1"/>
+          <p:cNvSpPr>
+            <a:spLocks noGrp="1"/>
+          </p:cNvSpPr>
+          <p:nvPr>
+            <p:ph type="title"/>
+          </p:nvPr>
+        </p:nvSpPr>
+        <p:spPr/>
+        <p:txBody>
+          <a:bodyPr/>
+          <a:lstStyle/>
+          <a:p>
+            <a:r>
+              <a:rPr lang="en-US" dirty="0" smtClean="0"/>
+              <a:t>Conclusions</a:t>
+            </a:r>
+            <a:endParaRPr lang="nl-BE" dirty="0"/>
+          </a:p>
+        </p:txBody>
+      </p:sp>
+      <p:sp>
+        <p:nvSpPr>
+          <p:cNvPr id="3" name="Content Placeholder 2"/>
+          <p:cNvSpPr>
+            <a:spLocks noGrp="1"/>
+          </p:cNvSpPr>
+          <p:nvPr>
+            <p:ph idx="1"/>
+          </p:nvPr>
+        </p:nvSpPr>
+        <p:spPr/>
+        <p:txBody>
+          <a:bodyPr/>
+          <a:lstStyle/>
+          <a:p>
+            <a:r>
+              <a:rPr lang="en-US" dirty="0" smtClean="0"/>
+              <a:t>Singularity advantages</a:t>
+            </a:r>
+          </a:p>
+          <a:p>
+            <a:pPr lvl="1"/>
+            <a:r>
+              <a:rPr lang="en-US" dirty="0" smtClean="0"/>
+              <a:t>Portability</a:t>
+            </a:r>
+          </a:p>
+          <a:p>
+            <a:pPr lvl="1"/>
+            <a:r>
+              <a:rPr lang="en-US" dirty="0" smtClean="0"/>
+              <a:t>Reproducibility</a:t>
+            </a:r>
+          </a:p>
+          <a:p>
+            <a:pPr lvl="1"/>
+            <a:r>
+              <a:rPr lang="en-US" dirty="0" smtClean="0"/>
+              <a:t>Easily create images</a:t>
+            </a:r>
+          </a:p>
+          <a:p>
+            <a:pPr lvl="1"/>
+            <a:r>
+              <a:rPr lang="en-US" dirty="0" smtClean="0"/>
+              <a:t>Integrate images into existing workflows</a:t>
+            </a:r>
+          </a:p>
+          <a:p>
+            <a:pPr lvl="1"/>
+            <a:r>
+              <a:rPr lang="en-US" dirty="0" smtClean="0"/>
+              <a:t>No privilege escalation</a:t>
+            </a:r>
+          </a:p>
+          <a:p>
+            <a:pPr lvl="2"/>
+            <a:r>
+              <a:rPr lang="en-US" dirty="0" smtClean="0"/>
+              <a:t>Create as root</a:t>
+            </a:r>
+          </a:p>
+          <a:p>
+            <a:pPr lvl="2"/>
+            <a:r>
+              <a:rPr lang="en-US" dirty="0" smtClean="0"/>
+              <a:t>Run as user</a:t>
+            </a:r>
+            <a:endParaRPr lang="nl-BE" dirty="0"/>
+          </a:p>
+        </p:txBody>
+      </p:sp>
+      <p:sp>
+        <p:nvSpPr>
+          <p:cNvPr id="4" name="Slide Number Placeholder 3"/>
+          <p:cNvSpPr>
+            <a:spLocks noGrp="1"/>
+          </p:cNvSpPr>
+          <p:nvPr>
+            <p:ph type="sldNum" sz="quarter" idx="12"/>
+          </p:nvPr>
+        </p:nvSpPr>
+        <p:spPr/>
+        <p:txBody>
+          <a:bodyPr/>
+          <a:lstStyle/>
+          <a:p>
+            <a:fld id="{AEFF399F-E3B5-4890-BC79-9BC8D4DF3F2D}" type="slidenum">
+              <a:rPr lang="nl-BE" smtClean="0"/>
+              <a:t>24</a:t>
+            </a:fld>
+            <a:endParaRPr lang="nl-BE"/>
+          </a:p>
+        </p:txBody>
+      </p:sp>
+    </p:spTree>
+    <p:extLst>
+      <p:ext uri="{BB962C8B-B14F-4D97-AF65-F5344CB8AC3E}">
+        <p14:creationId xmlns:p14="http://schemas.microsoft.com/office/powerpoint/2010/main" val="4038801045"/>
+      </p:ext>
+    </p:extLst>
+  </p:cSld>
+  <p:clrMapOvr>
+    <a:masterClrMapping/>
+  </p:clrMapOvr>
+</p:sld>
+</file>
+
+<file path=ppt/slides/slide25.xml><?xml version="1.0" encoding="utf-8"?>
+<p:sld xmlns:a="http://schemas.openxmlformats.org/drawingml/2006/main" xmlns:r="http://schemas.openxmlformats.org/officeDocument/2006/relationships" xmlns:p="http://schemas.openxmlformats.org/presentationml/2006/main">
+  <p:cSld>
+    <p:spTree>
+      <p:nvGrpSpPr>
+        <p:cNvPr id="1" name=""/>
+        <p:cNvGrpSpPr/>
+        <p:nvPr/>
+      </p:nvGrpSpPr>
+      <p:grpSpPr>
+        <a:xfrm>
+          <a:off x="0" y="0"/>
+          <a:ext cx="0" cy="0"/>
+          <a:chOff x="0" y="0"/>
+          <a:chExt cx="0" cy="0"/>
+        </a:xfrm>
+      </p:grpSpPr>
+      <p:sp>
+        <p:nvSpPr>
+          <p:cNvPr id="2" name="Title 1"/>
+          <p:cNvSpPr>
+            <a:spLocks noGrp="1"/>
+          </p:cNvSpPr>
+          <p:nvPr>
+            <p:ph type="title"/>
+          </p:nvPr>
+        </p:nvSpPr>
+        <p:spPr/>
+        <p:txBody>
+          <a:bodyPr/>
+          <a:lstStyle/>
+          <a:p>
+            <a:r>
+              <a:rPr lang="en-US" dirty="0" smtClean="0"/>
+              <a:t>Bootstrap best practices</a:t>
+            </a:r>
+            <a:endParaRPr lang="nl-BE" dirty="0"/>
+          </a:p>
+        </p:txBody>
+      </p:sp>
+      <p:sp>
+        <p:nvSpPr>
+          <p:cNvPr id="3" name="Content Placeholder 2"/>
+          <p:cNvSpPr>
+            <a:spLocks noGrp="1"/>
+          </p:cNvSpPr>
+          <p:nvPr>
+            <p:ph idx="1"/>
+          </p:nvPr>
+        </p:nvSpPr>
+        <p:spPr/>
+        <p:txBody>
+          <a:bodyPr/>
+          <a:lstStyle/>
+          <a:p>
+            <a:r>
+              <a:rPr lang="en-US" dirty="0" smtClean="0"/>
+              <a:t>Install software in default location, not home directory</a:t>
+            </a:r>
+          </a:p>
+          <a:p>
+            <a:r>
+              <a:rPr lang="en-US" dirty="0" smtClean="0"/>
+              <a:t>Define environment variables in image's </a:t>
+            </a:r>
+            <a:r>
+              <a:rPr lang="en-US" dirty="0" smtClean="0">
+                <a:latin typeface="Courier New" panose="02070309020205020404" pitchFamily="49" charset="0"/>
+                <a:cs typeface="Courier New" panose="02070309020205020404" pitchFamily="49" charset="0"/>
+              </a:rPr>
+              <a:t>/environment</a:t>
+            </a:r>
+          </a:p>
+          <a:p>
+            <a:r>
+              <a:rPr lang="en-US" dirty="0" smtClean="0"/>
+              <a:t>Files should be owned by system account, not user</a:t>
+            </a:r>
+          </a:p>
+          <a:p>
+            <a:r>
+              <a:rPr lang="en-US" dirty="0" smtClean="0"/>
+              <a:t>Don’t mess with </a:t>
+            </a:r>
+            <a:r>
+              <a:rPr lang="en-US" dirty="0" smtClean="0">
+                <a:latin typeface="Courier New" panose="02070309020205020404" pitchFamily="49" charset="0"/>
+                <a:cs typeface="Courier New" panose="02070309020205020404" pitchFamily="49" charset="0"/>
+              </a:rPr>
+              <a:t>/</a:t>
+            </a:r>
+            <a:r>
+              <a:rPr lang="en-US" dirty="0" err="1" smtClean="0">
+                <a:latin typeface="Courier New" panose="02070309020205020404" pitchFamily="49" charset="0"/>
+                <a:cs typeface="Courier New" panose="02070309020205020404" pitchFamily="49" charset="0"/>
+              </a:rPr>
+              <a:t>etc</a:t>
+            </a:r>
+            <a:r>
+              <a:rPr lang="en-US" dirty="0" smtClean="0">
+                <a:latin typeface="Courier New" panose="02070309020205020404" pitchFamily="49" charset="0"/>
+                <a:cs typeface="Courier New" panose="02070309020205020404" pitchFamily="49" charset="0"/>
+              </a:rPr>
+              <a:t>/</a:t>
+            </a:r>
+            <a:r>
+              <a:rPr lang="en-US" dirty="0" err="1" smtClean="0">
+                <a:latin typeface="Courier New" panose="02070309020205020404" pitchFamily="49" charset="0"/>
+                <a:cs typeface="Courier New" panose="02070309020205020404" pitchFamily="49" charset="0"/>
+              </a:rPr>
+              <a:t>passwd</a:t>
+            </a:r>
+            <a:r>
+              <a:rPr lang="en-US" dirty="0" smtClean="0"/>
+              <a:t>, </a:t>
+            </a:r>
+            <a:r>
+              <a:rPr lang="en-US" dirty="0" smtClean="0">
+                <a:latin typeface="Courier New" panose="02070309020205020404" pitchFamily="49" charset="0"/>
+                <a:cs typeface="Courier New" panose="02070309020205020404" pitchFamily="49" charset="0"/>
+              </a:rPr>
+              <a:t>/</a:t>
+            </a:r>
+            <a:r>
+              <a:rPr lang="en-US" dirty="0" err="1" smtClean="0">
+                <a:latin typeface="Courier New" panose="02070309020205020404" pitchFamily="49" charset="0"/>
+                <a:cs typeface="Courier New" panose="02070309020205020404" pitchFamily="49" charset="0"/>
+              </a:rPr>
+              <a:t>etc</a:t>
+            </a:r>
+            <a:r>
+              <a:rPr lang="en-US" dirty="0" smtClean="0">
+                <a:latin typeface="Courier New" panose="02070309020205020404" pitchFamily="49" charset="0"/>
+                <a:cs typeface="Courier New" panose="02070309020205020404" pitchFamily="49" charset="0"/>
+              </a:rPr>
+              <a:t>/group</a:t>
+            </a:r>
+            <a:r>
+              <a:rPr lang="en-US" dirty="0" smtClean="0"/>
+              <a:t>, </a:t>
+            </a:r>
+            <a:r>
+              <a:rPr lang="en-US" dirty="0" smtClean="0">
+                <a:latin typeface="Courier New" panose="02070309020205020404" pitchFamily="49" charset="0"/>
+                <a:cs typeface="Courier New" panose="02070309020205020404" pitchFamily="49" charset="0"/>
+              </a:rPr>
+              <a:t>/</a:t>
+            </a:r>
+            <a:r>
+              <a:rPr lang="en-US" dirty="0" err="1" smtClean="0">
+                <a:latin typeface="Courier New" panose="02070309020205020404" pitchFamily="49" charset="0"/>
+                <a:cs typeface="Courier New" panose="02070309020205020404" pitchFamily="49" charset="0"/>
+              </a:rPr>
+              <a:t>etc</a:t>
+            </a:r>
+            <a:r>
+              <a:rPr lang="en-US" dirty="0" smtClean="0">
+                <a:latin typeface="Courier New" panose="02070309020205020404" pitchFamily="49" charset="0"/>
+                <a:cs typeface="Courier New" panose="02070309020205020404" pitchFamily="49" charset="0"/>
+              </a:rPr>
+              <a:t>/shadow</a:t>
+            </a:r>
+          </a:p>
+          <a:p>
+            <a:r>
+              <a:rPr lang="en-US" dirty="0" smtClean="0"/>
+              <a:t>Do installation via definition file, not by hand</a:t>
+            </a:r>
+          </a:p>
+          <a:p>
+            <a:pPr lvl="1"/>
+            <a:r>
+              <a:rPr lang="en-US" dirty="0" smtClean="0"/>
+              <a:t>Better reproducibility</a:t>
+            </a:r>
+            <a:endParaRPr lang="nl-BE" dirty="0"/>
+          </a:p>
+        </p:txBody>
+      </p:sp>
+      <p:sp>
+        <p:nvSpPr>
+          <p:cNvPr id="4" name="Slide Number Placeholder 3"/>
+          <p:cNvSpPr>
+            <a:spLocks noGrp="1"/>
+          </p:cNvSpPr>
+          <p:nvPr>
+            <p:ph type="sldNum" sz="quarter" idx="12"/>
+          </p:nvPr>
+        </p:nvSpPr>
+        <p:spPr/>
+        <p:txBody>
+          <a:bodyPr/>
+          <a:lstStyle/>
+          <a:p>
+            <a:fld id="{AEFF399F-E3B5-4890-BC79-9BC8D4DF3F2D}" type="slidenum">
+              <a:rPr lang="nl-BE" smtClean="0"/>
+              <a:t>25</a:t>
+            </a:fld>
+            <a:endParaRPr lang="nl-BE"/>
+          </a:p>
+        </p:txBody>
+      </p:sp>
+    </p:spTree>
+    <p:extLst>
+      <p:ext uri="{BB962C8B-B14F-4D97-AF65-F5344CB8AC3E}">
+        <p14:creationId xmlns:p14="http://schemas.microsoft.com/office/powerpoint/2010/main" val="1728430184"/>
+      </p:ext>
+    </p:extLst>
+  </p:cSld>
+  <p:clrMapOvr>
+    <a:masterClrMapping/>
+  </p:clrMapOvr>
+</p:sld>
+</file>
+
+<file path=ppt/slides/slide26.xml><?xml version="1.0" encoding="utf-8"?>
+<p:sld xmlns:a="http://schemas.openxmlformats.org/drawingml/2006/main" xmlns:r="http://schemas.openxmlformats.org/officeDocument/2006/relationships" xmlns:p="http://schemas.openxmlformats.org/presentationml/2006/main">
+  <p:cSld>
+    <p:spTree>
+      <p:nvGrpSpPr>
+        <p:cNvPr id="1" name=""/>
+        <p:cNvGrpSpPr/>
+        <p:nvPr/>
+      </p:nvGrpSpPr>
+      <p:grpSpPr>
+        <a:xfrm>
+          <a:off x="0" y="0"/>
+          <a:ext cx="0" cy="0"/>
+          <a:chOff x="0" y="0"/>
+          <a:chExt cx="0" cy="0"/>
+        </a:xfrm>
+      </p:grpSpPr>
+      <p:sp>
+        <p:nvSpPr>
+          <p:cNvPr id="2" name="Title 1"/>
+          <p:cNvSpPr>
+            <a:spLocks noGrp="1"/>
+          </p:cNvSpPr>
+          <p:nvPr>
+            <p:ph type="title"/>
+          </p:nvPr>
+        </p:nvSpPr>
+        <p:spPr/>
+        <p:txBody>
+          <a:bodyPr/>
+          <a:lstStyle/>
+          <a:p>
+            <a:r>
+              <a:rPr lang="en-US" dirty="0" smtClean="0"/>
               <a:t>References</a:t>
             </a:r>
             <a:endParaRPr lang="nl-BE" dirty="0"/>
@@ -7282,7 +9187,7 @@
           <a:p>
             <a:fld id="{AEFF399F-E3B5-4890-BC79-9BC8D4DF3F2D}" type="slidenum">
               <a:rPr lang="nl-BE" smtClean="0"/>
-              <a:t>22</a:t>
+              <a:t>26</a:t>
             </a:fld>
             <a:endParaRPr lang="nl-BE"/>
           </a:p>

</xml_diff>

<commit_message>
Added serial/OpenMP overhead figures
</commit_message>
<xml_diff>
--- a/Virtualization/singularity.pptx
+++ b/Virtualization/singularity.pptx
@@ -5,7 +5,7 @@
     <p:sldMasterId id="2147483660" r:id="rId1"/>
   </p:sldMasterIdLst>
   <p:notesMasterIdLst>
-    <p:notesMasterId r:id="rId31"/>
+    <p:notesMasterId r:id="rId33"/>
   </p:notesMasterIdLst>
   <p:sldIdLst>
     <p:sldId id="256" r:id="rId2"/>
@@ -33,10 +33,12 @@
     <p:sldId id="279" r:id="rId24"/>
     <p:sldId id="280" r:id="rId25"/>
     <p:sldId id="281" r:id="rId26"/>
-    <p:sldId id="272" r:id="rId27"/>
-    <p:sldId id="276" r:id="rId28"/>
-    <p:sldId id="270" r:id="rId29"/>
-    <p:sldId id="277" r:id="rId30"/>
+    <p:sldId id="285" r:id="rId27"/>
+    <p:sldId id="286" r:id="rId28"/>
+    <p:sldId id="272" r:id="rId29"/>
+    <p:sldId id="276" r:id="rId30"/>
+    <p:sldId id="270" r:id="rId31"/>
+    <p:sldId id="277" r:id="rId32"/>
   </p:sldIdLst>
   <p:sldSz cx="9144000" cy="6858000" type="screen4x3"/>
   <p:notesSz cx="6858000" cy="9144000"/>
@@ -12585,7 +12587,7 @@
           <a:p>
             <a:r>
               <a:rPr lang="en-US" dirty="0" smtClean="0"/>
-              <a:t>Conclusions</a:t>
+              <a:t>Performance</a:t>
             </a:r>
             <a:endParaRPr lang="nl-BE" dirty="0"/>
           </a:p>
@@ -12636,7 +12638,7 @@
     </p:spTree>
     <p:extLst>
       <p:ext uri="{BB962C8B-B14F-4D97-AF65-F5344CB8AC3E}">
-        <p14:creationId xmlns:p14="http://schemas.microsoft.com/office/powerpoint/2010/main" val="2192721825"/>
+        <p14:creationId xmlns:p14="http://schemas.microsoft.com/office/powerpoint/2010/main" val="3021828449"/>
       </p:ext>
     </p:extLst>
   </p:cSld>
@@ -12672,6 +12674,226 @@
       </p:grpSpPr>
       <p:sp>
         <p:nvSpPr>
+          <p:cNvPr id="5" name="Title 4"/>
+          <p:cNvSpPr>
+            <a:spLocks noGrp="1"/>
+          </p:cNvSpPr>
+          <p:nvPr>
+            <p:ph type="title"/>
+          </p:nvPr>
+        </p:nvSpPr>
+        <p:spPr/>
+        <p:txBody>
+          <a:bodyPr/>
+          <a:lstStyle/>
+          <a:p>
+            <a:r>
+              <a:rPr lang="en-US" dirty="0" smtClean="0"/>
+              <a:t>Singularity overhead</a:t>
+            </a:r>
+            <a:endParaRPr lang="nl-BE" dirty="0"/>
+          </a:p>
+        </p:txBody>
+      </p:sp>
+      <p:sp>
+        <p:nvSpPr>
+          <p:cNvPr id="6" name="Content Placeholder 5"/>
+          <p:cNvSpPr>
+            <a:spLocks noGrp="1"/>
+          </p:cNvSpPr>
+          <p:nvPr>
+            <p:ph idx="1"/>
+          </p:nvPr>
+        </p:nvSpPr>
+        <p:spPr/>
+        <p:txBody>
+          <a:bodyPr/>
+          <a:lstStyle/>
+          <a:p>
+            <a:r>
+              <a:rPr lang="en-US" dirty="0" smtClean="0"/>
+              <a:t>Startup of image</a:t>
+            </a:r>
+            <a:r>
+              <a:rPr lang="en-US" dirty="0">
+                <a:sym typeface="Symbol" panose="05050102010706020507" pitchFamily="18" charset="2"/>
+              </a:rPr>
+              <a:t>  </a:t>
+            </a:r>
+            <a:r>
+              <a:rPr lang="en-US" dirty="0" smtClean="0">
+                <a:sym typeface="Symbol" panose="05050102010706020507" pitchFamily="18" charset="2"/>
+              </a:rPr>
+              <a:t>0.4</a:t>
+            </a:r>
+            <a:r>
+              <a:rPr lang="en-US" dirty="0" smtClean="0"/>
+              <a:t> </a:t>
+            </a:r>
+            <a:r>
+              <a:rPr lang="en-US" dirty="0"/>
+              <a:t>s</a:t>
+            </a:r>
+            <a:endParaRPr lang="en-US" dirty="0" smtClean="0"/>
+          </a:p>
+          <a:p>
+            <a:r>
+              <a:rPr lang="en-US" dirty="0" smtClean="0"/>
+              <a:t>Serial code/</a:t>
+            </a:r>
+            <a:r>
+              <a:rPr lang="en-US" dirty="0" err="1" smtClean="0"/>
+              <a:t>OpenMP</a:t>
+            </a:r>
+            <a:endParaRPr lang="en-US" dirty="0" smtClean="0"/>
+          </a:p>
+          <a:p>
+            <a:pPr lvl="1"/>
+            <a:r>
+              <a:rPr lang="en-US" dirty="0" smtClean="0"/>
+              <a:t>Overhead for </a:t>
+            </a:r>
+            <a:r>
+              <a:rPr lang="en-US" dirty="0" err="1" smtClean="0"/>
+              <a:t>walltime</a:t>
+            </a:r>
+            <a:r>
+              <a:rPr lang="en-US" dirty="0" smtClean="0"/>
+              <a:t> </a:t>
+            </a:r>
+            <a:r>
+              <a:rPr lang="en-US" dirty="0" smtClean="0">
+                <a:sym typeface="Symbol" panose="05050102010706020507" pitchFamily="18" charset="2"/>
+              </a:rPr>
+              <a:t> </a:t>
+            </a:r>
+            <a:r>
+              <a:rPr lang="en-US" dirty="0" smtClean="0"/>
+              <a:t>20 seconds: &lt; 0.85 %</a:t>
+            </a:r>
+          </a:p>
+          <a:p>
+            <a:pPr lvl="1"/>
+            <a:r>
+              <a:rPr lang="en-US" dirty="0" smtClean="0"/>
+              <a:t>Overhead </a:t>
+            </a:r>
+            <a:r>
+              <a:rPr lang="en-US" dirty="0"/>
+              <a:t>for </a:t>
+            </a:r>
+            <a:r>
+              <a:rPr lang="en-US" dirty="0" err="1"/>
+              <a:t>walltime</a:t>
+            </a:r>
+            <a:r>
+              <a:rPr lang="en-US" dirty="0"/>
+              <a:t> </a:t>
+            </a:r>
+            <a:r>
+              <a:rPr lang="en-US" dirty="0">
+                <a:sym typeface="Symbol" panose="05050102010706020507" pitchFamily="18" charset="2"/>
+              </a:rPr>
+              <a:t> </a:t>
+            </a:r>
+            <a:r>
+              <a:rPr lang="en-US" dirty="0" smtClean="0"/>
+              <a:t>3 minutes: </a:t>
+            </a:r>
+            <a:r>
+              <a:rPr lang="en-US"/>
+              <a:t>&lt; </a:t>
+            </a:r>
+            <a:r>
+              <a:rPr lang="en-US" smtClean="0"/>
+              <a:t>0.7 </a:t>
+            </a:r>
+            <a:r>
+              <a:rPr lang="en-US" dirty="0"/>
+              <a:t>%</a:t>
+            </a:r>
+          </a:p>
+          <a:p>
+            <a:pPr lvl="1"/>
+            <a:r>
+              <a:rPr lang="en-US" dirty="0" smtClean="0"/>
+              <a:t>(Almost) independent of number of threads</a:t>
+            </a:r>
+          </a:p>
+          <a:p>
+            <a:r>
+              <a:rPr lang="en-US" dirty="0" smtClean="0"/>
+              <a:t>MPI</a:t>
+            </a:r>
+          </a:p>
+          <a:p>
+            <a:pPr lvl="1"/>
+            <a:endParaRPr lang="nl-BE" dirty="0"/>
+          </a:p>
+        </p:txBody>
+      </p:sp>
+      <p:sp>
+        <p:nvSpPr>
+          <p:cNvPr id="4" name="Slide Number Placeholder 3"/>
+          <p:cNvSpPr>
+            <a:spLocks noGrp="1"/>
+          </p:cNvSpPr>
+          <p:nvPr>
+            <p:ph type="sldNum" sz="quarter" idx="12"/>
+          </p:nvPr>
+        </p:nvSpPr>
+        <p:spPr/>
+        <p:txBody>
+          <a:bodyPr/>
+          <a:lstStyle/>
+          <a:p>
+            <a:fld id="{AEFF399F-E3B5-4890-BC79-9BC8D4DF3F2D}" type="slidenum">
+              <a:rPr lang="nl-BE" smtClean="0"/>
+              <a:t>27</a:t>
+            </a:fld>
+            <a:endParaRPr lang="nl-BE"/>
+          </a:p>
+        </p:txBody>
+      </p:sp>
+    </p:spTree>
+    <p:extLst>
+      <p:ext uri="{BB962C8B-B14F-4D97-AF65-F5344CB8AC3E}">
+        <p14:creationId xmlns:p14="http://schemas.microsoft.com/office/powerpoint/2010/main" val="1174775964"/>
+      </p:ext>
+    </p:extLst>
+  </p:cSld>
+  <p:clrMapOvr>
+    <a:masterClrMapping/>
+  </p:clrMapOvr>
+  <p:timing>
+    <p:tnLst>
+      <p:par>
+        <p:cTn id="1" dur="indefinite" restart="never" nodeType="tmRoot"/>
+      </p:par>
+    </p:tnLst>
+  </p:timing>
+</p:sld>
+</file>
+
+<file path=ppt/slides/slide28.xml><?xml version="1.0" encoding="utf-8"?>
+<p:sld xmlns:a="http://schemas.openxmlformats.org/drawingml/2006/main" xmlns:r="http://schemas.openxmlformats.org/officeDocument/2006/relationships" xmlns:p="http://schemas.openxmlformats.org/presentationml/2006/main">
+  <p:cSld>
+    <p:spTree>
+      <p:nvGrpSpPr>
+        <p:cNvPr id="1" name=""/>
+        <p:cNvGrpSpPr/>
+        <p:nvPr/>
+      </p:nvGrpSpPr>
+      <p:grpSpPr>
+        <a:xfrm>
+          <a:off x="0" y="0"/>
+          <a:ext cx="0" cy="0"/>
+          <a:chOff x="0" y="0"/>
+          <a:chExt cx="0" cy="0"/>
+        </a:xfrm>
+      </p:grpSpPr>
+      <p:sp>
+        <p:nvSpPr>
           <p:cNvPr id="2" name="Title 1"/>
           <p:cNvSpPr>
             <a:spLocks noGrp="1"/>
@@ -12695,6 +12917,108 @@
       </p:sp>
       <p:sp>
         <p:nvSpPr>
+          <p:cNvPr id="3" name="Text Placeholder 2"/>
+          <p:cNvSpPr>
+            <a:spLocks noGrp="1"/>
+          </p:cNvSpPr>
+          <p:nvPr>
+            <p:ph type="body" idx="1"/>
+          </p:nvPr>
+        </p:nvSpPr>
+        <p:spPr/>
+        <p:txBody>
+          <a:bodyPr/>
+          <a:lstStyle/>
+          <a:p>
+            <a:endParaRPr lang="nl-BE"/>
+          </a:p>
+        </p:txBody>
+      </p:sp>
+      <p:sp>
+        <p:nvSpPr>
+          <p:cNvPr id="4" name="Slide Number Placeholder 3"/>
+          <p:cNvSpPr>
+            <a:spLocks noGrp="1"/>
+          </p:cNvSpPr>
+          <p:nvPr>
+            <p:ph type="sldNum" sz="quarter" idx="12"/>
+          </p:nvPr>
+        </p:nvSpPr>
+        <p:spPr/>
+        <p:txBody>
+          <a:bodyPr/>
+          <a:lstStyle/>
+          <a:p>
+            <a:fld id="{AEFF399F-E3B5-4890-BC79-9BC8D4DF3F2D}" type="slidenum">
+              <a:rPr lang="nl-BE" smtClean="0"/>
+              <a:t>28</a:t>
+            </a:fld>
+            <a:endParaRPr lang="nl-BE"/>
+          </a:p>
+        </p:txBody>
+      </p:sp>
+    </p:spTree>
+    <p:extLst>
+      <p:ext uri="{BB962C8B-B14F-4D97-AF65-F5344CB8AC3E}">
+        <p14:creationId xmlns:p14="http://schemas.microsoft.com/office/powerpoint/2010/main" val="2192721825"/>
+      </p:ext>
+    </p:extLst>
+  </p:cSld>
+  <p:clrMapOvr>
+    <a:masterClrMapping/>
+  </p:clrMapOvr>
+  <p:timing>
+    <p:tnLst>
+      <p:par>
+        <p:cTn id="1" dur="indefinite" restart="never" nodeType="tmRoot"/>
+      </p:par>
+    </p:tnLst>
+  </p:timing>
+</p:sld>
+</file>
+
+<file path=ppt/slides/slide29.xml><?xml version="1.0" encoding="utf-8"?>
+<p:sld xmlns:a="http://schemas.openxmlformats.org/drawingml/2006/main" xmlns:r="http://schemas.openxmlformats.org/officeDocument/2006/relationships" xmlns:p="http://schemas.openxmlformats.org/presentationml/2006/main">
+  <p:cSld>
+    <p:spTree>
+      <p:nvGrpSpPr>
+        <p:cNvPr id="1" name=""/>
+        <p:cNvGrpSpPr/>
+        <p:nvPr/>
+      </p:nvGrpSpPr>
+      <p:grpSpPr>
+        <a:xfrm>
+          <a:off x="0" y="0"/>
+          <a:ext cx="0" cy="0"/>
+          <a:chOff x="0" y="0"/>
+          <a:chExt cx="0" cy="0"/>
+        </a:xfrm>
+      </p:grpSpPr>
+      <p:sp>
+        <p:nvSpPr>
+          <p:cNvPr id="2" name="Title 1"/>
+          <p:cNvSpPr>
+            <a:spLocks noGrp="1"/>
+          </p:cNvSpPr>
+          <p:nvPr>
+            <p:ph type="title"/>
+          </p:nvPr>
+        </p:nvSpPr>
+        <p:spPr/>
+        <p:txBody>
+          <a:bodyPr/>
+          <a:lstStyle/>
+          <a:p>
+            <a:r>
+              <a:rPr lang="en-US" dirty="0" smtClean="0"/>
+              <a:t>Conclusions</a:t>
+            </a:r>
+            <a:endParaRPr lang="nl-BE" dirty="0"/>
+          </a:p>
+        </p:txBody>
+      </p:sp>
+      <p:sp>
+        <p:nvSpPr>
           <p:cNvPr id="3" name="Content Placeholder 2"/>
           <p:cNvSpPr>
             <a:spLocks noGrp="1"/>
@@ -12800,7 +13124,7 @@
           <a:p>
             <a:fld id="{AEFF399F-E3B5-4890-BC79-9BC8D4DF3F2D}" type="slidenum">
               <a:rPr lang="nl-BE" smtClean="0"/>
-              <a:t>27</a:t>
+              <a:t>29</a:t>
             </a:fld>
             <a:endParaRPr lang="nl-BE"/>
           </a:p>
@@ -13260,7 +13584,7 @@
 </p:sld>
 </file>
 
-<file path=ppt/slides/slide28.xml><?xml version="1.0" encoding="utf-8"?>
+<file path=ppt/slides/slide3.xml><?xml version="1.0" encoding="utf-8"?>
 <p:sld xmlns:a="http://schemas.openxmlformats.org/drawingml/2006/main" xmlns:r="http://schemas.openxmlformats.org/officeDocument/2006/relationships" xmlns:p="http://schemas.openxmlformats.org/presentationml/2006/main">
   <p:cSld>
     <p:spTree>
@@ -13294,7 +13618,7 @@
           <a:p>
             <a:r>
               <a:rPr lang="en-US" dirty="0" smtClean="0"/>
-              <a:t>Bootstrap best practices</a:t>
+              <a:t>Introduction</a:t>
             </a:r>
             <a:endParaRPr lang="nl-BE" dirty="0"/>
           </a:p>
@@ -13317,131 +13641,92 @@
           <a:p>
             <a:r>
               <a:rPr lang="en-US" dirty="0" smtClean="0"/>
-              <a:t>Install software in default location, not home directory</a:t>
-            </a:r>
-          </a:p>
-          <a:p>
+              <a:t>Singularity developed </a:t>
+            </a:r>
+            <a:r>
+              <a:rPr lang="en-US" dirty="0"/>
+              <a:t>by Berkeley Lab</a:t>
+            </a:r>
+            <a:br>
+              <a:rPr lang="en-US" dirty="0"/>
+            </a:br>
+            <a:r>
+              <a:rPr lang="en-US" dirty="0">
+                <a:hlinkClick r:id="rId2"/>
+              </a:rPr>
+              <a:t>http://singularity.lbl.gov</a:t>
+            </a:r>
+            <a:r>
+              <a:rPr lang="en-US" dirty="0" smtClean="0">
+                <a:hlinkClick r:id="rId2"/>
+              </a:rPr>
+              <a:t>/</a:t>
+            </a:r>
             <a:r>
               <a:rPr lang="en-US" dirty="0" smtClean="0"/>
-              <a:t>Define environment variables in image's </a:t>
+              <a:t> </a:t>
+            </a:r>
+          </a:p>
+          <a:p>
+            <a:r>
+              <a:rPr lang="en-US" dirty="0" smtClean="0"/>
+              <a:t>Intended as HPC alternative to</a:t>
+            </a:r>
+          </a:p>
+          <a:p>
+            <a:pPr lvl="1"/>
+            <a:r>
+              <a:rPr lang="en-US" dirty="0"/>
+              <a:t>Docker</a:t>
+            </a:r>
+            <a:br>
+              <a:rPr lang="en-US" dirty="0"/>
+            </a:br>
+            <a:r>
+              <a:rPr lang="en-US" dirty="0">
+                <a:hlinkClick r:id="rId3"/>
+              </a:rPr>
+              <a:t>https://www.docker.com</a:t>
             </a:r>
             <a:r>
               <a:rPr lang="en-US" dirty="0" smtClean="0">
-                <a:latin typeface="Courier New" panose="02070309020205020404" pitchFamily="49" charset="0"/>
-                <a:cs typeface="Courier New" panose="02070309020205020404" pitchFamily="49" charset="0"/>
-              </a:rPr>
-              <a:t>/environment</a:t>
-            </a:r>
-          </a:p>
-          <a:p>
+                <a:hlinkClick r:id="rId3"/>
+              </a:rPr>
+              <a:t>/</a:t>
+            </a:r>
             <a:r>
               <a:rPr lang="en-US" dirty="0" smtClean="0"/>
-              <a:t>Files should be owned by system account, not user</a:t>
-            </a:r>
-          </a:p>
-          <a:p>
+              <a:t> </a:t>
+            </a:r>
+          </a:p>
+          <a:p>
+            <a:pPr lvl="1"/>
             <a:r>
               <a:rPr lang="en-US" dirty="0" smtClean="0"/>
-              <a:t>Don’t mess with </a:t>
+              <a:t>Shifter</a:t>
+            </a:r>
+            <a:r>
+              <a:rPr lang="en-US" dirty="0"/>
+              <a:t/>
+            </a:r>
+            <a:br>
+              <a:rPr lang="en-US" dirty="0"/>
+            </a:br>
+            <a:r>
+              <a:rPr lang="en-US" dirty="0">
+                <a:hlinkClick r:id="rId4"/>
+              </a:rPr>
+              <a:t>https://</a:t>
             </a:r>
             <a:r>
               <a:rPr lang="en-US" dirty="0" smtClean="0">
-                <a:latin typeface="Courier New" panose="02070309020205020404" pitchFamily="49" charset="0"/>
-                <a:cs typeface="Courier New" panose="02070309020205020404" pitchFamily="49" charset="0"/>
-              </a:rPr>
-              <a:t>/</a:t>
-            </a:r>
-            <a:r>
-              <a:rPr lang="en-US" dirty="0" err="1" smtClean="0">
-                <a:latin typeface="Courier New" panose="02070309020205020404" pitchFamily="49" charset="0"/>
-                <a:cs typeface="Courier New" panose="02070309020205020404" pitchFamily="49" charset="0"/>
-              </a:rPr>
-              <a:t>etc</a:t>
-            </a:r>
-            <a:r>
-              <a:rPr lang="en-US" dirty="0" smtClean="0">
-                <a:latin typeface="Courier New" panose="02070309020205020404" pitchFamily="49" charset="0"/>
-                <a:cs typeface="Courier New" panose="02070309020205020404" pitchFamily="49" charset="0"/>
-              </a:rPr>
-              <a:t>/</a:t>
-            </a:r>
-            <a:r>
-              <a:rPr lang="en-US" dirty="0" err="1" smtClean="0">
-                <a:latin typeface="Courier New" panose="02070309020205020404" pitchFamily="49" charset="0"/>
-                <a:cs typeface="Courier New" panose="02070309020205020404" pitchFamily="49" charset="0"/>
-              </a:rPr>
-              <a:t>passwd</a:t>
+                <a:hlinkClick r:id="rId4"/>
+              </a:rPr>
+              <a:t>github.com/NERSC/shifter</a:t>
             </a:r>
             <a:r>
               <a:rPr lang="en-US" dirty="0" smtClean="0"/>
-              <a:t>, </a:t>
-            </a:r>
-            <a:r>
-              <a:rPr lang="en-US" dirty="0" smtClean="0">
-                <a:latin typeface="Courier New" panose="02070309020205020404" pitchFamily="49" charset="0"/>
-                <a:cs typeface="Courier New" panose="02070309020205020404" pitchFamily="49" charset="0"/>
-              </a:rPr>
-              <a:t>/</a:t>
-            </a:r>
-            <a:r>
-              <a:rPr lang="en-US" dirty="0" err="1" smtClean="0">
-                <a:latin typeface="Courier New" panose="02070309020205020404" pitchFamily="49" charset="0"/>
-                <a:cs typeface="Courier New" panose="02070309020205020404" pitchFamily="49" charset="0"/>
-              </a:rPr>
-              <a:t>etc</a:t>
-            </a:r>
-            <a:r>
-              <a:rPr lang="en-US" dirty="0" smtClean="0">
-                <a:latin typeface="Courier New" panose="02070309020205020404" pitchFamily="49" charset="0"/>
-                <a:cs typeface="Courier New" panose="02070309020205020404" pitchFamily="49" charset="0"/>
-              </a:rPr>
-              <a:t>/group</a:t>
-            </a:r>
-            <a:r>
-              <a:rPr lang="en-US" dirty="0" smtClean="0"/>
-              <a:t>, </a:t>
-            </a:r>
-            <a:r>
-              <a:rPr lang="en-US" dirty="0" smtClean="0">
-                <a:latin typeface="Courier New" panose="02070309020205020404" pitchFamily="49" charset="0"/>
-                <a:cs typeface="Courier New" panose="02070309020205020404" pitchFamily="49" charset="0"/>
-              </a:rPr>
-              <a:t>/</a:t>
-            </a:r>
-            <a:r>
-              <a:rPr lang="en-US" dirty="0" err="1" smtClean="0">
-                <a:latin typeface="Courier New" panose="02070309020205020404" pitchFamily="49" charset="0"/>
-                <a:cs typeface="Courier New" panose="02070309020205020404" pitchFamily="49" charset="0"/>
-              </a:rPr>
-              <a:t>etc</a:t>
-            </a:r>
-            <a:r>
-              <a:rPr lang="en-US" dirty="0" smtClean="0">
-                <a:latin typeface="Courier New" panose="02070309020205020404" pitchFamily="49" charset="0"/>
-                <a:cs typeface="Courier New" panose="02070309020205020404" pitchFamily="49" charset="0"/>
-              </a:rPr>
-              <a:t>/shadow</a:t>
-            </a:r>
-          </a:p>
-          <a:p>
-            <a:r>
-              <a:rPr lang="en-US" dirty="0" smtClean="0"/>
-              <a:t>Do installation via definition file, </a:t>
-            </a:r>
-            <a:r>
-              <a:rPr lang="en-US" i="1" dirty="0" smtClean="0"/>
-              <a:t>not</a:t>
-            </a:r>
-            <a:r>
-              <a:rPr lang="en-US" dirty="0" smtClean="0"/>
-              <a:t> by hand</a:t>
-            </a:r>
-          </a:p>
-          <a:p>
-            <a:pPr lvl="1"/>
-            <a:r>
-              <a:rPr lang="en-US" dirty="0" smtClean="0"/>
-              <a:t>Better reproducibility</a:t>
+              <a:t> </a:t>
             </a:r>
             <a:endParaRPr lang="nl-BE" dirty="0"/>
           </a:p>
@@ -13464,7 +13749,426 @@
           <a:p>
             <a:fld id="{AEFF399F-E3B5-4890-BC79-9BC8D4DF3F2D}" type="slidenum">
               <a:rPr lang="nl-BE" smtClean="0"/>
-              <a:t>28</a:t>
+              <a:t>3</a:t>
+            </a:fld>
+            <a:endParaRPr lang="nl-BE"/>
+          </a:p>
+        </p:txBody>
+      </p:sp>
+    </p:spTree>
+    <p:extLst>
+      <p:ext uri="{BB962C8B-B14F-4D97-AF65-F5344CB8AC3E}">
+        <p14:creationId xmlns:p14="http://schemas.microsoft.com/office/powerpoint/2010/main" val="658783311"/>
+      </p:ext>
+    </p:extLst>
+  </p:cSld>
+  <p:clrMapOvr>
+    <a:masterClrMapping/>
+  </p:clrMapOvr>
+  <p:timing>
+    <p:tnLst>
+      <p:par>
+        <p:cTn id="1" dur="indefinite" restart="never" nodeType="tmRoot">
+          <p:childTnLst>
+            <p:seq concurrent="1" nextAc="seek">
+              <p:cTn id="2" dur="indefinite" nodeType="mainSeq">
+                <p:childTnLst>
+                  <p:par>
+                    <p:cTn id="3" fill="hold">
+                      <p:stCondLst>
+                        <p:cond delay="indefinite"/>
+                        <p:cond evt="onBegin" delay="0">
+                          <p:tn val="2"/>
+                        </p:cond>
+                      </p:stCondLst>
+                      <p:childTnLst>
+                        <p:par>
+                          <p:cTn id="4" fill="hold">
+                            <p:stCondLst>
+                              <p:cond delay="0"/>
+                            </p:stCondLst>
+                            <p:childTnLst>
+                              <p:par>
+                                <p:cTn id="5" presetID="1" presetClass="entr" presetSubtype="0" fill="hold" grpId="0" nodeType="withEffect">
+                                  <p:stCondLst>
+                                    <p:cond delay="0"/>
+                                  </p:stCondLst>
+                                  <p:childTnLst>
+                                    <p:set>
+                                      <p:cBhvr>
+                                        <p:cTn id="6" dur="1" fill="hold">
+                                          <p:stCondLst>
+                                            <p:cond delay="0"/>
+                                          </p:stCondLst>
+                                        </p:cTn>
+                                        <p:tgtEl>
+                                          <p:spTgt spid="3">
+                                            <p:txEl>
+                                              <p:pRg st="0" end="0"/>
+                                            </p:txEl>
+                                          </p:spTgt>
+                                        </p:tgtEl>
+                                        <p:attrNameLst>
+                                          <p:attrName>style.visibility</p:attrName>
+                                        </p:attrNameLst>
+                                      </p:cBhvr>
+                                      <p:to>
+                                        <p:strVal val="visible"/>
+                                      </p:to>
+                                    </p:set>
+                                  </p:childTnLst>
+                                </p:cTn>
+                              </p:par>
+                            </p:childTnLst>
+                          </p:cTn>
+                        </p:par>
+                      </p:childTnLst>
+                    </p:cTn>
+                  </p:par>
+                  <p:par>
+                    <p:cTn id="7" fill="hold">
+                      <p:stCondLst>
+                        <p:cond delay="indefinite"/>
+                      </p:stCondLst>
+                      <p:childTnLst>
+                        <p:par>
+                          <p:cTn id="8" fill="hold">
+                            <p:stCondLst>
+                              <p:cond delay="0"/>
+                            </p:stCondLst>
+                            <p:childTnLst>
+                              <p:par>
+                                <p:cTn id="9" presetID="1" presetClass="entr" presetSubtype="0" fill="hold" grpId="0" nodeType="clickEffect">
+                                  <p:stCondLst>
+                                    <p:cond delay="0"/>
+                                  </p:stCondLst>
+                                  <p:childTnLst>
+                                    <p:set>
+                                      <p:cBhvr>
+                                        <p:cTn id="10" dur="1" fill="hold">
+                                          <p:stCondLst>
+                                            <p:cond delay="0"/>
+                                          </p:stCondLst>
+                                        </p:cTn>
+                                        <p:tgtEl>
+                                          <p:spTgt spid="3">
+                                            <p:txEl>
+                                              <p:pRg st="1" end="1"/>
+                                            </p:txEl>
+                                          </p:spTgt>
+                                        </p:tgtEl>
+                                        <p:attrNameLst>
+                                          <p:attrName>style.visibility</p:attrName>
+                                        </p:attrNameLst>
+                                      </p:cBhvr>
+                                      <p:to>
+                                        <p:strVal val="visible"/>
+                                      </p:to>
+                                    </p:set>
+                                  </p:childTnLst>
+                                </p:cTn>
+                              </p:par>
+                              <p:par>
+                                <p:cTn id="11" presetID="1" presetClass="entr" presetSubtype="0" fill="hold" grpId="0" nodeType="withEffect">
+                                  <p:stCondLst>
+                                    <p:cond delay="0"/>
+                                  </p:stCondLst>
+                                  <p:childTnLst>
+                                    <p:set>
+                                      <p:cBhvr>
+                                        <p:cTn id="12" dur="1" fill="hold">
+                                          <p:stCondLst>
+                                            <p:cond delay="0"/>
+                                          </p:stCondLst>
+                                        </p:cTn>
+                                        <p:tgtEl>
+                                          <p:spTgt spid="3">
+                                            <p:txEl>
+                                              <p:pRg st="2" end="2"/>
+                                            </p:txEl>
+                                          </p:spTgt>
+                                        </p:tgtEl>
+                                        <p:attrNameLst>
+                                          <p:attrName>style.visibility</p:attrName>
+                                        </p:attrNameLst>
+                                      </p:cBhvr>
+                                      <p:to>
+                                        <p:strVal val="visible"/>
+                                      </p:to>
+                                    </p:set>
+                                  </p:childTnLst>
+                                </p:cTn>
+                              </p:par>
+                              <p:par>
+                                <p:cTn id="13" presetID="1" presetClass="entr" presetSubtype="0" fill="hold" grpId="0" nodeType="withEffect">
+                                  <p:stCondLst>
+                                    <p:cond delay="0"/>
+                                  </p:stCondLst>
+                                  <p:childTnLst>
+                                    <p:set>
+                                      <p:cBhvr>
+                                        <p:cTn id="14" dur="1" fill="hold">
+                                          <p:stCondLst>
+                                            <p:cond delay="0"/>
+                                          </p:stCondLst>
+                                        </p:cTn>
+                                        <p:tgtEl>
+                                          <p:spTgt spid="3">
+                                            <p:txEl>
+                                              <p:pRg st="3" end="3"/>
+                                            </p:txEl>
+                                          </p:spTgt>
+                                        </p:tgtEl>
+                                        <p:attrNameLst>
+                                          <p:attrName>style.visibility</p:attrName>
+                                        </p:attrNameLst>
+                                      </p:cBhvr>
+                                      <p:to>
+                                        <p:strVal val="visible"/>
+                                      </p:to>
+                                    </p:set>
+                                  </p:childTnLst>
+                                </p:cTn>
+                              </p:par>
+                            </p:childTnLst>
+                          </p:cTn>
+                        </p:par>
+                      </p:childTnLst>
+                    </p:cTn>
+                  </p:par>
+                </p:childTnLst>
+              </p:cTn>
+              <p:prevCondLst>
+                <p:cond evt="onPrev" delay="0">
+                  <p:tgtEl>
+                    <p:sldTgt/>
+                  </p:tgtEl>
+                </p:cond>
+              </p:prevCondLst>
+              <p:nextCondLst>
+                <p:cond evt="onNext" delay="0">
+                  <p:tgtEl>
+                    <p:sldTgt/>
+                  </p:tgtEl>
+                </p:cond>
+              </p:nextCondLst>
+            </p:seq>
+          </p:childTnLst>
+        </p:cTn>
+      </p:par>
+    </p:tnLst>
+    <p:bldLst>
+      <p:bldP spid="3" grpId="0" uiExpand="1" build="p"/>
+    </p:bldLst>
+  </p:timing>
+</p:sld>
+</file>
+
+<file path=ppt/slides/slide30.xml><?xml version="1.0" encoding="utf-8"?>
+<p:sld xmlns:a="http://schemas.openxmlformats.org/drawingml/2006/main" xmlns:r="http://schemas.openxmlformats.org/officeDocument/2006/relationships" xmlns:p="http://schemas.openxmlformats.org/presentationml/2006/main">
+  <p:cSld>
+    <p:spTree>
+      <p:nvGrpSpPr>
+        <p:cNvPr id="1" name=""/>
+        <p:cNvGrpSpPr/>
+        <p:nvPr/>
+      </p:nvGrpSpPr>
+      <p:grpSpPr>
+        <a:xfrm>
+          <a:off x="0" y="0"/>
+          <a:ext cx="0" cy="0"/>
+          <a:chOff x="0" y="0"/>
+          <a:chExt cx="0" cy="0"/>
+        </a:xfrm>
+      </p:grpSpPr>
+      <p:sp>
+        <p:nvSpPr>
+          <p:cNvPr id="2" name="Title 1"/>
+          <p:cNvSpPr>
+            <a:spLocks noGrp="1"/>
+          </p:cNvSpPr>
+          <p:nvPr>
+            <p:ph type="title"/>
+          </p:nvPr>
+        </p:nvSpPr>
+        <p:spPr/>
+        <p:txBody>
+          <a:bodyPr/>
+          <a:lstStyle/>
+          <a:p>
+            <a:r>
+              <a:rPr lang="en-US" dirty="0" smtClean="0"/>
+              <a:t>Bootstrap best practices</a:t>
+            </a:r>
+            <a:endParaRPr lang="nl-BE" dirty="0"/>
+          </a:p>
+        </p:txBody>
+      </p:sp>
+      <p:sp>
+        <p:nvSpPr>
+          <p:cNvPr id="3" name="Content Placeholder 2"/>
+          <p:cNvSpPr>
+            <a:spLocks noGrp="1"/>
+          </p:cNvSpPr>
+          <p:nvPr>
+            <p:ph idx="1"/>
+          </p:nvPr>
+        </p:nvSpPr>
+        <p:spPr/>
+        <p:txBody>
+          <a:bodyPr/>
+          <a:lstStyle/>
+          <a:p>
+            <a:r>
+              <a:rPr lang="en-US" dirty="0" smtClean="0"/>
+              <a:t>Install software in default location, not home directory</a:t>
+            </a:r>
+          </a:p>
+          <a:p>
+            <a:r>
+              <a:rPr lang="en-US" dirty="0" smtClean="0"/>
+              <a:t>Define environment variables in image's </a:t>
+            </a:r>
+            <a:r>
+              <a:rPr lang="en-US" dirty="0" smtClean="0">
+                <a:latin typeface="Courier New" panose="02070309020205020404" pitchFamily="49" charset="0"/>
+                <a:cs typeface="Courier New" panose="02070309020205020404" pitchFamily="49" charset="0"/>
+              </a:rPr>
+              <a:t>/environment</a:t>
+            </a:r>
+          </a:p>
+          <a:p>
+            <a:r>
+              <a:rPr lang="en-US" dirty="0" smtClean="0"/>
+              <a:t>Files should be owned by system account, not user</a:t>
+            </a:r>
+          </a:p>
+          <a:p>
+            <a:r>
+              <a:rPr lang="en-US" dirty="0" smtClean="0"/>
+              <a:t>Don’t mess with </a:t>
+            </a:r>
+            <a:r>
+              <a:rPr lang="en-US" dirty="0" smtClean="0">
+                <a:latin typeface="Courier New" panose="02070309020205020404" pitchFamily="49" charset="0"/>
+                <a:cs typeface="Courier New" panose="02070309020205020404" pitchFamily="49" charset="0"/>
+              </a:rPr>
+              <a:t>/</a:t>
+            </a:r>
+            <a:r>
+              <a:rPr lang="en-US" dirty="0" err="1" smtClean="0">
+                <a:latin typeface="Courier New" panose="02070309020205020404" pitchFamily="49" charset="0"/>
+                <a:cs typeface="Courier New" panose="02070309020205020404" pitchFamily="49" charset="0"/>
+              </a:rPr>
+              <a:t>etc</a:t>
+            </a:r>
+            <a:r>
+              <a:rPr lang="en-US" dirty="0" smtClean="0">
+                <a:latin typeface="Courier New" panose="02070309020205020404" pitchFamily="49" charset="0"/>
+                <a:cs typeface="Courier New" panose="02070309020205020404" pitchFamily="49" charset="0"/>
+              </a:rPr>
+              <a:t>/</a:t>
+            </a:r>
+            <a:r>
+              <a:rPr lang="en-US" dirty="0" err="1" smtClean="0">
+                <a:latin typeface="Courier New" panose="02070309020205020404" pitchFamily="49" charset="0"/>
+                <a:cs typeface="Courier New" panose="02070309020205020404" pitchFamily="49" charset="0"/>
+              </a:rPr>
+              <a:t>passwd</a:t>
+            </a:r>
+            <a:r>
+              <a:rPr lang="en-US" dirty="0" smtClean="0"/>
+              <a:t>, </a:t>
+            </a:r>
+            <a:r>
+              <a:rPr lang="en-US" dirty="0" smtClean="0">
+                <a:latin typeface="Courier New" panose="02070309020205020404" pitchFamily="49" charset="0"/>
+                <a:cs typeface="Courier New" panose="02070309020205020404" pitchFamily="49" charset="0"/>
+              </a:rPr>
+              <a:t>/</a:t>
+            </a:r>
+            <a:r>
+              <a:rPr lang="en-US" dirty="0" err="1" smtClean="0">
+                <a:latin typeface="Courier New" panose="02070309020205020404" pitchFamily="49" charset="0"/>
+                <a:cs typeface="Courier New" panose="02070309020205020404" pitchFamily="49" charset="0"/>
+              </a:rPr>
+              <a:t>etc</a:t>
+            </a:r>
+            <a:r>
+              <a:rPr lang="en-US" dirty="0" smtClean="0">
+                <a:latin typeface="Courier New" panose="02070309020205020404" pitchFamily="49" charset="0"/>
+                <a:cs typeface="Courier New" panose="02070309020205020404" pitchFamily="49" charset="0"/>
+              </a:rPr>
+              <a:t>/group</a:t>
+            </a:r>
+            <a:r>
+              <a:rPr lang="en-US" dirty="0" smtClean="0"/>
+              <a:t>, </a:t>
+            </a:r>
+            <a:r>
+              <a:rPr lang="en-US" dirty="0" smtClean="0">
+                <a:latin typeface="Courier New" panose="02070309020205020404" pitchFamily="49" charset="0"/>
+                <a:cs typeface="Courier New" panose="02070309020205020404" pitchFamily="49" charset="0"/>
+              </a:rPr>
+              <a:t>/</a:t>
+            </a:r>
+            <a:r>
+              <a:rPr lang="en-US" dirty="0" err="1" smtClean="0">
+                <a:latin typeface="Courier New" panose="02070309020205020404" pitchFamily="49" charset="0"/>
+                <a:cs typeface="Courier New" panose="02070309020205020404" pitchFamily="49" charset="0"/>
+              </a:rPr>
+              <a:t>etc</a:t>
+            </a:r>
+            <a:r>
+              <a:rPr lang="en-US" dirty="0" smtClean="0">
+                <a:latin typeface="Courier New" panose="02070309020205020404" pitchFamily="49" charset="0"/>
+                <a:cs typeface="Courier New" panose="02070309020205020404" pitchFamily="49" charset="0"/>
+              </a:rPr>
+              <a:t>/shadow</a:t>
+            </a:r>
+          </a:p>
+          <a:p>
+            <a:r>
+              <a:rPr lang="en-US" dirty="0" smtClean="0"/>
+              <a:t>Do installation via definition file, </a:t>
+            </a:r>
+            <a:r>
+              <a:rPr lang="en-US" i="1" dirty="0" smtClean="0"/>
+              <a:t>not</a:t>
+            </a:r>
+            <a:r>
+              <a:rPr lang="en-US" dirty="0" smtClean="0"/>
+              <a:t> by hand</a:t>
+            </a:r>
+          </a:p>
+          <a:p>
+            <a:pPr lvl="1"/>
+            <a:r>
+              <a:rPr lang="en-US" dirty="0" smtClean="0"/>
+              <a:t>Better reproducibility</a:t>
+            </a:r>
+            <a:endParaRPr lang="nl-BE" dirty="0"/>
+          </a:p>
+        </p:txBody>
+      </p:sp>
+      <p:sp>
+        <p:nvSpPr>
+          <p:cNvPr id="4" name="Slide Number Placeholder 3"/>
+          <p:cNvSpPr>
+            <a:spLocks noGrp="1"/>
+          </p:cNvSpPr>
+          <p:nvPr>
+            <p:ph type="sldNum" sz="quarter" idx="12"/>
+          </p:nvPr>
+        </p:nvSpPr>
+        <p:spPr/>
+        <p:txBody>
+          <a:bodyPr/>
+          <a:lstStyle/>
+          <a:p>
+            <a:fld id="{AEFF399F-E3B5-4890-BC79-9BC8D4DF3F2D}" type="slidenum">
+              <a:rPr lang="nl-BE" smtClean="0"/>
+              <a:t>30</a:t>
             </a:fld>
             <a:endParaRPr lang="nl-BE"/>
           </a:p>
@@ -13795,7 +14499,7 @@
 </p:sld>
 </file>
 
-<file path=ppt/slides/slide29.xml><?xml version="1.0" encoding="utf-8"?>
+<file path=ppt/slides/slide31.xml><?xml version="1.0" encoding="utf-8"?>
 <p:sld xmlns:a="http://schemas.openxmlformats.org/drawingml/2006/main" xmlns:r="http://schemas.openxmlformats.org/officeDocument/2006/relationships" xmlns:p="http://schemas.openxmlformats.org/presentationml/2006/main">
   <p:cSld>
     <p:spTree>
@@ -13976,7 +14680,7 @@
           <a:p>
             <a:fld id="{AEFF399F-E3B5-4890-BC79-9BC8D4DF3F2D}" type="slidenum">
               <a:rPr lang="nl-BE" smtClean="0"/>
-              <a:t>29</a:t>
+              <a:t>31</a:t>
             </a:fld>
             <a:endParaRPr lang="nl-BE"/>
           </a:p>
@@ -13998,386 +14702,6 @@
         <p:cTn id="1" dur="indefinite" restart="never" nodeType="tmRoot"/>
       </p:par>
     </p:tnLst>
-  </p:timing>
-</p:sld>
-</file>
-
-<file path=ppt/slides/slide3.xml><?xml version="1.0" encoding="utf-8"?>
-<p:sld xmlns:a="http://schemas.openxmlformats.org/drawingml/2006/main" xmlns:r="http://schemas.openxmlformats.org/officeDocument/2006/relationships" xmlns:p="http://schemas.openxmlformats.org/presentationml/2006/main">
-  <p:cSld>
-    <p:spTree>
-      <p:nvGrpSpPr>
-        <p:cNvPr id="1" name=""/>
-        <p:cNvGrpSpPr/>
-        <p:nvPr/>
-      </p:nvGrpSpPr>
-      <p:grpSpPr>
-        <a:xfrm>
-          <a:off x="0" y="0"/>
-          <a:ext cx="0" cy="0"/>
-          <a:chOff x="0" y="0"/>
-          <a:chExt cx="0" cy="0"/>
-        </a:xfrm>
-      </p:grpSpPr>
-      <p:sp>
-        <p:nvSpPr>
-          <p:cNvPr id="2" name="Title 1"/>
-          <p:cNvSpPr>
-            <a:spLocks noGrp="1"/>
-          </p:cNvSpPr>
-          <p:nvPr>
-            <p:ph type="title"/>
-          </p:nvPr>
-        </p:nvSpPr>
-        <p:spPr/>
-        <p:txBody>
-          <a:bodyPr/>
-          <a:lstStyle/>
-          <a:p>
-            <a:r>
-              <a:rPr lang="en-US" dirty="0" smtClean="0"/>
-              <a:t>Introduction</a:t>
-            </a:r>
-            <a:endParaRPr lang="nl-BE" dirty="0"/>
-          </a:p>
-        </p:txBody>
-      </p:sp>
-      <p:sp>
-        <p:nvSpPr>
-          <p:cNvPr id="3" name="Content Placeholder 2"/>
-          <p:cNvSpPr>
-            <a:spLocks noGrp="1"/>
-          </p:cNvSpPr>
-          <p:nvPr>
-            <p:ph idx="1"/>
-          </p:nvPr>
-        </p:nvSpPr>
-        <p:spPr/>
-        <p:txBody>
-          <a:bodyPr/>
-          <a:lstStyle/>
-          <a:p>
-            <a:r>
-              <a:rPr lang="en-US" dirty="0" smtClean="0"/>
-              <a:t>Singularity developed </a:t>
-            </a:r>
-            <a:r>
-              <a:rPr lang="en-US" dirty="0"/>
-              <a:t>by Berkeley Lab</a:t>
-            </a:r>
-            <a:br>
-              <a:rPr lang="en-US" dirty="0"/>
-            </a:br>
-            <a:r>
-              <a:rPr lang="en-US" dirty="0">
-                <a:hlinkClick r:id="rId2"/>
-              </a:rPr>
-              <a:t>http://singularity.lbl.gov</a:t>
-            </a:r>
-            <a:r>
-              <a:rPr lang="en-US" dirty="0" smtClean="0">
-                <a:hlinkClick r:id="rId2"/>
-              </a:rPr>
-              <a:t>/</a:t>
-            </a:r>
-            <a:r>
-              <a:rPr lang="en-US" dirty="0" smtClean="0"/>
-              <a:t> </a:t>
-            </a:r>
-          </a:p>
-          <a:p>
-            <a:r>
-              <a:rPr lang="en-US" dirty="0" smtClean="0"/>
-              <a:t>Intended as HPC alternative to</a:t>
-            </a:r>
-          </a:p>
-          <a:p>
-            <a:pPr lvl="1"/>
-            <a:r>
-              <a:rPr lang="en-US" dirty="0"/>
-              <a:t>Docker</a:t>
-            </a:r>
-            <a:br>
-              <a:rPr lang="en-US" dirty="0"/>
-            </a:br>
-            <a:r>
-              <a:rPr lang="en-US" dirty="0">
-                <a:hlinkClick r:id="rId3"/>
-              </a:rPr>
-              <a:t>https://www.docker.com</a:t>
-            </a:r>
-            <a:r>
-              <a:rPr lang="en-US" dirty="0" smtClean="0">
-                <a:hlinkClick r:id="rId3"/>
-              </a:rPr>
-              <a:t>/</a:t>
-            </a:r>
-            <a:r>
-              <a:rPr lang="en-US" dirty="0" smtClean="0"/>
-              <a:t> </a:t>
-            </a:r>
-          </a:p>
-          <a:p>
-            <a:pPr lvl="1"/>
-            <a:r>
-              <a:rPr lang="en-US" dirty="0" smtClean="0"/>
-              <a:t>Shifter</a:t>
-            </a:r>
-            <a:r>
-              <a:rPr lang="en-US" dirty="0"/>
-              <a:t/>
-            </a:r>
-            <a:br>
-              <a:rPr lang="en-US" dirty="0"/>
-            </a:br>
-            <a:r>
-              <a:rPr lang="en-US" dirty="0">
-                <a:hlinkClick r:id="rId4"/>
-              </a:rPr>
-              <a:t>https://</a:t>
-            </a:r>
-            <a:r>
-              <a:rPr lang="en-US" dirty="0" smtClean="0">
-                <a:hlinkClick r:id="rId4"/>
-              </a:rPr>
-              <a:t>github.com/NERSC/shifter</a:t>
-            </a:r>
-            <a:r>
-              <a:rPr lang="en-US" dirty="0" smtClean="0"/>
-              <a:t> </a:t>
-            </a:r>
-            <a:endParaRPr lang="nl-BE" dirty="0"/>
-          </a:p>
-        </p:txBody>
-      </p:sp>
-      <p:sp>
-        <p:nvSpPr>
-          <p:cNvPr id="4" name="Slide Number Placeholder 3"/>
-          <p:cNvSpPr>
-            <a:spLocks noGrp="1"/>
-          </p:cNvSpPr>
-          <p:nvPr>
-            <p:ph type="sldNum" sz="quarter" idx="12"/>
-          </p:nvPr>
-        </p:nvSpPr>
-        <p:spPr/>
-        <p:txBody>
-          <a:bodyPr/>
-          <a:lstStyle/>
-          <a:p>
-            <a:fld id="{AEFF399F-E3B5-4890-BC79-9BC8D4DF3F2D}" type="slidenum">
-              <a:rPr lang="nl-BE" smtClean="0"/>
-              <a:t>3</a:t>
-            </a:fld>
-            <a:endParaRPr lang="nl-BE"/>
-          </a:p>
-        </p:txBody>
-      </p:sp>
-    </p:spTree>
-    <p:extLst>
-      <p:ext uri="{BB962C8B-B14F-4D97-AF65-F5344CB8AC3E}">
-        <p14:creationId xmlns:p14="http://schemas.microsoft.com/office/powerpoint/2010/main" val="658783311"/>
-      </p:ext>
-    </p:extLst>
-  </p:cSld>
-  <p:clrMapOvr>
-    <a:masterClrMapping/>
-  </p:clrMapOvr>
-  <p:timing>
-    <p:tnLst>
-      <p:par>
-        <p:cTn id="1" dur="indefinite" restart="never" nodeType="tmRoot">
-          <p:childTnLst>
-            <p:seq concurrent="1" nextAc="seek">
-              <p:cTn id="2" dur="indefinite" nodeType="mainSeq">
-                <p:childTnLst>
-                  <p:par>
-                    <p:cTn id="3" fill="hold">
-                      <p:stCondLst>
-                        <p:cond delay="indefinite"/>
-                        <p:cond evt="onBegin" delay="0">
-                          <p:tn val="2"/>
-                        </p:cond>
-                      </p:stCondLst>
-                      <p:childTnLst>
-                        <p:par>
-                          <p:cTn id="4" fill="hold">
-                            <p:stCondLst>
-                              <p:cond delay="0"/>
-                            </p:stCondLst>
-                            <p:childTnLst>
-                              <p:par>
-                                <p:cTn id="5" presetID="1" presetClass="entr" presetSubtype="0" fill="hold" grpId="0" nodeType="withEffect">
-                                  <p:stCondLst>
-                                    <p:cond delay="0"/>
-                                  </p:stCondLst>
-                                  <p:childTnLst>
-                                    <p:set>
-                                      <p:cBhvr>
-                                        <p:cTn id="6" dur="1" fill="hold">
-                                          <p:stCondLst>
-                                            <p:cond delay="0"/>
-                                          </p:stCondLst>
-                                        </p:cTn>
-                                        <p:tgtEl>
-                                          <p:spTgt spid="3">
-                                            <p:txEl>
-                                              <p:pRg st="0" end="0"/>
-                                            </p:txEl>
-                                          </p:spTgt>
-                                        </p:tgtEl>
-                                        <p:attrNameLst>
-                                          <p:attrName>style.visibility</p:attrName>
-                                        </p:attrNameLst>
-                                      </p:cBhvr>
-                                      <p:to>
-                                        <p:strVal val="visible"/>
-                                      </p:to>
-                                    </p:set>
-                                  </p:childTnLst>
-                                </p:cTn>
-                              </p:par>
-                            </p:childTnLst>
-                          </p:cTn>
-                        </p:par>
-                      </p:childTnLst>
-                    </p:cTn>
-                  </p:par>
-                  <p:par>
-                    <p:cTn id="7" fill="hold">
-                      <p:stCondLst>
-                        <p:cond delay="indefinite"/>
-                      </p:stCondLst>
-                      <p:childTnLst>
-                        <p:par>
-                          <p:cTn id="8" fill="hold">
-                            <p:stCondLst>
-                              <p:cond delay="0"/>
-                            </p:stCondLst>
-                            <p:childTnLst>
-                              <p:par>
-                                <p:cTn id="9" presetID="1" presetClass="entr" presetSubtype="0" fill="hold" grpId="0" nodeType="clickEffect">
-                                  <p:stCondLst>
-                                    <p:cond delay="0"/>
-                                  </p:stCondLst>
-                                  <p:childTnLst>
-                                    <p:set>
-                                      <p:cBhvr>
-                                        <p:cTn id="10" dur="1" fill="hold">
-                                          <p:stCondLst>
-                                            <p:cond delay="0"/>
-                                          </p:stCondLst>
-                                        </p:cTn>
-                                        <p:tgtEl>
-                                          <p:spTgt spid="3">
-                                            <p:txEl>
-                                              <p:pRg st="1" end="1"/>
-                                            </p:txEl>
-                                          </p:spTgt>
-                                        </p:tgtEl>
-                                        <p:attrNameLst>
-                                          <p:attrName>style.visibility</p:attrName>
-                                        </p:attrNameLst>
-                                      </p:cBhvr>
-                                      <p:to>
-                                        <p:strVal val="visible"/>
-                                      </p:to>
-                                    </p:set>
-                                  </p:childTnLst>
-                                </p:cTn>
-                              </p:par>
-                              <p:par>
-                                <p:cTn id="11" presetID="1" presetClass="entr" presetSubtype="0" fill="hold" grpId="0" nodeType="withEffect">
-                                  <p:stCondLst>
-                                    <p:cond delay="0"/>
-                                  </p:stCondLst>
-                                  <p:childTnLst>
-                                    <p:set>
-                                      <p:cBhvr>
-                                        <p:cTn id="12" dur="1" fill="hold">
-                                          <p:stCondLst>
-                                            <p:cond delay="0"/>
-                                          </p:stCondLst>
-                                        </p:cTn>
-                                        <p:tgtEl>
-                                          <p:spTgt spid="3">
-                                            <p:txEl>
-                                              <p:pRg st="2" end="2"/>
-                                            </p:txEl>
-                                          </p:spTgt>
-                                        </p:tgtEl>
-                                        <p:attrNameLst>
-                                          <p:attrName>style.visibility</p:attrName>
-                                        </p:attrNameLst>
-                                      </p:cBhvr>
-                                      <p:to>
-                                        <p:strVal val="visible"/>
-                                      </p:to>
-                                    </p:set>
-                                  </p:childTnLst>
-                                </p:cTn>
-                              </p:par>
-                              <p:par>
-                                <p:cTn id="13" presetID="1" presetClass="entr" presetSubtype="0" fill="hold" grpId="0" nodeType="withEffect">
-                                  <p:stCondLst>
-                                    <p:cond delay="0"/>
-                                  </p:stCondLst>
-                                  <p:childTnLst>
-                                    <p:set>
-                                      <p:cBhvr>
-                                        <p:cTn id="14" dur="1" fill="hold">
-                                          <p:stCondLst>
-                                            <p:cond delay="0"/>
-                                          </p:stCondLst>
-                                        </p:cTn>
-                                        <p:tgtEl>
-                                          <p:spTgt spid="3">
-                                            <p:txEl>
-                                              <p:pRg st="3" end="3"/>
-                                            </p:txEl>
-                                          </p:spTgt>
-                                        </p:tgtEl>
-                                        <p:attrNameLst>
-                                          <p:attrName>style.visibility</p:attrName>
-                                        </p:attrNameLst>
-                                      </p:cBhvr>
-                                      <p:to>
-                                        <p:strVal val="visible"/>
-                                      </p:to>
-                                    </p:set>
-                                  </p:childTnLst>
-                                </p:cTn>
-                              </p:par>
-                            </p:childTnLst>
-                          </p:cTn>
-                        </p:par>
-                      </p:childTnLst>
-                    </p:cTn>
-                  </p:par>
-                </p:childTnLst>
-              </p:cTn>
-              <p:prevCondLst>
-                <p:cond evt="onPrev" delay="0">
-                  <p:tgtEl>
-                    <p:sldTgt/>
-                  </p:tgtEl>
-                </p:cond>
-              </p:prevCondLst>
-              <p:nextCondLst>
-                <p:cond evt="onNext" delay="0">
-                  <p:tgtEl>
-                    <p:sldTgt/>
-                  </p:tgtEl>
-                </p:cond>
-              </p:nextCondLst>
-            </p:seq>
-          </p:childTnLst>
-        </p:cTn>
-      </p:par>
-    </p:tnLst>
-    <p:bldLst>
-      <p:bldP spid="3" grpId="0" uiExpand="1" build="p"/>
-    </p:bldLst>
   </p:timing>
 </p:sld>
 </file>

</xml_diff>

<commit_message>
Added slides on performance/overhead
</commit_message>
<xml_diff>
--- a/Virtualization/singularity.pptx
+++ b/Virtualization/singularity.pptx
@@ -5,7 +5,7 @@
     <p:sldMasterId id="2147483660" r:id="rId1"/>
   </p:sldMasterIdLst>
   <p:notesMasterIdLst>
-    <p:notesMasterId r:id="rId33"/>
+    <p:notesMasterId r:id="rId34"/>
   </p:notesMasterIdLst>
   <p:sldIdLst>
     <p:sldId id="256" r:id="rId2"/>
@@ -35,10 +35,11 @@
     <p:sldId id="281" r:id="rId26"/>
     <p:sldId id="285" r:id="rId27"/>
     <p:sldId id="286" r:id="rId28"/>
-    <p:sldId id="272" r:id="rId29"/>
-    <p:sldId id="276" r:id="rId30"/>
-    <p:sldId id="270" r:id="rId31"/>
-    <p:sldId id="277" r:id="rId32"/>
+    <p:sldId id="287" r:id="rId29"/>
+    <p:sldId id="272" r:id="rId30"/>
+    <p:sldId id="276" r:id="rId31"/>
+    <p:sldId id="270" r:id="rId32"/>
+    <p:sldId id="277" r:id="rId33"/>
   </p:sldIdLst>
   <p:sldSz cx="9144000" cy="6858000" type="screen4x3"/>
   <p:notesSz cx="6858000" cy="9144000"/>
@@ -227,7 +228,7 @@
           <a:p>
             <a:fld id="{6BD974B4-F374-4E74-84D3-1EB7DBF32A2A}" type="datetimeFigureOut">
               <a:rPr lang="nl-BE" smtClean="0"/>
-              <a:t>2016-11-09</a:t>
+              <a:t>2016-11-14</a:t>
             </a:fld>
             <a:endParaRPr lang="nl-BE"/>
           </a:p>
@@ -710,7 +711,7 @@
           <a:p>
             <a:fld id="{A433E747-842D-4EF3-8202-AC54FEC33061}" type="datetime1">
               <a:rPr lang="nl-BE" smtClean="0"/>
-              <a:t>2016-11-09</a:t>
+              <a:t>2016-11-14</a:t>
             </a:fld>
             <a:endParaRPr lang="nl-BE"/>
           </a:p>
@@ -880,7 +881,7 @@
           <a:p>
             <a:fld id="{7C821354-3381-4DF5-ABED-FDAFA2BAD3F8}" type="datetime1">
               <a:rPr lang="nl-BE" smtClean="0"/>
-              <a:t>2016-11-09</a:t>
+              <a:t>2016-11-14</a:t>
             </a:fld>
             <a:endParaRPr lang="nl-BE"/>
           </a:p>
@@ -1060,7 +1061,7 @@
           <a:p>
             <a:fld id="{C6B54B95-9964-4BBF-B171-A69413AB9FC5}" type="datetime1">
               <a:rPr lang="nl-BE" smtClean="0"/>
-              <a:t>2016-11-09</a:t>
+              <a:t>2016-11-14</a:t>
             </a:fld>
             <a:endParaRPr lang="nl-BE"/>
           </a:p>
@@ -1230,7 +1231,7 @@
           <a:p>
             <a:fld id="{BE45CDE5-064C-4862-90E9-83B8FD778625}" type="datetime1">
               <a:rPr lang="nl-BE" smtClean="0"/>
-              <a:t>2016-11-09</a:t>
+              <a:t>2016-11-14</a:t>
             </a:fld>
             <a:endParaRPr lang="nl-BE"/>
           </a:p>
@@ -1474,7 +1475,7 @@
           <a:p>
             <a:fld id="{C75A345C-628E-463E-B8F7-69C25D344DF5}" type="datetime1">
               <a:rPr lang="nl-BE" smtClean="0"/>
-              <a:t>2016-11-09</a:t>
+              <a:t>2016-11-14</a:t>
             </a:fld>
             <a:endParaRPr lang="nl-BE"/>
           </a:p>
@@ -1706,7 +1707,7 @@
           <a:p>
             <a:fld id="{65B04534-538C-4249-A635-8BB2B8486464}" type="datetime1">
               <a:rPr lang="nl-BE" smtClean="0"/>
-              <a:t>2016-11-09</a:t>
+              <a:t>2016-11-14</a:t>
             </a:fld>
             <a:endParaRPr lang="nl-BE"/>
           </a:p>
@@ -2073,7 +2074,7 @@
           <a:p>
             <a:fld id="{089671CB-8547-4C91-A3D5-012E6E8790E6}" type="datetime1">
               <a:rPr lang="nl-BE" smtClean="0"/>
-              <a:t>2016-11-09</a:t>
+              <a:t>2016-11-14</a:t>
             </a:fld>
             <a:endParaRPr lang="nl-BE"/>
           </a:p>
@@ -2191,7 +2192,7 @@
           <a:p>
             <a:fld id="{5765335F-FC99-4A2B-B87B-6AF6F3762B67}" type="datetime1">
               <a:rPr lang="nl-BE" smtClean="0"/>
-              <a:t>2016-11-09</a:t>
+              <a:t>2016-11-14</a:t>
             </a:fld>
             <a:endParaRPr lang="nl-BE"/>
           </a:p>
@@ -2286,7 +2287,7 @@
           <a:p>
             <a:fld id="{1711BA58-B677-4D21-BDCD-9DD1AEA8A328}" type="datetime1">
               <a:rPr lang="nl-BE" smtClean="0"/>
-              <a:t>2016-11-09</a:t>
+              <a:t>2016-11-14</a:t>
             </a:fld>
             <a:endParaRPr lang="nl-BE"/>
           </a:p>
@@ -2563,7 +2564,7 @@
           <a:p>
             <a:fld id="{5513BE8B-B89C-461B-89D1-D5BE33ADB6B9}" type="datetime1">
               <a:rPr lang="nl-BE" smtClean="0"/>
-              <a:t>2016-11-09</a:t>
+              <a:t>2016-11-14</a:t>
             </a:fld>
             <a:endParaRPr lang="nl-BE"/>
           </a:p>
@@ -2820,7 +2821,7 @@
           <a:p>
             <a:fld id="{AEE65485-0554-4482-9B9C-289893A0B56B}" type="datetime1">
               <a:rPr lang="nl-BE" smtClean="0"/>
-              <a:t>2016-11-09</a:t>
+              <a:t>2016-11-14</a:t>
             </a:fld>
             <a:endParaRPr lang="nl-BE"/>
           </a:p>
@@ -3033,7 +3034,7 @@
           <a:p>
             <a:fld id="{6FF26CEC-AF8A-4096-9A53-521F7571A055}" type="datetime1">
               <a:rPr lang="nl-BE" smtClean="0"/>
-              <a:t>2016-11-09</a:t>
+              <a:t>2016-11-14</a:t>
             </a:fld>
             <a:endParaRPr lang="nl-BE"/>
           </a:p>
@@ -5937,11 +5938,7 @@
             <a:pPr lvl="1"/>
             <a:r>
               <a:rPr lang="en-US" dirty="0" smtClean="0"/>
-              <a:t>Nice for debugging, fast </a:t>
-            </a:r>
-            <a:r>
-              <a:rPr lang="en-US" dirty="0" smtClean="0"/>
-              <a:t>cycle</a:t>
+              <a:t>Nice for debugging, fast cycle</a:t>
             </a:r>
           </a:p>
           <a:p>
@@ -10221,11 +10218,7 @@
           <a:p>
             <a:r>
               <a:rPr lang="en-US" dirty="0" smtClean="0"/>
-              <a:t>PBS job </a:t>
-            </a:r>
-            <a:r>
-              <a:rPr lang="en-US" dirty="0" smtClean="0"/>
-              <a:t>script, e.g., scaling test</a:t>
+              <a:t>PBS job script, e.g., scaling test</a:t>
             </a:r>
             <a:endParaRPr lang="nl-BE" dirty="0"/>
           </a:p>
@@ -10461,14 +10454,7 @@
                 <a:latin typeface="Courier New" panose="02070309020205020404" pitchFamily="49" charset="0"/>
                 <a:cs typeface="Courier New" panose="02070309020205020404" pitchFamily="49" charset="0"/>
               </a:rPr>
-              <a:t>       </a:t>
-            </a:r>
-            <a:r>
-              <a:rPr lang="en-US" dirty="0" smtClean="0">
-                <a:latin typeface="Courier New" panose="02070309020205020404" pitchFamily="49" charset="0"/>
-                <a:cs typeface="Courier New" panose="02070309020205020404" pitchFamily="49" charset="0"/>
-              </a:rPr>
-              <a:t>pi_openmp.exe 100000000</a:t>
+              <a:t>       pi_openmp.exe 100000000</a:t>
             </a:r>
           </a:p>
           <a:p>
@@ -10515,27 +10501,7 @@
           <a:p>
             <a:r>
               <a:rPr lang="en-US" sz="2400" dirty="0" smtClean="0"/>
-              <a:t>Note: </a:t>
-            </a:r>
-            <a:r>
-              <a:rPr lang="en-US" sz="2400" dirty="0" smtClean="0"/>
-              <a:t>compiler </a:t>
-            </a:r>
-            <a:r>
-              <a:rPr lang="en-US" sz="2400" dirty="0" smtClean="0"/>
-              <a:t>version </a:t>
-            </a:r>
-            <a:r>
-              <a:rPr lang="en-US" sz="2400" dirty="0" smtClean="0"/>
-              <a:t>in image </a:t>
-            </a:r>
-            <a:r>
-              <a:rPr lang="en-US" sz="2400" dirty="0" smtClean="0"/>
-              <a:t>need not be same as </a:t>
-            </a:r>
-            <a:r>
-              <a:rPr lang="en-US" sz="2400" dirty="0" smtClean="0"/>
-              <a:t>on host</a:t>
+              <a:t>Note: compiler version in image need not be same as on host</a:t>
             </a:r>
             <a:endParaRPr lang="nl-BE" sz="2400" dirty="0"/>
           </a:p>
@@ -12448,15 +12414,7 @@
             </a:r>
             <a:r>
               <a:rPr lang="en-US" sz="2400" dirty="0" smtClean="0"/>
-              <a:t> version in image is same as </a:t>
-            </a:r>
-            <a:r>
-              <a:rPr lang="en-US" sz="2400" dirty="0" smtClean="0"/>
-              <a:t>on </a:t>
-            </a:r>
-            <a:r>
-              <a:rPr lang="en-US" sz="2400" dirty="0" smtClean="0"/>
-              <a:t>host</a:t>
+              <a:t> version in image is same as on host</a:t>
             </a:r>
             <a:endParaRPr lang="nl-BE" sz="2400" dirty="0"/>
           </a:p>
@@ -12707,7 +12665,9 @@
         </p:nvSpPr>
         <p:spPr/>
         <p:txBody>
-          <a:bodyPr/>
+          <a:bodyPr>
+            <a:normAutofit lnSpcReduction="10000"/>
+          </a:bodyPr>
           <a:lstStyle/>
           <a:p>
             <a:r>
@@ -12741,12 +12701,30 @@
           <a:p>
             <a:r>
               <a:rPr lang="en-US" dirty="0" smtClean="0"/>
-              <a:t>Serial code/</a:t>
+              <a:t>Serial </a:t>
+            </a:r>
+            <a:r>
+              <a:rPr lang="en-US" dirty="0" smtClean="0"/>
+              <a:t>code/</a:t>
             </a:r>
             <a:r>
               <a:rPr lang="en-US" dirty="0" err="1" smtClean="0"/>
               <a:t>OpenMP</a:t>
             </a:r>
+            <a:r>
+              <a:rPr lang="en-US" dirty="0" smtClean="0"/>
+              <a:t> (computing </a:t>
+            </a:r>
+            <a:r>
+              <a:rPr lang="en-US" dirty="0" smtClean="0">
+                <a:sym typeface="Symbol" panose="05050102010706020507" pitchFamily="18" charset="2"/>
+              </a:rPr>
+              <a:t></a:t>
+            </a:r>
+            <a:r>
+              <a:rPr lang="en-US" dirty="0" smtClean="0"/>
+              <a:t>)</a:t>
+            </a:r>
             <a:endParaRPr lang="en-US" dirty="0" smtClean="0"/>
           </a:p>
           <a:p>
@@ -12811,8 +12789,40 @@
             <a:pPr lvl="1"/>
             <a:r>
               <a:rPr lang="en-US" dirty="0" smtClean="0"/>
-              <a:t>(Almost) independent of number of threads</a:t>
-            </a:r>
+              <a:t>(Almost) independent of number of </a:t>
+            </a:r>
+            <a:r>
+              <a:rPr lang="en-US" dirty="0" smtClean="0"/>
+              <a:t>threads</a:t>
+            </a:r>
+          </a:p>
+          <a:p>
+            <a:r>
+              <a:rPr lang="en-US" dirty="0" smtClean="0"/>
+              <a:t>MPI (computing SVD, matrix product)</a:t>
+            </a:r>
+          </a:p>
+          <a:p>
+            <a:pPr lvl="1"/>
+            <a:r>
+              <a:rPr lang="en-US" dirty="0" smtClean="0"/>
+              <a:t>PDGESVD: 7 % for 16 processes, 24 % for 64 processes</a:t>
+            </a:r>
+          </a:p>
+          <a:p>
+            <a:pPr lvl="1"/>
+            <a:r>
+              <a:rPr lang="en-US" dirty="0" smtClean="0"/>
+              <a:t>PDGEMM: &lt; 1 % for 16 processes, 10 % for 64 processes</a:t>
+            </a:r>
+          </a:p>
+          <a:p>
+            <a:pPr lvl="1"/>
+            <a:r>
+              <a:rPr lang="en-US" dirty="0" smtClean="0"/>
+              <a:t>However, serial GESVD: 10 % </a:t>
+            </a:r>
+            <a:endParaRPr lang="en-US" dirty="0" smtClean="0"/>
           </a:p>
           <a:p>
             <a:pPr lvl="1"/>
@@ -12851,7 +12861,7 @@
         </p:nvSpPr>
         <p:spPr>
           <a:xfrm>
-            <a:off x="1551214" y="2311174"/>
+            <a:off x="1551214" y="2245862"/>
             <a:ext cx="5102807" cy="830997"/>
           </a:xfrm>
           <a:prstGeom prst="rect">
@@ -13184,6 +13194,166 @@
                       </p:childTnLst>
                     </p:cTn>
                   </p:par>
+                  <p:par>
+                    <p:cTn id="23" fill="hold">
+                      <p:stCondLst>
+                        <p:cond delay="indefinite"/>
+                      </p:stCondLst>
+                      <p:childTnLst>
+                        <p:par>
+                          <p:cTn id="24" fill="hold">
+                            <p:stCondLst>
+                              <p:cond delay="0"/>
+                            </p:stCondLst>
+                            <p:childTnLst>
+                              <p:par>
+                                <p:cTn id="25" presetID="1" presetClass="entr" presetSubtype="0" fill="hold" grpId="0" nodeType="clickEffect">
+                                  <p:stCondLst>
+                                    <p:cond delay="0"/>
+                                  </p:stCondLst>
+                                  <p:childTnLst>
+                                    <p:set>
+                                      <p:cBhvr>
+                                        <p:cTn id="26" dur="1" fill="hold">
+                                          <p:stCondLst>
+                                            <p:cond delay="0"/>
+                                          </p:stCondLst>
+                                        </p:cTn>
+                                        <p:tgtEl>
+                                          <p:spTgt spid="6">
+                                            <p:txEl>
+                                              <p:pRg st="7" end="7"/>
+                                            </p:txEl>
+                                          </p:spTgt>
+                                        </p:tgtEl>
+                                        <p:attrNameLst>
+                                          <p:attrName>style.visibility</p:attrName>
+                                        </p:attrNameLst>
+                                      </p:cBhvr>
+                                      <p:to>
+                                        <p:strVal val="visible"/>
+                                      </p:to>
+                                    </p:set>
+                                  </p:childTnLst>
+                                </p:cTn>
+                              </p:par>
+                              <p:par>
+                                <p:cTn id="27" presetID="1" presetClass="entr" presetSubtype="0" fill="hold" grpId="0" nodeType="withEffect">
+                                  <p:stCondLst>
+                                    <p:cond delay="0"/>
+                                  </p:stCondLst>
+                                  <p:childTnLst>
+                                    <p:set>
+                                      <p:cBhvr>
+                                        <p:cTn id="28" dur="1" fill="hold">
+                                          <p:stCondLst>
+                                            <p:cond delay="0"/>
+                                          </p:stCondLst>
+                                        </p:cTn>
+                                        <p:tgtEl>
+                                          <p:spTgt spid="6">
+                                            <p:txEl>
+                                              <p:pRg st="8" end="8"/>
+                                            </p:txEl>
+                                          </p:spTgt>
+                                        </p:tgtEl>
+                                        <p:attrNameLst>
+                                          <p:attrName>style.visibility</p:attrName>
+                                        </p:attrNameLst>
+                                      </p:cBhvr>
+                                      <p:to>
+                                        <p:strVal val="visible"/>
+                                      </p:to>
+                                    </p:set>
+                                  </p:childTnLst>
+                                </p:cTn>
+                              </p:par>
+                              <p:par>
+                                <p:cTn id="29" presetID="1" presetClass="entr" presetSubtype="0" fill="hold" grpId="0" nodeType="withEffect">
+                                  <p:stCondLst>
+                                    <p:cond delay="0"/>
+                                  </p:stCondLst>
+                                  <p:childTnLst>
+                                    <p:set>
+                                      <p:cBhvr>
+                                        <p:cTn id="30" dur="1" fill="hold">
+                                          <p:stCondLst>
+                                            <p:cond delay="0"/>
+                                          </p:stCondLst>
+                                        </p:cTn>
+                                        <p:tgtEl>
+                                          <p:spTgt spid="6">
+                                            <p:txEl>
+                                              <p:pRg st="9" end="9"/>
+                                            </p:txEl>
+                                          </p:spTgt>
+                                        </p:tgtEl>
+                                        <p:attrNameLst>
+                                          <p:attrName>style.visibility</p:attrName>
+                                        </p:attrNameLst>
+                                      </p:cBhvr>
+                                      <p:to>
+                                        <p:strVal val="visible"/>
+                                      </p:to>
+                                    </p:set>
+                                  </p:childTnLst>
+                                </p:cTn>
+                              </p:par>
+                            </p:childTnLst>
+                          </p:cTn>
+                        </p:par>
+                      </p:childTnLst>
+                    </p:cTn>
+                  </p:par>
+                  <p:par>
+                    <p:cTn id="31" fill="hold">
+                      <p:stCondLst>
+                        <p:cond delay="indefinite"/>
+                      </p:stCondLst>
+                      <p:childTnLst>
+                        <p:par>
+                          <p:cTn id="32" fill="hold">
+                            <p:stCondLst>
+                              <p:cond delay="0"/>
+                            </p:stCondLst>
+                            <p:childTnLst>
+                              <p:par>
+                                <p:cTn id="33" presetID="1" presetClass="entr" presetSubtype="0" fill="hold" grpId="0" nodeType="clickEffect">
+                                  <p:stCondLst>
+                                    <p:cond delay="0"/>
+                                  </p:stCondLst>
+                                  <p:childTnLst>
+                                    <p:set>
+                                      <p:cBhvr>
+                                        <p:cTn id="34" dur="1" fill="hold">
+                                          <p:stCondLst>
+                                            <p:cond delay="0"/>
+                                          </p:stCondLst>
+                                        </p:cTn>
+                                        <p:tgtEl>
+                                          <p:spTgt spid="6">
+                                            <p:txEl>
+                                              <p:pRg st="10" end="10"/>
+                                            </p:txEl>
+                                          </p:spTgt>
+                                        </p:tgtEl>
+                                        <p:attrNameLst>
+                                          <p:attrName>style.visibility</p:attrName>
+                                        </p:attrNameLst>
+                                      </p:cBhvr>
+                                      <p:to>
+                                        <p:strVal val="visible"/>
+                                      </p:to>
+                                    </p:set>
+                                  </p:childTnLst>
+                                </p:cTn>
+                              </p:par>
+                            </p:childTnLst>
+                          </p:cTn>
+                        </p:par>
+                      </p:childTnLst>
+                    </p:cTn>
+                  </p:par>
                 </p:childTnLst>
               </p:cTn>
               <p:prevCondLst>
@@ -13247,7 +13417,7 @@
           <a:p>
             <a:r>
               <a:rPr lang="en-US" dirty="0" smtClean="0"/>
-              <a:t>Conclusions</a:t>
+              <a:t>Singularity performance pitfalls</a:t>
             </a:r>
             <a:endParaRPr lang="nl-BE" dirty="0"/>
           </a:p>
@@ -13255,12 +13425,12 @@
       </p:sp>
       <p:sp>
         <p:nvSpPr>
-          <p:cNvPr id="3" name="Text Placeholder 2"/>
+          <p:cNvPr id="3" name="Content Placeholder 2"/>
           <p:cNvSpPr>
             <a:spLocks noGrp="1"/>
           </p:cNvSpPr>
           <p:nvPr>
-            <p:ph type="body" idx="1"/>
+            <p:ph idx="1"/>
           </p:nvPr>
         </p:nvSpPr>
         <p:spPr/>
@@ -13268,7 +13438,77 @@
           <a:bodyPr/>
           <a:lstStyle/>
           <a:p>
-            <a:endParaRPr lang="nl-BE"/>
+            <a:r>
+              <a:rPr lang="en-US" dirty="0" smtClean="0"/>
+              <a:t>Using non-optimized libraries/applications</a:t>
+            </a:r>
+          </a:p>
+          <a:p>
+            <a:pPr lvl="1"/>
+            <a:r>
+              <a:rPr lang="en-US" dirty="0" smtClean="0"/>
+              <a:t>Compilation can/should target specific hardware,</a:t>
+            </a:r>
+            <a:br>
+              <a:rPr lang="en-US" dirty="0" smtClean="0"/>
+            </a:br>
+            <a:r>
+              <a:rPr lang="en-US" dirty="0" smtClean="0"/>
+              <a:t>e.g., </a:t>
+            </a:r>
+            <a:r>
+              <a:rPr lang="en-US" dirty="0" smtClean="0">
+                <a:latin typeface="Courier New" panose="02070309020205020404" pitchFamily="49" charset="0"/>
+                <a:cs typeface="Courier New" panose="02070309020205020404" pitchFamily="49" charset="0"/>
+              </a:rPr>
+              <a:t>-</a:t>
+            </a:r>
+            <a:r>
+              <a:rPr lang="en-US" dirty="0" err="1" smtClean="0">
+                <a:latin typeface="Courier New" panose="02070309020205020404" pitchFamily="49" charset="0"/>
+                <a:cs typeface="Courier New" panose="02070309020205020404" pitchFamily="49" charset="0"/>
+              </a:rPr>
+              <a:t>xHost</a:t>
+            </a:r>
+            <a:endParaRPr lang="en-US" dirty="0" smtClean="0">
+              <a:latin typeface="Courier New" panose="02070309020205020404" pitchFamily="49" charset="0"/>
+              <a:cs typeface="Courier New" panose="02070309020205020404" pitchFamily="49" charset="0"/>
+            </a:endParaRPr>
+          </a:p>
+          <a:p>
+            <a:pPr lvl="1"/>
+            <a:r>
+              <a:rPr lang="en-US" dirty="0" smtClean="0"/>
+              <a:t>Performance loss up to 10-40 %</a:t>
+            </a:r>
+            <a:endParaRPr lang="en-US" dirty="0" smtClean="0">
+              <a:sym typeface="Symbol" panose="05050102010706020507" pitchFamily="18" charset="2"/>
+            </a:endParaRPr>
+          </a:p>
+          <a:p>
+            <a:pPr lvl="1"/>
+            <a:r>
+              <a:rPr lang="en-US" dirty="0" smtClean="0">
+                <a:sym typeface="Symbol" panose="05050102010706020507" pitchFamily="18" charset="2"/>
+              </a:rPr>
+              <a:t>Crucial for BLAS, propagates to other scientific libraries, e.g., LAPACK, </a:t>
+            </a:r>
+            <a:r>
+              <a:rPr lang="en-US" dirty="0" err="1" smtClean="0">
+                <a:sym typeface="Symbol" panose="05050102010706020507" pitchFamily="18" charset="2"/>
+              </a:rPr>
+              <a:t>PETSc</a:t>
+            </a:r>
+            <a:r>
+              <a:rPr lang="en-US" dirty="0" smtClean="0">
+                <a:sym typeface="Symbol" panose="05050102010706020507" pitchFamily="18" charset="2"/>
+              </a:rPr>
+              <a:t>,…</a:t>
+            </a:r>
+          </a:p>
+          <a:p>
+            <a:pPr lvl="1"/>
+            <a:endParaRPr lang="nl-BE" dirty="0"/>
           </a:p>
         </p:txBody>
       </p:sp>
@@ -13298,7 +13538,7 @@
     </p:spTree>
     <p:extLst>
       <p:ext uri="{BB962C8B-B14F-4D97-AF65-F5344CB8AC3E}">
-        <p14:creationId xmlns:p14="http://schemas.microsoft.com/office/powerpoint/2010/main" val="2192721825"/>
+        <p14:creationId xmlns:p14="http://schemas.microsoft.com/office/powerpoint/2010/main" val="2815864639"/>
       </p:ext>
     </p:extLst>
   </p:cSld>
@@ -13308,9 +13548,234 @@
   <p:timing>
     <p:tnLst>
       <p:par>
-        <p:cTn id="1" dur="indefinite" restart="never" nodeType="tmRoot"/>
+        <p:cTn id="1" dur="indefinite" restart="never" nodeType="tmRoot">
+          <p:childTnLst>
+            <p:seq concurrent="1" nextAc="seek">
+              <p:cTn id="2" dur="indefinite" nodeType="mainSeq">
+                <p:childTnLst>
+                  <p:par>
+                    <p:cTn id="3" fill="hold">
+                      <p:stCondLst>
+                        <p:cond delay="indefinite"/>
+                        <p:cond evt="onBegin" delay="0">
+                          <p:tn val="2"/>
+                        </p:cond>
+                      </p:stCondLst>
+                      <p:childTnLst>
+                        <p:par>
+                          <p:cTn id="4" fill="hold">
+                            <p:stCondLst>
+                              <p:cond delay="0"/>
+                            </p:stCondLst>
+                            <p:childTnLst>
+                              <p:par>
+                                <p:cTn id="5" presetID="1" presetClass="entr" presetSubtype="0" fill="hold" grpId="0" nodeType="withEffect">
+                                  <p:stCondLst>
+                                    <p:cond delay="0"/>
+                                  </p:stCondLst>
+                                  <p:childTnLst>
+                                    <p:set>
+                                      <p:cBhvr>
+                                        <p:cTn id="6" dur="1" fill="hold">
+                                          <p:stCondLst>
+                                            <p:cond delay="0"/>
+                                          </p:stCondLst>
+                                        </p:cTn>
+                                        <p:tgtEl>
+                                          <p:spTgt spid="3">
+                                            <p:txEl>
+                                              <p:pRg st="0" end="0"/>
+                                            </p:txEl>
+                                          </p:spTgt>
+                                        </p:tgtEl>
+                                        <p:attrNameLst>
+                                          <p:attrName>style.visibility</p:attrName>
+                                        </p:attrNameLst>
+                                      </p:cBhvr>
+                                      <p:to>
+                                        <p:strVal val="visible"/>
+                                      </p:to>
+                                    </p:set>
+                                  </p:childTnLst>
+                                </p:cTn>
+                              </p:par>
+                            </p:childTnLst>
+                          </p:cTn>
+                        </p:par>
+                      </p:childTnLst>
+                    </p:cTn>
+                  </p:par>
+                  <p:par>
+                    <p:cTn id="7" fill="hold">
+                      <p:stCondLst>
+                        <p:cond delay="indefinite"/>
+                      </p:stCondLst>
+                      <p:childTnLst>
+                        <p:par>
+                          <p:cTn id="8" fill="hold">
+                            <p:stCondLst>
+                              <p:cond delay="0"/>
+                            </p:stCondLst>
+                            <p:childTnLst>
+                              <p:par>
+                                <p:cTn id="9" presetID="1" presetClass="entr" presetSubtype="0" fill="hold" grpId="0" nodeType="clickEffect">
+                                  <p:stCondLst>
+                                    <p:cond delay="0"/>
+                                  </p:stCondLst>
+                                  <p:childTnLst>
+                                    <p:set>
+                                      <p:cBhvr>
+                                        <p:cTn id="10" dur="1" fill="hold">
+                                          <p:stCondLst>
+                                            <p:cond delay="0"/>
+                                          </p:stCondLst>
+                                        </p:cTn>
+                                        <p:tgtEl>
+                                          <p:spTgt spid="3">
+                                            <p:txEl>
+                                              <p:pRg st="1" end="1"/>
+                                            </p:txEl>
+                                          </p:spTgt>
+                                        </p:tgtEl>
+                                        <p:attrNameLst>
+                                          <p:attrName>style.visibility</p:attrName>
+                                        </p:attrNameLst>
+                                      </p:cBhvr>
+                                      <p:to>
+                                        <p:strVal val="visible"/>
+                                      </p:to>
+                                    </p:set>
+                                  </p:childTnLst>
+                                </p:cTn>
+                              </p:par>
+                            </p:childTnLst>
+                          </p:cTn>
+                        </p:par>
+                      </p:childTnLst>
+                    </p:cTn>
+                  </p:par>
+                  <p:par>
+                    <p:cTn id="11" fill="hold">
+                      <p:stCondLst>
+                        <p:cond delay="indefinite"/>
+                      </p:stCondLst>
+                      <p:childTnLst>
+                        <p:par>
+                          <p:cTn id="12" fill="hold">
+                            <p:stCondLst>
+                              <p:cond delay="0"/>
+                            </p:stCondLst>
+                            <p:childTnLst>
+                              <p:par>
+                                <p:cTn id="13" presetID="1" presetClass="entr" presetSubtype="0" fill="hold" grpId="0" nodeType="clickEffect">
+                                  <p:stCondLst>
+                                    <p:cond delay="0"/>
+                                  </p:stCondLst>
+                                  <p:childTnLst>
+                                    <p:set>
+                                      <p:cBhvr>
+                                        <p:cTn id="14" dur="1" fill="hold">
+                                          <p:stCondLst>
+                                            <p:cond delay="0"/>
+                                          </p:stCondLst>
+                                        </p:cTn>
+                                        <p:tgtEl>
+                                          <p:spTgt spid="3">
+                                            <p:txEl>
+                                              <p:pRg st="2" end="2"/>
+                                            </p:txEl>
+                                          </p:spTgt>
+                                        </p:tgtEl>
+                                        <p:attrNameLst>
+                                          <p:attrName>style.visibility</p:attrName>
+                                        </p:attrNameLst>
+                                      </p:cBhvr>
+                                      <p:to>
+                                        <p:strVal val="visible"/>
+                                      </p:to>
+                                    </p:set>
+                                  </p:childTnLst>
+                                </p:cTn>
+                              </p:par>
+                            </p:childTnLst>
+                          </p:cTn>
+                        </p:par>
+                      </p:childTnLst>
+                    </p:cTn>
+                  </p:par>
+                  <p:par>
+                    <p:cTn id="15" fill="hold">
+                      <p:stCondLst>
+                        <p:cond delay="indefinite"/>
+                      </p:stCondLst>
+                      <p:childTnLst>
+                        <p:par>
+                          <p:cTn id="16" fill="hold">
+                            <p:stCondLst>
+                              <p:cond delay="0"/>
+                            </p:stCondLst>
+                            <p:childTnLst>
+                              <p:par>
+                                <p:cTn id="17" presetID="1" presetClass="entr" presetSubtype="0" fill="hold" grpId="0" nodeType="clickEffect">
+                                  <p:stCondLst>
+                                    <p:cond delay="0"/>
+                                  </p:stCondLst>
+                                  <p:childTnLst>
+                                    <p:set>
+                                      <p:cBhvr>
+                                        <p:cTn id="18" dur="1" fill="hold">
+                                          <p:stCondLst>
+                                            <p:cond delay="0"/>
+                                          </p:stCondLst>
+                                        </p:cTn>
+                                        <p:tgtEl>
+                                          <p:spTgt spid="3">
+                                            <p:txEl>
+                                              <p:pRg st="3" end="3"/>
+                                            </p:txEl>
+                                          </p:spTgt>
+                                        </p:tgtEl>
+                                        <p:attrNameLst>
+                                          <p:attrName>style.visibility</p:attrName>
+                                        </p:attrNameLst>
+                                      </p:cBhvr>
+                                      <p:to>
+                                        <p:strVal val="visible"/>
+                                      </p:to>
+                                    </p:set>
+                                  </p:childTnLst>
+                                </p:cTn>
+                              </p:par>
+                            </p:childTnLst>
+                          </p:cTn>
+                        </p:par>
+                      </p:childTnLst>
+                    </p:cTn>
+                  </p:par>
+                </p:childTnLst>
+              </p:cTn>
+              <p:prevCondLst>
+                <p:cond evt="onPrev" delay="0">
+                  <p:tgtEl>
+                    <p:sldTgt/>
+                  </p:tgtEl>
+                </p:cond>
+              </p:prevCondLst>
+              <p:nextCondLst>
+                <p:cond evt="onNext" delay="0">
+                  <p:tgtEl>
+                    <p:sldTgt/>
+                  </p:tgtEl>
+                </p:cond>
+              </p:nextCondLst>
+            </p:seq>
+          </p:childTnLst>
+        </p:cTn>
       </p:par>
     </p:tnLst>
+    <p:bldLst>
+      <p:bldP spid="3" grpId="0" uiExpand="1" build="p" bldLvl="2"/>
+    </p:bldLst>
   </p:timing>
 </p:sld>
 </file>
@@ -13357,6 +13822,108 @@
       </p:sp>
       <p:sp>
         <p:nvSpPr>
+          <p:cNvPr id="3" name="Text Placeholder 2"/>
+          <p:cNvSpPr>
+            <a:spLocks noGrp="1"/>
+          </p:cNvSpPr>
+          <p:nvPr>
+            <p:ph type="body" idx="1"/>
+          </p:nvPr>
+        </p:nvSpPr>
+        <p:spPr/>
+        <p:txBody>
+          <a:bodyPr/>
+          <a:lstStyle/>
+          <a:p>
+            <a:endParaRPr lang="nl-BE"/>
+          </a:p>
+        </p:txBody>
+      </p:sp>
+      <p:sp>
+        <p:nvSpPr>
+          <p:cNvPr id="4" name="Slide Number Placeholder 3"/>
+          <p:cNvSpPr>
+            <a:spLocks noGrp="1"/>
+          </p:cNvSpPr>
+          <p:nvPr>
+            <p:ph type="sldNum" sz="quarter" idx="12"/>
+          </p:nvPr>
+        </p:nvSpPr>
+        <p:spPr/>
+        <p:txBody>
+          <a:bodyPr/>
+          <a:lstStyle/>
+          <a:p>
+            <a:fld id="{AEFF399F-E3B5-4890-BC79-9BC8D4DF3F2D}" type="slidenum">
+              <a:rPr lang="nl-BE" smtClean="0"/>
+              <a:t>29</a:t>
+            </a:fld>
+            <a:endParaRPr lang="nl-BE"/>
+          </a:p>
+        </p:txBody>
+      </p:sp>
+    </p:spTree>
+    <p:extLst>
+      <p:ext uri="{BB962C8B-B14F-4D97-AF65-F5344CB8AC3E}">
+        <p14:creationId xmlns:p14="http://schemas.microsoft.com/office/powerpoint/2010/main" val="2192721825"/>
+      </p:ext>
+    </p:extLst>
+  </p:cSld>
+  <p:clrMapOvr>
+    <a:masterClrMapping/>
+  </p:clrMapOvr>
+  <p:timing>
+    <p:tnLst>
+      <p:par>
+        <p:cTn id="1" dur="indefinite" restart="never" nodeType="tmRoot"/>
+      </p:par>
+    </p:tnLst>
+  </p:timing>
+</p:sld>
+</file>
+
+<file path=ppt/slides/slide3.xml><?xml version="1.0" encoding="utf-8"?>
+<p:sld xmlns:a="http://schemas.openxmlformats.org/drawingml/2006/main" xmlns:r="http://schemas.openxmlformats.org/officeDocument/2006/relationships" xmlns:p="http://schemas.openxmlformats.org/presentationml/2006/main">
+  <p:cSld>
+    <p:spTree>
+      <p:nvGrpSpPr>
+        <p:cNvPr id="1" name=""/>
+        <p:cNvGrpSpPr/>
+        <p:nvPr/>
+      </p:nvGrpSpPr>
+      <p:grpSpPr>
+        <a:xfrm>
+          <a:off x="0" y="0"/>
+          <a:ext cx="0" cy="0"/>
+          <a:chOff x="0" y="0"/>
+          <a:chExt cx="0" cy="0"/>
+        </a:xfrm>
+      </p:grpSpPr>
+      <p:sp>
+        <p:nvSpPr>
+          <p:cNvPr id="2" name="Title 1"/>
+          <p:cNvSpPr>
+            <a:spLocks noGrp="1"/>
+          </p:cNvSpPr>
+          <p:nvPr>
+            <p:ph type="title"/>
+          </p:nvPr>
+        </p:nvSpPr>
+        <p:spPr/>
+        <p:txBody>
+          <a:bodyPr/>
+          <a:lstStyle/>
+          <a:p>
+            <a:r>
+              <a:rPr lang="en-US" dirty="0" smtClean="0"/>
+              <a:t>Introduction</a:t>
+            </a:r>
+            <a:endParaRPr lang="nl-BE" dirty="0"/>
+          </a:p>
+        </p:txBody>
+      </p:sp>
+      <p:sp>
+        <p:nvSpPr>
           <p:cNvPr id="3" name="Content Placeholder 2"/>
           <p:cNvSpPr>
             <a:spLocks noGrp="1"/>
@@ -13372,74 +13939,92 @@
           <a:p>
             <a:r>
               <a:rPr lang="en-US" dirty="0" smtClean="0"/>
-              <a:t>Singularity advantages</a:t>
+              <a:t>Singularity developed </a:t>
+            </a:r>
+            <a:r>
+              <a:rPr lang="en-US" dirty="0"/>
+              <a:t>by Berkeley Lab</a:t>
+            </a:r>
+            <a:br>
+              <a:rPr lang="en-US" dirty="0"/>
+            </a:br>
+            <a:r>
+              <a:rPr lang="en-US" dirty="0">
+                <a:hlinkClick r:id="rId2"/>
+              </a:rPr>
+              <a:t>http://singularity.lbl.gov</a:t>
+            </a:r>
+            <a:r>
+              <a:rPr lang="en-US" dirty="0" smtClean="0">
+                <a:hlinkClick r:id="rId2"/>
+              </a:rPr>
+              <a:t>/</a:t>
+            </a:r>
+            <a:r>
+              <a:rPr lang="en-US" dirty="0" smtClean="0"/>
+              <a:t> </a:t>
+            </a:r>
+          </a:p>
+          <a:p>
+            <a:r>
+              <a:rPr lang="en-US" dirty="0" smtClean="0"/>
+              <a:t>Intended as HPC alternative to</a:t>
             </a:r>
           </a:p>
           <a:p>
             <a:pPr lvl="1"/>
             <a:r>
+              <a:rPr lang="en-US" dirty="0"/>
+              <a:t>Docker</a:t>
+            </a:r>
+            <a:br>
+              <a:rPr lang="en-US" dirty="0"/>
+            </a:br>
+            <a:r>
+              <a:rPr lang="en-US" dirty="0">
+                <a:hlinkClick r:id="rId3"/>
+              </a:rPr>
+              <a:t>https://www.docker.com</a:t>
+            </a:r>
+            <a:r>
+              <a:rPr lang="en-US" dirty="0" smtClean="0">
+                <a:hlinkClick r:id="rId3"/>
+              </a:rPr>
+              <a:t>/</a:t>
+            </a:r>
+            <a:r>
               <a:rPr lang="en-US" dirty="0" smtClean="0"/>
-              <a:t>Portability</a:t>
+              <a:t> </a:t>
             </a:r>
           </a:p>
           <a:p>
             <a:pPr lvl="1"/>
             <a:r>
               <a:rPr lang="en-US" dirty="0" smtClean="0"/>
-              <a:t>Reproducibility</a:t>
-            </a:r>
-          </a:p>
-          <a:p>
-            <a:pPr lvl="1"/>
+              <a:t>Shifter</a:t>
+            </a:r>
+            <a:r>
+              <a:rPr lang="en-US" dirty="0"/>
+              <a:t/>
+            </a:r>
+            <a:br>
+              <a:rPr lang="en-US" dirty="0"/>
+            </a:br>
+            <a:r>
+              <a:rPr lang="en-US" dirty="0">
+                <a:hlinkClick r:id="rId4"/>
+              </a:rPr>
+              <a:t>https://</a:t>
+            </a:r>
+            <a:r>
+              <a:rPr lang="en-US" dirty="0" smtClean="0">
+                <a:hlinkClick r:id="rId4"/>
+              </a:rPr>
+              <a:t>github.com/NERSC/shifter</a:t>
+            </a:r>
             <a:r>
               <a:rPr lang="en-US" dirty="0" smtClean="0"/>
-              <a:t>Easily create images</a:t>
-            </a:r>
-          </a:p>
-          <a:p>
-            <a:pPr lvl="1"/>
-            <a:r>
-              <a:rPr lang="en-US" dirty="0" smtClean="0"/>
-              <a:t>Integrate images into existing workflows</a:t>
-            </a:r>
-          </a:p>
-          <a:p>
-            <a:pPr lvl="1"/>
-            <a:r>
-              <a:rPr lang="en-US" dirty="0" smtClean="0"/>
-              <a:t>No privilege escalation</a:t>
-            </a:r>
-          </a:p>
-          <a:p>
-            <a:pPr lvl="2"/>
-            <a:r>
-              <a:rPr lang="en-US" dirty="0" smtClean="0"/>
-              <a:t>Create as root</a:t>
-            </a:r>
-          </a:p>
-          <a:p>
-            <a:pPr lvl="2"/>
-            <a:r>
-              <a:rPr lang="en-US" dirty="0" smtClean="0"/>
-              <a:t>Run as </a:t>
-            </a:r>
-            <a:r>
-              <a:rPr lang="en-US" dirty="0" smtClean="0"/>
-              <a:t>user, no </a:t>
-            </a:r>
-            <a:r>
-              <a:rPr lang="en-US" dirty="0" err="1" smtClean="0"/>
-              <a:t>sudo</a:t>
-            </a:r>
-            <a:r>
-              <a:rPr lang="en-US" dirty="0" smtClean="0"/>
-              <a:t> possible</a:t>
-            </a:r>
-          </a:p>
-          <a:p>
-            <a:r>
-              <a:rPr lang="en-US" dirty="0" smtClean="0"/>
-              <a:t>No excuse to run crappy/suboptimal software!</a:t>
+              <a:t> </a:t>
             </a:r>
             <a:endParaRPr lang="nl-BE" dirty="0"/>
           </a:p>
@@ -13462,7 +14047,381 @@
           <a:p>
             <a:fld id="{AEFF399F-E3B5-4890-BC79-9BC8D4DF3F2D}" type="slidenum">
               <a:rPr lang="nl-BE" smtClean="0"/>
-              <a:t>29</a:t>
+              <a:t>3</a:t>
+            </a:fld>
+            <a:endParaRPr lang="nl-BE"/>
+          </a:p>
+        </p:txBody>
+      </p:sp>
+    </p:spTree>
+    <p:extLst>
+      <p:ext uri="{BB962C8B-B14F-4D97-AF65-F5344CB8AC3E}">
+        <p14:creationId xmlns:p14="http://schemas.microsoft.com/office/powerpoint/2010/main" val="658783311"/>
+      </p:ext>
+    </p:extLst>
+  </p:cSld>
+  <p:clrMapOvr>
+    <a:masterClrMapping/>
+  </p:clrMapOvr>
+  <p:timing>
+    <p:tnLst>
+      <p:par>
+        <p:cTn id="1" dur="indefinite" restart="never" nodeType="tmRoot">
+          <p:childTnLst>
+            <p:seq concurrent="1" nextAc="seek">
+              <p:cTn id="2" dur="indefinite" nodeType="mainSeq">
+                <p:childTnLst>
+                  <p:par>
+                    <p:cTn id="3" fill="hold">
+                      <p:stCondLst>
+                        <p:cond delay="indefinite"/>
+                        <p:cond evt="onBegin" delay="0">
+                          <p:tn val="2"/>
+                        </p:cond>
+                      </p:stCondLst>
+                      <p:childTnLst>
+                        <p:par>
+                          <p:cTn id="4" fill="hold">
+                            <p:stCondLst>
+                              <p:cond delay="0"/>
+                            </p:stCondLst>
+                            <p:childTnLst>
+                              <p:par>
+                                <p:cTn id="5" presetID="1" presetClass="entr" presetSubtype="0" fill="hold" grpId="0" nodeType="withEffect">
+                                  <p:stCondLst>
+                                    <p:cond delay="0"/>
+                                  </p:stCondLst>
+                                  <p:childTnLst>
+                                    <p:set>
+                                      <p:cBhvr>
+                                        <p:cTn id="6" dur="1" fill="hold">
+                                          <p:stCondLst>
+                                            <p:cond delay="0"/>
+                                          </p:stCondLst>
+                                        </p:cTn>
+                                        <p:tgtEl>
+                                          <p:spTgt spid="3">
+                                            <p:txEl>
+                                              <p:pRg st="0" end="0"/>
+                                            </p:txEl>
+                                          </p:spTgt>
+                                        </p:tgtEl>
+                                        <p:attrNameLst>
+                                          <p:attrName>style.visibility</p:attrName>
+                                        </p:attrNameLst>
+                                      </p:cBhvr>
+                                      <p:to>
+                                        <p:strVal val="visible"/>
+                                      </p:to>
+                                    </p:set>
+                                  </p:childTnLst>
+                                </p:cTn>
+                              </p:par>
+                            </p:childTnLst>
+                          </p:cTn>
+                        </p:par>
+                      </p:childTnLst>
+                    </p:cTn>
+                  </p:par>
+                  <p:par>
+                    <p:cTn id="7" fill="hold">
+                      <p:stCondLst>
+                        <p:cond delay="indefinite"/>
+                      </p:stCondLst>
+                      <p:childTnLst>
+                        <p:par>
+                          <p:cTn id="8" fill="hold">
+                            <p:stCondLst>
+                              <p:cond delay="0"/>
+                            </p:stCondLst>
+                            <p:childTnLst>
+                              <p:par>
+                                <p:cTn id="9" presetID="1" presetClass="entr" presetSubtype="0" fill="hold" grpId="0" nodeType="clickEffect">
+                                  <p:stCondLst>
+                                    <p:cond delay="0"/>
+                                  </p:stCondLst>
+                                  <p:childTnLst>
+                                    <p:set>
+                                      <p:cBhvr>
+                                        <p:cTn id="10" dur="1" fill="hold">
+                                          <p:stCondLst>
+                                            <p:cond delay="0"/>
+                                          </p:stCondLst>
+                                        </p:cTn>
+                                        <p:tgtEl>
+                                          <p:spTgt spid="3">
+                                            <p:txEl>
+                                              <p:pRg st="1" end="1"/>
+                                            </p:txEl>
+                                          </p:spTgt>
+                                        </p:tgtEl>
+                                        <p:attrNameLst>
+                                          <p:attrName>style.visibility</p:attrName>
+                                        </p:attrNameLst>
+                                      </p:cBhvr>
+                                      <p:to>
+                                        <p:strVal val="visible"/>
+                                      </p:to>
+                                    </p:set>
+                                  </p:childTnLst>
+                                </p:cTn>
+                              </p:par>
+                              <p:par>
+                                <p:cTn id="11" presetID="1" presetClass="entr" presetSubtype="0" fill="hold" grpId="0" nodeType="withEffect">
+                                  <p:stCondLst>
+                                    <p:cond delay="0"/>
+                                  </p:stCondLst>
+                                  <p:childTnLst>
+                                    <p:set>
+                                      <p:cBhvr>
+                                        <p:cTn id="12" dur="1" fill="hold">
+                                          <p:stCondLst>
+                                            <p:cond delay="0"/>
+                                          </p:stCondLst>
+                                        </p:cTn>
+                                        <p:tgtEl>
+                                          <p:spTgt spid="3">
+                                            <p:txEl>
+                                              <p:pRg st="2" end="2"/>
+                                            </p:txEl>
+                                          </p:spTgt>
+                                        </p:tgtEl>
+                                        <p:attrNameLst>
+                                          <p:attrName>style.visibility</p:attrName>
+                                        </p:attrNameLst>
+                                      </p:cBhvr>
+                                      <p:to>
+                                        <p:strVal val="visible"/>
+                                      </p:to>
+                                    </p:set>
+                                  </p:childTnLst>
+                                </p:cTn>
+                              </p:par>
+                              <p:par>
+                                <p:cTn id="13" presetID="1" presetClass="entr" presetSubtype="0" fill="hold" grpId="0" nodeType="withEffect">
+                                  <p:stCondLst>
+                                    <p:cond delay="0"/>
+                                  </p:stCondLst>
+                                  <p:childTnLst>
+                                    <p:set>
+                                      <p:cBhvr>
+                                        <p:cTn id="14" dur="1" fill="hold">
+                                          <p:stCondLst>
+                                            <p:cond delay="0"/>
+                                          </p:stCondLst>
+                                        </p:cTn>
+                                        <p:tgtEl>
+                                          <p:spTgt spid="3">
+                                            <p:txEl>
+                                              <p:pRg st="3" end="3"/>
+                                            </p:txEl>
+                                          </p:spTgt>
+                                        </p:tgtEl>
+                                        <p:attrNameLst>
+                                          <p:attrName>style.visibility</p:attrName>
+                                        </p:attrNameLst>
+                                      </p:cBhvr>
+                                      <p:to>
+                                        <p:strVal val="visible"/>
+                                      </p:to>
+                                    </p:set>
+                                  </p:childTnLst>
+                                </p:cTn>
+                              </p:par>
+                            </p:childTnLst>
+                          </p:cTn>
+                        </p:par>
+                      </p:childTnLst>
+                    </p:cTn>
+                  </p:par>
+                </p:childTnLst>
+              </p:cTn>
+              <p:prevCondLst>
+                <p:cond evt="onPrev" delay="0">
+                  <p:tgtEl>
+                    <p:sldTgt/>
+                  </p:tgtEl>
+                </p:cond>
+              </p:prevCondLst>
+              <p:nextCondLst>
+                <p:cond evt="onNext" delay="0">
+                  <p:tgtEl>
+                    <p:sldTgt/>
+                  </p:tgtEl>
+                </p:cond>
+              </p:nextCondLst>
+            </p:seq>
+          </p:childTnLst>
+        </p:cTn>
+      </p:par>
+    </p:tnLst>
+    <p:bldLst>
+      <p:bldP spid="3" grpId="0" uiExpand="1" build="p"/>
+    </p:bldLst>
+  </p:timing>
+</p:sld>
+</file>
+
+<file path=ppt/slides/slide30.xml><?xml version="1.0" encoding="utf-8"?>
+<p:sld xmlns:a="http://schemas.openxmlformats.org/drawingml/2006/main" xmlns:r="http://schemas.openxmlformats.org/officeDocument/2006/relationships" xmlns:p="http://schemas.openxmlformats.org/presentationml/2006/main">
+  <p:cSld>
+    <p:spTree>
+      <p:nvGrpSpPr>
+        <p:cNvPr id="1" name=""/>
+        <p:cNvGrpSpPr/>
+        <p:nvPr/>
+      </p:nvGrpSpPr>
+      <p:grpSpPr>
+        <a:xfrm>
+          <a:off x="0" y="0"/>
+          <a:ext cx="0" cy="0"/>
+          <a:chOff x="0" y="0"/>
+          <a:chExt cx="0" cy="0"/>
+        </a:xfrm>
+      </p:grpSpPr>
+      <p:sp>
+        <p:nvSpPr>
+          <p:cNvPr id="2" name="Title 1"/>
+          <p:cNvSpPr>
+            <a:spLocks noGrp="1"/>
+          </p:cNvSpPr>
+          <p:nvPr>
+            <p:ph type="title"/>
+          </p:nvPr>
+        </p:nvSpPr>
+        <p:spPr/>
+        <p:txBody>
+          <a:bodyPr/>
+          <a:lstStyle/>
+          <a:p>
+            <a:r>
+              <a:rPr lang="en-US" dirty="0" smtClean="0"/>
+              <a:t>Conclusions</a:t>
+            </a:r>
+            <a:endParaRPr lang="nl-BE" dirty="0"/>
+          </a:p>
+        </p:txBody>
+      </p:sp>
+      <p:sp>
+        <p:nvSpPr>
+          <p:cNvPr id="3" name="Content Placeholder 2"/>
+          <p:cNvSpPr>
+            <a:spLocks noGrp="1"/>
+          </p:cNvSpPr>
+          <p:nvPr>
+            <p:ph idx="1"/>
+          </p:nvPr>
+        </p:nvSpPr>
+        <p:spPr/>
+        <p:txBody>
+          <a:bodyPr/>
+          <a:lstStyle/>
+          <a:p>
+            <a:r>
+              <a:rPr lang="en-US" dirty="0" smtClean="0"/>
+              <a:t>Singularity advantages</a:t>
+            </a:r>
+          </a:p>
+          <a:p>
+            <a:pPr lvl="1"/>
+            <a:r>
+              <a:rPr lang="en-US" dirty="0" smtClean="0"/>
+              <a:t>Portability</a:t>
+            </a:r>
+          </a:p>
+          <a:p>
+            <a:pPr lvl="1"/>
+            <a:r>
+              <a:rPr lang="en-US" dirty="0" smtClean="0"/>
+              <a:t>Reproducibility</a:t>
+            </a:r>
+          </a:p>
+          <a:p>
+            <a:pPr lvl="1"/>
+            <a:r>
+              <a:rPr lang="en-US" dirty="0" smtClean="0"/>
+              <a:t>Easily create images</a:t>
+            </a:r>
+          </a:p>
+          <a:p>
+            <a:pPr lvl="1"/>
+            <a:r>
+              <a:rPr lang="en-US" dirty="0" smtClean="0"/>
+              <a:t>Integrate images into existing workflows</a:t>
+            </a:r>
+          </a:p>
+          <a:p>
+            <a:pPr lvl="1"/>
+            <a:r>
+              <a:rPr lang="en-US" dirty="0" smtClean="0"/>
+              <a:t>No privilege escalation</a:t>
+            </a:r>
+          </a:p>
+          <a:p>
+            <a:pPr lvl="2"/>
+            <a:r>
+              <a:rPr lang="en-US" dirty="0" smtClean="0"/>
+              <a:t>Create as root</a:t>
+            </a:r>
+          </a:p>
+          <a:p>
+            <a:pPr lvl="2"/>
+            <a:r>
+              <a:rPr lang="en-US" dirty="0" smtClean="0"/>
+              <a:t>Run as user, no </a:t>
+            </a:r>
+            <a:r>
+              <a:rPr lang="en-US" dirty="0" err="1" smtClean="0"/>
+              <a:t>sudo</a:t>
+            </a:r>
+            <a:r>
+              <a:rPr lang="en-US" dirty="0" smtClean="0"/>
+              <a:t> </a:t>
+            </a:r>
+            <a:r>
+              <a:rPr lang="en-US" dirty="0" smtClean="0"/>
+              <a:t>possible</a:t>
+            </a:r>
+          </a:p>
+          <a:p>
+            <a:pPr lvl="1"/>
+            <a:r>
+              <a:rPr lang="en-US" dirty="0" smtClean="0"/>
+              <a:t>Quite </a:t>
+            </a:r>
+            <a:r>
+              <a:rPr lang="en-US" smtClean="0"/>
+              <a:t>reasonable performance/overhead</a:t>
+            </a:r>
+            <a:endParaRPr lang="en-US" dirty="0" smtClean="0"/>
+          </a:p>
+          <a:p>
+            <a:r>
+              <a:rPr lang="en-US" dirty="0" smtClean="0"/>
+              <a:t>No excuse to run crappy/suboptimal software!</a:t>
+            </a:r>
+            <a:endParaRPr lang="nl-BE" dirty="0"/>
+          </a:p>
+        </p:txBody>
+      </p:sp>
+      <p:sp>
+        <p:nvSpPr>
+          <p:cNvPr id="4" name="Slide Number Placeholder 3"/>
+          <p:cNvSpPr>
+            <a:spLocks noGrp="1"/>
+          </p:cNvSpPr>
+          <p:nvPr>
+            <p:ph type="sldNum" sz="quarter" idx="12"/>
+          </p:nvPr>
+        </p:nvSpPr>
+        <p:spPr/>
+        <p:txBody>
+          <a:bodyPr/>
+          <a:lstStyle/>
+          <a:p>
+            <a:fld id="{AEFF399F-E3B5-4890-BC79-9BC8D4DF3F2D}" type="slidenum">
+              <a:rPr lang="nl-BE" smtClean="0"/>
+              <a:t>30</a:t>
             </a:fld>
             <a:endParaRPr lang="nl-BE"/>
           </a:p>
@@ -13894,247 +14853,27 @@
                       </p:childTnLst>
                     </p:cTn>
                   </p:par>
-                </p:childTnLst>
-              </p:cTn>
-              <p:prevCondLst>
-                <p:cond evt="onPrev" delay="0">
-                  <p:tgtEl>
-                    <p:sldTgt/>
-                  </p:tgtEl>
-                </p:cond>
-              </p:prevCondLst>
-              <p:nextCondLst>
-                <p:cond evt="onNext" delay="0">
-                  <p:tgtEl>
-                    <p:sldTgt/>
-                  </p:tgtEl>
-                </p:cond>
-              </p:nextCondLst>
-            </p:seq>
-          </p:childTnLst>
-        </p:cTn>
-      </p:par>
-    </p:tnLst>
-    <p:bldLst>
-      <p:bldP spid="3" grpId="0" uiExpand="1" build="p" bldLvl="2"/>
-    </p:bldLst>
-  </p:timing>
-</p:sld>
-</file>
-
-<file path=ppt/slides/slide3.xml><?xml version="1.0" encoding="utf-8"?>
-<p:sld xmlns:a="http://schemas.openxmlformats.org/drawingml/2006/main" xmlns:r="http://schemas.openxmlformats.org/officeDocument/2006/relationships" xmlns:p="http://schemas.openxmlformats.org/presentationml/2006/main">
-  <p:cSld>
-    <p:spTree>
-      <p:nvGrpSpPr>
-        <p:cNvPr id="1" name=""/>
-        <p:cNvGrpSpPr/>
-        <p:nvPr/>
-      </p:nvGrpSpPr>
-      <p:grpSpPr>
-        <a:xfrm>
-          <a:off x="0" y="0"/>
-          <a:ext cx="0" cy="0"/>
-          <a:chOff x="0" y="0"/>
-          <a:chExt cx="0" cy="0"/>
-        </a:xfrm>
-      </p:grpSpPr>
-      <p:sp>
-        <p:nvSpPr>
-          <p:cNvPr id="2" name="Title 1"/>
-          <p:cNvSpPr>
-            <a:spLocks noGrp="1"/>
-          </p:cNvSpPr>
-          <p:nvPr>
-            <p:ph type="title"/>
-          </p:nvPr>
-        </p:nvSpPr>
-        <p:spPr/>
-        <p:txBody>
-          <a:bodyPr/>
-          <a:lstStyle/>
-          <a:p>
-            <a:r>
-              <a:rPr lang="en-US" dirty="0" smtClean="0"/>
-              <a:t>Introduction</a:t>
-            </a:r>
-            <a:endParaRPr lang="nl-BE" dirty="0"/>
-          </a:p>
-        </p:txBody>
-      </p:sp>
-      <p:sp>
-        <p:nvSpPr>
-          <p:cNvPr id="3" name="Content Placeholder 2"/>
-          <p:cNvSpPr>
-            <a:spLocks noGrp="1"/>
-          </p:cNvSpPr>
-          <p:nvPr>
-            <p:ph idx="1"/>
-          </p:nvPr>
-        </p:nvSpPr>
-        <p:spPr/>
-        <p:txBody>
-          <a:bodyPr/>
-          <a:lstStyle/>
-          <a:p>
-            <a:r>
-              <a:rPr lang="en-US" dirty="0" smtClean="0"/>
-              <a:t>Singularity developed </a:t>
-            </a:r>
-            <a:r>
-              <a:rPr lang="en-US" dirty="0"/>
-              <a:t>by Berkeley Lab</a:t>
-            </a:r>
-            <a:br>
-              <a:rPr lang="en-US" dirty="0"/>
-            </a:br>
-            <a:r>
-              <a:rPr lang="en-US" dirty="0">
-                <a:hlinkClick r:id="rId2"/>
-              </a:rPr>
-              <a:t>http://singularity.lbl.gov</a:t>
-            </a:r>
-            <a:r>
-              <a:rPr lang="en-US" dirty="0" smtClean="0">
-                <a:hlinkClick r:id="rId2"/>
-              </a:rPr>
-              <a:t>/</a:t>
-            </a:r>
-            <a:r>
-              <a:rPr lang="en-US" dirty="0" smtClean="0"/>
-              <a:t> </a:t>
-            </a:r>
-          </a:p>
-          <a:p>
-            <a:r>
-              <a:rPr lang="en-US" dirty="0" smtClean="0"/>
-              <a:t>Intended as HPC alternative to</a:t>
-            </a:r>
-          </a:p>
-          <a:p>
-            <a:pPr lvl="1"/>
-            <a:r>
-              <a:rPr lang="en-US" dirty="0"/>
-              <a:t>Docker</a:t>
-            </a:r>
-            <a:br>
-              <a:rPr lang="en-US" dirty="0"/>
-            </a:br>
-            <a:r>
-              <a:rPr lang="en-US" dirty="0">
-                <a:hlinkClick r:id="rId3"/>
-              </a:rPr>
-              <a:t>https://www.docker.com</a:t>
-            </a:r>
-            <a:r>
-              <a:rPr lang="en-US" dirty="0" smtClean="0">
-                <a:hlinkClick r:id="rId3"/>
-              </a:rPr>
-              <a:t>/</a:t>
-            </a:r>
-            <a:r>
-              <a:rPr lang="en-US" dirty="0" smtClean="0"/>
-              <a:t> </a:t>
-            </a:r>
-          </a:p>
-          <a:p>
-            <a:pPr lvl="1"/>
-            <a:r>
-              <a:rPr lang="en-US" dirty="0" smtClean="0"/>
-              <a:t>Shifter</a:t>
-            </a:r>
-            <a:r>
-              <a:rPr lang="en-US" dirty="0"/>
-              <a:t/>
-            </a:r>
-            <a:br>
-              <a:rPr lang="en-US" dirty="0"/>
-            </a:br>
-            <a:r>
-              <a:rPr lang="en-US" dirty="0">
-                <a:hlinkClick r:id="rId4"/>
-              </a:rPr>
-              <a:t>https://</a:t>
-            </a:r>
-            <a:r>
-              <a:rPr lang="en-US" dirty="0" smtClean="0">
-                <a:hlinkClick r:id="rId4"/>
-              </a:rPr>
-              <a:t>github.com/NERSC/shifter</a:t>
-            </a:r>
-            <a:r>
-              <a:rPr lang="en-US" dirty="0" smtClean="0"/>
-              <a:t> </a:t>
-            </a:r>
-            <a:endParaRPr lang="nl-BE" dirty="0"/>
-          </a:p>
-        </p:txBody>
-      </p:sp>
-      <p:sp>
-        <p:nvSpPr>
-          <p:cNvPr id="4" name="Slide Number Placeholder 3"/>
-          <p:cNvSpPr>
-            <a:spLocks noGrp="1"/>
-          </p:cNvSpPr>
-          <p:nvPr>
-            <p:ph type="sldNum" sz="quarter" idx="12"/>
-          </p:nvPr>
-        </p:nvSpPr>
-        <p:spPr/>
-        <p:txBody>
-          <a:bodyPr/>
-          <a:lstStyle/>
-          <a:p>
-            <a:fld id="{AEFF399F-E3B5-4890-BC79-9BC8D4DF3F2D}" type="slidenum">
-              <a:rPr lang="nl-BE" smtClean="0"/>
-              <a:t>3</a:t>
-            </a:fld>
-            <a:endParaRPr lang="nl-BE"/>
-          </a:p>
-        </p:txBody>
-      </p:sp>
-    </p:spTree>
-    <p:extLst>
-      <p:ext uri="{BB962C8B-B14F-4D97-AF65-F5344CB8AC3E}">
-        <p14:creationId xmlns:p14="http://schemas.microsoft.com/office/powerpoint/2010/main" val="658783311"/>
-      </p:ext>
-    </p:extLst>
-  </p:cSld>
-  <p:clrMapOvr>
-    <a:masterClrMapping/>
-  </p:clrMapOvr>
-  <p:timing>
-    <p:tnLst>
-      <p:par>
-        <p:cTn id="1" dur="indefinite" restart="never" nodeType="tmRoot">
-          <p:childTnLst>
-            <p:seq concurrent="1" nextAc="seek">
-              <p:cTn id="2" dur="indefinite" nodeType="mainSeq">
-                <p:childTnLst>
                   <p:par>
-                    <p:cTn id="3" fill="hold">
+                    <p:cTn id="35" fill="hold">
                       <p:stCondLst>
                         <p:cond delay="indefinite"/>
-                        <p:cond evt="onBegin" delay="0">
-                          <p:tn val="2"/>
-                        </p:cond>
                       </p:stCondLst>
                       <p:childTnLst>
                         <p:par>
-                          <p:cTn id="4" fill="hold">
+                          <p:cTn id="36" fill="hold">
                             <p:stCondLst>
                               <p:cond delay="0"/>
                             </p:stCondLst>
                             <p:childTnLst>
                               <p:par>
-                                <p:cTn id="5" presetID="1" presetClass="entr" presetSubtype="0" fill="hold" grpId="0" nodeType="withEffect">
+                                <p:cTn id="37" presetID="1" presetClass="entr" presetSubtype="0" fill="hold" grpId="0" nodeType="clickEffect">
                                   <p:stCondLst>
                                     <p:cond delay="0"/>
                                   </p:stCondLst>
                                   <p:childTnLst>
                                     <p:set>
                                       <p:cBhvr>
-                                        <p:cTn id="6" dur="1" fill="hold">
+                                        <p:cTn id="38" dur="1" fill="hold">
                                           <p:stCondLst>
                                             <p:cond delay="0"/>
                                           </p:stCondLst>
@@ -14142,118 +14881,7 @@
                                         <p:tgtEl>
                                           <p:spTgt spid="3">
                                             <p:txEl>
-                                              <p:pRg st="0" end="0"/>
-                                            </p:txEl>
-                                          </p:spTgt>
-                                        </p:tgtEl>
-                                        <p:attrNameLst>
-                                          <p:attrName>style.visibility</p:attrName>
-                                        </p:attrNameLst>
-                                      </p:cBhvr>
-                                      <p:to>
-                                        <p:strVal val="visible"/>
-                                      </p:to>
-                                    </p:set>
-                                  </p:childTnLst>
-                                </p:cTn>
-                              </p:par>
-                            </p:childTnLst>
-                          </p:cTn>
-                        </p:par>
-                      </p:childTnLst>
-                    </p:cTn>
-                  </p:par>
-                  <p:par>
-                    <p:cTn id="7" fill="hold">
-                      <p:stCondLst>
-                        <p:cond delay="indefinite"/>
-                      </p:stCondLst>
-                      <p:childTnLst>
-                        <p:par>
-                          <p:cTn id="8" fill="hold">
-                            <p:stCondLst>
-                              <p:cond delay="0"/>
-                            </p:stCondLst>
-                            <p:childTnLst>
-                              <p:par>
-                                <p:cTn id="9" presetID="1" presetClass="entr" presetSubtype="0" fill="hold" grpId="0" nodeType="clickEffect">
-                                  <p:stCondLst>
-                                    <p:cond delay="0"/>
-                                  </p:stCondLst>
-                                  <p:childTnLst>
-                                    <p:set>
-                                      <p:cBhvr>
-                                        <p:cTn id="10" dur="1" fill="hold">
-                                          <p:stCondLst>
-                                            <p:cond delay="0"/>
-                                          </p:stCondLst>
-                                        </p:cTn>
-                                        <p:tgtEl>
-                                          <p:spTgt spid="3">
-                                            <p:txEl>
-                                              <p:pRg st="1" end="1"/>
-                                            </p:txEl>
-                                          </p:spTgt>
-                                        </p:tgtEl>
-                                        <p:attrNameLst>
-                                          <p:attrName>style.visibility</p:attrName>
-                                        </p:attrNameLst>
-                                      </p:cBhvr>
-                                      <p:to>
-                                        <p:strVal val="visible"/>
-                                      </p:to>
-                                    </p:set>
-                                  </p:childTnLst>
-                                </p:cTn>
-                              </p:par>
-                              <p:par>
-                                <p:cTn id="11" presetID="1" presetClass="entr" presetSubtype="0" fill="hold" grpId="0" nodeType="withEffect">
-                                  <p:stCondLst>
-                                    <p:cond delay="0"/>
-                                  </p:stCondLst>
-                                  <p:childTnLst>
-                                    <p:set>
-                                      <p:cBhvr>
-                                        <p:cTn id="12" dur="1" fill="hold">
-                                          <p:stCondLst>
-                                            <p:cond delay="0"/>
-                                          </p:stCondLst>
-                                        </p:cTn>
-                                        <p:tgtEl>
-                                          <p:spTgt spid="3">
-                                            <p:txEl>
-                                              <p:pRg st="2" end="2"/>
-                                            </p:txEl>
-                                          </p:spTgt>
-                                        </p:tgtEl>
-                                        <p:attrNameLst>
-                                          <p:attrName>style.visibility</p:attrName>
-                                        </p:attrNameLst>
-                                      </p:cBhvr>
-                                      <p:to>
-                                        <p:strVal val="visible"/>
-                                      </p:to>
-                                    </p:set>
-                                  </p:childTnLst>
-                                </p:cTn>
-                              </p:par>
-                              <p:par>
-                                <p:cTn id="13" presetID="1" presetClass="entr" presetSubtype="0" fill="hold" grpId="0" nodeType="withEffect">
-                                  <p:stCondLst>
-                                    <p:cond delay="0"/>
-                                  </p:stCondLst>
-                                  <p:childTnLst>
-                                    <p:set>
-                                      <p:cBhvr>
-                                        <p:cTn id="14" dur="1" fill="hold">
-                                          <p:stCondLst>
-                                            <p:cond delay="0"/>
-                                          </p:stCondLst>
-                                        </p:cTn>
-                                        <p:tgtEl>
-                                          <p:spTgt spid="3">
-                                            <p:txEl>
-                                              <p:pRg st="3" end="3"/>
+                                              <p:pRg st="9" end="9"/>
                                             </p:txEl>
                                           </p:spTgt>
                                         </p:tgtEl>
@@ -14296,13 +14924,13 @@
       </p:par>
     </p:tnLst>
     <p:bldLst>
-      <p:bldP spid="3" grpId="0" uiExpand="1" build="p"/>
+      <p:bldP spid="3" grpId="0" uiExpand="1" build="p" bldLvl="2"/>
     </p:bldLst>
   </p:timing>
 </p:sld>
 </file>
 
-<file path=ppt/slides/slide30.xml><?xml version="1.0" encoding="utf-8"?>
+<file path=ppt/slides/slide31.xml><?xml version="1.0" encoding="utf-8"?>
 <p:sld xmlns:a="http://schemas.openxmlformats.org/drawingml/2006/main" xmlns:r="http://schemas.openxmlformats.org/officeDocument/2006/relationships" xmlns:p="http://schemas.openxmlformats.org/presentationml/2006/main">
   <p:cSld>
     <p:spTree>
@@ -14506,7 +15134,7 @@
           <a:p>
             <a:fld id="{AEFF399F-E3B5-4890-BC79-9BC8D4DF3F2D}" type="slidenum">
               <a:rPr lang="nl-BE" smtClean="0"/>
-              <a:t>30</a:t>
+              <a:t>31</a:t>
             </a:fld>
             <a:endParaRPr lang="nl-BE"/>
           </a:p>
@@ -14837,7 +15465,7 @@
 </p:sld>
 </file>
 
-<file path=ppt/slides/slide31.xml><?xml version="1.0" encoding="utf-8"?>
+<file path=ppt/slides/slide32.xml><?xml version="1.0" encoding="utf-8"?>
 <p:sld xmlns:a="http://schemas.openxmlformats.org/drawingml/2006/main" xmlns:r="http://schemas.openxmlformats.org/officeDocument/2006/relationships" xmlns:p="http://schemas.openxmlformats.org/presentationml/2006/main">
   <p:cSld>
     <p:spTree>
@@ -15018,7 +15646,7 @@
           <a:p>
             <a:fld id="{AEFF399F-E3B5-4890-BC79-9BC8D4DF3F2D}" type="slidenum">
               <a:rPr lang="nl-BE" smtClean="0"/>
-              <a:t>31</a:t>
+              <a:t>32</a:t>
             </a:fld>
             <a:endParaRPr lang="nl-BE"/>
           </a:p>
@@ -15972,11 +16600,7 @@
             <a:pPr lvl="1"/>
             <a:r>
               <a:rPr lang="en-US" dirty="0" smtClean="0"/>
-              <a:t>No </a:t>
-            </a:r>
-            <a:r>
-              <a:rPr lang="en-US" dirty="0" smtClean="0"/>
-              <a:t>root </a:t>
+              <a:t>No root </a:t>
             </a:r>
             <a:r>
               <a:rPr lang="en-US" dirty="0"/>
@@ -17771,13 +18395,8 @@
           <a:p>
             <a:r>
               <a:rPr lang="en-US" dirty="0" smtClean="0"/>
-              <a:t>Initially, </a:t>
-            </a:r>
-            <a:r>
-              <a:rPr lang="en-US" dirty="0" smtClean="0"/>
-              <a:t>empty image</a:t>
-            </a:r>
-            <a:endParaRPr lang="en-US" dirty="0" smtClean="0"/>
+              <a:t>Initially, empty image</a:t>
+            </a:r>
           </a:p>
           <a:p>
             <a:r>
@@ -17820,15 +18439,7 @@
           <a:p>
             <a:r>
               <a:rPr lang="en-US" dirty="0" smtClean="0"/>
-              <a:t>File system </a:t>
-            </a:r>
-            <a:r>
-              <a:rPr lang="en-US" dirty="0" smtClean="0"/>
-              <a:t>created </a:t>
-            </a:r>
-            <a:r>
-              <a:rPr lang="en-US" dirty="0" smtClean="0"/>
-              <a:t>"inside" image</a:t>
+              <a:t>File system created "inside" image</a:t>
             </a:r>
             <a:endParaRPr lang="nl-BE" dirty="0"/>
           </a:p>

</xml_diff>

<commit_message>
Added slide on directories and binding
</commit_message>
<xml_diff>
--- a/Virtualization/singularity.pptx
+++ b/Virtualization/singularity.pptx
@@ -5,7 +5,7 @@
     <p:sldMasterId id="2147483660" r:id="rId1"/>
   </p:sldMasterIdLst>
   <p:notesMasterIdLst>
-    <p:notesMasterId r:id="rId34"/>
+    <p:notesMasterId r:id="rId35"/>
   </p:notesMasterIdLst>
   <p:sldIdLst>
     <p:sldId id="256" r:id="rId2"/>
@@ -27,19 +27,20 @@
     <p:sldId id="269" r:id="rId18"/>
     <p:sldId id="278" r:id="rId19"/>
     <p:sldId id="271" r:id="rId20"/>
-    <p:sldId id="282" r:id="rId21"/>
-    <p:sldId id="283" r:id="rId22"/>
-    <p:sldId id="284" r:id="rId23"/>
-    <p:sldId id="279" r:id="rId24"/>
-    <p:sldId id="280" r:id="rId25"/>
-    <p:sldId id="281" r:id="rId26"/>
-    <p:sldId id="285" r:id="rId27"/>
-    <p:sldId id="286" r:id="rId28"/>
-    <p:sldId id="287" r:id="rId29"/>
-    <p:sldId id="272" r:id="rId30"/>
-    <p:sldId id="276" r:id="rId31"/>
-    <p:sldId id="270" r:id="rId32"/>
-    <p:sldId id="277" r:id="rId33"/>
+    <p:sldId id="289" r:id="rId21"/>
+    <p:sldId id="282" r:id="rId22"/>
+    <p:sldId id="283" r:id="rId23"/>
+    <p:sldId id="284" r:id="rId24"/>
+    <p:sldId id="279" r:id="rId25"/>
+    <p:sldId id="280" r:id="rId26"/>
+    <p:sldId id="281" r:id="rId27"/>
+    <p:sldId id="285" r:id="rId28"/>
+    <p:sldId id="286" r:id="rId29"/>
+    <p:sldId id="287" r:id="rId30"/>
+    <p:sldId id="272" r:id="rId31"/>
+    <p:sldId id="276" r:id="rId32"/>
+    <p:sldId id="270" r:id="rId33"/>
+    <p:sldId id="277" r:id="rId34"/>
   </p:sldIdLst>
   <p:sldSz cx="9144000" cy="6858000" type="screen4x3"/>
   <p:notesSz cx="6858000" cy="9144000"/>
@@ -228,7 +229,7 @@
           <a:p>
             <a:fld id="{6BD974B4-F374-4E74-84D3-1EB7DBF32A2A}" type="datetimeFigureOut">
               <a:rPr lang="nl-BE" smtClean="0"/>
-              <a:t>2016-11-14</a:t>
+              <a:t>1/02/2017</a:t>
             </a:fld>
             <a:endParaRPr lang="nl-BE"/>
           </a:p>
@@ -711,7 +712,7 @@
           <a:p>
             <a:fld id="{A433E747-842D-4EF3-8202-AC54FEC33061}" type="datetime1">
               <a:rPr lang="nl-BE" smtClean="0"/>
-              <a:t>2016-11-14</a:t>
+              <a:t>1/02/2017</a:t>
             </a:fld>
             <a:endParaRPr lang="nl-BE"/>
           </a:p>
@@ -881,7 +882,7 @@
           <a:p>
             <a:fld id="{7C821354-3381-4DF5-ABED-FDAFA2BAD3F8}" type="datetime1">
               <a:rPr lang="nl-BE" smtClean="0"/>
-              <a:t>2016-11-14</a:t>
+              <a:t>1/02/2017</a:t>
             </a:fld>
             <a:endParaRPr lang="nl-BE"/>
           </a:p>
@@ -1061,7 +1062,7 @@
           <a:p>
             <a:fld id="{C6B54B95-9964-4BBF-B171-A69413AB9FC5}" type="datetime1">
               <a:rPr lang="nl-BE" smtClean="0"/>
-              <a:t>2016-11-14</a:t>
+              <a:t>1/02/2017</a:t>
             </a:fld>
             <a:endParaRPr lang="nl-BE"/>
           </a:p>
@@ -1231,7 +1232,7 @@
           <a:p>
             <a:fld id="{BE45CDE5-064C-4862-90E9-83B8FD778625}" type="datetime1">
               <a:rPr lang="nl-BE" smtClean="0"/>
-              <a:t>2016-11-14</a:t>
+              <a:t>1/02/2017</a:t>
             </a:fld>
             <a:endParaRPr lang="nl-BE"/>
           </a:p>
@@ -1475,7 +1476,7 @@
           <a:p>
             <a:fld id="{C75A345C-628E-463E-B8F7-69C25D344DF5}" type="datetime1">
               <a:rPr lang="nl-BE" smtClean="0"/>
-              <a:t>2016-11-14</a:t>
+              <a:t>1/02/2017</a:t>
             </a:fld>
             <a:endParaRPr lang="nl-BE"/>
           </a:p>
@@ -1707,7 +1708,7 @@
           <a:p>
             <a:fld id="{65B04534-538C-4249-A635-8BB2B8486464}" type="datetime1">
               <a:rPr lang="nl-BE" smtClean="0"/>
-              <a:t>2016-11-14</a:t>
+              <a:t>1/02/2017</a:t>
             </a:fld>
             <a:endParaRPr lang="nl-BE"/>
           </a:p>
@@ -2074,7 +2075,7 @@
           <a:p>
             <a:fld id="{089671CB-8547-4C91-A3D5-012E6E8790E6}" type="datetime1">
               <a:rPr lang="nl-BE" smtClean="0"/>
-              <a:t>2016-11-14</a:t>
+              <a:t>1/02/2017</a:t>
             </a:fld>
             <a:endParaRPr lang="nl-BE"/>
           </a:p>
@@ -2192,7 +2193,7 @@
           <a:p>
             <a:fld id="{5765335F-FC99-4A2B-B87B-6AF6F3762B67}" type="datetime1">
               <a:rPr lang="nl-BE" smtClean="0"/>
-              <a:t>2016-11-14</a:t>
+              <a:t>1/02/2017</a:t>
             </a:fld>
             <a:endParaRPr lang="nl-BE"/>
           </a:p>
@@ -2287,7 +2288,7 @@
           <a:p>
             <a:fld id="{1711BA58-B677-4D21-BDCD-9DD1AEA8A328}" type="datetime1">
               <a:rPr lang="nl-BE" smtClean="0"/>
-              <a:t>2016-11-14</a:t>
+              <a:t>1/02/2017</a:t>
             </a:fld>
             <a:endParaRPr lang="nl-BE"/>
           </a:p>
@@ -2564,7 +2565,7 @@
           <a:p>
             <a:fld id="{5513BE8B-B89C-461B-89D1-D5BE33ADB6B9}" type="datetime1">
               <a:rPr lang="nl-BE" smtClean="0"/>
-              <a:t>2016-11-14</a:t>
+              <a:t>1/02/2017</a:t>
             </a:fld>
             <a:endParaRPr lang="nl-BE"/>
           </a:p>
@@ -2821,7 +2822,7 @@
           <a:p>
             <a:fld id="{AEE65485-0554-4482-9B9C-289893A0B56B}" type="datetime1">
               <a:rPr lang="nl-BE" smtClean="0"/>
-              <a:t>2016-11-14</a:t>
+              <a:t>1/02/2017</a:t>
             </a:fld>
             <a:endParaRPr lang="nl-BE"/>
           </a:p>
@@ -3034,7 +3035,7 @@
           <a:p>
             <a:fld id="{6FF26CEC-AF8A-4096-9A53-521F7571A055}" type="datetime1">
               <a:rPr lang="nl-BE" smtClean="0"/>
-              <a:t>2016-11-14</a:t>
+              <a:t>1/02/2017</a:t>
             </a:fld>
             <a:endParaRPr lang="nl-BE"/>
           </a:p>
@@ -3589,6 +3590,13 @@
   <p:clrMapOvr>
     <a:masterClrMapping/>
   </p:clrMapOvr>
+  <p:timing>
+    <p:tnLst>
+      <p:par>
+        <p:cTn id="1" dur="indefinite" restart="never" nodeType="tmRoot"/>
+      </p:par>
+    </p:tnLst>
+  </p:timing>
 </p:sld>
 </file>
 
@@ -9191,20 +9199,20 @@
           <a:p>
             <a:r>
               <a:rPr lang="en-US" dirty="0" smtClean="0"/>
-              <a:t>Multithreaded applications</a:t>
-            </a:r>
-            <a:endParaRPr lang="nl-BE" dirty="0"/>
-          </a:p>
-        </p:txBody>
-      </p:sp>
-      <p:sp>
-        <p:nvSpPr>
-          <p:cNvPr id="3" name="Text Placeholder 2"/>
+              <a:t>Directory bindings</a:t>
+            </a:r>
+            <a:endParaRPr lang="en-US" dirty="0"/>
+          </a:p>
+        </p:txBody>
+      </p:sp>
+      <p:sp>
+        <p:nvSpPr>
+          <p:cNvPr id="3" name="Content Placeholder 2"/>
           <p:cNvSpPr>
             <a:spLocks noGrp="1"/>
           </p:cNvSpPr>
           <p:nvPr>
-            <p:ph type="body" idx="1"/>
+            <p:ph idx="1"/>
           </p:nvPr>
         </p:nvSpPr>
         <p:spPr/>
@@ -9212,7 +9220,121 @@
           <a:bodyPr/>
           <a:lstStyle/>
           <a:p>
-            <a:endParaRPr lang="nl-BE"/>
+            <a:r>
+              <a:rPr lang="en-US" dirty="0" smtClean="0"/>
+              <a:t>Current working directory</a:t>
+            </a:r>
+          </a:p>
+          <a:p>
+            <a:pPr lvl="1"/>
+            <a:r>
+              <a:rPr lang="en-US" dirty="0" smtClean="0"/>
+              <a:t>where image is executed</a:t>
+            </a:r>
+          </a:p>
+          <a:p>
+            <a:r>
+              <a:rPr lang="en-US" dirty="0" smtClean="0"/>
+              <a:t>Home directory</a:t>
+            </a:r>
+          </a:p>
+          <a:p>
+            <a:pPr lvl="1"/>
+            <a:r>
+              <a:rPr lang="en-US" dirty="0" smtClean="0"/>
+              <a:t>bound to user's host home directory</a:t>
+            </a:r>
+          </a:p>
+          <a:p>
+            <a:r>
+              <a:rPr lang="en-US" dirty="0" smtClean="0"/>
+              <a:t>Additional bindings</a:t>
+            </a:r>
+          </a:p>
+          <a:p>
+            <a:pPr lvl="1"/>
+            <a:r>
+              <a:rPr lang="en-US" dirty="0" smtClean="0"/>
+              <a:t>command line option:</a:t>
+            </a:r>
+            <a:br>
+              <a:rPr lang="en-US" dirty="0" smtClean="0"/>
+            </a:br>
+            <a:r>
+              <a:rPr lang="en-US" dirty="0" smtClean="0">
+                <a:latin typeface="Courier New" panose="02070309020205020404" pitchFamily="49" charset="0"/>
+                <a:cs typeface="Courier New" panose="02070309020205020404" pitchFamily="49" charset="0"/>
+              </a:rPr>
+              <a:t>-B &lt;host-path&gt;:&lt;</a:t>
+            </a:r>
+            <a:r>
+              <a:rPr lang="en-US" dirty="0" err="1" smtClean="0">
+                <a:latin typeface="Courier New" panose="02070309020205020404" pitchFamily="49" charset="0"/>
+                <a:cs typeface="Courier New" panose="02070309020205020404" pitchFamily="49" charset="0"/>
+              </a:rPr>
+              <a:t>img</a:t>
+            </a:r>
+            <a:r>
+              <a:rPr lang="en-US" dirty="0" smtClean="0">
+                <a:latin typeface="Courier New" panose="02070309020205020404" pitchFamily="49" charset="0"/>
+                <a:cs typeface="Courier New" panose="02070309020205020404" pitchFamily="49" charset="0"/>
+              </a:rPr>
+              <a:t>-mount-point&gt;</a:t>
+            </a:r>
+          </a:p>
+          <a:p>
+            <a:pPr lvl="1"/>
+            <a:r>
+              <a:rPr lang="en-US" dirty="0" smtClean="0"/>
+              <a:t>e.g., </a:t>
+            </a:r>
+            <a:r>
+              <a:rPr lang="en-US" dirty="0" smtClean="0">
+                <a:latin typeface="Courier New" panose="02070309020205020404" pitchFamily="49" charset="0"/>
+                <a:cs typeface="Courier New" panose="02070309020205020404" pitchFamily="49" charset="0"/>
+              </a:rPr>
+              <a:t>-B ~/Data:/</a:t>
+            </a:r>
+            <a:r>
+              <a:rPr lang="en-US" dirty="0" err="1" smtClean="0">
+                <a:latin typeface="Courier New" panose="02070309020205020404" pitchFamily="49" charset="0"/>
+                <a:cs typeface="Courier New" panose="02070309020205020404" pitchFamily="49" charset="0"/>
+              </a:rPr>
+              <a:t>mnt</a:t>
+            </a:r>
+            <a:r>
+              <a:rPr lang="en-US" dirty="0" smtClean="0">
+                <a:latin typeface="Courier New" panose="02070309020205020404" pitchFamily="49" charset="0"/>
+                <a:cs typeface="Courier New" panose="02070309020205020404" pitchFamily="49" charset="0"/>
+              </a:rPr>
+              <a:t>/data</a:t>
+            </a:r>
+          </a:p>
+          <a:p>
+            <a:pPr lvl="1"/>
+            <a:r>
+              <a:rPr lang="en-US" dirty="0" smtClean="0"/>
+              <a:t>Note: mount point </a:t>
+            </a:r>
+            <a:r>
+              <a:rPr lang="en-US" b="1" i="1" dirty="0" smtClean="0"/>
+              <a:t>must</a:t>
+            </a:r>
+            <a:r>
+              <a:rPr lang="en-US" dirty="0" smtClean="0"/>
+              <a:t> exist</a:t>
+            </a:r>
+          </a:p>
+          <a:p>
+            <a:pPr lvl="1"/>
+            <a:r>
+              <a:rPr lang="en-US" dirty="0" smtClean="0"/>
+              <a:t>as many as required</a:t>
+            </a:r>
+          </a:p>
+          <a:p>
+            <a:pPr lvl="1"/>
+            <a:endParaRPr lang="en-US" dirty="0"/>
           </a:p>
         </p:txBody>
       </p:sp>
@@ -9242,7 +9364,7 @@
     </p:spTree>
     <p:extLst>
       <p:ext uri="{BB962C8B-B14F-4D97-AF65-F5344CB8AC3E}">
-        <p14:creationId xmlns:p14="http://schemas.microsoft.com/office/powerpoint/2010/main" val="2233734622"/>
+        <p14:creationId xmlns:p14="http://schemas.microsoft.com/office/powerpoint/2010/main" val="2946079089"/>
       </p:ext>
     </p:extLst>
   </p:cSld>
@@ -9252,9 +9374,371 @@
   <p:timing>
     <p:tnLst>
       <p:par>
-        <p:cTn id="1" dur="indefinite" restart="never" nodeType="tmRoot"/>
+        <p:cTn id="1" dur="indefinite" restart="never" nodeType="tmRoot">
+          <p:childTnLst>
+            <p:seq concurrent="1" nextAc="seek">
+              <p:cTn id="2" dur="indefinite" nodeType="mainSeq">
+                <p:childTnLst>
+                  <p:par>
+                    <p:cTn id="3" fill="hold">
+                      <p:stCondLst>
+                        <p:cond delay="indefinite"/>
+                        <p:cond evt="onBegin" delay="0">
+                          <p:tn val="2"/>
+                        </p:cond>
+                      </p:stCondLst>
+                      <p:childTnLst>
+                        <p:par>
+                          <p:cTn id="4" fill="hold">
+                            <p:stCondLst>
+                              <p:cond delay="0"/>
+                            </p:stCondLst>
+                            <p:childTnLst>
+                              <p:par>
+                                <p:cTn id="5" presetID="1" presetClass="entr" presetSubtype="0" fill="hold" grpId="0" nodeType="withEffect">
+                                  <p:stCondLst>
+                                    <p:cond delay="0"/>
+                                  </p:stCondLst>
+                                  <p:childTnLst>
+                                    <p:set>
+                                      <p:cBhvr>
+                                        <p:cTn id="6" dur="1" fill="hold">
+                                          <p:stCondLst>
+                                            <p:cond delay="0"/>
+                                          </p:stCondLst>
+                                        </p:cTn>
+                                        <p:tgtEl>
+                                          <p:spTgt spid="3">
+                                            <p:txEl>
+                                              <p:pRg st="0" end="0"/>
+                                            </p:txEl>
+                                          </p:spTgt>
+                                        </p:tgtEl>
+                                        <p:attrNameLst>
+                                          <p:attrName>style.visibility</p:attrName>
+                                        </p:attrNameLst>
+                                      </p:cBhvr>
+                                      <p:to>
+                                        <p:strVal val="visible"/>
+                                      </p:to>
+                                    </p:set>
+                                  </p:childTnLst>
+                                </p:cTn>
+                              </p:par>
+                              <p:par>
+                                <p:cTn id="7" presetID="1" presetClass="entr" presetSubtype="0" fill="hold" grpId="0" nodeType="withEffect">
+                                  <p:stCondLst>
+                                    <p:cond delay="0"/>
+                                  </p:stCondLst>
+                                  <p:childTnLst>
+                                    <p:set>
+                                      <p:cBhvr>
+                                        <p:cTn id="8" dur="1" fill="hold">
+                                          <p:stCondLst>
+                                            <p:cond delay="0"/>
+                                          </p:stCondLst>
+                                        </p:cTn>
+                                        <p:tgtEl>
+                                          <p:spTgt spid="3">
+                                            <p:txEl>
+                                              <p:pRg st="1" end="1"/>
+                                            </p:txEl>
+                                          </p:spTgt>
+                                        </p:tgtEl>
+                                        <p:attrNameLst>
+                                          <p:attrName>style.visibility</p:attrName>
+                                        </p:attrNameLst>
+                                      </p:cBhvr>
+                                      <p:to>
+                                        <p:strVal val="visible"/>
+                                      </p:to>
+                                    </p:set>
+                                  </p:childTnLst>
+                                </p:cTn>
+                              </p:par>
+                            </p:childTnLst>
+                          </p:cTn>
+                        </p:par>
+                      </p:childTnLst>
+                    </p:cTn>
+                  </p:par>
+                  <p:par>
+                    <p:cTn id="9" fill="hold">
+                      <p:stCondLst>
+                        <p:cond delay="indefinite"/>
+                      </p:stCondLst>
+                      <p:childTnLst>
+                        <p:par>
+                          <p:cTn id="10" fill="hold">
+                            <p:stCondLst>
+                              <p:cond delay="0"/>
+                            </p:stCondLst>
+                            <p:childTnLst>
+                              <p:par>
+                                <p:cTn id="11" presetID="1" presetClass="entr" presetSubtype="0" fill="hold" grpId="0" nodeType="clickEffect">
+                                  <p:stCondLst>
+                                    <p:cond delay="0"/>
+                                  </p:stCondLst>
+                                  <p:childTnLst>
+                                    <p:set>
+                                      <p:cBhvr>
+                                        <p:cTn id="12" dur="1" fill="hold">
+                                          <p:stCondLst>
+                                            <p:cond delay="0"/>
+                                          </p:stCondLst>
+                                        </p:cTn>
+                                        <p:tgtEl>
+                                          <p:spTgt spid="3">
+                                            <p:txEl>
+                                              <p:pRg st="2" end="2"/>
+                                            </p:txEl>
+                                          </p:spTgt>
+                                        </p:tgtEl>
+                                        <p:attrNameLst>
+                                          <p:attrName>style.visibility</p:attrName>
+                                        </p:attrNameLst>
+                                      </p:cBhvr>
+                                      <p:to>
+                                        <p:strVal val="visible"/>
+                                      </p:to>
+                                    </p:set>
+                                  </p:childTnLst>
+                                </p:cTn>
+                              </p:par>
+                              <p:par>
+                                <p:cTn id="13" presetID="1" presetClass="entr" presetSubtype="0" fill="hold" grpId="0" nodeType="withEffect">
+                                  <p:stCondLst>
+                                    <p:cond delay="0"/>
+                                  </p:stCondLst>
+                                  <p:childTnLst>
+                                    <p:set>
+                                      <p:cBhvr>
+                                        <p:cTn id="14" dur="1" fill="hold">
+                                          <p:stCondLst>
+                                            <p:cond delay="0"/>
+                                          </p:stCondLst>
+                                        </p:cTn>
+                                        <p:tgtEl>
+                                          <p:spTgt spid="3">
+                                            <p:txEl>
+                                              <p:pRg st="3" end="3"/>
+                                            </p:txEl>
+                                          </p:spTgt>
+                                        </p:tgtEl>
+                                        <p:attrNameLst>
+                                          <p:attrName>style.visibility</p:attrName>
+                                        </p:attrNameLst>
+                                      </p:cBhvr>
+                                      <p:to>
+                                        <p:strVal val="visible"/>
+                                      </p:to>
+                                    </p:set>
+                                  </p:childTnLst>
+                                </p:cTn>
+                              </p:par>
+                            </p:childTnLst>
+                          </p:cTn>
+                        </p:par>
+                      </p:childTnLst>
+                    </p:cTn>
+                  </p:par>
+                  <p:par>
+                    <p:cTn id="15" fill="hold">
+                      <p:stCondLst>
+                        <p:cond delay="indefinite"/>
+                      </p:stCondLst>
+                      <p:childTnLst>
+                        <p:par>
+                          <p:cTn id="16" fill="hold">
+                            <p:stCondLst>
+                              <p:cond delay="0"/>
+                            </p:stCondLst>
+                            <p:childTnLst>
+                              <p:par>
+                                <p:cTn id="17" presetID="1" presetClass="entr" presetSubtype="0" fill="hold" grpId="0" nodeType="clickEffect">
+                                  <p:stCondLst>
+                                    <p:cond delay="0"/>
+                                  </p:stCondLst>
+                                  <p:childTnLst>
+                                    <p:set>
+                                      <p:cBhvr>
+                                        <p:cTn id="18" dur="1" fill="hold">
+                                          <p:stCondLst>
+                                            <p:cond delay="0"/>
+                                          </p:stCondLst>
+                                        </p:cTn>
+                                        <p:tgtEl>
+                                          <p:spTgt spid="3">
+                                            <p:txEl>
+                                              <p:pRg st="4" end="4"/>
+                                            </p:txEl>
+                                          </p:spTgt>
+                                        </p:tgtEl>
+                                        <p:attrNameLst>
+                                          <p:attrName>style.visibility</p:attrName>
+                                        </p:attrNameLst>
+                                      </p:cBhvr>
+                                      <p:to>
+                                        <p:strVal val="visible"/>
+                                      </p:to>
+                                    </p:set>
+                                  </p:childTnLst>
+                                </p:cTn>
+                              </p:par>
+                              <p:par>
+                                <p:cTn id="19" presetID="1" presetClass="entr" presetSubtype="0" fill="hold" grpId="0" nodeType="withEffect">
+                                  <p:stCondLst>
+                                    <p:cond delay="0"/>
+                                  </p:stCondLst>
+                                  <p:childTnLst>
+                                    <p:set>
+                                      <p:cBhvr>
+                                        <p:cTn id="20" dur="1" fill="hold">
+                                          <p:stCondLst>
+                                            <p:cond delay="0"/>
+                                          </p:stCondLst>
+                                        </p:cTn>
+                                        <p:tgtEl>
+                                          <p:spTgt spid="3">
+                                            <p:txEl>
+                                              <p:pRg st="5" end="5"/>
+                                            </p:txEl>
+                                          </p:spTgt>
+                                        </p:tgtEl>
+                                        <p:attrNameLst>
+                                          <p:attrName>style.visibility</p:attrName>
+                                        </p:attrNameLst>
+                                      </p:cBhvr>
+                                      <p:to>
+                                        <p:strVal val="visible"/>
+                                      </p:to>
+                                    </p:set>
+                                  </p:childTnLst>
+                                </p:cTn>
+                              </p:par>
+                              <p:par>
+                                <p:cTn id="21" presetID="1" presetClass="entr" presetSubtype="0" fill="hold" grpId="0" nodeType="withEffect">
+                                  <p:stCondLst>
+                                    <p:cond delay="0"/>
+                                  </p:stCondLst>
+                                  <p:childTnLst>
+                                    <p:set>
+                                      <p:cBhvr>
+                                        <p:cTn id="22" dur="1" fill="hold">
+                                          <p:stCondLst>
+                                            <p:cond delay="0"/>
+                                          </p:stCondLst>
+                                        </p:cTn>
+                                        <p:tgtEl>
+                                          <p:spTgt spid="3">
+                                            <p:txEl>
+                                              <p:pRg st="6" end="6"/>
+                                            </p:txEl>
+                                          </p:spTgt>
+                                        </p:tgtEl>
+                                        <p:attrNameLst>
+                                          <p:attrName>style.visibility</p:attrName>
+                                        </p:attrNameLst>
+                                      </p:cBhvr>
+                                      <p:to>
+                                        <p:strVal val="visible"/>
+                                      </p:to>
+                                    </p:set>
+                                  </p:childTnLst>
+                                </p:cTn>
+                              </p:par>
+                              <p:par>
+                                <p:cTn id="23" presetID="1" presetClass="entr" presetSubtype="0" fill="hold" grpId="0" nodeType="withEffect">
+                                  <p:stCondLst>
+                                    <p:cond delay="0"/>
+                                  </p:stCondLst>
+                                  <p:childTnLst>
+                                    <p:set>
+                                      <p:cBhvr>
+                                        <p:cTn id="24" dur="1" fill="hold">
+                                          <p:stCondLst>
+                                            <p:cond delay="0"/>
+                                          </p:stCondLst>
+                                        </p:cTn>
+                                        <p:tgtEl>
+                                          <p:spTgt spid="3">
+                                            <p:txEl>
+                                              <p:pRg st="7" end="7"/>
+                                            </p:txEl>
+                                          </p:spTgt>
+                                        </p:tgtEl>
+                                        <p:attrNameLst>
+                                          <p:attrName>style.visibility</p:attrName>
+                                        </p:attrNameLst>
+                                      </p:cBhvr>
+                                      <p:to>
+                                        <p:strVal val="visible"/>
+                                      </p:to>
+                                    </p:set>
+                                  </p:childTnLst>
+                                </p:cTn>
+                              </p:par>
+                              <p:par>
+                                <p:cTn id="25" presetID="1" presetClass="entr" presetSubtype="0" fill="hold" grpId="0" nodeType="withEffect">
+                                  <p:stCondLst>
+                                    <p:cond delay="0"/>
+                                  </p:stCondLst>
+                                  <p:childTnLst>
+                                    <p:set>
+                                      <p:cBhvr>
+                                        <p:cTn id="26" dur="1" fill="hold">
+                                          <p:stCondLst>
+                                            <p:cond delay="0"/>
+                                          </p:stCondLst>
+                                        </p:cTn>
+                                        <p:tgtEl>
+                                          <p:spTgt spid="3">
+                                            <p:txEl>
+                                              <p:pRg st="8" end="8"/>
+                                            </p:txEl>
+                                          </p:spTgt>
+                                        </p:tgtEl>
+                                        <p:attrNameLst>
+                                          <p:attrName>style.visibility</p:attrName>
+                                        </p:attrNameLst>
+                                      </p:cBhvr>
+                                      <p:to>
+                                        <p:strVal val="visible"/>
+                                      </p:to>
+                                    </p:set>
+                                  </p:childTnLst>
+                                </p:cTn>
+                              </p:par>
+                            </p:childTnLst>
+                          </p:cTn>
+                        </p:par>
+                      </p:childTnLst>
+                    </p:cTn>
+                  </p:par>
+                </p:childTnLst>
+              </p:cTn>
+              <p:prevCondLst>
+                <p:cond evt="onPrev" delay="0">
+                  <p:tgtEl>
+                    <p:sldTgt/>
+                  </p:tgtEl>
+                </p:cond>
+              </p:prevCondLst>
+              <p:nextCondLst>
+                <p:cond evt="onNext" delay="0">
+                  <p:tgtEl>
+                    <p:sldTgt/>
+                  </p:tgtEl>
+                </p:cond>
+              </p:nextCondLst>
+            </p:seq>
+          </p:childTnLst>
+        </p:cTn>
       </p:par>
     </p:tnLst>
+    <p:bldLst>
+      <p:bldP spid="3" grpId="0" uiExpand="1" build="p"/>
+    </p:bldLst>
   </p:timing>
 </p:sld>
 </file>
@@ -9293,9 +9777,28 @@
           <a:p>
             <a:r>
               <a:rPr lang="en-US" dirty="0" smtClean="0"/>
-              <a:t>Example definition file</a:t>
+              <a:t>Multithreaded applications</a:t>
             </a:r>
             <a:endParaRPr lang="nl-BE" dirty="0"/>
+          </a:p>
+        </p:txBody>
+      </p:sp>
+      <p:sp>
+        <p:nvSpPr>
+          <p:cNvPr id="3" name="Text Placeholder 2"/>
+          <p:cNvSpPr>
+            <a:spLocks noGrp="1"/>
+          </p:cNvSpPr>
+          <p:nvPr>
+            <p:ph type="body" idx="1"/>
+          </p:nvPr>
+        </p:nvSpPr>
+        <p:spPr/>
+        <p:txBody>
+          <a:bodyPr/>
+          <a:lstStyle/>
+          <a:p>
+            <a:endParaRPr lang="nl-BE"/>
           </a:p>
         </p:txBody>
       </p:sp>
@@ -9317,6 +9820,89 @@
             <a:fld id="{AEFF399F-E3B5-4890-BC79-9BC8D4DF3F2D}" type="slidenum">
               <a:rPr lang="nl-BE" smtClean="0"/>
               <a:t>21</a:t>
+            </a:fld>
+            <a:endParaRPr lang="nl-BE"/>
+          </a:p>
+        </p:txBody>
+      </p:sp>
+    </p:spTree>
+    <p:extLst>
+      <p:ext uri="{BB962C8B-B14F-4D97-AF65-F5344CB8AC3E}">
+        <p14:creationId xmlns:p14="http://schemas.microsoft.com/office/powerpoint/2010/main" val="2233734622"/>
+      </p:ext>
+    </p:extLst>
+  </p:cSld>
+  <p:clrMapOvr>
+    <a:masterClrMapping/>
+  </p:clrMapOvr>
+  <p:timing>
+    <p:tnLst>
+      <p:par>
+        <p:cTn id="1" dur="indefinite" restart="never" nodeType="tmRoot"/>
+      </p:par>
+    </p:tnLst>
+  </p:timing>
+</p:sld>
+</file>
+
+<file path=ppt/slides/slide22.xml><?xml version="1.0" encoding="utf-8"?>
+<p:sld xmlns:a="http://schemas.openxmlformats.org/drawingml/2006/main" xmlns:r="http://schemas.openxmlformats.org/officeDocument/2006/relationships" xmlns:p="http://schemas.openxmlformats.org/presentationml/2006/main">
+  <p:cSld>
+    <p:spTree>
+      <p:nvGrpSpPr>
+        <p:cNvPr id="1" name=""/>
+        <p:cNvGrpSpPr/>
+        <p:nvPr/>
+      </p:nvGrpSpPr>
+      <p:grpSpPr>
+        <a:xfrm>
+          <a:off x="0" y="0"/>
+          <a:ext cx="0" cy="0"/>
+          <a:chOff x="0" y="0"/>
+          <a:chExt cx="0" cy="0"/>
+        </a:xfrm>
+      </p:grpSpPr>
+      <p:sp>
+        <p:nvSpPr>
+          <p:cNvPr id="2" name="Title 1"/>
+          <p:cNvSpPr>
+            <a:spLocks noGrp="1"/>
+          </p:cNvSpPr>
+          <p:nvPr>
+            <p:ph type="title"/>
+          </p:nvPr>
+        </p:nvSpPr>
+        <p:spPr/>
+        <p:txBody>
+          <a:bodyPr/>
+          <a:lstStyle/>
+          <a:p>
+            <a:r>
+              <a:rPr lang="en-US" dirty="0" smtClean="0"/>
+              <a:t>Example definition file</a:t>
+            </a:r>
+            <a:endParaRPr lang="nl-BE" dirty="0"/>
+          </a:p>
+        </p:txBody>
+      </p:sp>
+      <p:sp>
+        <p:nvSpPr>
+          <p:cNvPr id="4" name="Slide Number Placeholder 3"/>
+          <p:cNvSpPr>
+            <a:spLocks noGrp="1"/>
+          </p:cNvSpPr>
+          <p:nvPr>
+            <p:ph type="sldNum" sz="quarter" idx="12"/>
+          </p:nvPr>
+        </p:nvSpPr>
+        <p:spPr/>
+        <p:txBody>
+          <a:bodyPr/>
+          <a:lstStyle/>
+          <a:p>
+            <a:fld id="{AEFF399F-E3B5-4890-BC79-9BC8D4DF3F2D}" type="slidenum">
+              <a:rPr lang="nl-BE" smtClean="0"/>
+              <a:t>22</a:t>
             </a:fld>
             <a:endParaRPr lang="nl-BE"/>
           </a:p>
@@ -10153,7 +10739,7 @@
 </p:sld>
 </file>
 
-<file path=ppt/slides/slide22.xml><?xml version="1.0" encoding="utf-8"?>
+<file path=ppt/slides/slide23.xml><?xml version="1.0" encoding="utf-8"?>
 <p:sld xmlns:a="http://schemas.openxmlformats.org/drawingml/2006/main" xmlns:r="http://schemas.openxmlformats.org/officeDocument/2006/relationships" xmlns:p="http://schemas.openxmlformats.org/presentationml/2006/main">
   <p:cSld>
     <p:spTree>
@@ -10241,7 +10827,7 @@
           <a:p>
             <a:fld id="{AEFF399F-E3B5-4890-BC79-9BC8D4DF3F2D}" type="slidenum">
               <a:rPr lang="nl-BE" smtClean="0"/>
-              <a:t>22</a:t>
+              <a:t>23</a:t>
             </a:fld>
             <a:endParaRPr lang="nl-BE"/>
           </a:p>
@@ -10598,7 +11184,7 @@
 </p:sld>
 </file>
 
-<file path=ppt/slides/slide23.xml><?xml version="1.0" encoding="utf-8"?>
+<file path=ppt/slides/slide24.xml><?xml version="1.0" encoding="utf-8"?>
 <p:sld xmlns:a="http://schemas.openxmlformats.org/drawingml/2006/main" xmlns:r="http://schemas.openxmlformats.org/officeDocument/2006/relationships" xmlns:p="http://schemas.openxmlformats.org/presentationml/2006/main">
   <p:cSld>
     <p:spTree>
@@ -10674,7 +11260,7 @@
           <a:p>
             <a:fld id="{AEFF399F-E3B5-4890-BC79-9BC8D4DF3F2D}" type="slidenum">
               <a:rPr lang="nl-BE" smtClean="0"/>
-              <a:t>23</a:t>
+              <a:t>24</a:t>
             </a:fld>
             <a:endParaRPr lang="nl-BE"/>
           </a:p>
@@ -10700,7 +11286,7 @@
 </p:sld>
 </file>
 
-<file path=ppt/slides/slide24.xml><?xml version="1.0" encoding="utf-8"?>
+<file path=ppt/slides/slide25.xml><?xml version="1.0" encoding="utf-8"?>
 <p:sld xmlns:a="http://schemas.openxmlformats.org/drawingml/2006/main" xmlns:r="http://schemas.openxmlformats.org/officeDocument/2006/relationships" xmlns:p="http://schemas.openxmlformats.org/presentationml/2006/main">
   <p:cSld>
     <p:spTree>
@@ -10757,7 +11343,7 @@
           <a:p>
             <a:fld id="{AEFF399F-E3B5-4890-BC79-9BC8D4DF3F2D}" type="slidenum">
               <a:rPr lang="nl-BE" smtClean="0"/>
-              <a:t>24</a:t>
+              <a:t>25</a:t>
             </a:fld>
             <a:endParaRPr lang="nl-BE"/>
           </a:p>
@@ -12082,7 +12668,7 @@
 </p:sld>
 </file>
 
-<file path=ppt/slides/slide25.xml><?xml version="1.0" encoding="utf-8"?>
+<file path=ppt/slides/slide26.xml><?xml version="1.0" encoding="utf-8"?>
 <p:sld xmlns:a="http://schemas.openxmlformats.org/drawingml/2006/main" xmlns:r="http://schemas.openxmlformats.org/officeDocument/2006/relationships" xmlns:p="http://schemas.openxmlformats.org/presentationml/2006/main">
   <p:cSld>
     <p:spTree>
@@ -12162,7 +12748,7 @@
           <a:p>
             <a:fld id="{AEFF399F-E3B5-4890-BC79-9BC8D4DF3F2D}" type="slidenum">
               <a:rPr lang="nl-BE" smtClean="0"/>
-              <a:t>25</a:t>
+              <a:t>26</a:t>
             </a:fld>
             <a:endParaRPr lang="nl-BE"/>
           </a:p>
@@ -12511,7 +13097,7 @@
 </p:sld>
 </file>
 
-<file path=ppt/slides/slide26.xml><?xml version="1.0" encoding="utf-8"?>
+<file path=ppt/slides/slide27.xml><?xml version="1.0" encoding="utf-8"?>
 <p:sld xmlns:a="http://schemas.openxmlformats.org/drawingml/2006/main" xmlns:r="http://schemas.openxmlformats.org/officeDocument/2006/relationships" xmlns:p="http://schemas.openxmlformats.org/presentationml/2006/main">
   <p:cSld>
     <p:spTree>
@@ -12587,7 +13173,7 @@
           <a:p>
             <a:fld id="{AEFF399F-E3B5-4890-BC79-9BC8D4DF3F2D}" type="slidenum">
               <a:rPr lang="nl-BE" smtClean="0"/>
-              <a:t>26</a:t>
+              <a:t>27</a:t>
             </a:fld>
             <a:endParaRPr lang="nl-BE"/>
           </a:p>
@@ -12613,7 +13199,7 @@
 </p:sld>
 </file>
 
-<file path=ppt/slides/slide27.xml><?xml version="1.0" encoding="utf-8"?>
+<file path=ppt/slides/slide28.xml><?xml version="1.0" encoding="utf-8"?>
 <p:sld xmlns:a="http://schemas.openxmlformats.org/drawingml/2006/main" xmlns:r="http://schemas.openxmlformats.org/officeDocument/2006/relationships" xmlns:p="http://schemas.openxmlformats.org/presentationml/2006/main">
   <p:cSld>
     <p:spTree>
@@ -12701,11 +13287,7 @@
           <a:p>
             <a:r>
               <a:rPr lang="en-US" dirty="0" smtClean="0"/>
-              <a:t>Serial </a:t>
-            </a:r>
-            <a:r>
-              <a:rPr lang="en-US" dirty="0" smtClean="0"/>
-              <a:t>code/</a:t>
+              <a:t>Serial code/</a:t>
             </a:r>
             <a:r>
               <a:rPr lang="en-US" dirty="0" err="1" smtClean="0"/>
@@ -12725,7 +13307,6 @@
               <a:rPr lang="en-US" dirty="0" smtClean="0"/>
               <a:t>)</a:t>
             </a:r>
-            <a:endParaRPr lang="en-US" dirty="0" smtClean="0"/>
           </a:p>
           <a:p>
             <a:pPr lvl="1"/>
@@ -12789,11 +13370,7 @@
             <a:pPr lvl="1"/>
             <a:r>
               <a:rPr lang="en-US" dirty="0" smtClean="0"/>
-              <a:t>(Almost) independent of number of </a:t>
-            </a:r>
-            <a:r>
-              <a:rPr lang="en-US" dirty="0" smtClean="0"/>
-              <a:t>threads</a:t>
+              <a:t>(Almost) independent of number of threads</a:t>
             </a:r>
           </a:p>
           <a:p>
@@ -12822,7 +13399,6 @@
               <a:rPr lang="en-US" dirty="0" smtClean="0"/>
               <a:t>However, serial GESVD: 10 % </a:t>
             </a:r>
-            <a:endParaRPr lang="en-US" dirty="0" smtClean="0"/>
           </a:p>
           <a:p>
             <a:pPr lvl="1"/>
@@ -12847,7 +13423,7 @@
           <a:p>
             <a:fld id="{AEFF399F-E3B5-4890-BC79-9BC8D4DF3F2D}" type="slidenum">
               <a:rPr lang="nl-BE" smtClean="0"/>
-              <a:t>27</a:t>
+              <a:t>28</a:t>
             </a:fld>
             <a:endParaRPr lang="nl-BE"/>
           </a:p>
@@ -13383,7 +13959,7 @@
 </p:sld>
 </file>
 
-<file path=ppt/slides/slide28.xml><?xml version="1.0" encoding="utf-8"?>
+<file path=ppt/slides/slide29.xml><?xml version="1.0" encoding="utf-8"?>
 <p:sld xmlns:a="http://schemas.openxmlformats.org/drawingml/2006/main" xmlns:r="http://schemas.openxmlformats.org/officeDocument/2006/relationships" xmlns:p="http://schemas.openxmlformats.org/presentationml/2006/main">
   <p:cSld>
     <p:spTree>
@@ -13529,7 +14105,7 @@
           <a:p>
             <a:fld id="{AEFF399F-E3B5-4890-BC79-9BC8D4DF3F2D}" type="slidenum">
               <a:rPr lang="nl-BE" smtClean="0"/>
-              <a:t>28</a:t>
+              <a:t>29</a:t>
             </a:fld>
             <a:endParaRPr lang="nl-BE"/>
           </a:p>
@@ -13780,108 +14356,6 @@
 </p:sld>
 </file>
 
-<file path=ppt/slides/slide29.xml><?xml version="1.0" encoding="utf-8"?>
-<p:sld xmlns:a="http://schemas.openxmlformats.org/drawingml/2006/main" xmlns:r="http://schemas.openxmlformats.org/officeDocument/2006/relationships" xmlns:p="http://schemas.openxmlformats.org/presentationml/2006/main">
-  <p:cSld>
-    <p:spTree>
-      <p:nvGrpSpPr>
-        <p:cNvPr id="1" name=""/>
-        <p:cNvGrpSpPr/>
-        <p:nvPr/>
-      </p:nvGrpSpPr>
-      <p:grpSpPr>
-        <a:xfrm>
-          <a:off x="0" y="0"/>
-          <a:ext cx="0" cy="0"/>
-          <a:chOff x="0" y="0"/>
-          <a:chExt cx="0" cy="0"/>
-        </a:xfrm>
-      </p:grpSpPr>
-      <p:sp>
-        <p:nvSpPr>
-          <p:cNvPr id="2" name="Title 1"/>
-          <p:cNvSpPr>
-            <a:spLocks noGrp="1"/>
-          </p:cNvSpPr>
-          <p:nvPr>
-            <p:ph type="title"/>
-          </p:nvPr>
-        </p:nvSpPr>
-        <p:spPr/>
-        <p:txBody>
-          <a:bodyPr/>
-          <a:lstStyle/>
-          <a:p>
-            <a:r>
-              <a:rPr lang="en-US" dirty="0" smtClean="0"/>
-              <a:t>Conclusions</a:t>
-            </a:r>
-            <a:endParaRPr lang="nl-BE" dirty="0"/>
-          </a:p>
-        </p:txBody>
-      </p:sp>
-      <p:sp>
-        <p:nvSpPr>
-          <p:cNvPr id="3" name="Text Placeholder 2"/>
-          <p:cNvSpPr>
-            <a:spLocks noGrp="1"/>
-          </p:cNvSpPr>
-          <p:nvPr>
-            <p:ph type="body" idx="1"/>
-          </p:nvPr>
-        </p:nvSpPr>
-        <p:spPr/>
-        <p:txBody>
-          <a:bodyPr/>
-          <a:lstStyle/>
-          <a:p>
-            <a:endParaRPr lang="nl-BE"/>
-          </a:p>
-        </p:txBody>
-      </p:sp>
-      <p:sp>
-        <p:nvSpPr>
-          <p:cNvPr id="4" name="Slide Number Placeholder 3"/>
-          <p:cNvSpPr>
-            <a:spLocks noGrp="1"/>
-          </p:cNvSpPr>
-          <p:nvPr>
-            <p:ph type="sldNum" sz="quarter" idx="12"/>
-          </p:nvPr>
-        </p:nvSpPr>
-        <p:spPr/>
-        <p:txBody>
-          <a:bodyPr/>
-          <a:lstStyle/>
-          <a:p>
-            <a:fld id="{AEFF399F-E3B5-4890-BC79-9BC8D4DF3F2D}" type="slidenum">
-              <a:rPr lang="nl-BE" smtClean="0"/>
-              <a:t>29</a:t>
-            </a:fld>
-            <a:endParaRPr lang="nl-BE"/>
-          </a:p>
-        </p:txBody>
-      </p:sp>
-    </p:spTree>
-    <p:extLst>
-      <p:ext uri="{BB962C8B-B14F-4D97-AF65-F5344CB8AC3E}">
-        <p14:creationId xmlns:p14="http://schemas.microsoft.com/office/powerpoint/2010/main" val="2192721825"/>
-      </p:ext>
-    </p:extLst>
-  </p:cSld>
-  <p:clrMapOvr>
-    <a:masterClrMapping/>
-  </p:clrMapOvr>
-  <p:timing>
-    <p:tnLst>
-      <p:par>
-        <p:cTn id="1" dur="indefinite" restart="never" nodeType="tmRoot"/>
-      </p:par>
-    </p:tnLst>
-  </p:timing>
-</p:sld>
-</file>
-
 <file path=ppt/slides/slide3.xml><?xml version="1.0" encoding="utf-8"?>
 <p:sld xmlns:a="http://schemas.openxmlformats.org/drawingml/2006/main" xmlns:r="http://schemas.openxmlformats.org/officeDocument/2006/relationships" xmlns:p="http://schemas.openxmlformats.org/presentationml/2006/main">
   <p:cSld>
@@ -14304,6 +14778,108 @@
       </p:sp>
       <p:sp>
         <p:nvSpPr>
+          <p:cNvPr id="3" name="Text Placeholder 2"/>
+          <p:cNvSpPr>
+            <a:spLocks noGrp="1"/>
+          </p:cNvSpPr>
+          <p:nvPr>
+            <p:ph type="body" idx="1"/>
+          </p:nvPr>
+        </p:nvSpPr>
+        <p:spPr/>
+        <p:txBody>
+          <a:bodyPr/>
+          <a:lstStyle/>
+          <a:p>
+            <a:endParaRPr lang="nl-BE"/>
+          </a:p>
+        </p:txBody>
+      </p:sp>
+      <p:sp>
+        <p:nvSpPr>
+          <p:cNvPr id="4" name="Slide Number Placeholder 3"/>
+          <p:cNvSpPr>
+            <a:spLocks noGrp="1"/>
+          </p:cNvSpPr>
+          <p:nvPr>
+            <p:ph type="sldNum" sz="quarter" idx="12"/>
+          </p:nvPr>
+        </p:nvSpPr>
+        <p:spPr/>
+        <p:txBody>
+          <a:bodyPr/>
+          <a:lstStyle/>
+          <a:p>
+            <a:fld id="{AEFF399F-E3B5-4890-BC79-9BC8D4DF3F2D}" type="slidenum">
+              <a:rPr lang="nl-BE" smtClean="0"/>
+              <a:t>30</a:t>
+            </a:fld>
+            <a:endParaRPr lang="nl-BE"/>
+          </a:p>
+        </p:txBody>
+      </p:sp>
+    </p:spTree>
+    <p:extLst>
+      <p:ext uri="{BB962C8B-B14F-4D97-AF65-F5344CB8AC3E}">
+        <p14:creationId xmlns:p14="http://schemas.microsoft.com/office/powerpoint/2010/main" val="2192721825"/>
+      </p:ext>
+    </p:extLst>
+  </p:cSld>
+  <p:clrMapOvr>
+    <a:masterClrMapping/>
+  </p:clrMapOvr>
+  <p:timing>
+    <p:tnLst>
+      <p:par>
+        <p:cTn id="1" dur="indefinite" restart="never" nodeType="tmRoot"/>
+      </p:par>
+    </p:tnLst>
+  </p:timing>
+</p:sld>
+</file>
+
+<file path=ppt/slides/slide31.xml><?xml version="1.0" encoding="utf-8"?>
+<p:sld xmlns:a="http://schemas.openxmlformats.org/drawingml/2006/main" xmlns:r="http://schemas.openxmlformats.org/officeDocument/2006/relationships" xmlns:p="http://schemas.openxmlformats.org/presentationml/2006/main">
+  <p:cSld>
+    <p:spTree>
+      <p:nvGrpSpPr>
+        <p:cNvPr id="1" name=""/>
+        <p:cNvGrpSpPr/>
+        <p:nvPr/>
+      </p:nvGrpSpPr>
+      <p:grpSpPr>
+        <a:xfrm>
+          <a:off x="0" y="0"/>
+          <a:ext cx="0" cy="0"/>
+          <a:chOff x="0" y="0"/>
+          <a:chExt cx="0" cy="0"/>
+        </a:xfrm>
+      </p:grpSpPr>
+      <p:sp>
+        <p:nvSpPr>
+          <p:cNvPr id="2" name="Title 1"/>
+          <p:cNvSpPr>
+            <a:spLocks noGrp="1"/>
+          </p:cNvSpPr>
+          <p:nvPr>
+            <p:ph type="title"/>
+          </p:nvPr>
+        </p:nvSpPr>
+        <p:spPr/>
+        <p:txBody>
+          <a:bodyPr/>
+          <a:lstStyle/>
+          <a:p>
+            <a:r>
+              <a:rPr lang="en-US" dirty="0" smtClean="0"/>
+              <a:t>Conclusions</a:t>
+            </a:r>
+            <a:endParaRPr lang="nl-BE" dirty="0"/>
+          </a:p>
+        </p:txBody>
+      </p:sp>
+      <p:sp>
+        <p:nvSpPr>
           <p:cNvPr id="3" name="Content Placeholder 2"/>
           <p:cNvSpPr>
             <a:spLocks noGrp="1"/>
@@ -14376,11 +14952,7 @@
             </a:r>
             <a:r>
               <a:rPr lang="en-US" dirty="0" smtClean="0"/>
-              <a:t> </a:t>
-            </a:r>
-            <a:r>
-              <a:rPr lang="en-US" dirty="0" smtClean="0"/>
-              <a:t>possible</a:t>
+              <a:t> possible</a:t>
             </a:r>
           </a:p>
           <a:p>
@@ -14421,7 +14993,7 @@
           <a:p>
             <a:fld id="{AEFF399F-E3B5-4890-BC79-9BC8D4DF3F2D}" type="slidenum">
               <a:rPr lang="nl-BE" smtClean="0"/>
-              <a:t>30</a:t>
+              <a:t>31</a:t>
             </a:fld>
             <a:endParaRPr lang="nl-BE"/>
           </a:p>
@@ -14930,7 +15502,7 @@
 </p:sld>
 </file>
 
-<file path=ppt/slides/slide31.xml><?xml version="1.0" encoding="utf-8"?>
+<file path=ppt/slides/slide32.xml><?xml version="1.0" encoding="utf-8"?>
 <p:sld xmlns:a="http://schemas.openxmlformats.org/drawingml/2006/main" xmlns:r="http://schemas.openxmlformats.org/officeDocument/2006/relationships" xmlns:p="http://schemas.openxmlformats.org/presentationml/2006/main">
   <p:cSld>
     <p:spTree>
@@ -15134,7 +15706,7 @@
           <a:p>
             <a:fld id="{AEFF399F-E3B5-4890-BC79-9BC8D4DF3F2D}" type="slidenum">
               <a:rPr lang="nl-BE" smtClean="0"/>
-              <a:t>31</a:t>
+              <a:t>32</a:t>
             </a:fld>
             <a:endParaRPr lang="nl-BE"/>
           </a:p>
@@ -15465,7 +16037,7 @@
 </p:sld>
 </file>
 
-<file path=ppt/slides/slide32.xml><?xml version="1.0" encoding="utf-8"?>
+<file path=ppt/slides/slide33.xml><?xml version="1.0" encoding="utf-8"?>
 <p:sld xmlns:a="http://schemas.openxmlformats.org/drawingml/2006/main" xmlns:r="http://schemas.openxmlformats.org/officeDocument/2006/relationships" xmlns:p="http://schemas.openxmlformats.org/presentationml/2006/main">
   <p:cSld>
     <p:spTree>
@@ -15646,7 +16218,7 @@
           <a:p>
             <a:fld id="{AEFF399F-E3B5-4890-BC79-9BC8D4DF3F2D}" type="slidenum">
               <a:rPr lang="nl-BE" smtClean="0"/>
-              <a:t>32</a:t>
+              <a:t>33</a:t>
             </a:fld>
             <a:endParaRPr lang="nl-BE"/>
           </a:p>

</xml_diff>

<commit_message>
Added slide on bootstrapping from docker containers
</commit_message>
<xml_diff>
--- a/Virtualization/singularity.pptx
+++ b/Virtualization/singularity.pptx
@@ -5,7 +5,7 @@
     <p:sldMasterId id="2147483660" r:id="rId1"/>
   </p:sldMasterIdLst>
   <p:notesMasterIdLst>
-    <p:notesMasterId r:id="rId35"/>
+    <p:notesMasterId r:id="rId36"/>
   </p:notesMasterIdLst>
   <p:sldIdLst>
     <p:sldId id="256" r:id="rId2"/>
@@ -18,29 +18,30 @@
     <p:sldId id="274" r:id="rId9"/>
     <p:sldId id="261" r:id="rId10"/>
     <p:sldId id="263" r:id="rId11"/>
-    <p:sldId id="264" r:id="rId12"/>
-    <p:sldId id="265" r:id="rId13"/>
-    <p:sldId id="266" r:id="rId14"/>
-    <p:sldId id="267" r:id="rId15"/>
-    <p:sldId id="268" r:id="rId16"/>
-    <p:sldId id="275" r:id="rId17"/>
-    <p:sldId id="269" r:id="rId18"/>
-    <p:sldId id="278" r:id="rId19"/>
-    <p:sldId id="271" r:id="rId20"/>
-    <p:sldId id="289" r:id="rId21"/>
-    <p:sldId id="282" r:id="rId22"/>
-    <p:sldId id="283" r:id="rId23"/>
-    <p:sldId id="284" r:id="rId24"/>
-    <p:sldId id="279" r:id="rId25"/>
-    <p:sldId id="280" r:id="rId26"/>
-    <p:sldId id="281" r:id="rId27"/>
-    <p:sldId id="285" r:id="rId28"/>
-    <p:sldId id="286" r:id="rId29"/>
-    <p:sldId id="287" r:id="rId30"/>
-    <p:sldId id="272" r:id="rId31"/>
-    <p:sldId id="276" r:id="rId32"/>
-    <p:sldId id="270" r:id="rId33"/>
-    <p:sldId id="277" r:id="rId34"/>
+    <p:sldId id="290" r:id="rId12"/>
+    <p:sldId id="264" r:id="rId13"/>
+    <p:sldId id="265" r:id="rId14"/>
+    <p:sldId id="266" r:id="rId15"/>
+    <p:sldId id="267" r:id="rId16"/>
+    <p:sldId id="268" r:id="rId17"/>
+    <p:sldId id="275" r:id="rId18"/>
+    <p:sldId id="269" r:id="rId19"/>
+    <p:sldId id="278" r:id="rId20"/>
+    <p:sldId id="271" r:id="rId21"/>
+    <p:sldId id="289" r:id="rId22"/>
+    <p:sldId id="282" r:id="rId23"/>
+    <p:sldId id="283" r:id="rId24"/>
+    <p:sldId id="284" r:id="rId25"/>
+    <p:sldId id="279" r:id="rId26"/>
+    <p:sldId id="280" r:id="rId27"/>
+    <p:sldId id="281" r:id="rId28"/>
+    <p:sldId id="285" r:id="rId29"/>
+    <p:sldId id="286" r:id="rId30"/>
+    <p:sldId id="287" r:id="rId31"/>
+    <p:sldId id="272" r:id="rId32"/>
+    <p:sldId id="276" r:id="rId33"/>
+    <p:sldId id="270" r:id="rId34"/>
+    <p:sldId id="277" r:id="rId35"/>
   </p:sldIdLst>
   <p:sldSz cx="9144000" cy="6858000" type="screen4x3"/>
   <p:notesSz cx="6858000" cy="9144000"/>
@@ -229,7 +230,7 @@
           <a:p>
             <a:fld id="{6BD974B4-F374-4E74-84D3-1EB7DBF32A2A}" type="datetimeFigureOut">
               <a:rPr lang="nl-BE" smtClean="0"/>
-              <a:t>1/02/2017</a:t>
+              <a:t>2017-02-13</a:t>
             </a:fld>
             <a:endParaRPr lang="nl-BE"/>
           </a:p>
@@ -712,7 +713,7 @@
           <a:p>
             <a:fld id="{A433E747-842D-4EF3-8202-AC54FEC33061}" type="datetime1">
               <a:rPr lang="nl-BE" smtClean="0"/>
-              <a:t>1/02/2017</a:t>
+              <a:t>2017-02-13</a:t>
             </a:fld>
             <a:endParaRPr lang="nl-BE"/>
           </a:p>
@@ -882,7 +883,7 @@
           <a:p>
             <a:fld id="{7C821354-3381-4DF5-ABED-FDAFA2BAD3F8}" type="datetime1">
               <a:rPr lang="nl-BE" smtClean="0"/>
-              <a:t>1/02/2017</a:t>
+              <a:t>2017-02-13</a:t>
             </a:fld>
             <a:endParaRPr lang="nl-BE"/>
           </a:p>
@@ -1062,7 +1063,7 @@
           <a:p>
             <a:fld id="{C6B54B95-9964-4BBF-B171-A69413AB9FC5}" type="datetime1">
               <a:rPr lang="nl-BE" smtClean="0"/>
-              <a:t>1/02/2017</a:t>
+              <a:t>2017-02-13</a:t>
             </a:fld>
             <a:endParaRPr lang="nl-BE"/>
           </a:p>
@@ -1232,7 +1233,7 @@
           <a:p>
             <a:fld id="{BE45CDE5-064C-4862-90E9-83B8FD778625}" type="datetime1">
               <a:rPr lang="nl-BE" smtClean="0"/>
-              <a:t>1/02/2017</a:t>
+              <a:t>2017-02-13</a:t>
             </a:fld>
             <a:endParaRPr lang="nl-BE"/>
           </a:p>
@@ -1476,7 +1477,7 @@
           <a:p>
             <a:fld id="{C75A345C-628E-463E-B8F7-69C25D344DF5}" type="datetime1">
               <a:rPr lang="nl-BE" smtClean="0"/>
-              <a:t>1/02/2017</a:t>
+              <a:t>2017-02-13</a:t>
             </a:fld>
             <a:endParaRPr lang="nl-BE"/>
           </a:p>
@@ -1708,7 +1709,7 @@
           <a:p>
             <a:fld id="{65B04534-538C-4249-A635-8BB2B8486464}" type="datetime1">
               <a:rPr lang="nl-BE" smtClean="0"/>
-              <a:t>1/02/2017</a:t>
+              <a:t>2017-02-13</a:t>
             </a:fld>
             <a:endParaRPr lang="nl-BE"/>
           </a:p>
@@ -2075,7 +2076,7 @@
           <a:p>
             <a:fld id="{089671CB-8547-4C91-A3D5-012E6E8790E6}" type="datetime1">
               <a:rPr lang="nl-BE" smtClean="0"/>
-              <a:t>1/02/2017</a:t>
+              <a:t>2017-02-13</a:t>
             </a:fld>
             <a:endParaRPr lang="nl-BE"/>
           </a:p>
@@ -2193,7 +2194,7 @@
           <a:p>
             <a:fld id="{5765335F-FC99-4A2B-B87B-6AF6F3762B67}" type="datetime1">
               <a:rPr lang="nl-BE" smtClean="0"/>
-              <a:t>1/02/2017</a:t>
+              <a:t>2017-02-13</a:t>
             </a:fld>
             <a:endParaRPr lang="nl-BE"/>
           </a:p>
@@ -2288,7 +2289,7 @@
           <a:p>
             <a:fld id="{1711BA58-B677-4D21-BDCD-9DD1AEA8A328}" type="datetime1">
               <a:rPr lang="nl-BE" smtClean="0"/>
-              <a:t>1/02/2017</a:t>
+              <a:t>2017-02-13</a:t>
             </a:fld>
             <a:endParaRPr lang="nl-BE"/>
           </a:p>
@@ -2565,7 +2566,7 @@
           <a:p>
             <a:fld id="{5513BE8B-B89C-461B-89D1-D5BE33ADB6B9}" type="datetime1">
               <a:rPr lang="nl-BE" smtClean="0"/>
-              <a:t>1/02/2017</a:t>
+              <a:t>2017-02-13</a:t>
             </a:fld>
             <a:endParaRPr lang="nl-BE"/>
           </a:p>
@@ -2822,7 +2823,7 @@
           <a:p>
             <a:fld id="{AEE65485-0554-4482-9B9C-289893A0B56B}" type="datetime1">
               <a:rPr lang="nl-BE" smtClean="0"/>
-              <a:t>1/02/2017</a:t>
+              <a:t>2017-02-13</a:t>
             </a:fld>
             <a:endParaRPr lang="nl-BE"/>
           </a:p>
@@ -3035,7 +3036,7 @@
           <a:p>
             <a:fld id="{6FF26CEC-AF8A-4096-9A53-521F7571A055}" type="datetime1">
               <a:rPr lang="nl-BE" smtClean="0"/>
-              <a:t>1/02/2017</a:t>
+              <a:t>2017-02-13</a:t>
             </a:fld>
             <a:endParaRPr lang="nl-BE"/>
           </a:p>
@@ -4328,6 +4329,472 @@
           <a:p>
             <a:r>
               <a:rPr lang="en-US" dirty="0" smtClean="0"/>
+              <a:t>Bootstrap from Docker</a:t>
+            </a:r>
+            <a:endParaRPr lang="nl-BE" dirty="0"/>
+          </a:p>
+        </p:txBody>
+      </p:sp>
+      <p:sp>
+        <p:nvSpPr>
+          <p:cNvPr id="3" name="Content Placeholder 2"/>
+          <p:cNvSpPr>
+            <a:spLocks noGrp="1"/>
+          </p:cNvSpPr>
+          <p:nvPr>
+            <p:ph idx="1"/>
+          </p:nvPr>
+        </p:nvSpPr>
+        <p:spPr/>
+        <p:txBody>
+          <a:bodyPr/>
+          <a:lstStyle/>
+          <a:p>
+            <a:r>
+              <a:rPr lang="en-US" dirty="0" smtClean="0"/>
+              <a:t>For, e.g., </a:t>
+            </a:r>
+            <a:r>
+              <a:rPr lang="en-US" dirty="0" err="1" smtClean="0"/>
+              <a:t>Debian</a:t>
+            </a:r>
+            <a:endParaRPr lang="en-US" dirty="0" smtClean="0"/>
+          </a:p>
+          <a:p>
+            <a:endParaRPr lang="en-US" dirty="0"/>
+          </a:p>
+          <a:p>
+            <a:endParaRPr lang="en-US" dirty="0" smtClean="0"/>
+          </a:p>
+          <a:p>
+            <a:r>
+              <a:rPr lang="en-US" dirty="0" smtClean="0"/>
+              <a:t>Any public Docker container can be used</a:t>
+            </a:r>
+          </a:p>
+          <a:p>
+            <a:r>
+              <a:rPr lang="en-US" dirty="0" smtClean="0"/>
+              <a:t>Docker containers in private repositories can be used</a:t>
+            </a:r>
+          </a:p>
+          <a:p>
+            <a:pPr lvl="1"/>
+            <a:r>
+              <a:rPr lang="en-US" dirty="0" smtClean="0"/>
+              <a:t>Specify token</a:t>
+            </a:r>
+          </a:p>
+          <a:p>
+            <a:endParaRPr lang="nl-BE" dirty="0"/>
+          </a:p>
+        </p:txBody>
+      </p:sp>
+      <p:sp>
+        <p:nvSpPr>
+          <p:cNvPr id="4" name="Slide Number Placeholder 3"/>
+          <p:cNvSpPr>
+            <a:spLocks noGrp="1"/>
+          </p:cNvSpPr>
+          <p:nvPr>
+            <p:ph type="sldNum" sz="quarter" idx="12"/>
+          </p:nvPr>
+        </p:nvSpPr>
+        <p:spPr/>
+        <p:txBody>
+          <a:bodyPr/>
+          <a:lstStyle/>
+          <a:p>
+            <a:fld id="{AEFF399F-E3B5-4890-BC79-9BC8D4DF3F2D}" type="slidenum">
+              <a:rPr lang="nl-BE" smtClean="0"/>
+              <a:t>11</a:t>
+            </a:fld>
+            <a:endParaRPr lang="nl-BE"/>
+          </a:p>
+        </p:txBody>
+      </p:sp>
+      <p:sp>
+        <p:nvSpPr>
+          <p:cNvPr id="5" name="TextBox 4"/>
+          <p:cNvSpPr txBox="1"/>
+          <p:nvPr/>
+        </p:nvSpPr>
+        <p:spPr>
+          <a:xfrm>
+            <a:off x="277586" y="2320386"/>
+            <a:ext cx="2803973" cy="646331"/>
+          </a:xfrm>
+          <a:prstGeom prst="rect">
+            <a:avLst/>
+          </a:prstGeom>
+          <a:solidFill>
+            <a:schemeClr val="bg1">
+              <a:lumMod val="85000"/>
+            </a:schemeClr>
+          </a:solidFill>
+          <a:ln>
+            <a:solidFill>
+              <a:schemeClr val="tx1"/>
+            </a:solidFill>
+          </a:ln>
+        </p:spPr>
+        <p:txBody>
+          <a:bodyPr wrap="none" rtlCol="0">
+            <a:spAutoFit/>
+          </a:bodyPr>
+          <a:lstStyle/>
+          <a:p>
+            <a:r>
+              <a:rPr lang="nl-BE" dirty="0" err="1" smtClean="0">
+                <a:latin typeface="Courier New" panose="02070309020205020404" pitchFamily="49" charset="0"/>
+                <a:cs typeface="Courier New" panose="02070309020205020404" pitchFamily="49" charset="0"/>
+              </a:rPr>
+              <a:t>BootStrap</a:t>
+            </a:r>
+            <a:r>
+              <a:rPr lang="nl-BE" dirty="0" smtClean="0">
+                <a:latin typeface="Courier New" panose="02070309020205020404" pitchFamily="49" charset="0"/>
+                <a:cs typeface="Courier New" panose="02070309020205020404" pitchFamily="49" charset="0"/>
+              </a:rPr>
+              <a:t>: </a:t>
+            </a:r>
+            <a:r>
+              <a:rPr lang="nl-BE" dirty="0" err="1" smtClean="0">
+                <a:latin typeface="Courier New" panose="02070309020205020404" pitchFamily="49" charset="0"/>
+                <a:cs typeface="Courier New" panose="02070309020205020404" pitchFamily="49" charset="0"/>
+              </a:rPr>
+              <a:t>docker</a:t>
+            </a:r>
+            <a:endParaRPr lang="nl-BE" dirty="0" smtClean="0">
+              <a:latin typeface="Courier New" panose="02070309020205020404" pitchFamily="49" charset="0"/>
+              <a:cs typeface="Courier New" panose="02070309020205020404" pitchFamily="49" charset="0"/>
+            </a:endParaRPr>
+          </a:p>
+          <a:p>
+            <a:r>
+              <a:rPr lang="nl-BE" dirty="0" err="1" smtClean="0">
+                <a:latin typeface="Courier New" panose="02070309020205020404" pitchFamily="49" charset="0"/>
+                <a:cs typeface="Courier New" panose="02070309020205020404" pitchFamily="49" charset="0"/>
+              </a:rPr>
+              <a:t>From</a:t>
+            </a:r>
+            <a:r>
+              <a:rPr lang="nl-BE" dirty="0" smtClean="0">
+                <a:latin typeface="Courier New" panose="02070309020205020404" pitchFamily="49" charset="0"/>
+                <a:cs typeface="Courier New" panose="02070309020205020404" pitchFamily="49" charset="0"/>
+              </a:rPr>
+              <a:t>: </a:t>
+            </a:r>
+            <a:r>
+              <a:rPr lang="nl-BE" dirty="0" err="1" smtClean="0">
+                <a:latin typeface="Courier New" panose="02070309020205020404" pitchFamily="49" charset="0"/>
+                <a:cs typeface="Courier New" panose="02070309020205020404" pitchFamily="49" charset="0"/>
+              </a:rPr>
+              <a:t>debian</a:t>
+            </a:r>
+            <a:r>
+              <a:rPr lang="nl-BE" dirty="0" err="1" smtClean="0">
+                <a:latin typeface="Courier New" panose="02070309020205020404" pitchFamily="49" charset="0"/>
+                <a:cs typeface="Courier New" panose="02070309020205020404" pitchFamily="49" charset="0"/>
+              </a:rPr>
+              <a:t>:jessie</a:t>
+            </a:r>
+            <a:endParaRPr lang="nl-BE" dirty="0" smtClean="0">
+              <a:latin typeface="Courier New" panose="02070309020205020404" pitchFamily="49" charset="0"/>
+              <a:cs typeface="Courier New" panose="02070309020205020404" pitchFamily="49" charset="0"/>
+            </a:endParaRPr>
+          </a:p>
+        </p:txBody>
+      </p:sp>
+    </p:spTree>
+    <p:extLst>
+      <p:ext uri="{BB962C8B-B14F-4D97-AF65-F5344CB8AC3E}">
+        <p14:creationId xmlns:p14="http://schemas.microsoft.com/office/powerpoint/2010/main" val="1107434665"/>
+      </p:ext>
+    </p:extLst>
+  </p:cSld>
+  <p:clrMapOvr>
+    <a:masterClrMapping/>
+  </p:clrMapOvr>
+  <p:timing>
+    <p:tnLst>
+      <p:par>
+        <p:cTn id="1" dur="indefinite" restart="never" nodeType="tmRoot">
+          <p:childTnLst>
+            <p:seq concurrent="1" nextAc="seek">
+              <p:cTn id="2" dur="indefinite" nodeType="mainSeq">
+                <p:childTnLst>
+                  <p:par>
+                    <p:cTn id="3" fill="hold">
+                      <p:stCondLst>
+                        <p:cond delay="indefinite"/>
+                        <p:cond evt="onBegin" delay="0">
+                          <p:tn val="2"/>
+                        </p:cond>
+                      </p:stCondLst>
+                      <p:childTnLst>
+                        <p:par>
+                          <p:cTn id="4" fill="hold">
+                            <p:stCondLst>
+                              <p:cond delay="0"/>
+                            </p:stCondLst>
+                            <p:childTnLst>
+                              <p:par>
+                                <p:cTn id="5" presetID="1" presetClass="entr" presetSubtype="0" fill="hold" grpId="0" nodeType="withEffect">
+                                  <p:stCondLst>
+                                    <p:cond delay="0"/>
+                                  </p:stCondLst>
+                                  <p:childTnLst>
+                                    <p:set>
+                                      <p:cBhvr>
+                                        <p:cTn id="6" dur="1" fill="hold">
+                                          <p:stCondLst>
+                                            <p:cond delay="0"/>
+                                          </p:stCondLst>
+                                        </p:cTn>
+                                        <p:tgtEl>
+                                          <p:spTgt spid="3">
+                                            <p:txEl>
+                                              <p:pRg st="0" end="0"/>
+                                            </p:txEl>
+                                          </p:spTgt>
+                                        </p:tgtEl>
+                                        <p:attrNameLst>
+                                          <p:attrName>style.visibility</p:attrName>
+                                        </p:attrNameLst>
+                                      </p:cBhvr>
+                                      <p:to>
+                                        <p:strVal val="visible"/>
+                                      </p:to>
+                                    </p:set>
+                                  </p:childTnLst>
+                                </p:cTn>
+                              </p:par>
+                              <p:par>
+                                <p:cTn id="7" presetID="1" presetClass="entr" presetSubtype="0" fill="hold" grpId="0" nodeType="withEffect">
+                                  <p:stCondLst>
+                                    <p:cond delay="0"/>
+                                  </p:stCondLst>
+                                  <p:childTnLst>
+                                    <p:set>
+                                      <p:cBhvr>
+                                        <p:cTn id="8" dur="1" fill="hold">
+                                          <p:stCondLst>
+                                            <p:cond delay="0"/>
+                                          </p:stCondLst>
+                                        </p:cTn>
+                                        <p:tgtEl>
+                                          <p:spTgt spid="5"/>
+                                        </p:tgtEl>
+                                        <p:attrNameLst>
+                                          <p:attrName>style.visibility</p:attrName>
+                                        </p:attrNameLst>
+                                      </p:cBhvr>
+                                      <p:to>
+                                        <p:strVal val="visible"/>
+                                      </p:to>
+                                    </p:set>
+                                  </p:childTnLst>
+                                </p:cTn>
+                              </p:par>
+                            </p:childTnLst>
+                          </p:cTn>
+                        </p:par>
+                      </p:childTnLst>
+                    </p:cTn>
+                  </p:par>
+                  <p:par>
+                    <p:cTn id="9" fill="hold">
+                      <p:stCondLst>
+                        <p:cond delay="indefinite"/>
+                      </p:stCondLst>
+                      <p:childTnLst>
+                        <p:par>
+                          <p:cTn id="10" fill="hold">
+                            <p:stCondLst>
+                              <p:cond delay="0"/>
+                            </p:stCondLst>
+                            <p:childTnLst>
+                              <p:par>
+                                <p:cTn id="11" presetID="1" presetClass="entr" presetSubtype="0" fill="hold" grpId="0" nodeType="clickEffect">
+                                  <p:stCondLst>
+                                    <p:cond delay="0"/>
+                                  </p:stCondLst>
+                                  <p:childTnLst>
+                                    <p:set>
+                                      <p:cBhvr>
+                                        <p:cTn id="12" dur="1" fill="hold">
+                                          <p:stCondLst>
+                                            <p:cond delay="0"/>
+                                          </p:stCondLst>
+                                        </p:cTn>
+                                        <p:tgtEl>
+                                          <p:spTgt spid="3">
+                                            <p:txEl>
+                                              <p:pRg st="3" end="3"/>
+                                            </p:txEl>
+                                          </p:spTgt>
+                                        </p:tgtEl>
+                                        <p:attrNameLst>
+                                          <p:attrName>style.visibility</p:attrName>
+                                        </p:attrNameLst>
+                                      </p:cBhvr>
+                                      <p:to>
+                                        <p:strVal val="visible"/>
+                                      </p:to>
+                                    </p:set>
+                                  </p:childTnLst>
+                                </p:cTn>
+                              </p:par>
+                            </p:childTnLst>
+                          </p:cTn>
+                        </p:par>
+                      </p:childTnLst>
+                    </p:cTn>
+                  </p:par>
+                  <p:par>
+                    <p:cTn id="13" fill="hold">
+                      <p:stCondLst>
+                        <p:cond delay="indefinite"/>
+                      </p:stCondLst>
+                      <p:childTnLst>
+                        <p:par>
+                          <p:cTn id="14" fill="hold">
+                            <p:stCondLst>
+                              <p:cond delay="0"/>
+                            </p:stCondLst>
+                            <p:childTnLst>
+                              <p:par>
+                                <p:cTn id="15" presetID="1" presetClass="entr" presetSubtype="0" fill="hold" grpId="0" nodeType="clickEffect">
+                                  <p:stCondLst>
+                                    <p:cond delay="0"/>
+                                  </p:stCondLst>
+                                  <p:childTnLst>
+                                    <p:set>
+                                      <p:cBhvr>
+                                        <p:cTn id="16" dur="1" fill="hold">
+                                          <p:stCondLst>
+                                            <p:cond delay="0"/>
+                                          </p:stCondLst>
+                                        </p:cTn>
+                                        <p:tgtEl>
+                                          <p:spTgt spid="3">
+                                            <p:txEl>
+                                              <p:pRg st="4" end="4"/>
+                                            </p:txEl>
+                                          </p:spTgt>
+                                        </p:tgtEl>
+                                        <p:attrNameLst>
+                                          <p:attrName>style.visibility</p:attrName>
+                                        </p:attrNameLst>
+                                      </p:cBhvr>
+                                      <p:to>
+                                        <p:strVal val="visible"/>
+                                      </p:to>
+                                    </p:set>
+                                  </p:childTnLst>
+                                </p:cTn>
+                              </p:par>
+                              <p:par>
+                                <p:cTn id="17" presetID="1" presetClass="entr" presetSubtype="0" fill="hold" grpId="0" nodeType="withEffect">
+                                  <p:stCondLst>
+                                    <p:cond delay="0"/>
+                                  </p:stCondLst>
+                                  <p:childTnLst>
+                                    <p:set>
+                                      <p:cBhvr>
+                                        <p:cTn id="18" dur="1" fill="hold">
+                                          <p:stCondLst>
+                                            <p:cond delay="0"/>
+                                          </p:stCondLst>
+                                        </p:cTn>
+                                        <p:tgtEl>
+                                          <p:spTgt spid="3">
+                                            <p:txEl>
+                                              <p:pRg st="5" end="5"/>
+                                            </p:txEl>
+                                          </p:spTgt>
+                                        </p:tgtEl>
+                                        <p:attrNameLst>
+                                          <p:attrName>style.visibility</p:attrName>
+                                        </p:attrNameLst>
+                                      </p:cBhvr>
+                                      <p:to>
+                                        <p:strVal val="visible"/>
+                                      </p:to>
+                                    </p:set>
+                                  </p:childTnLst>
+                                </p:cTn>
+                              </p:par>
+                            </p:childTnLst>
+                          </p:cTn>
+                        </p:par>
+                      </p:childTnLst>
+                    </p:cTn>
+                  </p:par>
+                </p:childTnLst>
+              </p:cTn>
+              <p:prevCondLst>
+                <p:cond evt="onPrev" delay="0">
+                  <p:tgtEl>
+                    <p:sldTgt/>
+                  </p:tgtEl>
+                </p:cond>
+              </p:prevCondLst>
+              <p:nextCondLst>
+                <p:cond evt="onNext" delay="0">
+                  <p:tgtEl>
+                    <p:sldTgt/>
+                  </p:tgtEl>
+                </p:cond>
+              </p:nextCondLst>
+            </p:seq>
+          </p:childTnLst>
+        </p:cTn>
+      </p:par>
+    </p:tnLst>
+    <p:bldLst>
+      <p:bldP spid="3" grpId="0" uiExpand="1" build="p"/>
+      <p:bldP spid="5" grpId="0" animBg="1"/>
+    </p:bldLst>
+  </p:timing>
+</p:sld>
+</file>
+
+<file path=ppt/slides/slide12.xml><?xml version="1.0" encoding="utf-8"?>
+<p:sld xmlns:a="http://schemas.openxmlformats.org/drawingml/2006/main" xmlns:r="http://schemas.openxmlformats.org/officeDocument/2006/relationships" xmlns:p="http://schemas.openxmlformats.org/presentationml/2006/main">
+  <p:cSld>
+    <p:spTree>
+      <p:nvGrpSpPr>
+        <p:cNvPr id="1" name=""/>
+        <p:cNvGrpSpPr/>
+        <p:nvPr/>
+      </p:nvGrpSpPr>
+      <p:grpSpPr>
+        <a:xfrm>
+          <a:off x="0" y="0"/>
+          <a:ext cx="0" cy="0"/>
+          <a:chOff x="0" y="0"/>
+          <a:chExt cx="0" cy="0"/>
+        </a:xfrm>
+      </p:grpSpPr>
+      <p:sp>
+        <p:nvSpPr>
+          <p:cNvPr id="2" name="Title 1"/>
+          <p:cNvSpPr>
+            <a:spLocks noGrp="1"/>
+          </p:cNvSpPr>
+          <p:nvPr>
+            <p:ph type="title"/>
+          </p:nvPr>
+        </p:nvSpPr>
+        <p:spPr/>
+        <p:txBody>
+          <a:bodyPr/>
+          <a:lstStyle/>
+          <a:p>
+            <a:r>
+              <a:rPr lang="en-US" dirty="0" smtClean="0"/>
               <a:t>Image definition file: </a:t>
             </a:r>
             <a:r>
@@ -4590,7 +5057,7 @@
           <a:p>
             <a:fld id="{AEFF399F-E3B5-4890-BC79-9BC8D4DF3F2D}" type="slidenum">
               <a:rPr lang="nl-BE" smtClean="0"/>
-              <a:t>11</a:t>
+              <a:t>12</a:t>
             </a:fld>
             <a:endParaRPr lang="nl-BE"/>
           </a:p>
@@ -4928,7 +5395,7 @@
 </p:sld>
 </file>
 
-<file path=ppt/slides/slide12.xml><?xml version="1.0" encoding="utf-8"?>
+<file path=ppt/slides/slide13.xml><?xml version="1.0" encoding="utf-8"?>
 <p:sld xmlns:a="http://schemas.openxmlformats.org/drawingml/2006/main" xmlns:r="http://schemas.openxmlformats.org/officeDocument/2006/relationships" xmlns:p="http://schemas.openxmlformats.org/presentationml/2006/main">
   <p:cSld>
     <p:spTree>
@@ -5236,7 +5703,7 @@
           <a:p>
             <a:fld id="{AEFF399F-E3B5-4890-BC79-9BC8D4DF3F2D}" type="slidenum">
               <a:rPr lang="nl-BE" smtClean="0"/>
-              <a:t>12</a:t>
+              <a:t>13</a:t>
             </a:fld>
             <a:endParaRPr lang="nl-BE"/>
           </a:p>
@@ -5445,7 +5912,7 @@
 </p:sld>
 </file>
 
-<file path=ppt/slides/slide13.xml><?xml version="1.0" encoding="utf-8"?>
+<file path=ppt/slides/slide14.xml><?xml version="1.0" encoding="utf-8"?>
 <p:sld xmlns:a="http://schemas.openxmlformats.org/drawingml/2006/main" xmlns:r="http://schemas.openxmlformats.org/officeDocument/2006/relationships" xmlns:p="http://schemas.openxmlformats.org/presentationml/2006/main">
   <p:cSld>
     <p:spTree>
@@ -5811,7 +6278,7 @@
           <a:p>
             <a:fld id="{AEFF399F-E3B5-4890-BC79-9BC8D4DF3F2D}" type="slidenum">
               <a:rPr lang="nl-BE" smtClean="0"/>
-              <a:t>13</a:t>
+              <a:t>14</a:t>
             </a:fld>
             <a:endParaRPr lang="nl-BE"/>
           </a:p>
@@ -5837,7 +6304,7 @@
 </p:sld>
 </file>
 
-<file path=ppt/slides/slide14.xml><?xml version="1.0" encoding="utf-8"?>
+<file path=ppt/slides/slide15.xml><?xml version="1.0" encoding="utf-8"?>
 <p:sld xmlns:a="http://schemas.openxmlformats.org/drawingml/2006/main" xmlns:r="http://schemas.openxmlformats.org/officeDocument/2006/relationships" xmlns:p="http://schemas.openxmlformats.org/presentationml/2006/main">
   <p:cSld>
     <p:spTree>
@@ -6060,7 +6527,7 @@
           <a:p>
             <a:fld id="{AEFF399F-E3B5-4890-BC79-9BC8D4DF3F2D}" type="slidenum">
               <a:rPr lang="nl-BE" smtClean="0"/>
-              <a:t>14</a:t>
+              <a:t>15</a:t>
             </a:fld>
             <a:endParaRPr lang="nl-BE"/>
           </a:p>
@@ -6401,7 +6868,7 @@
 </p:sld>
 </file>
 
-<file path=ppt/slides/slide15.xml><?xml version="1.0" encoding="utf-8"?>
+<file path=ppt/slides/slide16.xml><?xml version="1.0" encoding="utf-8"?>
 <p:sld xmlns:a="http://schemas.openxmlformats.org/drawingml/2006/main" xmlns:r="http://schemas.openxmlformats.org/officeDocument/2006/relationships" xmlns:p="http://schemas.openxmlformats.org/presentationml/2006/main">
   <p:cSld>
     <p:spTree>
@@ -6862,7 +7329,7 @@
           <a:p>
             <a:fld id="{AEFF399F-E3B5-4890-BC79-9BC8D4DF3F2D}" type="slidenum">
               <a:rPr lang="nl-BE" smtClean="0"/>
-              <a:t>15</a:t>
+              <a:t>16</a:t>
             </a:fld>
             <a:endParaRPr lang="nl-BE"/>
           </a:p>
@@ -7168,7 +7635,7 @@
 </p:sld>
 </file>
 
-<file path=ppt/slides/slide16.xml><?xml version="1.0" encoding="utf-8"?>
+<file path=ppt/slides/slide17.xml><?xml version="1.0" encoding="utf-8"?>
 <p:sld xmlns:a="http://schemas.openxmlformats.org/drawingml/2006/main" xmlns:r="http://schemas.openxmlformats.org/officeDocument/2006/relationships" xmlns:p="http://schemas.openxmlformats.org/presentationml/2006/main">
   <p:cSld>
     <p:spTree>
@@ -7244,7 +7711,7 @@
           <a:p>
             <a:fld id="{AEFF399F-E3B5-4890-BC79-9BC8D4DF3F2D}" type="slidenum">
               <a:rPr lang="nl-BE" smtClean="0"/>
-              <a:t>16</a:t>
+              <a:t>17</a:t>
             </a:fld>
             <a:endParaRPr lang="nl-BE"/>
           </a:p>
@@ -7270,7 +7737,7 @@
 </p:sld>
 </file>
 
-<file path=ppt/slides/slide17.xml><?xml version="1.0" encoding="utf-8"?>
+<file path=ppt/slides/slide18.xml><?xml version="1.0" encoding="utf-8"?>
 <p:sld xmlns:a="http://schemas.openxmlformats.org/drawingml/2006/main" xmlns:r="http://schemas.openxmlformats.org/officeDocument/2006/relationships" xmlns:p="http://schemas.openxmlformats.org/presentationml/2006/main">
   <p:cSld>
     <p:spTree>
@@ -7700,7 +8167,7 @@
           <a:p>
             <a:fld id="{AEFF399F-E3B5-4890-BC79-9BC8D4DF3F2D}" type="slidenum">
               <a:rPr lang="nl-BE" smtClean="0"/>
-              <a:t>17</a:t>
+              <a:t>18</a:t>
             </a:fld>
             <a:endParaRPr lang="nl-BE"/>
           </a:p>
@@ -8143,7 +8610,7 @@
 </p:sld>
 </file>
 
-<file path=ppt/slides/slide18.xml><?xml version="1.0" encoding="utf-8"?>
+<file path=ppt/slides/slide19.xml><?xml version="1.0" encoding="utf-8"?>
 <p:sld xmlns:a="http://schemas.openxmlformats.org/drawingml/2006/main" xmlns:r="http://schemas.openxmlformats.org/officeDocument/2006/relationships" xmlns:p="http://schemas.openxmlformats.org/presentationml/2006/main">
   <p:cSld>
     <p:spTree>
@@ -8244,7 +8711,7 @@
           <a:p>
             <a:fld id="{AEFF399F-E3B5-4890-BC79-9BC8D4DF3F2D}" type="slidenum">
               <a:rPr lang="nl-BE" smtClean="0"/>
-              <a:t>18</a:t>
+              <a:t>19</a:t>
             </a:fld>
             <a:endParaRPr lang="nl-BE"/>
           </a:p>
@@ -8588,7 +9055,102 @@
 </p:sld>
 </file>
 
-<file path=ppt/slides/slide19.xml><?xml version="1.0" encoding="utf-8"?>
+<file path=ppt/slides/slide2.xml><?xml version="1.0" encoding="utf-8"?>
+<p:sld xmlns:a="http://schemas.openxmlformats.org/drawingml/2006/main" xmlns:r="http://schemas.openxmlformats.org/officeDocument/2006/relationships" xmlns:p="http://schemas.openxmlformats.org/presentationml/2006/main">
+  <p:cSld>
+    <p:spTree>
+      <p:nvGrpSpPr>
+        <p:cNvPr id="1" name=""/>
+        <p:cNvGrpSpPr/>
+        <p:nvPr/>
+      </p:nvGrpSpPr>
+      <p:grpSpPr>
+        <a:xfrm>
+          <a:off x="0" y="0"/>
+          <a:ext cx="0" cy="0"/>
+          <a:chOff x="0" y="0"/>
+          <a:chExt cx="0" cy="0"/>
+        </a:xfrm>
+      </p:grpSpPr>
+      <p:sp>
+        <p:nvSpPr>
+          <p:cNvPr id="2" name="Title 1"/>
+          <p:cNvSpPr>
+            <a:spLocks noGrp="1"/>
+          </p:cNvSpPr>
+          <p:nvPr>
+            <p:ph type="title"/>
+          </p:nvPr>
+        </p:nvSpPr>
+        <p:spPr/>
+        <p:txBody>
+          <a:bodyPr/>
+          <a:lstStyle/>
+          <a:p>
+            <a:r>
+              <a:rPr lang="en-US" dirty="0" smtClean="0"/>
+              <a:t>Introduction</a:t>
+            </a:r>
+            <a:endParaRPr lang="nl-BE" dirty="0"/>
+          </a:p>
+        </p:txBody>
+      </p:sp>
+      <p:sp>
+        <p:nvSpPr>
+          <p:cNvPr id="3" name="Text Placeholder 2"/>
+          <p:cNvSpPr>
+            <a:spLocks noGrp="1"/>
+          </p:cNvSpPr>
+          <p:nvPr>
+            <p:ph type="body" idx="1"/>
+          </p:nvPr>
+        </p:nvSpPr>
+        <p:spPr/>
+        <p:txBody>
+          <a:bodyPr/>
+          <a:lstStyle/>
+          <a:p>
+            <a:endParaRPr lang="nl-BE"/>
+          </a:p>
+        </p:txBody>
+      </p:sp>
+      <p:sp>
+        <p:nvSpPr>
+          <p:cNvPr id="4" name="Slide Number Placeholder 3"/>
+          <p:cNvSpPr>
+            <a:spLocks noGrp="1"/>
+          </p:cNvSpPr>
+          <p:nvPr>
+            <p:ph type="sldNum" sz="quarter" idx="12"/>
+          </p:nvPr>
+        </p:nvSpPr>
+        <p:spPr/>
+        <p:txBody>
+          <a:bodyPr/>
+          <a:lstStyle/>
+          <a:p>
+            <a:fld id="{AEFF399F-E3B5-4890-BC79-9BC8D4DF3F2D}" type="slidenum">
+              <a:rPr lang="nl-BE" smtClean="0"/>
+              <a:t>2</a:t>
+            </a:fld>
+            <a:endParaRPr lang="nl-BE"/>
+          </a:p>
+        </p:txBody>
+      </p:sp>
+    </p:spTree>
+    <p:extLst>
+      <p:ext uri="{BB962C8B-B14F-4D97-AF65-F5344CB8AC3E}">
+        <p14:creationId xmlns:p14="http://schemas.microsoft.com/office/powerpoint/2010/main" val="2215557954"/>
+      </p:ext>
+    </p:extLst>
+  </p:cSld>
+  <p:clrMapOvr>
+    <a:masterClrMapping/>
+  </p:clrMapOvr>
+</p:sld>
+</file>
+
+<file path=ppt/slides/slide20.xml><?xml version="1.0" encoding="utf-8"?>
 <p:sld xmlns:a="http://schemas.openxmlformats.org/drawingml/2006/main" xmlns:r="http://schemas.openxmlformats.org/officeDocument/2006/relationships" xmlns:p="http://schemas.openxmlformats.org/presentationml/2006/main">
   <p:cSld>
     <p:spTree>
@@ -8809,7 +9371,7 @@
           <a:p>
             <a:fld id="{AEFF399F-E3B5-4890-BC79-9BC8D4DF3F2D}" type="slidenum">
               <a:rPr lang="nl-BE" smtClean="0"/>
-              <a:t>19</a:t>
+              <a:t>20</a:t>
             </a:fld>
             <a:endParaRPr lang="nl-BE"/>
           </a:p>
@@ -9070,7 +9632,7 @@
 </p:sld>
 </file>
 
-<file path=ppt/slides/slide2.xml><?xml version="1.0" encoding="utf-8"?>
+<file path=ppt/slides/slide21.xml><?xml version="1.0" encoding="utf-8"?>
 <p:sld xmlns:a="http://schemas.openxmlformats.org/drawingml/2006/main" xmlns:r="http://schemas.openxmlformats.org/officeDocument/2006/relationships" xmlns:p="http://schemas.openxmlformats.org/presentationml/2006/main">
   <p:cSld>
     <p:spTree>
@@ -9104,20 +9666,20 @@
           <a:p>
             <a:r>
               <a:rPr lang="en-US" dirty="0" smtClean="0"/>
-              <a:t>Introduction</a:t>
-            </a:r>
-            <a:endParaRPr lang="nl-BE" dirty="0"/>
+              <a:t>Directory bindings</a:t>
+            </a:r>
+            <a:endParaRPr lang="en-US" dirty="0"/>
           </a:p>
         </p:txBody>
       </p:sp>
       <p:sp>
         <p:nvSpPr>
-          <p:cNvPr id="3" name="Text Placeholder 2"/>
+          <p:cNvPr id="3" name="Content Placeholder 2"/>
           <p:cNvSpPr>
             <a:spLocks noGrp="1"/>
           </p:cNvSpPr>
           <p:nvPr>
-            <p:ph type="body" idx="1"/>
+            <p:ph idx="1"/>
           </p:nvPr>
         </p:nvSpPr>
         <p:spPr/>
@@ -9125,7 +9687,121 @@
           <a:bodyPr/>
           <a:lstStyle/>
           <a:p>
-            <a:endParaRPr lang="nl-BE"/>
+            <a:r>
+              <a:rPr lang="en-US" dirty="0" smtClean="0"/>
+              <a:t>Current working directory</a:t>
+            </a:r>
+          </a:p>
+          <a:p>
+            <a:pPr lvl="1"/>
+            <a:r>
+              <a:rPr lang="en-US" dirty="0" smtClean="0"/>
+              <a:t>where image is executed</a:t>
+            </a:r>
+          </a:p>
+          <a:p>
+            <a:r>
+              <a:rPr lang="en-US" dirty="0" smtClean="0"/>
+              <a:t>Home directory</a:t>
+            </a:r>
+          </a:p>
+          <a:p>
+            <a:pPr lvl="1"/>
+            <a:r>
+              <a:rPr lang="en-US" dirty="0" smtClean="0"/>
+              <a:t>bound to user's host home directory</a:t>
+            </a:r>
+          </a:p>
+          <a:p>
+            <a:r>
+              <a:rPr lang="en-US" dirty="0" smtClean="0"/>
+              <a:t>Additional bindings</a:t>
+            </a:r>
+          </a:p>
+          <a:p>
+            <a:pPr lvl="1"/>
+            <a:r>
+              <a:rPr lang="en-US" dirty="0" smtClean="0"/>
+              <a:t>command line option:</a:t>
+            </a:r>
+            <a:br>
+              <a:rPr lang="en-US" dirty="0" smtClean="0"/>
+            </a:br>
+            <a:r>
+              <a:rPr lang="en-US" dirty="0" smtClean="0">
+                <a:latin typeface="Courier New" panose="02070309020205020404" pitchFamily="49" charset="0"/>
+                <a:cs typeface="Courier New" panose="02070309020205020404" pitchFamily="49" charset="0"/>
+              </a:rPr>
+              <a:t>-B &lt;host-path&gt;:&lt;</a:t>
+            </a:r>
+            <a:r>
+              <a:rPr lang="en-US" dirty="0" err="1" smtClean="0">
+                <a:latin typeface="Courier New" panose="02070309020205020404" pitchFamily="49" charset="0"/>
+                <a:cs typeface="Courier New" panose="02070309020205020404" pitchFamily="49" charset="0"/>
+              </a:rPr>
+              <a:t>img</a:t>
+            </a:r>
+            <a:r>
+              <a:rPr lang="en-US" dirty="0" smtClean="0">
+                <a:latin typeface="Courier New" panose="02070309020205020404" pitchFamily="49" charset="0"/>
+                <a:cs typeface="Courier New" panose="02070309020205020404" pitchFamily="49" charset="0"/>
+              </a:rPr>
+              <a:t>-mount-point&gt;</a:t>
+            </a:r>
+          </a:p>
+          <a:p>
+            <a:pPr lvl="1"/>
+            <a:r>
+              <a:rPr lang="en-US" dirty="0" smtClean="0"/>
+              <a:t>e.g., </a:t>
+            </a:r>
+            <a:r>
+              <a:rPr lang="en-US" dirty="0" smtClean="0">
+                <a:latin typeface="Courier New" panose="02070309020205020404" pitchFamily="49" charset="0"/>
+                <a:cs typeface="Courier New" panose="02070309020205020404" pitchFamily="49" charset="0"/>
+              </a:rPr>
+              <a:t>-B ~/Data:/</a:t>
+            </a:r>
+            <a:r>
+              <a:rPr lang="en-US" dirty="0" err="1" smtClean="0">
+                <a:latin typeface="Courier New" panose="02070309020205020404" pitchFamily="49" charset="0"/>
+                <a:cs typeface="Courier New" panose="02070309020205020404" pitchFamily="49" charset="0"/>
+              </a:rPr>
+              <a:t>mnt</a:t>
+            </a:r>
+            <a:r>
+              <a:rPr lang="en-US" dirty="0" smtClean="0">
+                <a:latin typeface="Courier New" panose="02070309020205020404" pitchFamily="49" charset="0"/>
+                <a:cs typeface="Courier New" panose="02070309020205020404" pitchFamily="49" charset="0"/>
+              </a:rPr>
+              <a:t>/data</a:t>
+            </a:r>
+          </a:p>
+          <a:p>
+            <a:pPr lvl="1"/>
+            <a:r>
+              <a:rPr lang="en-US" dirty="0" smtClean="0"/>
+              <a:t>Note: mount point </a:t>
+            </a:r>
+            <a:r>
+              <a:rPr lang="en-US" b="1" i="1" dirty="0" smtClean="0"/>
+              <a:t>must</a:t>
+            </a:r>
+            <a:r>
+              <a:rPr lang="en-US" dirty="0" smtClean="0"/>
+              <a:t> exist</a:t>
+            </a:r>
+          </a:p>
+          <a:p>
+            <a:pPr lvl="1"/>
+            <a:r>
+              <a:rPr lang="en-US" dirty="0" smtClean="0"/>
+              <a:t>as many as required</a:t>
+            </a:r>
+          </a:p>
+          <a:p>
+            <a:pPr lvl="1"/>
+            <a:endParaRPr lang="en-US" dirty="0"/>
           </a:p>
         </p:txBody>
       </p:sp>
@@ -9146,216 +9822,7 @@
           <a:p>
             <a:fld id="{AEFF399F-E3B5-4890-BC79-9BC8D4DF3F2D}" type="slidenum">
               <a:rPr lang="nl-BE" smtClean="0"/>
-              <a:t>2</a:t>
-            </a:fld>
-            <a:endParaRPr lang="nl-BE"/>
-          </a:p>
-        </p:txBody>
-      </p:sp>
-    </p:spTree>
-    <p:extLst>
-      <p:ext uri="{BB962C8B-B14F-4D97-AF65-F5344CB8AC3E}">
-        <p14:creationId xmlns:p14="http://schemas.microsoft.com/office/powerpoint/2010/main" val="2215557954"/>
-      </p:ext>
-    </p:extLst>
-  </p:cSld>
-  <p:clrMapOvr>
-    <a:masterClrMapping/>
-  </p:clrMapOvr>
-</p:sld>
-</file>
-
-<file path=ppt/slides/slide20.xml><?xml version="1.0" encoding="utf-8"?>
-<p:sld xmlns:a="http://schemas.openxmlformats.org/drawingml/2006/main" xmlns:r="http://schemas.openxmlformats.org/officeDocument/2006/relationships" xmlns:p="http://schemas.openxmlformats.org/presentationml/2006/main">
-  <p:cSld>
-    <p:spTree>
-      <p:nvGrpSpPr>
-        <p:cNvPr id="1" name=""/>
-        <p:cNvGrpSpPr/>
-        <p:nvPr/>
-      </p:nvGrpSpPr>
-      <p:grpSpPr>
-        <a:xfrm>
-          <a:off x="0" y="0"/>
-          <a:ext cx="0" cy="0"/>
-          <a:chOff x="0" y="0"/>
-          <a:chExt cx="0" cy="0"/>
-        </a:xfrm>
-      </p:grpSpPr>
-      <p:sp>
-        <p:nvSpPr>
-          <p:cNvPr id="2" name="Title 1"/>
-          <p:cNvSpPr>
-            <a:spLocks noGrp="1"/>
-          </p:cNvSpPr>
-          <p:nvPr>
-            <p:ph type="title"/>
-          </p:nvPr>
-        </p:nvSpPr>
-        <p:spPr/>
-        <p:txBody>
-          <a:bodyPr/>
-          <a:lstStyle/>
-          <a:p>
-            <a:r>
-              <a:rPr lang="en-US" dirty="0" smtClean="0"/>
-              <a:t>Directory bindings</a:t>
-            </a:r>
-            <a:endParaRPr lang="en-US" dirty="0"/>
-          </a:p>
-        </p:txBody>
-      </p:sp>
-      <p:sp>
-        <p:nvSpPr>
-          <p:cNvPr id="3" name="Content Placeholder 2"/>
-          <p:cNvSpPr>
-            <a:spLocks noGrp="1"/>
-          </p:cNvSpPr>
-          <p:nvPr>
-            <p:ph idx="1"/>
-          </p:nvPr>
-        </p:nvSpPr>
-        <p:spPr/>
-        <p:txBody>
-          <a:bodyPr/>
-          <a:lstStyle/>
-          <a:p>
-            <a:r>
-              <a:rPr lang="en-US" dirty="0" smtClean="0"/>
-              <a:t>Current working directory</a:t>
-            </a:r>
-          </a:p>
-          <a:p>
-            <a:pPr lvl="1"/>
-            <a:r>
-              <a:rPr lang="en-US" dirty="0" smtClean="0"/>
-              <a:t>where image is executed</a:t>
-            </a:r>
-          </a:p>
-          <a:p>
-            <a:r>
-              <a:rPr lang="en-US" dirty="0" smtClean="0"/>
-              <a:t>Home directory</a:t>
-            </a:r>
-          </a:p>
-          <a:p>
-            <a:pPr lvl="1"/>
-            <a:r>
-              <a:rPr lang="en-US" dirty="0" smtClean="0"/>
-              <a:t>bound to user's host home directory</a:t>
-            </a:r>
-          </a:p>
-          <a:p>
-            <a:r>
-              <a:rPr lang="en-US" dirty="0" smtClean="0"/>
-              <a:t>Additional bindings</a:t>
-            </a:r>
-          </a:p>
-          <a:p>
-            <a:pPr lvl="1"/>
-            <a:r>
-              <a:rPr lang="en-US" dirty="0" smtClean="0"/>
-              <a:t>command line option:</a:t>
-            </a:r>
-            <a:br>
-              <a:rPr lang="en-US" dirty="0" smtClean="0"/>
-            </a:br>
-            <a:r>
-              <a:rPr lang="en-US" dirty="0" smtClean="0">
-                <a:latin typeface="Courier New" panose="02070309020205020404" pitchFamily="49" charset="0"/>
-                <a:cs typeface="Courier New" panose="02070309020205020404" pitchFamily="49" charset="0"/>
-              </a:rPr>
-              <a:t>-B &lt;host-path&gt;:&lt;</a:t>
-            </a:r>
-            <a:r>
-              <a:rPr lang="en-US" dirty="0" err="1" smtClean="0">
-                <a:latin typeface="Courier New" panose="02070309020205020404" pitchFamily="49" charset="0"/>
-                <a:cs typeface="Courier New" panose="02070309020205020404" pitchFamily="49" charset="0"/>
-              </a:rPr>
-              <a:t>img</a:t>
-            </a:r>
-            <a:r>
-              <a:rPr lang="en-US" dirty="0" smtClean="0">
-                <a:latin typeface="Courier New" panose="02070309020205020404" pitchFamily="49" charset="0"/>
-                <a:cs typeface="Courier New" panose="02070309020205020404" pitchFamily="49" charset="0"/>
-              </a:rPr>
-              <a:t>-mount-point&gt;</a:t>
-            </a:r>
-          </a:p>
-          <a:p>
-            <a:pPr lvl="1"/>
-            <a:r>
-              <a:rPr lang="en-US" dirty="0" smtClean="0"/>
-              <a:t>e.g., </a:t>
-            </a:r>
-            <a:r>
-              <a:rPr lang="en-US" dirty="0" smtClean="0">
-                <a:latin typeface="Courier New" panose="02070309020205020404" pitchFamily="49" charset="0"/>
-                <a:cs typeface="Courier New" panose="02070309020205020404" pitchFamily="49" charset="0"/>
-              </a:rPr>
-              <a:t>-B ~/Data:/</a:t>
-            </a:r>
-            <a:r>
-              <a:rPr lang="en-US" dirty="0" err="1" smtClean="0">
-                <a:latin typeface="Courier New" panose="02070309020205020404" pitchFamily="49" charset="0"/>
-                <a:cs typeface="Courier New" panose="02070309020205020404" pitchFamily="49" charset="0"/>
-              </a:rPr>
-              <a:t>mnt</a:t>
-            </a:r>
-            <a:r>
-              <a:rPr lang="en-US" dirty="0" smtClean="0">
-                <a:latin typeface="Courier New" panose="02070309020205020404" pitchFamily="49" charset="0"/>
-                <a:cs typeface="Courier New" panose="02070309020205020404" pitchFamily="49" charset="0"/>
-              </a:rPr>
-              <a:t>/data</a:t>
-            </a:r>
-          </a:p>
-          <a:p>
-            <a:pPr lvl="1"/>
-            <a:r>
-              <a:rPr lang="en-US" dirty="0" smtClean="0"/>
-              <a:t>Note: mount point </a:t>
-            </a:r>
-            <a:r>
-              <a:rPr lang="en-US" b="1" i="1" dirty="0" smtClean="0"/>
-              <a:t>must</a:t>
-            </a:r>
-            <a:r>
-              <a:rPr lang="en-US" dirty="0" smtClean="0"/>
-              <a:t> exist</a:t>
-            </a:r>
-          </a:p>
-          <a:p>
-            <a:pPr lvl="1"/>
-            <a:r>
-              <a:rPr lang="en-US" dirty="0" smtClean="0"/>
-              <a:t>as many as required</a:t>
-            </a:r>
-          </a:p>
-          <a:p>
-            <a:pPr lvl="1"/>
-            <a:endParaRPr lang="en-US" dirty="0"/>
-          </a:p>
-        </p:txBody>
-      </p:sp>
-      <p:sp>
-        <p:nvSpPr>
-          <p:cNvPr id="4" name="Slide Number Placeholder 3"/>
-          <p:cNvSpPr>
-            <a:spLocks noGrp="1"/>
-          </p:cNvSpPr>
-          <p:nvPr>
-            <p:ph type="sldNum" sz="quarter" idx="12"/>
-          </p:nvPr>
-        </p:nvSpPr>
-        <p:spPr/>
-        <p:txBody>
-          <a:bodyPr/>
-          <a:lstStyle/>
-          <a:p>
-            <a:fld id="{AEFF399F-E3B5-4890-BC79-9BC8D4DF3F2D}" type="slidenum">
-              <a:rPr lang="nl-BE" smtClean="0"/>
-              <a:t>20</a:t>
+              <a:t>21</a:t>
             </a:fld>
             <a:endParaRPr lang="nl-BE"/>
           </a:p>
@@ -9743,7 +10210,7 @@
 </p:sld>
 </file>
 
-<file path=ppt/slides/slide21.xml><?xml version="1.0" encoding="utf-8"?>
+<file path=ppt/slides/slide22.xml><?xml version="1.0" encoding="utf-8"?>
 <p:sld xmlns:a="http://schemas.openxmlformats.org/drawingml/2006/main" xmlns:r="http://schemas.openxmlformats.org/officeDocument/2006/relationships" xmlns:p="http://schemas.openxmlformats.org/presentationml/2006/main">
   <p:cSld>
     <p:spTree>
@@ -9819,7 +10286,7 @@
           <a:p>
             <a:fld id="{AEFF399F-E3B5-4890-BC79-9BC8D4DF3F2D}" type="slidenum">
               <a:rPr lang="nl-BE" smtClean="0"/>
-              <a:t>21</a:t>
+              <a:t>22</a:t>
             </a:fld>
             <a:endParaRPr lang="nl-BE"/>
           </a:p>
@@ -9845,7 +10312,7 @@
 </p:sld>
 </file>
 
-<file path=ppt/slides/slide22.xml><?xml version="1.0" encoding="utf-8"?>
+<file path=ppt/slides/slide23.xml><?xml version="1.0" encoding="utf-8"?>
 <p:sld xmlns:a="http://schemas.openxmlformats.org/drawingml/2006/main" xmlns:r="http://schemas.openxmlformats.org/officeDocument/2006/relationships" xmlns:p="http://schemas.openxmlformats.org/presentationml/2006/main">
   <p:cSld>
     <p:spTree>
@@ -9902,7 +10369,7 @@
           <a:p>
             <a:fld id="{AEFF399F-E3B5-4890-BC79-9BC8D4DF3F2D}" type="slidenum">
               <a:rPr lang="nl-BE" smtClean="0"/>
-              <a:t>22</a:t>
+              <a:t>23</a:t>
             </a:fld>
             <a:endParaRPr lang="nl-BE"/>
           </a:p>
@@ -10739,7 +11206,7 @@
 </p:sld>
 </file>
 
-<file path=ppt/slides/slide23.xml><?xml version="1.0" encoding="utf-8"?>
+<file path=ppt/slides/slide24.xml><?xml version="1.0" encoding="utf-8"?>
 <p:sld xmlns:a="http://schemas.openxmlformats.org/drawingml/2006/main" xmlns:r="http://schemas.openxmlformats.org/officeDocument/2006/relationships" xmlns:p="http://schemas.openxmlformats.org/presentationml/2006/main">
   <p:cSld>
     <p:spTree>
@@ -10827,7 +11294,7 @@
           <a:p>
             <a:fld id="{AEFF399F-E3B5-4890-BC79-9BC8D4DF3F2D}" type="slidenum">
               <a:rPr lang="nl-BE" smtClean="0"/>
-              <a:t>23</a:t>
+              <a:t>24</a:t>
             </a:fld>
             <a:endParaRPr lang="nl-BE"/>
           </a:p>
@@ -11184,7 +11651,7 @@
 </p:sld>
 </file>
 
-<file path=ppt/slides/slide24.xml><?xml version="1.0" encoding="utf-8"?>
+<file path=ppt/slides/slide25.xml><?xml version="1.0" encoding="utf-8"?>
 <p:sld xmlns:a="http://schemas.openxmlformats.org/drawingml/2006/main" xmlns:r="http://schemas.openxmlformats.org/officeDocument/2006/relationships" xmlns:p="http://schemas.openxmlformats.org/presentationml/2006/main">
   <p:cSld>
     <p:spTree>
@@ -11260,7 +11727,7 @@
           <a:p>
             <a:fld id="{AEFF399F-E3B5-4890-BC79-9BC8D4DF3F2D}" type="slidenum">
               <a:rPr lang="nl-BE" smtClean="0"/>
-              <a:t>24</a:t>
+              <a:t>25</a:t>
             </a:fld>
             <a:endParaRPr lang="nl-BE"/>
           </a:p>
@@ -11286,7 +11753,7 @@
 </p:sld>
 </file>
 
-<file path=ppt/slides/slide25.xml><?xml version="1.0" encoding="utf-8"?>
+<file path=ppt/slides/slide26.xml><?xml version="1.0" encoding="utf-8"?>
 <p:sld xmlns:a="http://schemas.openxmlformats.org/drawingml/2006/main" xmlns:r="http://schemas.openxmlformats.org/officeDocument/2006/relationships" xmlns:p="http://schemas.openxmlformats.org/presentationml/2006/main">
   <p:cSld>
     <p:spTree>
@@ -11343,7 +11810,7 @@
           <a:p>
             <a:fld id="{AEFF399F-E3B5-4890-BC79-9BC8D4DF3F2D}" type="slidenum">
               <a:rPr lang="nl-BE" smtClean="0"/>
-              <a:t>25</a:t>
+              <a:t>26</a:t>
             </a:fld>
             <a:endParaRPr lang="nl-BE"/>
           </a:p>
@@ -12668,7 +13135,7 @@
 </p:sld>
 </file>
 
-<file path=ppt/slides/slide26.xml><?xml version="1.0" encoding="utf-8"?>
+<file path=ppt/slides/slide27.xml><?xml version="1.0" encoding="utf-8"?>
 <p:sld xmlns:a="http://schemas.openxmlformats.org/drawingml/2006/main" xmlns:r="http://schemas.openxmlformats.org/officeDocument/2006/relationships" xmlns:p="http://schemas.openxmlformats.org/presentationml/2006/main">
   <p:cSld>
     <p:spTree>
@@ -12748,7 +13215,7 @@
           <a:p>
             <a:fld id="{AEFF399F-E3B5-4890-BC79-9BC8D4DF3F2D}" type="slidenum">
               <a:rPr lang="nl-BE" smtClean="0"/>
-              <a:t>26</a:t>
+              <a:t>27</a:t>
             </a:fld>
             <a:endParaRPr lang="nl-BE"/>
           </a:p>
@@ -13097,7 +13564,7 @@
 </p:sld>
 </file>
 
-<file path=ppt/slides/slide27.xml><?xml version="1.0" encoding="utf-8"?>
+<file path=ppt/slides/slide28.xml><?xml version="1.0" encoding="utf-8"?>
 <p:sld xmlns:a="http://schemas.openxmlformats.org/drawingml/2006/main" xmlns:r="http://schemas.openxmlformats.org/officeDocument/2006/relationships" xmlns:p="http://schemas.openxmlformats.org/presentationml/2006/main">
   <p:cSld>
     <p:spTree>
@@ -13173,7 +13640,7 @@
           <a:p>
             <a:fld id="{AEFF399F-E3B5-4890-BC79-9BC8D4DF3F2D}" type="slidenum">
               <a:rPr lang="nl-BE" smtClean="0"/>
-              <a:t>27</a:t>
+              <a:t>28</a:t>
             </a:fld>
             <a:endParaRPr lang="nl-BE"/>
           </a:p>
@@ -13199,7 +13666,7 @@
 </p:sld>
 </file>
 
-<file path=ppt/slides/slide28.xml><?xml version="1.0" encoding="utf-8"?>
+<file path=ppt/slides/slide29.xml><?xml version="1.0" encoding="utf-8"?>
 <p:sld xmlns:a="http://schemas.openxmlformats.org/drawingml/2006/main" xmlns:r="http://schemas.openxmlformats.org/officeDocument/2006/relationships" xmlns:p="http://schemas.openxmlformats.org/presentationml/2006/main">
   <p:cSld>
     <p:spTree>
@@ -13423,7 +13890,7 @@
           <a:p>
             <a:fld id="{AEFF399F-E3B5-4890-BC79-9BC8D4DF3F2D}" type="slidenum">
               <a:rPr lang="nl-BE" smtClean="0"/>
-              <a:t>28</a:t>
+              <a:t>29</a:t>
             </a:fld>
             <a:endParaRPr lang="nl-BE"/>
           </a:p>
@@ -13959,7 +14426,7 @@
 </p:sld>
 </file>
 
-<file path=ppt/slides/slide29.xml><?xml version="1.0" encoding="utf-8"?>
+<file path=ppt/slides/slide3.xml><?xml version="1.0" encoding="utf-8"?>
 <p:sld xmlns:a="http://schemas.openxmlformats.org/drawingml/2006/main" xmlns:r="http://schemas.openxmlformats.org/officeDocument/2006/relationships" xmlns:p="http://schemas.openxmlformats.org/presentationml/2006/main">
   <p:cSld>
     <p:spTree>
@@ -13993,7 +14460,7 @@
           <a:p>
             <a:r>
               <a:rPr lang="en-US" dirty="0" smtClean="0"/>
-              <a:t>Singularity performance pitfalls</a:t>
+              <a:t>Introduction</a:t>
             </a:r>
             <a:endParaRPr lang="nl-BE" dirty="0"/>
           </a:p>
@@ -14016,74 +14483,93 @@
           <a:p>
             <a:r>
               <a:rPr lang="en-US" dirty="0" smtClean="0"/>
-              <a:t>Using non-optimized libraries/applications</a:t>
+              <a:t>Singularity developed </a:t>
+            </a:r>
+            <a:r>
+              <a:rPr lang="en-US" dirty="0"/>
+              <a:t>by Berkeley Lab</a:t>
+            </a:r>
+            <a:br>
+              <a:rPr lang="en-US" dirty="0"/>
+            </a:br>
+            <a:r>
+              <a:rPr lang="en-US" dirty="0">
+                <a:hlinkClick r:id="rId2"/>
+              </a:rPr>
+              <a:t>http://singularity.lbl.gov</a:t>
+            </a:r>
+            <a:r>
+              <a:rPr lang="en-US" dirty="0" smtClean="0">
+                <a:hlinkClick r:id="rId2"/>
+              </a:rPr>
+              <a:t>/</a:t>
+            </a:r>
+            <a:r>
+              <a:rPr lang="en-US" dirty="0" smtClean="0"/>
+              <a:t> </a:t>
+            </a:r>
+          </a:p>
+          <a:p>
+            <a:r>
+              <a:rPr lang="en-US" dirty="0" smtClean="0"/>
+              <a:t>Intended as HPC alternative to</a:t>
             </a:r>
           </a:p>
           <a:p>
             <a:pPr lvl="1"/>
             <a:r>
+              <a:rPr lang="en-US" dirty="0"/>
+              <a:t>Docker</a:t>
+            </a:r>
+            <a:br>
+              <a:rPr lang="en-US" dirty="0"/>
+            </a:br>
+            <a:r>
+              <a:rPr lang="en-US" dirty="0">
+                <a:hlinkClick r:id="rId3"/>
+              </a:rPr>
+              <a:t>https://www.docker.com</a:t>
+            </a:r>
+            <a:r>
+              <a:rPr lang="en-US" dirty="0" smtClean="0">
+                <a:hlinkClick r:id="rId3"/>
+              </a:rPr>
+              <a:t>/</a:t>
+            </a:r>
+            <a:r>
               <a:rPr lang="en-US" dirty="0" smtClean="0"/>
-              <a:t>Compilation can/should target specific hardware,</a:t>
+              <a:t> </a:t>
+            </a:r>
+          </a:p>
+          <a:p>
+            <a:pPr lvl="1"/>
+            <a:r>
+              <a:rPr lang="en-US" dirty="0" smtClean="0"/>
+              <a:t>Shifter</a:t>
+            </a:r>
+            <a:r>
+              <a:rPr lang="en-US" dirty="0"/>
+              <a:t/>
             </a:r>
             <a:br>
+              <a:rPr lang="en-US" dirty="0"/>
+            </a:br>
+            <a:r>
+              <a:rPr lang="en-US" dirty="0">
+                <a:hlinkClick r:id="rId4"/>
+              </a:rPr>
+              <a:t>https://</a:t>
+            </a:r>
+            <a:r>
+              <a:rPr lang="en-US" dirty="0" smtClean="0">
+                <a:hlinkClick r:id="rId4"/>
+              </a:rPr>
+              <a:t>github.com/NERSC/shifter</a:t>
+            </a:r>
+            <a:r>
               <a:rPr lang="en-US" dirty="0" smtClean="0"/>
-            </a:br>
-            <a:r>
-              <a:rPr lang="en-US" dirty="0" smtClean="0"/>
-              <a:t>e.g., </a:t>
-            </a:r>
-            <a:r>
-              <a:rPr lang="en-US" dirty="0" smtClean="0">
-                <a:latin typeface="Courier New" panose="02070309020205020404" pitchFamily="49" charset="0"/>
-                <a:cs typeface="Courier New" panose="02070309020205020404" pitchFamily="49" charset="0"/>
-              </a:rPr>
-              <a:t>-</a:t>
-            </a:r>
-            <a:r>
-              <a:rPr lang="en-US" dirty="0" err="1" smtClean="0">
-                <a:latin typeface="Courier New" panose="02070309020205020404" pitchFamily="49" charset="0"/>
-                <a:cs typeface="Courier New" panose="02070309020205020404" pitchFamily="49" charset="0"/>
-              </a:rPr>
-              <a:t>xHost</a:t>
-            </a:r>
-            <a:endParaRPr lang="en-US" dirty="0" smtClean="0">
-              <a:latin typeface="Courier New" panose="02070309020205020404" pitchFamily="49" charset="0"/>
-              <a:cs typeface="Courier New" panose="02070309020205020404" pitchFamily="49" charset="0"/>
-            </a:endParaRPr>
-          </a:p>
-          <a:p>
-            <a:pPr lvl="1"/>
-            <a:r>
-              <a:rPr lang="en-US" dirty="0" smtClean="0"/>
-              <a:t>Performance loss up to 10-40 %</a:t>
-            </a:r>
-            <a:endParaRPr lang="en-US" dirty="0" smtClean="0">
-              <a:sym typeface="Symbol" panose="05050102010706020507" pitchFamily="18" charset="2"/>
-            </a:endParaRPr>
-          </a:p>
-          <a:p>
-            <a:pPr lvl="1"/>
-            <a:r>
-              <a:rPr lang="en-US" dirty="0" smtClean="0">
-                <a:sym typeface="Symbol" panose="05050102010706020507" pitchFamily="18" charset="2"/>
-              </a:rPr>
-              <a:t>Crucial for BLAS, propagates to other scientific libraries, e.g., LAPACK, </a:t>
-            </a:r>
-            <a:r>
-              <a:rPr lang="en-US" dirty="0" err="1" smtClean="0">
-                <a:sym typeface="Symbol" panose="05050102010706020507" pitchFamily="18" charset="2"/>
-              </a:rPr>
-              <a:t>PETSc</a:t>
-            </a:r>
-            <a:r>
-              <a:rPr lang="en-US" dirty="0" smtClean="0">
-                <a:sym typeface="Symbol" panose="05050102010706020507" pitchFamily="18" charset="2"/>
-              </a:rPr>
-              <a:t>,…</a:t>
-            </a:r>
-          </a:p>
-          <a:p>
-            <a:pPr lvl="1"/>
+              <a:t> </a:t>
+            </a:r>
             <a:endParaRPr lang="nl-BE" dirty="0"/>
           </a:p>
         </p:txBody>
@@ -14105,7 +14591,368 @@
           <a:p>
             <a:fld id="{AEFF399F-E3B5-4890-BC79-9BC8D4DF3F2D}" type="slidenum">
               <a:rPr lang="nl-BE" smtClean="0"/>
-              <a:t>29</a:t>
+              <a:t>3</a:t>
+            </a:fld>
+            <a:endParaRPr lang="nl-BE"/>
+          </a:p>
+        </p:txBody>
+      </p:sp>
+    </p:spTree>
+    <p:extLst>
+      <p:ext uri="{BB962C8B-B14F-4D97-AF65-F5344CB8AC3E}">
+        <p14:creationId xmlns:p14="http://schemas.microsoft.com/office/powerpoint/2010/main" val="658783311"/>
+      </p:ext>
+    </p:extLst>
+  </p:cSld>
+  <p:clrMapOvr>
+    <a:masterClrMapping/>
+  </p:clrMapOvr>
+  <p:timing>
+    <p:tnLst>
+      <p:par>
+        <p:cTn id="1" dur="indefinite" restart="never" nodeType="tmRoot">
+          <p:childTnLst>
+            <p:seq concurrent="1" nextAc="seek">
+              <p:cTn id="2" dur="indefinite" nodeType="mainSeq">
+                <p:childTnLst>
+                  <p:par>
+                    <p:cTn id="3" fill="hold">
+                      <p:stCondLst>
+                        <p:cond delay="indefinite"/>
+                        <p:cond evt="onBegin" delay="0">
+                          <p:tn val="2"/>
+                        </p:cond>
+                      </p:stCondLst>
+                      <p:childTnLst>
+                        <p:par>
+                          <p:cTn id="4" fill="hold">
+                            <p:stCondLst>
+                              <p:cond delay="0"/>
+                            </p:stCondLst>
+                            <p:childTnLst>
+                              <p:par>
+                                <p:cTn id="5" presetID="1" presetClass="entr" presetSubtype="0" fill="hold" grpId="0" nodeType="withEffect">
+                                  <p:stCondLst>
+                                    <p:cond delay="0"/>
+                                  </p:stCondLst>
+                                  <p:childTnLst>
+                                    <p:set>
+                                      <p:cBhvr>
+                                        <p:cTn id="6" dur="1" fill="hold">
+                                          <p:stCondLst>
+                                            <p:cond delay="0"/>
+                                          </p:stCondLst>
+                                        </p:cTn>
+                                        <p:tgtEl>
+                                          <p:spTgt spid="3">
+                                            <p:txEl>
+                                              <p:pRg st="0" end="0"/>
+                                            </p:txEl>
+                                          </p:spTgt>
+                                        </p:tgtEl>
+                                        <p:attrNameLst>
+                                          <p:attrName>style.visibility</p:attrName>
+                                        </p:attrNameLst>
+                                      </p:cBhvr>
+                                      <p:to>
+                                        <p:strVal val="visible"/>
+                                      </p:to>
+                                    </p:set>
+                                  </p:childTnLst>
+                                </p:cTn>
+                              </p:par>
+                            </p:childTnLst>
+                          </p:cTn>
+                        </p:par>
+                      </p:childTnLst>
+                    </p:cTn>
+                  </p:par>
+                  <p:par>
+                    <p:cTn id="7" fill="hold">
+                      <p:stCondLst>
+                        <p:cond delay="indefinite"/>
+                      </p:stCondLst>
+                      <p:childTnLst>
+                        <p:par>
+                          <p:cTn id="8" fill="hold">
+                            <p:stCondLst>
+                              <p:cond delay="0"/>
+                            </p:stCondLst>
+                            <p:childTnLst>
+                              <p:par>
+                                <p:cTn id="9" presetID="1" presetClass="entr" presetSubtype="0" fill="hold" grpId="0" nodeType="clickEffect">
+                                  <p:stCondLst>
+                                    <p:cond delay="0"/>
+                                  </p:stCondLst>
+                                  <p:childTnLst>
+                                    <p:set>
+                                      <p:cBhvr>
+                                        <p:cTn id="10" dur="1" fill="hold">
+                                          <p:stCondLst>
+                                            <p:cond delay="0"/>
+                                          </p:stCondLst>
+                                        </p:cTn>
+                                        <p:tgtEl>
+                                          <p:spTgt spid="3">
+                                            <p:txEl>
+                                              <p:pRg st="1" end="1"/>
+                                            </p:txEl>
+                                          </p:spTgt>
+                                        </p:tgtEl>
+                                        <p:attrNameLst>
+                                          <p:attrName>style.visibility</p:attrName>
+                                        </p:attrNameLst>
+                                      </p:cBhvr>
+                                      <p:to>
+                                        <p:strVal val="visible"/>
+                                      </p:to>
+                                    </p:set>
+                                  </p:childTnLst>
+                                </p:cTn>
+                              </p:par>
+                              <p:par>
+                                <p:cTn id="11" presetID="1" presetClass="entr" presetSubtype="0" fill="hold" grpId="0" nodeType="withEffect">
+                                  <p:stCondLst>
+                                    <p:cond delay="0"/>
+                                  </p:stCondLst>
+                                  <p:childTnLst>
+                                    <p:set>
+                                      <p:cBhvr>
+                                        <p:cTn id="12" dur="1" fill="hold">
+                                          <p:stCondLst>
+                                            <p:cond delay="0"/>
+                                          </p:stCondLst>
+                                        </p:cTn>
+                                        <p:tgtEl>
+                                          <p:spTgt spid="3">
+                                            <p:txEl>
+                                              <p:pRg st="2" end="2"/>
+                                            </p:txEl>
+                                          </p:spTgt>
+                                        </p:tgtEl>
+                                        <p:attrNameLst>
+                                          <p:attrName>style.visibility</p:attrName>
+                                        </p:attrNameLst>
+                                      </p:cBhvr>
+                                      <p:to>
+                                        <p:strVal val="visible"/>
+                                      </p:to>
+                                    </p:set>
+                                  </p:childTnLst>
+                                </p:cTn>
+                              </p:par>
+                              <p:par>
+                                <p:cTn id="13" presetID="1" presetClass="entr" presetSubtype="0" fill="hold" grpId="0" nodeType="withEffect">
+                                  <p:stCondLst>
+                                    <p:cond delay="0"/>
+                                  </p:stCondLst>
+                                  <p:childTnLst>
+                                    <p:set>
+                                      <p:cBhvr>
+                                        <p:cTn id="14" dur="1" fill="hold">
+                                          <p:stCondLst>
+                                            <p:cond delay="0"/>
+                                          </p:stCondLst>
+                                        </p:cTn>
+                                        <p:tgtEl>
+                                          <p:spTgt spid="3">
+                                            <p:txEl>
+                                              <p:pRg st="3" end="3"/>
+                                            </p:txEl>
+                                          </p:spTgt>
+                                        </p:tgtEl>
+                                        <p:attrNameLst>
+                                          <p:attrName>style.visibility</p:attrName>
+                                        </p:attrNameLst>
+                                      </p:cBhvr>
+                                      <p:to>
+                                        <p:strVal val="visible"/>
+                                      </p:to>
+                                    </p:set>
+                                  </p:childTnLst>
+                                </p:cTn>
+                              </p:par>
+                            </p:childTnLst>
+                          </p:cTn>
+                        </p:par>
+                      </p:childTnLst>
+                    </p:cTn>
+                  </p:par>
+                </p:childTnLst>
+              </p:cTn>
+              <p:prevCondLst>
+                <p:cond evt="onPrev" delay="0">
+                  <p:tgtEl>
+                    <p:sldTgt/>
+                  </p:tgtEl>
+                </p:cond>
+              </p:prevCondLst>
+              <p:nextCondLst>
+                <p:cond evt="onNext" delay="0">
+                  <p:tgtEl>
+                    <p:sldTgt/>
+                  </p:tgtEl>
+                </p:cond>
+              </p:nextCondLst>
+            </p:seq>
+          </p:childTnLst>
+        </p:cTn>
+      </p:par>
+    </p:tnLst>
+    <p:bldLst>
+      <p:bldP spid="3" grpId="0" uiExpand="1" build="p"/>
+    </p:bldLst>
+  </p:timing>
+</p:sld>
+</file>
+
+<file path=ppt/slides/slide30.xml><?xml version="1.0" encoding="utf-8"?>
+<p:sld xmlns:a="http://schemas.openxmlformats.org/drawingml/2006/main" xmlns:r="http://schemas.openxmlformats.org/officeDocument/2006/relationships" xmlns:p="http://schemas.openxmlformats.org/presentationml/2006/main">
+  <p:cSld>
+    <p:spTree>
+      <p:nvGrpSpPr>
+        <p:cNvPr id="1" name=""/>
+        <p:cNvGrpSpPr/>
+        <p:nvPr/>
+      </p:nvGrpSpPr>
+      <p:grpSpPr>
+        <a:xfrm>
+          <a:off x="0" y="0"/>
+          <a:ext cx="0" cy="0"/>
+          <a:chOff x="0" y="0"/>
+          <a:chExt cx="0" cy="0"/>
+        </a:xfrm>
+      </p:grpSpPr>
+      <p:sp>
+        <p:nvSpPr>
+          <p:cNvPr id="2" name="Title 1"/>
+          <p:cNvSpPr>
+            <a:spLocks noGrp="1"/>
+          </p:cNvSpPr>
+          <p:nvPr>
+            <p:ph type="title"/>
+          </p:nvPr>
+        </p:nvSpPr>
+        <p:spPr/>
+        <p:txBody>
+          <a:bodyPr/>
+          <a:lstStyle/>
+          <a:p>
+            <a:r>
+              <a:rPr lang="en-US" dirty="0" smtClean="0"/>
+              <a:t>Singularity performance pitfalls</a:t>
+            </a:r>
+            <a:endParaRPr lang="nl-BE" dirty="0"/>
+          </a:p>
+        </p:txBody>
+      </p:sp>
+      <p:sp>
+        <p:nvSpPr>
+          <p:cNvPr id="3" name="Content Placeholder 2"/>
+          <p:cNvSpPr>
+            <a:spLocks noGrp="1"/>
+          </p:cNvSpPr>
+          <p:nvPr>
+            <p:ph idx="1"/>
+          </p:nvPr>
+        </p:nvSpPr>
+        <p:spPr/>
+        <p:txBody>
+          <a:bodyPr/>
+          <a:lstStyle/>
+          <a:p>
+            <a:r>
+              <a:rPr lang="en-US" dirty="0" smtClean="0"/>
+              <a:t>Using non-optimized libraries/applications</a:t>
+            </a:r>
+          </a:p>
+          <a:p>
+            <a:pPr lvl="1"/>
+            <a:r>
+              <a:rPr lang="en-US" dirty="0" smtClean="0"/>
+              <a:t>Compilation can/should target specific hardware,</a:t>
+            </a:r>
+            <a:br>
+              <a:rPr lang="en-US" dirty="0" smtClean="0"/>
+            </a:br>
+            <a:r>
+              <a:rPr lang="en-US" dirty="0" smtClean="0"/>
+              <a:t>e.g., </a:t>
+            </a:r>
+            <a:r>
+              <a:rPr lang="en-US" dirty="0" smtClean="0">
+                <a:latin typeface="Courier New" panose="02070309020205020404" pitchFamily="49" charset="0"/>
+                <a:cs typeface="Courier New" panose="02070309020205020404" pitchFamily="49" charset="0"/>
+              </a:rPr>
+              <a:t>-</a:t>
+            </a:r>
+            <a:r>
+              <a:rPr lang="en-US" dirty="0" err="1" smtClean="0">
+                <a:latin typeface="Courier New" panose="02070309020205020404" pitchFamily="49" charset="0"/>
+                <a:cs typeface="Courier New" panose="02070309020205020404" pitchFamily="49" charset="0"/>
+              </a:rPr>
+              <a:t>xHost</a:t>
+            </a:r>
+            <a:endParaRPr lang="en-US" dirty="0" smtClean="0">
+              <a:latin typeface="Courier New" panose="02070309020205020404" pitchFamily="49" charset="0"/>
+              <a:cs typeface="Courier New" panose="02070309020205020404" pitchFamily="49" charset="0"/>
+            </a:endParaRPr>
+          </a:p>
+          <a:p>
+            <a:pPr lvl="1"/>
+            <a:r>
+              <a:rPr lang="en-US" dirty="0" smtClean="0"/>
+              <a:t>Performance loss up to 10-40 %</a:t>
+            </a:r>
+            <a:endParaRPr lang="en-US" dirty="0" smtClean="0">
+              <a:sym typeface="Symbol" panose="05050102010706020507" pitchFamily="18" charset="2"/>
+            </a:endParaRPr>
+          </a:p>
+          <a:p>
+            <a:pPr lvl="1"/>
+            <a:r>
+              <a:rPr lang="en-US" dirty="0" smtClean="0">
+                <a:sym typeface="Symbol" panose="05050102010706020507" pitchFamily="18" charset="2"/>
+              </a:rPr>
+              <a:t>Crucial for BLAS, propagates to other scientific libraries, e.g., LAPACK, </a:t>
+            </a:r>
+            <a:r>
+              <a:rPr lang="en-US" dirty="0" err="1" smtClean="0">
+                <a:sym typeface="Symbol" panose="05050102010706020507" pitchFamily="18" charset="2"/>
+              </a:rPr>
+              <a:t>PETSc</a:t>
+            </a:r>
+            <a:r>
+              <a:rPr lang="en-US" dirty="0" smtClean="0">
+                <a:sym typeface="Symbol" panose="05050102010706020507" pitchFamily="18" charset="2"/>
+              </a:rPr>
+              <a:t>,…</a:t>
+            </a:r>
+          </a:p>
+          <a:p>
+            <a:pPr lvl="1"/>
+            <a:endParaRPr lang="nl-BE" dirty="0"/>
+          </a:p>
+        </p:txBody>
+      </p:sp>
+      <p:sp>
+        <p:nvSpPr>
+          <p:cNvPr id="4" name="Slide Number Placeholder 3"/>
+          <p:cNvSpPr>
+            <a:spLocks noGrp="1"/>
+          </p:cNvSpPr>
+          <p:nvPr>
+            <p:ph type="sldNum" sz="quarter" idx="12"/>
+          </p:nvPr>
+        </p:nvSpPr>
+        <p:spPr/>
+        <p:txBody>
+          <a:bodyPr/>
+          <a:lstStyle/>
+          <a:p>
+            <a:fld id="{AEFF399F-E3B5-4890-BC79-9BC8D4DF3F2D}" type="slidenum">
+              <a:rPr lang="nl-BE" smtClean="0"/>
+              <a:t>30</a:t>
             </a:fld>
             <a:endParaRPr lang="nl-BE"/>
           </a:p>
@@ -14356,7 +15203,7 @@
 </p:sld>
 </file>
 
-<file path=ppt/slides/slide3.xml><?xml version="1.0" encoding="utf-8"?>
+<file path=ppt/slides/slide31.xml><?xml version="1.0" encoding="utf-8"?>
 <p:sld xmlns:a="http://schemas.openxmlformats.org/drawingml/2006/main" xmlns:r="http://schemas.openxmlformats.org/officeDocument/2006/relationships" xmlns:p="http://schemas.openxmlformats.org/presentationml/2006/main">
   <p:cSld>
     <p:spTree>
@@ -14390,7 +15237,7 @@
           <a:p>
             <a:r>
               <a:rPr lang="en-US" dirty="0" smtClean="0"/>
-              <a:t>Introduction</a:t>
+              <a:t>Conclusions</a:t>
             </a:r>
             <a:endParaRPr lang="nl-BE" dirty="0"/>
           </a:p>
@@ -14398,12 +15245,12 @@
       </p:sp>
       <p:sp>
         <p:nvSpPr>
-          <p:cNvPr id="3" name="Content Placeholder 2"/>
+          <p:cNvPr id="3" name="Text Placeholder 2"/>
           <p:cNvSpPr>
             <a:spLocks noGrp="1"/>
           </p:cNvSpPr>
           <p:nvPr>
-            <p:ph idx="1"/>
+            <p:ph type="body" idx="1"/>
           </p:nvPr>
         </p:nvSpPr>
         <p:spPr/>
@@ -14411,96 +15258,7 @@
           <a:bodyPr/>
           <a:lstStyle/>
           <a:p>
-            <a:r>
-              <a:rPr lang="en-US" dirty="0" smtClean="0"/>
-              <a:t>Singularity developed </a:t>
-            </a:r>
-            <a:r>
-              <a:rPr lang="en-US" dirty="0"/>
-              <a:t>by Berkeley Lab</a:t>
-            </a:r>
-            <a:br>
-              <a:rPr lang="en-US" dirty="0"/>
-            </a:br>
-            <a:r>
-              <a:rPr lang="en-US" dirty="0">
-                <a:hlinkClick r:id="rId2"/>
-              </a:rPr>
-              <a:t>http://singularity.lbl.gov</a:t>
-            </a:r>
-            <a:r>
-              <a:rPr lang="en-US" dirty="0" smtClean="0">
-                <a:hlinkClick r:id="rId2"/>
-              </a:rPr>
-              <a:t>/</a:t>
-            </a:r>
-            <a:r>
-              <a:rPr lang="en-US" dirty="0" smtClean="0"/>
-              <a:t> </a:t>
-            </a:r>
-          </a:p>
-          <a:p>
-            <a:r>
-              <a:rPr lang="en-US" dirty="0" smtClean="0"/>
-              <a:t>Intended as HPC alternative to</a:t>
-            </a:r>
-          </a:p>
-          <a:p>
-            <a:pPr lvl="1"/>
-            <a:r>
-              <a:rPr lang="en-US" dirty="0"/>
-              <a:t>Docker</a:t>
-            </a:r>
-            <a:br>
-              <a:rPr lang="en-US" dirty="0"/>
-            </a:br>
-            <a:r>
-              <a:rPr lang="en-US" dirty="0">
-                <a:hlinkClick r:id="rId3"/>
-              </a:rPr>
-              <a:t>https://www.docker.com</a:t>
-            </a:r>
-            <a:r>
-              <a:rPr lang="en-US" dirty="0" smtClean="0">
-                <a:hlinkClick r:id="rId3"/>
-              </a:rPr>
-              <a:t>/</a:t>
-            </a:r>
-            <a:r>
-              <a:rPr lang="en-US" dirty="0" smtClean="0"/>
-              <a:t> </a:t>
-            </a:r>
-          </a:p>
-          <a:p>
-            <a:pPr lvl="1"/>
-            <a:r>
-              <a:rPr lang="en-US" dirty="0" smtClean="0"/>
-              <a:t>Shifter</a:t>
-            </a:r>
-            <a:r>
-              <a:rPr lang="en-US" dirty="0"/>
-              <a:t/>
-            </a:r>
-            <a:br>
-              <a:rPr lang="en-US" dirty="0"/>
-            </a:br>
-            <a:r>
-              <a:rPr lang="en-US" dirty="0">
-                <a:hlinkClick r:id="rId4"/>
-              </a:rPr>
-              <a:t>https://</a:t>
-            </a:r>
-            <a:r>
-              <a:rPr lang="en-US" dirty="0" smtClean="0">
-                <a:hlinkClick r:id="rId4"/>
-              </a:rPr>
-              <a:t>github.com/NERSC/shifter</a:t>
-            </a:r>
-            <a:r>
-              <a:rPr lang="en-US" dirty="0" smtClean="0"/>
-              <a:t> </a:t>
-            </a:r>
-            <a:endParaRPr lang="nl-BE" dirty="0"/>
+            <a:endParaRPr lang="nl-BE"/>
           </a:p>
         </p:txBody>
       </p:sp>
@@ -14521,298 +15279,7 @@
           <a:p>
             <a:fld id="{AEFF399F-E3B5-4890-BC79-9BC8D4DF3F2D}" type="slidenum">
               <a:rPr lang="nl-BE" smtClean="0"/>
-              <a:t>3</a:t>
-            </a:fld>
-            <a:endParaRPr lang="nl-BE"/>
-          </a:p>
-        </p:txBody>
-      </p:sp>
-    </p:spTree>
-    <p:extLst>
-      <p:ext uri="{BB962C8B-B14F-4D97-AF65-F5344CB8AC3E}">
-        <p14:creationId xmlns:p14="http://schemas.microsoft.com/office/powerpoint/2010/main" val="658783311"/>
-      </p:ext>
-    </p:extLst>
-  </p:cSld>
-  <p:clrMapOvr>
-    <a:masterClrMapping/>
-  </p:clrMapOvr>
-  <p:timing>
-    <p:tnLst>
-      <p:par>
-        <p:cTn id="1" dur="indefinite" restart="never" nodeType="tmRoot">
-          <p:childTnLst>
-            <p:seq concurrent="1" nextAc="seek">
-              <p:cTn id="2" dur="indefinite" nodeType="mainSeq">
-                <p:childTnLst>
-                  <p:par>
-                    <p:cTn id="3" fill="hold">
-                      <p:stCondLst>
-                        <p:cond delay="indefinite"/>
-                        <p:cond evt="onBegin" delay="0">
-                          <p:tn val="2"/>
-                        </p:cond>
-                      </p:stCondLst>
-                      <p:childTnLst>
-                        <p:par>
-                          <p:cTn id="4" fill="hold">
-                            <p:stCondLst>
-                              <p:cond delay="0"/>
-                            </p:stCondLst>
-                            <p:childTnLst>
-                              <p:par>
-                                <p:cTn id="5" presetID="1" presetClass="entr" presetSubtype="0" fill="hold" grpId="0" nodeType="withEffect">
-                                  <p:stCondLst>
-                                    <p:cond delay="0"/>
-                                  </p:stCondLst>
-                                  <p:childTnLst>
-                                    <p:set>
-                                      <p:cBhvr>
-                                        <p:cTn id="6" dur="1" fill="hold">
-                                          <p:stCondLst>
-                                            <p:cond delay="0"/>
-                                          </p:stCondLst>
-                                        </p:cTn>
-                                        <p:tgtEl>
-                                          <p:spTgt spid="3">
-                                            <p:txEl>
-                                              <p:pRg st="0" end="0"/>
-                                            </p:txEl>
-                                          </p:spTgt>
-                                        </p:tgtEl>
-                                        <p:attrNameLst>
-                                          <p:attrName>style.visibility</p:attrName>
-                                        </p:attrNameLst>
-                                      </p:cBhvr>
-                                      <p:to>
-                                        <p:strVal val="visible"/>
-                                      </p:to>
-                                    </p:set>
-                                  </p:childTnLst>
-                                </p:cTn>
-                              </p:par>
-                            </p:childTnLst>
-                          </p:cTn>
-                        </p:par>
-                      </p:childTnLst>
-                    </p:cTn>
-                  </p:par>
-                  <p:par>
-                    <p:cTn id="7" fill="hold">
-                      <p:stCondLst>
-                        <p:cond delay="indefinite"/>
-                      </p:stCondLst>
-                      <p:childTnLst>
-                        <p:par>
-                          <p:cTn id="8" fill="hold">
-                            <p:stCondLst>
-                              <p:cond delay="0"/>
-                            </p:stCondLst>
-                            <p:childTnLst>
-                              <p:par>
-                                <p:cTn id="9" presetID="1" presetClass="entr" presetSubtype="0" fill="hold" grpId="0" nodeType="clickEffect">
-                                  <p:stCondLst>
-                                    <p:cond delay="0"/>
-                                  </p:stCondLst>
-                                  <p:childTnLst>
-                                    <p:set>
-                                      <p:cBhvr>
-                                        <p:cTn id="10" dur="1" fill="hold">
-                                          <p:stCondLst>
-                                            <p:cond delay="0"/>
-                                          </p:stCondLst>
-                                        </p:cTn>
-                                        <p:tgtEl>
-                                          <p:spTgt spid="3">
-                                            <p:txEl>
-                                              <p:pRg st="1" end="1"/>
-                                            </p:txEl>
-                                          </p:spTgt>
-                                        </p:tgtEl>
-                                        <p:attrNameLst>
-                                          <p:attrName>style.visibility</p:attrName>
-                                        </p:attrNameLst>
-                                      </p:cBhvr>
-                                      <p:to>
-                                        <p:strVal val="visible"/>
-                                      </p:to>
-                                    </p:set>
-                                  </p:childTnLst>
-                                </p:cTn>
-                              </p:par>
-                              <p:par>
-                                <p:cTn id="11" presetID="1" presetClass="entr" presetSubtype="0" fill="hold" grpId="0" nodeType="withEffect">
-                                  <p:stCondLst>
-                                    <p:cond delay="0"/>
-                                  </p:stCondLst>
-                                  <p:childTnLst>
-                                    <p:set>
-                                      <p:cBhvr>
-                                        <p:cTn id="12" dur="1" fill="hold">
-                                          <p:stCondLst>
-                                            <p:cond delay="0"/>
-                                          </p:stCondLst>
-                                        </p:cTn>
-                                        <p:tgtEl>
-                                          <p:spTgt spid="3">
-                                            <p:txEl>
-                                              <p:pRg st="2" end="2"/>
-                                            </p:txEl>
-                                          </p:spTgt>
-                                        </p:tgtEl>
-                                        <p:attrNameLst>
-                                          <p:attrName>style.visibility</p:attrName>
-                                        </p:attrNameLst>
-                                      </p:cBhvr>
-                                      <p:to>
-                                        <p:strVal val="visible"/>
-                                      </p:to>
-                                    </p:set>
-                                  </p:childTnLst>
-                                </p:cTn>
-                              </p:par>
-                              <p:par>
-                                <p:cTn id="13" presetID="1" presetClass="entr" presetSubtype="0" fill="hold" grpId="0" nodeType="withEffect">
-                                  <p:stCondLst>
-                                    <p:cond delay="0"/>
-                                  </p:stCondLst>
-                                  <p:childTnLst>
-                                    <p:set>
-                                      <p:cBhvr>
-                                        <p:cTn id="14" dur="1" fill="hold">
-                                          <p:stCondLst>
-                                            <p:cond delay="0"/>
-                                          </p:stCondLst>
-                                        </p:cTn>
-                                        <p:tgtEl>
-                                          <p:spTgt spid="3">
-                                            <p:txEl>
-                                              <p:pRg st="3" end="3"/>
-                                            </p:txEl>
-                                          </p:spTgt>
-                                        </p:tgtEl>
-                                        <p:attrNameLst>
-                                          <p:attrName>style.visibility</p:attrName>
-                                        </p:attrNameLst>
-                                      </p:cBhvr>
-                                      <p:to>
-                                        <p:strVal val="visible"/>
-                                      </p:to>
-                                    </p:set>
-                                  </p:childTnLst>
-                                </p:cTn>
-                              </p:par>
-                            </p:childTnLst>
-                          </p:cTn>
-                        </p:par>
-                      </p:childTnLst>
-                    </p:cTn>
-                  </p:par>
-                </p:childTnLst>
-              </p:cTn>
-              <p:prevCondLst>
-                <p:cond evt="onPrev" delay="0">
-                  <p:tgtEl>
-                    <p:sldTgt/>
-                  </p:tgtEl>
-                </p:cond>
-              </p:prevCondLst>
-              <p:nextCondLst>
-                <p:cond evt="onNext" delay="0">
-                  <p:tgtEl>
-                    <p:sldTgt/>
-                  </p:tgtEl>
-                </p:cond>
-              </p:nextCondLst>
-            </p:seq>
-          </p:childTnLst>
-        </p:cTn>
-      </p:par>
-    </p:tnLst>
-    <p:bldLst>
-      <p:bldP spid="3" grpId="0" uiExpand="1" build="p"/>
-    </p:bldLst>
-  </p:timing>
-</p:sld>
-</file>
-
-<file path=ppt/slides/slide30.xml><?xml version="1.0" encoding="utf-8"?>
-<p:sld xmlns:a="http://schemas.openxmlformats.org/drawingml/2006/main" xmlns:r="http://schemas.openxmlformats.org/officeDocument/2006/relationships" xmlns:p="http://schemas.openxmlformats.org/presentationml/2006/main">
-  <p:cSld>
-    <p:spTree>
-      <p:nvGrpSpPr>
-        <p:cNvPr id="1" name=""/>
-        <p:cNvGrpSpPr/>
-        <p:nvPr/>
-      </p:nvGrpSpPr>
-      <p:grpSpPr>
-        <a:xfrm>
-          <a:off x="0" y="0"/>
-          <a:ext cx="0" cy="0"/>
-          <a:chOff x="0" y="0"/>
-          <a:chExt cx="0" cy="0"/>
-        </a:xfrm>
-      </p:grpSpPr>
-      <p:sp>
-        <p:nvSpPr>
-          <p:cNvPr id="2" name="Title 1"/>
-          <p:cNvSpPr>
-            <a:spLocks noGrp="1"/>
-          </p:cNvSpPr>
-          <p:nvPr>
-            <p:ph type="title"/>
-          </p:nvPr>
-        </p:nvSpPr>
-        <p:spPr/>
-        <p:txBody>
-          <a:bodyPr/>
-          <a:lstStyle/>
-          <a:p>
-            <a:r>
-              <a:rPr lang="en-US" dirty="0" smtClean="0"/>
-              <a:t>Conclusions</a:t>
-            </a:r>
-            <a:endParaRPr lang="nl-BE" dirty="0"/>
-          </a:p>
-        </p:txBody>
-      </p:sp>
-      <p:sp>
-        <p:nvSpPr>
-          <p:cNvPr id="3" name="Text Placeholder 2"/>
-          <p:cNvSpPr>
-            <a:spLocks noGrp="1"/>
-          </p:cNvSpPr>
-          <p:nvPr>
-            <p:ph type="body" idx="1"/>
-          </p:nvPr>
-        </p:nvSpPr>
-        <p:spPr/>
-        <p:txBody>
-          <a:bodyPr/>
-          <a:lstStyle/>
-          <a:p>
-            <a:endParaRPr lang="nl-BE"/>
-          </a:p>
-        </p:txBody>
-      </p:sp>
-      <p:sp>
-        <p:nvSpPr>
-          <p:cNvPr id="4" name="Slide Number Placeholder 3"/>
-          <p:cNvSpPr>
-            <a:spLocks noGrp="1"/>
-          </p:cNvSpPr>
-          <p:nvPr>
-            <p:ph type="sldNum" sz="quarter" idx="12"/>
-          </p:nvPr>
-        </p:nvSpPr>
-        <p:spPr/>
-        <p:txBody>
-          <a:bodyPr/>
-          <a:lstStyle/>
-          <a:p>
-            <a:fld id="{AEFF399F-E3B5-4890-BC79-9BC8D4DF3F2D}" type="slidenum">
-              <a:rPr lang="nl-BE" smtClean="0"/>
-              <a:t>30</a:t>
+              <a:t>31</a:t>
             </a:fld>
             <a:endParaRPr lang="nl-BE"/>
           </a:p>
@@ -14838,7 +15305,7 @@
 </p:sld>
 </file>
 
-<file path=ppt/slides/slide31.xml><?xml version="1.0" encoding="utf-8"?>
+<file path=ppt/slides/slide32.xml><?xml version="1.0" encoding="utf-8"?>
 <p:sld xmlns:a="http://schemas.openxmlformats.org/drawingml/2006/main" xmlns:r="http://schemas.openxmlformats.org/officeDocument/2006/relationships" xmlns:p="http://schemas.openxmlformats.org/presentationml/2006/main">
   <p:cSld>
     <p:spTree>
@@ -14993,7 +15460,7 @@
           <a:p>
             <a:fld id="{AEFF399F-E3B5-4890-BC79-9BC8D4DF3F2D}" type="slidenum">
               <a:rPr lang="nl-BE" smtClean="0"/>
-              <a:t>31</a:t>
+              <a:t>32</a:t>
             </a:fld>
             <a:endParaRPr lang="nl-BE"/>
           </a:p>
@@ -15502,7 +15969,7 @@
 </p:sld>
 </file>
 
-<file path=ppt/slides/slide32.xml><?xml version="1.0" encoding="utf-8"?>
+<file path=ppt/slides/slide33.xml><?xml version="1.0" encoding="utf-8"?>
 <p:sld xmlns:a="http://schemas.openxmlformats.org/drawingml/2006/main" xmlns:r="http://schemas.openxmlformats.org/officeDocument/2006/relationships" xmlns:p="http://schemas.openxmlformats.org/presentationml/2006/main">
   <p:cSld>
     <p:spTree>
@@ -15706,7 +16173,7 @@
           <a:p>
             <a:fld id="{AEFF399F-E3B5-4890-BC79-9BC8D4DF3F2D}" type="slidenum">
               <a:rPr lang="nl-BE" smtClean="0"/>
-              <a:t>32</a:t>
+              <a:t>33</a:t>
             </a:fld>
             <a:endParaRPr lang="nl-BE"/>
           </a:p>
@@ -16037,7 +16504,7 @@
 </p:sld>
 </file>
 
-<file path=ppt/slides/slide33.xml><?xml version="1.0" encoding="utf-8"?>
+<file path=ppt/slides/slide34.xml><?xml version="1.0" encoding="utf-8"?>
 <p:sld xmlns:a="http://schemas.openxmlformats.org/drawingml/2006/main" xmlns:r="http://schemas.openxmlformats.org/officeDocument/2006/relationships" xmlns:p="http://schemas.openxmlformats.org/presentationml/2006/main">
   <p:cSld>
     <p:spTree>
@@ -16218,7 +16685,7 @@
           <a:p>
             <a:fld id="{AEFF399F-E3B5-4890-BC79-9BC8D4DF3F2D}" type="slidenum">
               <a:rPr lang="nl-BE" smtClean="0"/>
-              <a:t>33</a:t>
+              <a:t>34</a:t>
             </a:fld>
             <a:endParaRPr lang="nl-BE"/>
           </a:p>

</xml_diff>

<commit_message>
Update for new Singularity version
</commit_message>
<xml_diff>
--- a/Virtualization/singularity.pptx
+++ b/Virtualization/singularity.pptx
@@ -14,7 +14,7 @@
     <p:sldId id="258" r:id="rId5"/>
     <p:sldId id="259" r:id="rId6"/>
     <p:sldId id="260" r:id="rId7"/>
-    <p:sldId id="262" r:id="rId8"/>
+    <p:sldId id="301" r:id="rId8"/>
     <p:sldId id="274" r:id="rId9"/>
     <p:sldId id="263" r:id="rId10"/>
     <p:sldId id="290" r:id="rId11"/>
@@ -164,7 +164,7 @@
             <p14:sldId id="258"/>
             <p14:sldId id="259"/>
             <p14:sldId id="260"/>
-            <p14:sldId id="262"/>
+            <p14:sldId id="301"/>
           </p14:sldIdLst>
         </p14:section>
         <p14:section name="Creating images" id="{C75D904B-D29C-4882-96E0-D063D26B6329}">
@@ -322,7 +322,7 @@
           <a:p>
             <a:fld id="{6BD974B4-F374-4E74-84D3-1EB7DBF32A2A}" type="datetimeFigureOut">
               <a:rPr lang="nl-BE" smtClean="0"/>
-              <a:t>14/08/2018</a:t>
+              <a:t>20/03/2019</a:t>
             </a:fld>
             <a:endParaRPr lang="nl-BE"/>
           </a:p>
@@ -805,7 +805,7 @@
           <a:p>
             <a:fld id="{A433E747-842D-4EF3-8202-AC54FEC33061}" type="datetime1">
               <a:rPr lang="nl-BE" smtClean="0"/>
-              <a:t>14/08/2018</a:t>
+              <a:t>20/03/2019</a:t>
             </a:fld>
             <a:endParaRPr lang="nl-BE"/>
           </a:p>
@@ -975,7 +975,7 @@
           <a:p>
             <a:fld id="{7C821354-3381-4DF5-ABED-FDAFA2BAD3F8}" type="datetime1">
               <a:rPr lang="nl-BE" smtClean="0"/>
-              <a:t>14/08/2018</a:t>
+              <a:t>20/03/2019</a:t>
             </a:fld>
             <a:endParaRPr lang="nl-BE"/>
           </a:p>
@@ -1155,7 +1155,7 @@
           <a:p>
             <a:fld id="{C6B54B95-9964-4BBF-B171-A69413AB9FC5}" type="datetime1">
               <a:rPr lang="nl-BE" smtClean="0"/>
-              <a:t>14/08/2018</a:t>
+              <a:t>20/03/2019</a:t>
             </a:fld>
             <a:endParaRPr lang="nl-BE"/>
           </a:p>
@@ -1325,7 +1325,7 @@
           <a:p>
             <a:fld id="{BE45CDE5-064C-4862-90E9-83B8FD778625}" type="datetime1">
               <a:rPr lang="nl-BE" smtClean="0"/>
-              <a:t>14/08/2018</a:t>
+              <a:t>20/03/2019</a:t>
             </a:fld>
             <a:endParaRPr lang="nl-BE"/>
           </a:p>
@@ -1569,7 +1569,7 @@
           <a:p>
             <a:fld id="{C75A345C-628E-463E-B8F7-69C25D344DF5}" type="datetime1">
               <a:rPr lang="nl-BE" smtClean="0"/>
-              <a:t>14/08/2018</a:t>
+              <a:t>20/03/2019</a:t>
             </a:fld>
             <a:endParaRPr lang="nl-BE"/>
           </a:p>
@@ -1801,7 +1801,7 @@
           <a:p>
             <a:fld id="{65B04534-538C-4249-A635-8BB2B8486464}" type="datetime1">
               <a:rPr lang="nl-BE" smtClean="0"/>
-              <a:t>14/08/2018</a:t>
+              <a:t>20/03/2019</a:t>
             </a:fld>
             <a:endParaRPr lang="nl-BE"/>
           </a:p>
@@ -2168,7 +2168,7 @@
           <a:p>
             <a:fld id="{089671CB-8547-4C91-A3D5-012E6E8790E6}" type="datetime1">
               <a:rPr lang="nl-BE" smtClean="0"/>
-              <a:t>14/08/2018</a:t>
+              <a:t>20/03/2019</a:t>
             </a:fld>
             <a:endParaRPr lang="nl-BE"/>
           </a:p>
@@ -2286,7 +2286,7 @@
           <a:p>
             <a:fld id="{5765335F-FC99-4A2B-B87B-6AF6F3762B67}" type="datetime1">
               <a:rPr lang="nl-BE" smtClean="0"/>
-              <a:t>14/08/2018</a:t>
+              <a:t>20/03/2019</a:t>
             </a:fld>
             <a:endParaRPr lang="nl-BE"/>
           </a:p>
@@ -2381,7 +2381,7 @@
           <a:p>
             <a:fld id="{1711BA58-B677-4D21-BDCD-9DD1AEA8A328}" type="datetime1">
               <a:rPr lang="nl-BE" smtClean="0"/>
-              <a:t>14/08/2018</a:t>
+              <a:t>20/03/2019</a:t>
             </a:fld>
             <a:endParaRPr lang="nl-BE"/>
           </a:p>
@@ -2658,7 +2658,7 @@
           <a:p>
             <a:fld id="{5513BE8B-B89C-461B-89D1-D5BE33ADB6B9}" type="datetime1">
               <a:rPr lang="nl-BE" smtClean="0"/>
-              <a:t>14/08/2018</a:t>
+              <a:t>20/03/2019</a:t>
             </a:fld>
             <a:endParaRPr lang="nl-BE"/>
           </a:p>
@@ -2915,7 +2915,7 @@
           <a:p>
             <a:fld id="{AEE65485-0554-4482-9B9C-289893A0B56B}" type="datetime1">
               <a:rPr lang="nl-BE" smtClean="0"/>
-              <a:t>14/08/2018</a:t>
+              <a:t>20/03/2019</a:t>
             </a:fld>
             <a:endParaRPr lang="nl-BE"/>
           </a:p>
@@ -3128,7 +3128,7 @@
           <a:p>
             <a:fld id="{6FF26CEC-AF8A-4096-9A53-521F7571A055}" type="datetime1">
               <a:rPr lang="nl-BE" smtClean="0"/>
-              <a:t>14/08/2018</a:t>
+              <a:t>20/03/2019</a:t>
             </a:fld>
             <a:endParaRPr lang="nl-BE"/>
           </a:p>
@@ -22988,7 +22988,6 @@
               <a:rPr lang="en-US" dirty="0" smtClean="0"/>
               <a:t> </a:t>
             </a:r>
-            <a:endParaRPr lang="en-US" dirty="0" smtClean="0"/>
           </a:p>
           <a:p>
             <a:pPr lvl="1"/>
@@ -23000,7 +22999,6 @@
               <a:rPr lang="en-US" dirty="0" smtClean="0"/>
               <a:t>guide</a:t>
             </a:r>
-            <a:endParaRPr lang="en-US" dirty="0" smtClean="0"/>
           </a:p>
           <a:p>
             <a:pPr lvl="1"/>
@@ -23012,7 +23010,6 @@
               <a:rPr lang="en-US" dirty="0" smtClean="0"/>
               <a:t>guide</a:t>
             </a:r>
-            <a:endParaRPr lang="en-US" dirty="0" smtClean="0"/>
           </a:p>
           <a:p>
             <a:r>
@@ -24627,7 +24624,7 @@
               <a:rPr lang="en-US" dirty="0" smtClean="0"/>
               <a:t>Installing singularity</a:t>
             </a:r>
-            <a:endParaRPr lang="nl-BE" dirty="0"/>
+            <a:endParaRPr lang="en-US" dirty="0"/>
           </a:p>
         </p:txBody>
       </p:sp>
@@ -24641,477 +24638,58 @@
             <p:ph idx="1"/>
           </p:nvPr>
         </p:nvSpPr>
-        <p:spPr>
-          <a:xfrm>
-            <a:off x="628649" y="1825625"/>
-            <a:ext cx="8319407" cy="4351338"/>
-          </a:xfrm>
-        </p:spPr>
+        <p:spPr/>
         <p:txBody>
-          <a:bodyPr>
-            <a:normAutofit fontScale="77500" lnSpcReduction="20000"/>
-          </a:bodyPr>
+          <a:bodyPr/>
           <a:lstStyle/>
           <a:p>
             <a:r>
               <a:rPr lang="en-US" dirty="0" smtClean="0"/>
-              <a:t>Clone GitHub repository</a:t>
-            </a:r>
-          </a:p>
-          <a:p>
-            <a:endParaRPr lang="en-US" dirty="0" smtClean="0">
-              <a:latin typeface="Courier New" panose="02070309020205020404" pitchFamily="49" charset="0"/>
-              <a:cs typeface="Courier New" panose="02070309020205020404" pitchFamily="49" charset="0"/>
-            </a:endParaRPr>
-          </a:p>
-          <a:p>
+              <a:t>Use distribution's package manager</a:t>
+            </a:r>
+          </a:p>
+          <a:p>
+            <a:pPr lvl="1"/>
             <a:r>
               <a:rPr lang="en-US" dirty="0" smtClean="0"/>
-              <a:t>Run </a:t>
+              <a:t>apt</a:t>
+            </a:r>
+          </a:p>
+          <a:p>
+            <a:pPr lvl="1"/>
+            <a:r>
+              <a:rPr lang="en-US" dirty="0" smtClean="0"/>
+              <a:t>yum</a:t>
+            </a:r>
+          </a:p>
+          <a:p>
+            <a:pPr lvl="1"/>
+            <a:r>
+              <a:rPr lang="en-US" dirty="0" smtClean="0"/>
+              <a:t>…</a:t>
+            </a:r>
+          </a:p>
+          <a:p>
+            <a:r>
+              <a:rPr lang="en-US" dirty="0" smtClean="0"/>
+              <a:t>Build from source</a:t>
+            </a:r>
+          </a:p>
+          <a:p>
+            <a:pPr lvl="1"/>
+            <a:r>
+              <a:rPr lang="en-US" dirty="0" smtClean="0"/>
+              <a:t>Note: requires </a:t>
             </a:r>
             <a:r>
               <a:rPr lang="en-US" dirty="0" err="1" smtClean="0"/>
-              <a:t>autogen</a:t>
+              <a:t>squashfs</a:t>
+            </a:r>
+            <a:r>
+              <a:rPr lang="en-US" dirty="0" smtClean="0"/>
+              <a:t>, fuse</a:t>
             </a:r>
             <a:endParaRPr lang="en-US" dirty="0"/>
-          </a:p>
-          <a:p>
-            <a:endParaRPr lang="en-US" dirty="0" smtClean="0"/>
-          </a:p>
-          <a:p>
-            <a:r>
-              <a:rPr lang="en-US" dirty="0" smtClean="0"/>
-              <a:t>Configure</a:t>
-            </a:r>
-          </a:p>
-          <a:p>
-            <a:endParaRPr lang="en-US" dirty="0" smtClean="0"/>
-          </a:p>
-          <a:p>
-            <a:r>
-              <a:rPr lang="en-US" dirty="0" smtClean="0"/>
-              <a:t>Make</a:t>
-            </a:r>
-            <a:endParaRPr lang="en-US" dirty="0"/>
-          </a:p>
-          <a:p>
-            <a:endParaRPr lang="en-US" dirty="0" smtClean="0">
-              <a:latin typeface="Courier New" panose="02070309020205020404" pitchFamily="49" charset="0"/>
-              <a:cs typeface="Courier New" panose="02070309020205020404" pitchFamily="49" charset="0"/>
-            </a:endParaRPr>
-          </a:p>
-          <a:p>
-            <a:r>
-              <a:rPr lang="en-US" dirty="0" smtClean="0"/>
-              <a:t>Install</a:t>
-            </a:r>
-            <a:endParaRPr lang="en-US" dirty="0"/>
-          </a:p>
-          <a:p>
-            <a:endParaRPr lang="en-US" dirty="0" smtClean="0">
-              <a:solidFill>
-                <a:srgbClr val="C00000"/>
-              </a:solidFill>
-            </a:endParaRPr>
-          </a:p>
-          <a:p>
-            <a:r>
-              <a:rPr lang="en-US" dirty="0" smtClean="0"/>
-              <a:t>Environment</a:t>
-            </a:r>
-          </a:p>
-          <a:p>
-            <a:pPr lvl="1"/>
-            <a:r>
-              <a:rPr lang="en-US" dirty="0" smtClean="0"/>
-              <a:t>Set </a:t>
-            </a:r>
-            <a:r>
-              <a:rPr lang="en-US" dirty="0" smtClean="0">
-                <a:latin typeface="Courier New" panose="02070309020205020404" pitchFamily="49" charset="0"/>
-                <a:cs typeface="Courier New" panose="02070309020205020404" pitchFamily="49" charset="0"/>
-              </a:rPr>
-              <a:t>PATH</a:t>
-            </a:r>
-            <a:r>
-              <a:rPr lang="en-US" dirty="0" smtClean="0"/>
-              <a:t> and </a:t>
-            </a:r>
-            <a:r>
-              <a:rPr lang="en-US" dirty="0" smtClean="0">
-                <a:latin typeface="Courier New" panose="02070309020205020404" pitchFamily="49" charset="0"/>
-                <a:cs typeface="Courier New" panose="02070309020205020404" pitchFamily="49" charset="0"/>
-              </a:rPr>
-              <a:t>LD_LIBRARY_PATH</a:t>
-            </a:r>
-            <a:r>
-              <a:rPr lang="en-US" dirty="0" smtClean="0"/>
-              <a:t> if installed in non-standard location</a:t>
-            </a:r>
-            <a:endParaRPr lang="nl-BE" dirty="0"/>
-          </a:p>
-        </p:txBody>
-      </p:sp>
-      <p:sp>
-        <p:nvSpPr>
-          <p:cNvPr id="7" name="TextBox 6"/>
-          <p:cNvSpPr txBox="1"/>
-          <p:nvPr/>
-        </p:nvSpPr>
-        <p:spPr>
-          <a:xfrm>
-            <a:off x="4008665" y="4694817"/>
-            <a:ext cx="2288575" cy="523220"/>
-          </a:xfrm>
-          <a:prstGeom prst="rect">
-            <a:avLst/>
-          </a:prstGeom>
-          <a:noFill/>
-          <a:ln>
-            <a:solidFill>
-              <a:srgbClr val="C00000"/>
-            </a:solidFill>
-          </a:ln>
-        </p:spPr>
-        <p:txBody>
-          <a:bodyPr wrap="none" rtlCol="0">
-            <a:spAutoFit/>
-          </a:bodyPr>
-          <a:lstStyle/>
-          <a:p>
-            <a:r>
-              <a:rPr lang="en-US" sz="2800" i="1" dirty="0" smtClean="0">
-                <a:solidFill>
-                  <a:srgbClr val="C00000"/>
-                </a:solidFill>
-              </a:rPr>
-              <a:t>Must</a:t>
-            </a:r>
-            <a:r>
-              <a:rPr lang="en-US" sz="2800" dirty="0" smtClean="0">
-                <a:solidFill>
-                  <a:srgbClr val="C00000"/>
-                </a:solidFill>
-              </a:rPr>
-              <a:t> be </a:t>
-            </a:r>
-            <a:r>
-              <a:rPr lang="en-US" sz="2800" dirty="0" err="1" smtClean="0">
-                <a:solidFill>
-                  <a:srgbClr val="C00000"/>
-                </a:solidFill>
-              </a:rPr>
-              <a:t>sudo</a:t>
-            </a:r>
-            <a:r>
-              <a:rPr lang="en-US" sz="2800" dirty="0" smtClean="0">
-                <a:solidFill>
-                  <a:srgbClr val="C00000"/>
-                </a:solidFill>
-              </a:rPr>
-              <a:t>!</a:t>
-            </a:r>
-            <a:endParaRPr lang="nl-BE" sz="2800" dirty="0"/>
-          </a:p>
-        </p:txBody>
-      </p:sp>
-      <p:sp>
-        <p:nvSpPr>
-          <p:cNvPr id="8" name="TextBox 7"/>
-          <p:cNvSpPr txBox="1"/>
-          <p:nvPr/>
-        </p:nvSpPr>
-        <p:spPr>
-          <a:xfrm>
-            <a:off x="4008665" y="3204882"/>
-            <a:ext cx="3044808" cy="369332"/>
-          </a:xfrm>
-          <a:prstGeom prst="rect">
-            <a:avLst/>
-          </a:prstGeom>
-          <a:noFill/>
-          <a:ln>
-            <a:solidFill>
-              <a:schemeClr val="tx1"/>
-            </a:solidFill>
-          </a:ln>
-        </p:spPr>
-        <p:txBody>
-          <a:bodyPr wrap="none" rtlCol="0">
-            <a:spAutoFit/>
-          </a:bodyPr>
-          <a:lstStyle/>
-          <a:p>
-            <a:r>
-              <a:rPr lang="en-US" dirty="0" smtClean="0"/>
-              <a:t>Or other appropriate directory</a:t>
-            </a:r>
-            <a:endParaRPr lang="nl-BE" dirty="0"/>
-          </a:p>
-        </p:txBody>
-      </p:sp>
-      <p:sp>
-        <p:nvSpPr>
-          <p:cNvPr id="9" name="TextBox 8"/>
-          <p:cNvSpPr txBox="1"/>
-          <p:nvPr/>
-        </p:nvSpPr>
-        <p:spPr>
-          <a:xfrm>
-            <a:off x="57150" y="2147200"/>
-            <a:ext cx="8731878" cy="369332"/>
-          </a:xfrm>
-          <a:prstGeom prst="rect">
-            <a:avLst/>
-          </a:prstGeom>
-          <a:solidFill>
-            <a:schemeClr val="tx1"/>
-          </a:solidFill>
-        </p:spPr>
-        <p:txBody>
-          <a:bodyPr wrap="none" rtlCol="0">
-            <a:spAutoFit/>
-          </a:bodyPr>
-          <a:lstStyle/>
-          <a:p>
-            <a:r>
-              <a:rPr lang="en-US" b="1" dirty="0" smtClean="0">
-                <a:solidFill>
-                  <a:schemeClr val="bg1"/>
-                </a:solidFill>
-                <a:latin typeface="Courier New" panose="02070309020205020404" pitchFamily="49" charset="0"/>
-                <a:cs typeface="Courier New" panose="02070309020205020404" pitchFamily="49" charset="0"/>
-              </a:rPr>
-              <a:t>$ </a:t>
-            </a:r>
-            <a:r>
-              <a:rPr lang="en-US" b="1" dirty="0" err="1" smtClean="0">
-                <a:solidFill>
-                  <a:schemeClr val="bg1"/>
-                </a:solidFill>
-                <a:latin typeface="Courier New" panose="02070309020205020404" pitchFamily="49" charset="0"/>
-                <a:cs typeface="Courier New" panose="02070309020205020404" pitchFamily="49" charset="0"/>
-              </a:rPr>
-              <a:t>git</a:t>
-            </a:r>
-            <a:r>
-              <a:rPr lang="en-US" b="1" dirty="0" smtClean="0">
-                <a:solidFill>
-                  <a:schemeClr val="bg1"/>
-                </a:solidFill>
-                <a:latin typeface="Courier New" panose="02070309020205020404" pitchFamily="49" charset="0"/>
-                <a:cs typeface="Courier New" panose="02070309020205020404" pitchFamily="49" charset="0"/>
-              </a:rPr>
-              <a:t> clone https://github.com/singularityware/singularity.git</a:t>
-            </a:r>
-            <a:endParaRPr lang="nl-BE" b="1" dirty="0">
-              <a:solidFill>
-                <a:schemeClr val="bg1"/>
-              </a:solidFill>
-            </a:endParaRPr>
-          </a:p>
-        </p:txBody>
-      </p:sp>
-      <p:sp>
-        <p:nvSpPr>
-          <p:cNvPr id="10" name="TextBox 9"/>
-          <p:cNvSpPr txBox="1"/>
-          <p:nvPr/>
-        </p:nvSpPr>
-        <p:spPr>
-          <a:xfrm>
-            <a:off x="1114229" y="2838107"/>
-            <a:ext cx="2114681" cy="369332"/>
-          </a:xfrm>
-          <a:prstGeom prst="rect">
-            <a:avLst/>
-          </a:prstGeom>
-          <a:solidFill>
-            <a:schemeClr val="tx1"/>
-          </a:solidFill>
-        </p:spPr>
-        <p:txBody>
-          <a:bodyPr wrap="none" rtlCol="0">
-            <a:spAutoFit/>
-          </a:bodyPr>
-          <a:lstStyle/>
-          <a:p>
-            <a:r>
-              <a:rPr lang="en-US" b="1" dirty="0" smtClean="0">
-                <a:solidFill>
-                  <a:schemeClr val="bg1"/>
-                </a:solidFill>
-                <a:latin typeface="Courier New" panose="02070309020205020404" pitchFamily="49" charset="0"/>
-                <a:cs typeface="Courier New" panose="02070309020205020404" pitchFamily="49" charset="0"/>
-              </a:rPr>
-              <a:t>$ ./autogen.sh</a:t>
-            </a:r>
-          </a:p>
-        </p:txBody>
-      </p:sp>
-      <p:sp>
-        <p:nvSpPr>
-          <p:cNvPr id="11" name="TextBox 10"/>
-          <p:cNvSpPr txBox="1"/>
-          <p:nvPr/>
-        </p:nvSpPr>
-        <p:spPr>
-          <a:xfrm>
-            <a:off x="1166936" y="3596379"/>
-            <a:ext cx="4733988" cy="369332"/>
-          </a:xfrm>
-          <a:prstGeom prst="rect">
-            <a:avLst/>
-          </a:prstGeom>
-          <a:solidFill>
-            <a:schemeClr val="tx1"/>
-          </a:solidFill>
-        </p:spPr>
-        <p:txBody>
-          <a:bodyPr wrap="none" rtlCol="0">
-            <a:spAutoFit/>
-          </a:bodyPr>
-          <a:lstStyle/>
-          <a:p>
-            <a:r>
-              <a:rPr lang="en-US" b="1" dirty="0" smtClean="0">
-                <a:solidFill>
-                  <a:schemeClr val="bg1"/>
-                </a:solidFill>
-                <a:latin typeface="Courier New" panose="02070309020205020404" pitchFamily="49" charset="0"/>
-                <a:cs typeface="Courier New" panose="02070309020205020404" pitchFamily="49" charset="0"/>
-              </a:rPr>
-              <a:t>$ ./configure --prefix=/</a:t>
-            </a:r>
-            <a:r>
-              <a:rPr lang="en-US" b="1" dirty="0" err="1" smtClean="0">
-                <a:solidFill>
-                  <a:schemeClr val="bg1"/>
-                </a:solidFill>
-                <a:latin typeface="Courier New" panose="02070309020205020404" pitchFamily="49" charset="0"/>
-                <a:cs typeface="Courier New" panose="02070309020205020404" pitchFamily="49" charset="0"/>
-              </a:rPr>
-              <a:t>usr</a:t>
-            </a:r>
-            <a:r>
-              <a:rPr lang="en-US" b="1" dirty="0" smtClean="0">
-                <a:solidFill>
-                  <a:schemeClr val="bg1"/>
-                </a:solidFill>
-                <a:latin typeface="Courier New" panose="02070309020205020404" pitchFamily="49" charset="0"/>
-                <a:cs typeface="Courier New" panose="02070309020205020404" pitchFamily="49" charset="0"/>
-              </a:rPr>
-              <a:t>/local</a:t>
-            </a:r>
-            <a:endParaRPr lang="nl-BE" b="1" dirty="0">
-              <a:solidFill>
-                <a:schemeClr val="bg1"/>
-              </a:solidFill>
-            </a:endParaRPr>
-          </a:p>
-        </p:txBody>
-      </p:sp>
-      <p:sp>
-        <p:nvSpPr>
-          <p:cNvPr id="13" name="TextBox 12"/>
-          <p:cNvSpPr txBox="1"/>
-          <p:nvPr/>
-        </p:nvSpPr>
-        <p:spPr>
-          <a:xfrm>
-            <a:off x="1166936" y="4325485"/>
-            <a:ext cx="1011815" cy="369332"/>
-          </a:xfrm>
-          <a:prstGeom prst="rect">
-            <a:avLst/>
-          </a:prstGeom>
-          <a:solidFill>
-            <a:schemeClr val="tx1"/>
-          </a:solidFill>
-        </p:spPr>
-        <p:txBody>
-          <a:bodyPr wrap="none" rtlCol="0">
-            <a:spAutoFit/>
-          </a:bodyPr>
-          <a:lstStyle/>
-          <a:p>
-            <a:r>
-              <a:rPr lang="en-US" b="1" dirty="0" smtClean="0">
-                <a:solidFill>
-                  <a:schemeClr val="bg1"/>
-                </a:solidFill>
-                <a:latin typeface="Courier New" panose="02070309020205020404" pitchFamily="49" charset="0"/>
-                <a:cs typeface="Courier New" panose="02070309020205020404" pitchFamily="49" charset="0"/>
-              </a:rPr>
-              <a:t>$ make</a:t>
-            </a:r>
-            <a:endParaRPr lang="nl-BE" b="1" dirty="0">
-              <a:solidFill>
-                <a:schemeClr val="bg1"/>
-              </a:solidFill>
-            </a:endParaRPr>
-          </a:p>
-        </p:txBody>
-      </p:sp>
-      <p:sp>
-        <p:nvSpPr>
-          <p:cNvPr id="14" name="TextBox 13"/>
-          <p:cNvSpPr txBox="1"/>
-          <p:nvPr/>
-        </p:nvSpPr>
-        <p:spPr>
-          <a:xfrm>
-            <a:off x="1114229" y="5012697"/>
-            <a:ext cx="2803973" cy="369332"/>
-          </a:xfrm>
-          <a:prstGeom prst="rect">
-            <a:avLst/>
-          </a:prstGeom>
-          <a:solidFill>
-            <a:schemeClr val="tx1"/>
-          </a:solidFill>
-        </p:spPr>
-        <p:txBody>
-          <a:bodyPr wrap="none" rtlCol="0">
-            <a:spAutoFit/>
-          </a:bodyPr>
-          <a:lstStyle/>
-          <a:p>
-            <a:r>
-              <a:rPr lang="en-US" b="1" dirty="0" smtClean="0">
-                <a:solidFill>
-                  <a:schemeClr val="bg1"/>
-                </a:solidFill>
-                <a:latin typeface="Courier New" panose="02070309020205020404" pitchFamily="49" charset="0"/>
-                <a:cs typeface="Courier New" panose="02070309020205020404" pitchFamily="49" charset="0"/>
-              </a:rPr>
-              <a:t>$ </a:t>
-            </a:r>
-            <a:r>
-              <a:rPr lang="en-US" b="1" dirty="0" err="1" smtClean="0">
-                <a:solidFill>
-                  <a:schemeClr val="bg1"/>
-                </a:solidFill>
-                <a:latin typeface="Courier New" panose="02070309020205020404" pitchFamily="49" charset="0"/>
-                <a:cs typeface="Courier New" panose="02070309020205020404" pitchFamily="49" charset="0"/>
-              </a:rPr>
-              <a:t>sudo</a:t>
-            </a:r>
-            <a:r>
-              <a:rPr lang="en-US" b="1" dirty="0" smtClean="0">
-                <a:solidFill>
-                  <a:schemeClr val="bg1"/>
-                </a:solidFill>
-                <a:latin typeface="Courier New" panose="02070309020205020404" pitchFamily="49" charset="0"/>
-                <a:cs typeface="Courier New" panose="02070309020205020404" pitchFamily="49" charset="0"/>
-              </a:rPr>
-              <a:t> make install</a:t>
-            </a:r>
-            <a:endParaRPr lang="nl-BE" b="1" dirty="0">
-              <a:solidFill>
-                <a:schemeClr val="bg1"/>
-              </a:solidFill>
-            </a:endParaRPr>
           </a:p>
         </p:txBody>
       </p:sp>
@@ -25141,7 +24719,7 @@
     </p:spTree>
     <p:extLst>
       <p:ext uri="{BB962C8B-B14F-4D97-AF65-F5344CB8AC3E}">
-        <p14:creationId xmlns:p14="http://schemas.microsoft.com/office/powerpoint/2010/main" val="4127927242"/>
+        <p14:creationId xmlns:p14="http://schemas.microsoft.com/office/powerpoint/2010/main" val="1075109906"/>
       </p:ext>
     </p:extLst>
   </p:cSld>
@@ -25151,577 +24729,9 @@
   <p:timing>
     <p:tnLst>
       <p:par>
-        <p:cTn id="1" dur="indefinite" restart="never" nodeType="tmRoot">
-          <p:childTnLst>
-            <p:seq concurrent="1" nextAc="seek">
-              <p:cTn id="2" dur="indefinite" nodeType="mainSeq">
-                <p:childTnLst>
-                  <p:par>
-                    <p:cTn id="3" fill="hold">
-                      <p:stCondLst>
-                        <p:cond delay="indefinite"/>
-                        <p:cond evt="onBegin" delay="0">
-                          <p:tn val="2"/>
-                        </p:cond>
-                      </p:stCondLst>
-                      <p:childTnLst>
-                        <p:par>
-                          <p:cTn id="4" fill="hold">
-                            <p:stCondLst>
-                              <p:cond delay="0"/>
-                            </p:stCondLst>
-                            <p:childTnLst>
-                              <p:par>
-                                <p:cTn id="5" presetID="1" presetClass="entr" presetSubtype="0" fill="hold" grpId="0" nodeType="withEffect">
-                                  <p:stCondLst>
-                                    <p:cond delay="0"/>
-                                  </p:stCondLst>
-                                  <p:childTnLst>
-                                    <p:set>
-                                      <p:cBhvr>
-                                        <p:cTn id="6" dur="1" fill="hold">
-                                          <p:stCondLst>
-                                            <p:cond delay="0"/>
-                                          </p:stCondLst>
-                                        </p:cTn>
-                                        <p:tgtEl>
-                                          <p:spTgt spid="3">
-                                            <p:txEl>
-                                              <p:pRg st="0" end="0"/>
-                                            </p:txEl>
-                                          </p:spTgt>
-                                        </p:tgtEl>
-                                        <p:attrNameLst>
-                                          <p:attrName>style.visibility</p:attrName>
-                                        </p:attrNameLst>
-                                      </p:cBhvr>
-                                      <p:to>
-                                        <p:strVal val="visible"/>
-                                      </p:to>
-                                    </p:set>
-                                  </p:childTnLst>
-                                </p:cTn>
-                              </p:par>
-                              <p:par>
-                                <p:cTn id="7" presetID="1" presetClass="entr" presetSubtype="0" fill="hold" grpId="0" nodeType="withEffect">
-                                  <p:stCondLst>
-                                    <p:cond delay="0"/>
-                                  </p:stCondLst>
-                                  <p:childTnLst>
-                                    <p:set>
-                                      <p:cBhvr>
-                                        <p:cTn id="8" dur="1" fill="hold">
-                                          <p:stCondLst>
-                                            <p:cond delay="0"/>
-                                          </p:stCondLst>
-                                        </p:cTn>
-                                        <p:tgtEl>
-                                          <p:spTgt spid="9"/>
-                                        </p:tgtEl>
-                                        <p:attrNameLst>
-                                          <p:attrName>style.visibility</p:attrName>
-                                        </p:attrNameLst>
-                                      </p:cBhvr>
-                                      <p:to>
-                                        <p:strVal val="visible"/>
-                                      </p:to>
-                                    </p:set>
-                                  </p:childTnLst>
-                                </p:cTn>
-                              </p:par>
-                            </p:childTnLst>
-                          </p:cTn>
-                        </p:par>
-                      </p:childTnLst>
-                    </p:cTn>
-                  </p:par>
-                  <p:par>
-                    <p:cTn id="9" fill="hold">
-                      <p:stCondLst>
-                        <p:cond delay="indefinite"/>
-                      </p:stCondLst>
-                      <p:childTnLst>
-                        <p:par>
-                          <p:cTn id="10" fill="hold">
-                            <p:stCondLst>
-                              <p:cond delay="0"/>
-                            </p:stCondLst>
-                            <p:childTnLst>
-                              <p:par>
-                                <p:cTn id="11" presetID="1" presetClass="entr" presetSubtype="0" fill="hold" grpId="0" nodeType="clickEffect">
-                                  <p:stCondLst>
-                                    <p:cond delay="0"/>
-                                  </p:stCondLst>
-                                  <p:childTnLst>
-                                    <p:set>
-                                      <p:cBhvr>
-                                        <p:cTn id="12" dur="1" fill="hold">
-                                          <p:stCondLst>
-                                            <p:cond delay="0"/>
-                                          </p:stCondLst>
-                                        </p:cTn>
-                                        <p:tgtEl>
-                                          <p:spTgt spid="3">
-                                            <p:txEl>
-                                              <p:pRg st="2" end="2"/>
-                                            </p:txEl>
-                                          </p:spTgt>
-                                        </p:tgtEl>
-                                        <p:attrNameLst>
-                                          <p:attrName>style.visibility</p:attrName>
-                                        </p:attrNameLst>
-                                      </p:cBhvr>
-                                      <p:to>
-                                        <p:strVal val="visible"/>
-                                      </p:to>
-                                    </p:set>
-                                  </p:childTnLst>
-                                </p:cTn>
-                              </p:par>
-                              <p:par>
-                                <p:cTn id="13" presetID="1" presetClass="entr" presetSubtype="0" fill="hold" grpId="0" nodeType="withEffect">
-                                  <p:stCondLst>
-                                    <p:cond delay="0"/>
-                                  </p:stCondLst>
-                                  <p:childTnLst>
-                                    <p:set>
-                                      <p:cBhvr>
-                                        <p:cTn id="14" dur="1" fill="hold">
-                                          <p:stCondLst>
-                                            <p:cond delay="0"/>
-                                          </p:stCondLst>
-                                        </p:cTn>
-                                        <p:tgtEl>
-                                          <p:spTgt spid="10"/>
-                                        </p:tgtEl>
-                                        <p:attrNameLst>
-                                          <p:attrName>style.visibility</p:attrName>
-                                        </p:attrNameLst>
-                                      </p:cBhvr>
-                                      <p:to>
-                                        <p:strVal val="visible"/>
-                                      </p:to>
-                                    </p:set>
-                                  </p:childTnLst>
-                                </p:cTn>
-                              </p:par>
-                            </p:childTnLst>
-                          </p:cTn>
-                        </p:par>
-                      </p:childTnLst>
-                    </p:cTn>
-                  </p:par>
-                  <p:par>
-                    <p:cTn id="15" fill="hold">
-                      <p:stCondLst>
-                        <p:cond delay="indefinite"/>
-                      </p:stCondLst>
-                      <p:childTnLst>
-                        <p:par>
-                          <p:cTn id="16" fill="hold">
-                            <p:stCondLst>
-                              <p:cond delay="0"/>
-                            </p:stCondLst>
-                            <p:childTnLst>
-                              <p:par>
-                                <p:cTn id="17" presetID="1" presetClass="entr" presetSubtype="0" fill="hold" grpId="0" nodeType="clickEffect">
-                                  <p:stCondLst>
-                                    <p:cond delay="0"/>
-                                  </p:stCondLst>
-                                  <p:childTnLst>
-                                    <p:set>
-                                      <p:cBhvr>
-                                        <p:cTn id="18" dur="1" fill="hold">
-                                          <p:stCondLst>
-                                            <p:cond delay="0"/>
-                                          </p:stCondLst>
-                                        </p:cTn>
-                                        <p:tgtEl>
-                                          <p:spTgt spid="3">
-                                            <p:txEl>
-                                              <p:pRg st="4" end="4"/>
-                                            </p:txEl>
-                                          </p:spTgt>
-                                        </p:tgtEl>
-                                        <p:attrNameLst>
-                                          <p:attrName>style.visibility</p:attrName>
-                                        </p:attrNameLst>
-                                      </p:cBhvr>
-                                      <p:to>
-                                        <p:strVal val="visible"/>
-                                      </p:to>
-                                    </p:set>
-                                  </p:childTnLst>
-                                </p:cTn>
-                              </p:par>
-                              <p:par>
-                                <p:cTn id="19" presetID="1" presetClass="entr" presetSubtype="0" fill="hold" grpId="0" nodeType="withEffect">
-                                  <p:stCondLst>
-                                    <p:cond delay="0"/>
-                                  </p:stCondLst>
-                                  <p:childTnLst>
-                                    <p:set>
-                                      <p:cBhvr>
-                                        <p:cTn id="20" dur="1" fill="hold">
-                                          <p:stCondLst>
-                                            <p:cond delay="0"/>
-                                          </p:stCondLst>
-                                        </p:cTn>
-                                        <p:tgtEl>
-                                          <p:spTgt spid="11"/>
-                                        </p:tgtEl>
-                                        <p:attrNameLst>
-                                          <p:attrName>style.visibility</p:attrName>
-                                        </p:attrNameLst>
-                                      </p:cBhvr>
-                                      <p:to>
-                                        <p:strVal val="visible"/>
-                                      </p:to>
-                                    </p:set>
-                                  </p:childTnLst>
-                                </p:cTn>
-                              </p:par>
-                              <p:par>
-                                <p:cTn id="21" presetID="1" presetClass="entr" presetSubtype="0" fill="hold" grpId="0" nodeType="withEffect">
-                                  <p:stCondLst>
-                                    <p:cond delay="0"/>
-                                  </p:stCondLst>
-                                  <p:childTnLst>
-                                    <p:set>
-                                      <p:cBhvr>
-                                        <p:cTn id="22" dur="1" fill="hold">
-                                          <p:stCondLst>
-                                            <p:cond delay="0"/>
-                                          </p:stCondLst>
-                                        </p:cTn>
-                                        <p:tgtEl>
-                                          <p:spTgt spid="8"/>
-                                        </p:tgtEl>
-                                        <p:attrNameLst>
-                                          <p:attrName>style.visibility</p:attrName>
-                                        </p:attrNameLst>
-                                      </p:cBhvr>
-                                      <p:to>
-                                        <p:strVal val="visible"/>
-                                      </p:to>
-                                    </p:set>
-                                  </p:childTnLst>
-                                </p:cTn>
-                              </p:par>
-                            </p:childTnLst>
-                          </p:cTn>
-                        </p:par>
-                      </p:childTnLst>
-                    </p:cTn>
-                  </p:par>
-                  <p:par>
-                    <p:cTn id="23" fill="hold">
-                      <p:stCondLst>
-                        <p:cond delay="indefinite"/>
-                      </p:stCondLst>
-                      <p:childTnLst>
-                        <p:par>
-                          <p:cTn id="24" fill="hold">
-                            <p:stCondLst>
-                              <p:cond delay="0"/>
-                            </p:stCondLst>
-                            <p:childTnLst>
-                              <p:par>
-                                <p:cTn id="25" presetID="1" presetClass="entr" presetSubtype="0" fill="hold" grpId="0" nodeType="clickEffect">
-                                  <p:stCondLst>
-                                    <p:cond delay="0"/>
-                                  </p:stCondLst>
-                                  <p:childTnLst>
-                                    <p:set>
-                                      <p:cBhvr>
-                                        <p:cTn id="26" dur="1" fill="hold">
-                                          <p:stCondLst>
-                                            <p:cond delay="0"/>
-                                          </p:stCondLst>
-                                        </p:cTn>
-                                        <p:tgtEl>
-                                          <p:spTgt spid="3">
-                                            <p:txEl>
-                                              <p:pRg st="6" end="6"/>
-                                            </p:txEl>
-                                          </p:spTgt>
-                                        </p:tgtEl>
-                                        <p:attrNameLst>
-                                          <p:attrName>style.visibility</p:attrName>
-                                        </p:attrNameLst>
-                                      </p:cBhvr>
-                                      <p:to>
-                                        <p:strVal val="visible"/>
-                                      </p:to>
-                                    </p:set>
-                                  </p:childTnLst>
-                                </p:cTn>
-                              </p:par>
-                              <p:par>
-                                <p:cTn id="27" presetID="1" presetClass="entr" presetSubtype="0" fill="hold" grpId="0" nodeType="withEffect">
-                                  <p:stCondLst>
-                                    <p:cond delay="0"/>
-                                  </p:stCondLst>
-                                  <p:childTnLst>
-                                    <p:set>
-                                      <p:cBhvr>
-                                        <p:cTn id="28" dur="1" fill="hold">
-                                          <p:stCondLst>
-                                            <p:cond delay="0"/>
-                                          </p:stCondLst>
-                                        </p:cTn>
-                                        <p:tgtEl>
-                                          <p:spTgt spid="13"/>
-                                        </p:tgtEl>
-                                        <p:attrNameLst>
-                                          <p:attrName>style.visibility</p:attrName>
-                                        </p:attrNameLst>
-                                      </p:cBhvr>
-                                      <p:to>
-                                        <p:strVal val="visible"/>
-                                      </p:to>
-                                    </p:set>
-                                  </p:childTnLst>
-                                </p:cTn>
-                              </p:par>
-                            </p:childTnLst>
-                          </p:cTn>
-                        </p:par>
-                      </p:childTnLst>
-                    </p:cTn>
-                  </p:par>
-                  <p:par>
-                    <p:cTn id="29" fill="hold">
-                      <p:stCondLst>
-                        <p:cond delay="indefinite"/>
-                      </p:stCondLst>
-                      <p:childTnLst>
-                        <p:par>
-                          <p:cTn id="30" fill="hold">
-                            <p:stCondLst>
-                              <p:cond delay="0"/>
-                            </p:stCondLst>
-                            <p:childTnLst>
-                              <p:par>
-                                <p:cTn id="31" presetID="1" presetClass="entr" presetSubtype="0" fill="hold" grpId="0" nodeType="clickEffect">
-                                  <p:stCondLst>
-                                    <p:cond delay="0"/>
-                                  </p:stCondLst>
-                                  <p:childTnLst>
-                                    <p:set>
-                                      <p:cBhvr>
-                                        <p:cTn id="32" dur="1" fill="hold">
-                                          <p:stCondLst>
-                                            <p:cond delay="0"/>
-                                          </p:stCondLst>
-                                        </p:cTn>
-                                        <p:tgtEl>
-                                          <p:spTgt spid="3">
-                                            <p:txEl>
-                                              <p:pRg st="8" end="8"/>
-                                            </p:txEl>
-                                          </p:spTgt>
-                                        </p:tgtEl>
-                                        <p:attrNameLst>
-                                          <p:attrName>style.visibility</p:attrName>
-                                        </p:attrNameLst>
-                                      </p:cBhvr>
-                                      <p:to>
-                                        <p:strVal val="visible"/>
-                                      </p:to>
-                                    </p:set>
-                                  </p:childTnLst>
-                                </p:cTn>
-                              </p:par>
-                              <p:par>
-                                <p:cTn id="33" presetID="1" presetClass="entr" presetSubtype="0" fill="hold" grpId="0" nodeType="withEffect">
-                                  <p:stCondLst>
-                                    <p:cond delay="0"/>
-                                  </p:stCondLst>
-                                  <p:childTnLst>
-                                    <p:set>
-                                      <p:cBhvr>
-                                        <p:cTn id="34" dur="1" fill="hold">
-                                          <p:stCondLst>
-                                            <p:cond delay="0"/>
-                                          </p:stCondLst>
-                                        </p:cTn>
-                                        <p:tgtEl>
-                                          <p:spTgt spid="14"/>
-                                        </p:tgtEl>
-                                        <p:attrNameLst>
-                                          <p:attrName>style.visibility</p:attrName>
-                                        </p:attrNameLst>
-                                      </p:cBhvr>
-                                      <p:to>
-                                        <p:strVal val="visible"/>
-                                      </p:to>
-                                    </p:set>
-                                  </p:childTnLst>
-                                </p:cTn>
-                              </p:par>
-                            </p:childTnLst>
-                          </p:cTn>
-                        </p:par>
-                      </p:childTnLst>
-                    </p:cTn>
-                  </p:par>
-                  <p:par>
-                    <p:cTn id="35" fill="hold">
-                      <p:stCondLst>
-                        <p:cond delay="indefinite"/>
-                      </p:stCondLst>
-                      <p:childTnLst>
-                        <p:par>
-                          <p:cTn id="36" fill="hold">
-                            <p:stCondLst>
-                              <p:cond delay="0"/>
-                            </p:stCondLst>
-                            <p:childTnLst>
-                              <p:par>
-                                <p:cTn id="37" presetID="1" presetClass="entr" presetSubtype="0" fill="hold" grpId="0" nodeType="clickEffect">
-                                  <p:stCondLst>
-                                    <p:cond delay="0"/>
-                                  </p:stCondLst>
-                                  <p:childTnLst>
-                                    <p:set>
-                                      <p:cBhvr>
-                                        <p:cTn id="38" dur="1" fill="hold">
-                                          <p:stCondLst>
-                                            <p:cond delay="0"/>
-                                          </p:stCondLst>
-                                        </p:cTn>
-                                        <p:tgtEl>
-                                          <p:spTgt spid="7"/>
-                                        </p:tgtEl>
-                                        <p:attrNameLst>
-                                          <p:attrName>style.visibility</p:attrName>
-                                        </p:attrNameLst>
-                                      </p:cBhvr>
-                                      <p:to>
-                                        <p:strVal val="visible"/>
-                                      </p:to>
-                                    </p:set>
-                                  </p:childTnLst>
-                                </p:cTn>
-                              </p:par>
-                            </p:childTnLst>
-                          </p:cTn>
-                        </p:par>
-                      </p:childTnLst>
-                    </p:cTn>
-                  </p:par>
-                  <p:par>
-                    <p:cTn id="39" fill="hold">
-                      <p:stCondLst>
-                        <p:cond delay="indefinite"/>
-                      </p:stCondLst>
-                      <p:childTnLst>
-                        <p:par>
-                          <p:cTn id="40" fill="hold">
-                            <p:stCondLst>
-                              <p:cond delay="0"/>
-                            </p:stCondLst>
-                            <p:childTnLst>
-                              <p:par>
-                                <p:cTn id="41" presetID="1" presetClass="entr" presetSubtype="0" fill="hold" grpId="0" nodeType="clickEffect">
-                                  <p:stCondLst>
-                                    <p:cond delay="0"/>
-                                  </p:stCondLst>
-                                  <p:childTnLst>
-                                    <p:set>
-                                      <p:cBhvr>
-                                        <p:cTn id="42" dur="1" fill="hold">
-                                          <p:stCondLst>
-                                            <p:cond delay="0"/>
-                                          </p:stCondLst>
-                                        </p:cTn>
-                                        <p:tgtEl>
-                                          <p:spTgt spid="3">
-                                            <p:txEl>
-                                              <p:pRg st="10" end="10"/>
-                                            </p:txEl>
-                                          </p:spTgt>
-                                        </p:tgtEl>
-                                        <p:attrNameLst>
-                                          <p:attrName>style.visibility</p:attrName>
-                                        </p:attrNameLst>
-                                      </p:cBhvr>
-                                      <p:to>
-                                        <p:strVal val="visible"/>
-                                      </p:to>
-                                    </p:set>
-                                  </p:childTnLst>
-                                </p:cTn>
-                              </p:par>
-                              <p:par>
-                                <p:cTn id="43" presetID="1" presetClass="entr" presetSubtype="0" fill="hold" grpId="0" nodeType="withEffect">
-                                  <p:stCondLst>
-                                    <p:cond delay="0"/>
-                                  </p:stCondLst>
-                                  <p:childTnLst>
-                                    <p:set>
-                                      <p:cBhvr>
-                                        <p:cTn id="44" dur="1" fill="hold">
-                                          <p:stCondLst>
-                                            <p:cond delay="0"/>
-                                          </p:stCondLst>
-                                        </p:cTn>
-                                        <p:tgtEl>
-                                          <p:spTgt spid="3">
-                                            <p:txEl>
-                                              <p:pRg st="11" end="11"/>
-                                            </p:txEl>
-                                          </p:spTgt>
-                                        </p:tgtEl>
-                                        <p:attrNameLst>
-                                          <p:attrName>style.visibility</p:attrName>
-                                        </p:attrNameLst>
-                                      </p:cBhvr>
-                                      <p:to>
-                                        <p:strVal val="visible"/>
-                                      </p:to>
-                                    </p:set>
-                                  </p:childTnLst>
-                                </p:cTn>
-                              </p:par>
-                            </p:childTnLst>
-                          </p:cTn>
-                        </p:par>
-                      </p:childTnLst>
-                    </p:cTn>
-                  </p:par>
-                </p:childTnLst>
-              </p:cTn>
-              <p:prevCondLst>
-                <p:cond evt="onPrev" delay="0">
-                  <p:tgtEl>
-                    <p:sldTgt/>
-                  </p:tgtEl>
-                </p:cond>
-              </p:prevCondLst>
-              <p:nextCondLst>
-                <p:cond evt="onNext" delay="0">
-                  <p:tgtEl>
-                    <p:sldTgt/>
-                  </p:tgtEl>
-                </p:cond>
-              </p:nextCondLst>
-            </p:seq>
-          </p:childTnLst>
-        </p:cTn>
+        <p:cTn id="1" dur="indefinite" restart="never" nodeType="tmRoot"/>
       </p:par>
     </p:tnLst>
-    <p:bldLst>
-      <p:bldP spid="3" grpId="0" uiExpand="1" build="p"/>
-      <p:bldP spid="7" grpId="0" animBg="1"/>
-      <p:bldP spid="8" grpId="0" animBg="1"/>
-      <p:bldP spid="9" grpId="0" animBg="1"/>
-      <p:bldP spid="10" grpId="0" animBg="1"/>
-      <p:bldP spid="11" grpId="0" animBg="1"/>
-      <p:bldP spid="13" grpId="0" animBg="1"/>
-      <p:bldP spid="14" grpId="0" animBg="1"/>
-    </p:bldLst>
   </p:timing>
 </p:sld>
 </file>

</xml_diff>

<commit_message>
Update for Singularity 3.x
</commit_message>
<xml_diff>
--- a/Virtualization/singularity.pptx
+++ b/Virtualization/singularity.pptx
@@ -322,7 +322,7 @@
           <a:p>
             <a:fld id="{6BD974B4-F374-4E74-84D3-1EB7DBF32A2A}" type="datetimeFigureOut">
               <a:rPr lang="nl-BE" smtClean="0"/>
-              <a:t>20/03/2019</a:t>
+              <a:t>2/09/2019</a:t>
             </a:fld>
             <a:endParaRPr lang="nl-BE"/>
           </a:p>
@@ -805,7 +805,7 @@
           <a:p>
             <a:fld id="{A433E747-842D-4EF3-8202-AC54FEC33061}" type="datetime1">
               <a:rPr lang="nl-BE" smtClean="0"/>
-              <a:t>20/03/2019</a:t>
+              <a:t>2/09/2019</a:t>
             </a:fld>
             <a:endParaRPr lang="nl-BE"/>
           </a:p>
@@ -975,7 +975,7 @@
           <a:p>
             <a:fld id="{7C821354-3381-4DF5-ABED-FDAFA2BAD3F8}" type="datetime1">
               <a:rPr lang="nl-BE" smtClean="0"/>
-              <a:t>20/03/2019</a:t>
+              <a:t>2/09/2019</a:t>
             </a:fld>
             <a:endParaRPr lang="nl-BE"/>
           </a:p>
@@ -1155,7 +1155,7 @@
           <a:p>
             <a:fld id="{C6B54B95-9964-4BBF-B171-A69413AB9FC5}" type="datetime1">
               <a:rPr lang="nl-BE" smtClean="0"/>
-              <a:t>20/03/2019</a:t>
+              <a:t>2/09/2019</a:t>
             </a:fld>
             <a:endParaRPr lang="nl-BE"/>
           </a:p>
@@ -1325,7 +1325,7 @@
           <a:p>
             <a:fld id="{BE45CDE5-064C-4862-90E9-83B8FD778625}" type="datetime1">
               <a:rPr lang="nl-BE" smtClean="0"/>
-              <a:t>20/03/2019</a:t>
+              <a:t>2/09/2019</a:t>
             </a:fld>
             <a:endParaRPr lang="nl-BE"/>
           </a:p>
@@ -1569,7 +1569,7 @@
           <a:p>
             <a:fld id="{C75A345C-628E-463E-B8F7-69C25D344DF5}" type="datetime1">
               <a:rPr lang="nl-BE" smtClean="0"/>
-              <a:t>20/03/2019</a:t>
+              <a:t>2/09/2019</a:t>
             </a:fld>
             <a:endParaRPr lang="nl-BE"/>
           </a:p>
@@ -1801,7 +1801,7 @@
           <a:p>
             <a:fld id="{65B04534-538C-4249-A635-8BB2B8486464}" type="datetime1">
               <a:rPr lang="nl-BE" smtClean="0"/>
-              <a:t>20/03/2019</a:t>
+              <a:t>2/09/2019</a:t>
             </a:fld>
             <a:endParaRPr lang="nl-BE"/>
           </a:p>
@@ -2168,7 +2168,7 @@
           <a:p>
             <a:fld id="{089671CB-8547-4C91-A3D5-012E6E8790E6}" type="datetime1">
               <a:rPr lang="nl-BE" smtClean="0"/>
-              <a:t>20/03/2019</a:t>
+              <a:t>2/09/2019</a:t>
             </a:fld>
             <a:endParaRPr lang="nl-BE"/>
           </a:p>
@@ -2286,7 +2286,7 @@
           <a:p>
             <a:fld id="{5765335F-FC99-4A2B-B87B-6AF6F3762B67}" type="datetime1">
               <a:rPr lang="nl-BE" smtClean="0"/>
-              <a:t>20/03/2019</a:t>
+              <a:t>2/09/2019</a:t>
             </a:fld>
             <a:endParaRPr lang="nl-BE"/>
           </a:p>
@@ -2381,7 +2381,7 @@
           <a:p>
             <a:fld id="{1711BA58-B677-4D21-BDCD-9DD1AEA8A328}" type="datetime1">
               <a:rPr lang="nl-BE" smtClean="0"/>
-              <a:t>20/03/2019</a:t>
+              <a:t>2/09/2019</a:t>
             </a:fld>
             <a:endParaRPr lang="nl-BE"/>
           </a:p>
@@ -2658,7 +2658,7 @@
           <a:p>
             <a:fld id="{5513BE8B-B89C-461B-89D1-D5BE33ADB6B9}" type="datetime1">
               <a:rPr lang="nl-BE" smtClean="0"/>
-              <a:t>20/03/2019</a:t>
+              <a:t>2/09/2019</a:t>
             </a:fld>
             <a:endParaRPr lang="nl-BE"/>
           </a:p>
@@ -2915,7 +2915,7 @@
           <a:p>
             <a:fld id="{AEE65485-0554-4482-9B9C-289893A0B56B}" type="datetime1">
               <a:rPr lang="nl-BE" smtClean="0"/>
-              <a:t>20/03/2019</a:t>
+              <a:t>2/09/2019</a:t>
             </a:fld>
             <a:endParaRPr lang="nl-BE"/>
           </a:p>
@@ -3128,7 +3128,7 @@
           <a:p>
             <a:fld id="{6FF26CEC-AF8A-4096-9A53-521F7571A055}" type="datetime1">
               <a:rPr lang="nl-BE" smtClean="0"/>
-              <a:t>20/03/2019</a:t>
+              <a:t>2/09/2019</a:t>
             </a:fld>
             <a:endParaRPr lang="nl-BE"/>
           </a:p>
@@ -3727,7 +3727,11 @@
           <a:p>
             <a:r>
               <a:rPr lang="en-US" dirty="0" smtClean="0"/>
-              <a:t>Recipe file: bootstrap from Docker</a:t>
+              <a:t>Recipe file: bootstrap from </a:t>
+            </a:r>
+            <a:r>
+              <a:rPr lang="en-US" dirty="0" err="1" smtClean="0"/>
+              <a:t>docker</a:t>
             </a:r>
             <a:endParaRPr lang="nl-BE" dirty="0"/>
           </a:p>
@@ -3767,7 +3771,15 @@
           <a:p>
             <a:r>
               <a:rPr lang="en-US" dirty="0" smtClean="0"/>
-              <a:t>Any public Docker container can be used</a:t>
+              <a:t>Any public </a:t>
+            </a:r>
+            <a:r>
+              <a:rPr lang="en-US" dirty="0" err="1" smtClean="0"/>
+              <a:t>docker</a:t>
+            </a:r>
+            <a:r>
+              <a:rPr lang="en-US" dirty="0" smtClean="0"/>
+              <a:t> container can be used</a:t>
             </a:r>
           </a:p>
           <a:p>
@@ -7459,7 +7471,13 @@
               <a:rPr lang="en-US" dirty="0" smtClean="0">
                 <a:cs typeface="Courier New" panose="02070309020205020404" pitchFamily="49" charset="0"/>
               </a:rPr>
-              <a:t>Build done with </a:t>
+              <a:t>Build </a:t>
+            </a:r>
+            <a:r>
+              <a:rPr lang="en-US" dirty="0" smtClean="0">
+                <a:cs typeface="Courier New" panose="02070309020205020404" pitchFamily="49" charset="0"/>
+              </a:rPr>
+              <a:t>done with </a:t>
             </a:r>
             <a:r>
               <a:rPr lang="en-US" dirty="0" err="1" smtClean="0">
@@ -7512,7 +7530,7 @@
         <p:spPr>
           <a:xfrm>
             <a:off x="791937" y="3778858"/>
-            <a:ext cx="6388287" cy="369332"/>
+            <a:ext cx="6250429" cy="369332"/>
           </a:xfrm>
           <a:prstGeom prst="rect">
             <a:avLst/>
@@ -7565,7 +7583,7 @@
                 <a:latin typeface="Courier New" panose="02070309020205020404" pitchFamily="49" charset="0"/>
                 <a:cs typeface="Courier New" panose="02070309020205020404" pitchFamily="49" charset="0"/>
               </a:rPr>
-              <a:t>grace.simg</a:t>
+              <a:t>grace.sif</a:t>
             </a:r>
             <a:r>
               <a:rPr lang="en-US" b="1" dirty="0" smtClean="0">
@@ -7575,7 +7593,17 @@
                 <a:latin typeface="Courier New" panose="02070309020205020404" pitchFamily="49" charset="0"/>
                 <a:cs typeface="Courier New" panose="02070309020205020404" pitchFamily="49" charset="0"/>
               </a:rPr>
-              <a:t> grace.def</a:t>
+              <a:t> </a:t>
+            </a:r>
+            <a:r>
+              <a:rPr lang="en-US" b="1" dirty="0" smtClean="0">
+                <a:solidFill>
+                  <a:schemeClr val="bg1"/>
+                </a:solidFill>
+                <a:latin typeface="Courier New" panose="02070309020205020404" pitchFamily="49" charset="0"/>
+                <a:cs typeface="Courier New" panose="02070309020205020404" pitchFamily="49" charset="0"/>
+              </a:rPr>
+              <a:t>grace.def</a:t>
             </a:r>
             <a:endParaRPr lang="nl-BE" b="1" dirty="0">
               <a:solidFill>
@@ -8047,7 +8075,7 @@
         <p:spPr/>
         <p:txBody>
           <a:bodyPr>
-            <a:normAutofit/>
+            <a:normAutofit lnSpcReduction="10000"/>
           </a:bodyPr>
           <a:lstStyle/>
           <a:p>
@@ -8062,6 +8090,14 @@
               <a:rPr lang="en-US" dirty="0" smtClean="0"/>
               <a:t>default: </a:t>
             </a:r>
+            <a:r>
+              <a:rPr lang="en-US" dirty="0" err="1" smtClean="0"/>
+              <a:t>sif</a:t>
+            </a:r>
+            <a:endParaRPr lang="en-US" dirty="0" smtClean="0"/>
+          </a:p>
+          <a:p>
+            <a:pPr lvl="1"/>
             <a:r>
               <a:rPr lang="en-US" dirty="0" err="1" smtClean="0"/>
               <a:t>squashfs</a:t>
@@ -8276,15 +8312,33 @@
                                   </p:childTnLst>
                                 </p:cTn>
                               </p:par>
+                            </p:childTnLst>
+                          </p:cTn>
+                        </p:par>
+                      </p:childTnLst>
+                    </p:cTn>
+                  </p:par>
+                  <p:par>
+                    <p:cTn id="11" fill="hold">
+                      <p:stCondLst>
+                        <p:cond delay="indefinite"/>
+                      </p:stCondLst>
+                      <p:childTnLst>
+                        <p:par>
+                          <p:cTn id="12" fill="hold">
+                            <p:stCondLst>
+                              <p:cond delay="0"/>
+                            </p:stCondLst>
+                            <p:childTnLst>
                               <p:par>
-                                <p:cTn id="11" presetID="1" presetClass="entr" presetSubtype="0" fill="hold" grpId="0" nodeType="withEffect">
+                                <p:cTn id="13" presetID="1" presetClass="entr" presetSubtype="0" fill="hold" grpId="0" nodeType="clickEffect">
                                   <p:stCondLst>
                                     <p:cond delay="0"/>
                                   </p:stCondLst>
                                   <p:childTnLst>
                                     <p:set>
                                       <p:cBhvr>
-                                        <p:cTn id="12" dur="1" fill="hold">
+                                        <p:cTn id="14" dur="1" fill="hold">
                                           <p:stCondLst>
                                             <p:cond delay="0"/>
                                           </p:stCondLst>
@@ -8308,14 +8362,14 @@
                                 </p:cTn>
                               </p:par>
                               <p:par>
-                                <p:cTn id="13" presetID="1" presetClass="entr" presetSubtype="0" fill="hold" grpId="0" nodeType="withEffect">
+                                <p:cTn id="15" presetID="1" presetClass="entr" presetSubtype="0" fill="hold" grpId="0" nodeType="withEffect">
                                   <p:stCondLst>
                                     <p:cond delay="0"/>
                                   </p:stCondLst>
                                   <p:childTnLst>
                                     <p:set>
                                       <p:cBhvr>
-                                        <p:cTn id="14" dur="1" fill="hold">
+                                        <p:cTn id="16" dur="1" fill="hold">
                                           <p:stCondLst>
                                             <p:cond delay="0"/>
                                           </p:stCondLst>
@@ -8338,26 +8392,8 @@
                                   </p:childTnLst>
                                 </p:cTn>
                               </p:par>
-                            </p:childTnLst>
-                          </p:cTn>
-                        </p:par>
-                      </p:childTnLst>
-                    </p:cTn>
-                  </p:par>
-                  <p:par>
-                    <p:cTn id="15" fill="hold">
-                      <p:stCondLst>
-                        <p:cond delay="indefinite"/>
-                      </p:stCondLst>
-                      <p:childTnLst>
-                        <p:par>
-                          <p:cTn id="16" fill="hold">
-                            <p:stCondLst>
-                              <p:cond delay="0"/>
-                            </p:stCondLst>
-                            <p:childTnLst>
                               <p:par>
-                                <p:cTn id="17" presetID="1" presetClass="entr" presetSubtype="0" fill="hold" grpId="0" nodeType="clickEffect">
+                                <p:cTn id="17" presetID="1" presetClass="entr" presetSubtype="0" fill="hold" grpId="0" nodeType="withEffect">
                                   <p:stCondLst>
                                     <p:cond delay="0"/>
                                   </p:stCondLst>
@@ -8387,15 +8423,33 @@
                                   </p:childTnLst>
                                 </p:cTn>
                               </p:par>
+                            </p:childTnLst>
+                          </p:cTn>
+                        </p:par>
+                      </p:childTnLst>
+                    </p:cTn>
+                  </p:par>
+                  <p:par>
+                    <p:cTn id="19" fill="hold">
+                      <p:stCondLst>
+                        <p:cond delay="indefinite"/>
+                      </p:stCondLst>
+                      <p:childTnLst>
+                        <p:par>
+                          <p:cTn id="20" fill="hold">
+                            <p:stCondLst>
+                              <p:cond delay="0"/>
+                            </p:stCondLst>
+                            <p:childTnLst>
                               <p:par>
-                                <p:cTn id="19" presetID="1" presetClass="entr" presetSubtype="0" fill="hold" grpId="0" nodeType="withEffect">
+                                <p:cTn id="21" presetID="1" presetClass="entr" presetSubtype="0" fill="hold" grpId="0" nodeType="clickEffect">
                                   <p:stCondLst>
                                     <p:cond delay="0"/>
                                   </p:stCondLst>
                                   <p:childTnLst>
                                     <p:set>
                                       <p:cBhvr>
-                                        <p:cTn id="20" dur="1" fill="hold">
+                                        <p:cTn id="22" dur="1" fill="hold">
                                           <p:stCondLst>
                                             <p:cond delay="0"/>
                                           </p:stCondLst>
@@ -8418,26 +8472,8 @@
                                   </p:childTnLst>
                                 </p:cTn>
                               </p:par>
-                            </p:childTnLst>
-                          </p:cTn>
-                        </p:par>
-                      </p:childTnLst>
-                    </p:cTn>
-                  </p:par>
-                  <p:par>
-                    <p:cTn id="21" fill="hold">
-                      <p:stCondLst>
-                        <p:cond delay="indefinite"/>
-                      </p:stCondLst>
-                      <p:childTnLst>
-                        <p:par>
-                          <p:cTn id="22" fill="hold">
-                            <p:stCondLst>
-                              <p:cond delay="0"/>
-                            </p:stCondLst>
-                            <p:childTnLst>
                               <p:par>
-                                <p:cTn id="23" presetID="1" presetClass="entr" presetSubtype="0" fill="hold" grpId="0" nodeType="clickEffect">
+                                <p:cTn id="23" presetID="1" presetClass="entr" presetSubtype="0" fill="hold" grpId="0" nodeType="withEffect">
                                   <p:stCondLst>
                                     <p:cond delay="0"/>
                                   </p:stCondLst>
@@ -8600,6 +8636,55 @@
                                           <p:spTgt spid="3">
                                             <p:txEl>
                                               <p:pRg st="9" end="9"/>
+                                            </p:txEl>
+                                          </p:spTgt>
+                                        </p:tgtEl>
+                                        <p:attrNameLst>
+                                          <p:attrName>style.visibility</p:attrName>
+                                        </p:attrNameLst>
+                                      </p:cBhvr>
+                                      <p:to>
+                                        <p:strVal val="visible"/>
+                                      </p:to>
+                                    </p:set>
+                                  </p:childTnLst>
+                                </p:cTn>
+                              </p:par>
+                            </p:childTnLst>
+                          </p:cTn>
+                        </p:par>
+                      </p:childTnLst>
+                    </p:cTn>
+                  </p:par>
+                  <p:par>
+                    <p:cTn id="37" fill="hold">
+                      <p:stCondLst>
+                        <p:cond delay="indefinite"/>
+                      </p:stCondLst>
+                      <p:childTnLst>
+                        <p:par>
+                          <p:cTn id="38" fill="hold">
+                            <p:stCondLst>
+                              <p:cond delay="0"/>
+                            </p:stCondLst>
+                            <p:childTnLst>
+                              <p:par>
+                                <p:cTn id="39" presetID="1" presetClass="entr" presetSubtype="0" fill="hold" grpId="0" nodeType="clickEffect">
+                                  <p:stCondLst>
+                                    <p:cond delay="0"/>
+                                  </p:stCondLst>
+                                  <p:childTnLst>
+                                    <p:set>
+                                      <p:cBhvr>
+                                        <p:cTn id="40" dur="1" fill="hold">
+                                          <p:stCondLst>
+                                            <p:cond delay="0"/>
+                                          </p:stCondLst>
+                                        </p:cTn>
+                                        <p:tgtEl>
+                                          <p:spTgt spid="3">
+                                            <p:txEl>
+                                              <p:pRg st="10" end="10"/>
                                             </p:txEl>
                                           </p:spTgt>
                                         </p:tgtEl>
@@ -9641,7 +9726,15 @@
           <a:p>
             <a:r>
               <a:rPr lang="en-US" dirty="0" smtClean="0"/>
-              <a:t>Run image/execute commands</a:t>
+              <a:t>Run </a:t>
+            </a:r>
+            <a:r>
+              <a:rPr lang="en-US" dirty="0" smtClean="0"/>
+              <a:t>container/execute </a:t>
+            </a:r>
+            <a:r>
+              <a:rPr lang="en-US" dirty="0" smtClean="0"/>
+              <a:t>commands</a:t>
             </a:r>
             <a:endParaRPr lang="nl-BE" dirty="0"/>
           </a:p>
@@ -9796,7 +9889,7 @@
                 <a:latin typeface="Courier New" panose="02070309020205020404" pitchFamily="49" charset="0"/>
                 <a:cs typeface="Courier New" panose="02070309020205020404" pitchFamily="49" charset="0"/>
               </a:rPr>
-              <a:t>grace.img</a:t>
+              <a:t>grace.sif</a:t>
             </a:r>
             <a:endParaRPr lang="nl-BE" b="1" dirty="0">
               <a:solidFill>
@@ -9850,7 +9943,7 @@
                 <a:latin typeface="Courier New" panose="02070309020205020404" pitchFamily="49" charset="0"/>
                 <a:cs typeface="Courier New" panose="02070309020205020404" pitchFamily="49" charset="0"/>
               </a:rPr>
-              <a:t>grace.img</a:t>
+              <a:t>grace.sif</a:t>
             </a:r>
             <a:r>
               <a:rPr lang="en-US" b="1" dirty="0" smtClean="0">
@@ -9920,7 +10013,7 @@
         <p:spPr>
           <a:xfrm>
             <a:off x="693966" y="5722185"/>
-            <a:ext cx="5285421" cy="369332"/>
+            <a:ext cx="5147563" cy="369332"/>
           </a:xfrm>
           <a:prstGeom prst="rect">
             <a:avLst/>
@@ -9953,7 +10046,7 @@
                 <a:latin typeface="Courier New" panose="02070309020205020404" pitchFamily="49" charset="0"/>
                 <a:cs typeface="Courier New" panose="02070309020205020404" pitchFamily="49" charset="0"/>
               </a:rPr>
-              <a:t>grace.img</a:t>
+              <a:t>grace.sif</a:t>
             </a:r>
             <a:r>
               <a:rPr lang="en-US" b="1" dirty="0" smtClean="0">
@@ -10008,94 +10101,6 @@
           </a:p>
         </p:txBody>
       </p:sp>
-      <p:grpSp>
-        <p:nvGrpSpPr>
-          <p:cNvPr id="12" name="Group 11"/>
-          <p:cNvGrpSpPr/>
-          <p:nvPr/>
-        </p:nvGrpSpPr>
-        <p:grpSpPr>
-          <a:xfrm>
-            <a:off x="4778735" y="3518807"/>
-            <a:ext cx="2649514" cy="400110"/>
-            <a:chOff x="4778735" y="3518807"/>
-            <a:chExt cx="2649514" cy="400110"/>
-          </a:xfrm>
-        </p:grpSpPr>
-        <p:sp>
-          <p:nvSpPr>
-            <p:cNvPr id="5" name="TextBox 4"/>
-            <p:cNvSpPr txBox="1"/>
-            <p:nvPr/>
-          </p:nvSpPr>
-          <p:spPr>
-            <a:xfrm>
-              <a:off x="5151664" y="3518807"/>
-              <a:ext cx="2276585" cy="400110"/>
-            </a:xfrm>
-            <a:prstGeom prst="rect">
-              <a:avLst/>
-            </a:prstGeom>
-            <a:noFill/>
-            <a:ln>
-              <a:solidFill>
-                <a:schemeClr val="tx1"/>
-              </a:solidFill>
-            </a:ln>
-          </p:spPr>
-          <p:txBody>
-            <a:bodyPr wrap="none" rtlCol="0">
-              <a:spAutoFit/>
-            </a:bodyPr>
-            <a:lstStyle/>
-            <a:p>
-              <a:r>
-                <a:rPr lang="en-US" sz="2000" dirty="0" smtClean="0"/>
-                <a:t>Not on RHEL 6.x, 7.x</a:t>
-              </a:r>
-              <a:endParaRPr lang="nl-BE" sz="2000" dirty="0"/>
-            </a:p>
-          </p:txBody>
-        </p:sp>
-        <p:cxnSp>
-          <p:nvCxnSpPr>
-            <p:cNvPr id="10" name="Straight Arrow Connector 9"/>
-            <p:cNvCxnSpPr>
-              <a:stCxn id="5" idx="1"/>
-            </p:cNvCxnSpPr>
-            <p:nvPr/>
-          </p:nvCxnSpPr>
-          <p:spPr>
-            <a:xfrm flipH="1">
-              <a:off x="4778735" y="3718862"/>
-              <a:ext cx="372929" cy="137521"/>
-            </a:xfrm>
-            <a:prstGeom prst="straightConnector1">
-              <a:avLst/>
-            </a:prstGeom>
-            <a:ln w="12700">
-              <a:solidFill>
-                <a:schemeClr val="tx1"/>
-              </a:solidFill>
-              <a:tailEnd type="stealth" w="lg" len="lg"/>
-            </a:ln>
-          </p:spPr>
-          <p:style>
-            <a:lnRef idx="1">
-              <a:schemeClr val="accent1"/>
-            </a:lnRef>
-            <a:fillRef idx="0">
-              <a:schemeClr val="accent1"/>
-            </a:fillRef>
-            <a:effectRef idx="0">
-              <a:schemeClr val="accent1"/>
-            </a:effectRef>
-            <a:fontRef idx="minor">
-              <a:schemeClr val="tx1"/>
-            </a:fontRef>
-          </p:style>
-        </p:cxnSp>
-      </p:grpSp>
     </p:spTree>
     <p:extLst>
       <p:ext uri="{BB962C8B-B14F-4D97-AF65-F5344CB8AC3E}">
@@ -10348,7 +10353,7 @@
                             </p:stCondLst>
                             <p:childTnLst>
                               <p:par>
-                                <p:cTn id="21" presetID="1" presetClass="entr" presetSubtype="0" fill="hold" nodeType="clickEffect">
+                                <p:cTn id="21" presetID="1" presetClass="entr" presetSubtype="0" fill="hold" grpId="0" nodeType="clickEffect">
                                   <p:stCondLst>
                                     <p:cond delay="0"/>
                                   </p:stCondLst>
@@ -10356,51 +10361,6 @@
                                     <p:set>
                                       <p:cBhvr>
                                         <p:cTn id="22" dur="1" fill="hold">
-                                          <p:stCondLst>
-                                            <p:cond delay="0"/>
-                                          </p:stCondLst>
-                                        </p:cTn>
-                                        <p:tgtEl>
-                                          <p:spTgt spid="12"/>
-                                        </p:tgtEl>
-                                        <p:attrNameLst>
-                                          <p:attrName>style.visibility</p:attrName>
-                                        </p:attrNameLst>
-                                      </p:cBhvr>
-                                      <p:to>
-                                        <p:strVal val="visible"/>
-                                      </p:to>
-                                    </p:set>
-                                  </p:childTnLst>
-                                </p:cTn>
-                              </p:par>
-                            </p:childTnLst>
-                          </p:cTn>
-                        </p:par>
-                      </p:childTnLst>
-                    </p:cTn>
-                  </p:par>
-                  <p:par>
-                    <p:cTn id="23" fill="hold">
-                      <p:stCondLst>
-                        <p:cond delay="indefinite"/>
-                      </p:stCondLst>
-                      <p:childTnLst>
-                        <p:par>
-                          <p:cTn id="24" fill="hold">
-                            <p:stCondLst>
-                              <p:cond delay="0"/>
-                            </p:stCondLst>
-                            <p:childTnLst>
-                              <p:par>
-                                <p:cTn id="25" presetID="1" presetClass="entr" presetSubtype="0" fill="hold" grpId="0" nodeType="clickEffect">
-                                  <p:stCondLst>
-                                    <p:cond delay="0"/>
-                                  </p:stCondLst>
-                                  <p:childTnLst>
-                                    <p:set>
-                                      <p:cBhvr>
-                                        <p:cTn id="26" dur="1" fill="hold">
                                           <p:stCondLst>
                                             <p:cond delay="0"/>
                                           </p:stCondLst>
@@ -10424,14 +10384,14 @@
                                 </p:cTn>
                               </p:par>
                               <p:par>
-                                <p:cTn id="27" presetID="1" presetClass="entr" presetSubtype="0" fill="hold" grpId="0" nodeType="withEffect">
+                                <p:cTn id="23" presetID="1" presetClass="entr" presetSubtype="0" fill="hold" grpId="0" nodeType="withEffect">
                                   <p:stCondLst>
                                     <p:cond delay="0"/>
                                   </p:stCondLst>
                                   <p:childTnLst>
                                     <p:set>
                                       <p:cBhvr>
-                                        <p:cTn id="28" dur="1" fill="hold">
+                                        <p:cTn id="24" dur="1" fill="hold">
                                           <p:stCondLst>
                                             <p:cond delay="0"/>
                                           </p:stCondLst>
@@ -10457,26 +10417,26 @@
                     </p:cTn>
                   </p:par>
                   <p:par>
-                    <p:cTn id="29" fill="hold">
+                    <p:cTn id="25" fill="hold">
                       <p:stCondLst>
                         <p:cond delay="indefinite"/>
                       </p:stCondLst>
                       <p:childTnLst>
                         <p:par>
-                          <p:cTn id="30" fill="hold">
+                          <p:cTn id="26" fill="hold">
                             <p:stCondLst>
                               <p:cond delay="0"/>
                             </p:stCondLst>
                             <p:childTnLst>
                               <p:par>
-                                <p:cTn id="31" presetID="1" presetClass="entr" presetSubtype="0" fill="hold" grpId="0" nodeType="clickEffect">
+                                <p:cTn id="27" presetID="1" presetClass="entr" presetSubtype="0" fill="hold" grpId="0" nodeType="clickEffect">
                                   <p:stCondLst>
                                     <p:cond delay="0"/>
                                   </p:stCondLst>
                                   <p:childTnLst>
                                     <p:set>
                                       <p:cBhvr>
-                                        <p:cTn id="32" dur="1" fill="hold">
+                                        <p:cTn id="28" dur="1" fill="hold">
                                           <p:stCondLst>
                                             <p:cond delay="0"/>
                                           </p:stCondLst>
@@ -10734,14 +10694,14 @@
               <a:t>singularity exec </a:t>
             </a:r>
             <a:r>
-              <a:rPr lang="en-US" dirty="0" err="1">
-                <a:latin typeface="Courier New" panose="02070309020205020404" pitchFamily="49" charset="0"/>
-                <a:cs typeface="Courier New" panose="02070309020205020404" pitchFamily="49" charset="0"/>
-              </a:rPr>
-              <a:t>grace.img</a:t>
-            </a:r>
-            <a:r>
-              <a:rPr lang="en-US" dirty="0">
+              <a:rPr lang="en-US" dirty="0" err="1" smtClean="0">
+                <a:latin typeface="Courier New" panose="02070309020205020404" pitchFamily="49" charset="0"/>
+                <a:cs typeface="Courier New" panose="02070309020205020404" pitchFamily="49" charset="0"/>
+              </a:rPr>
+              <a:t>grace.sif</a:t>
+            </a:r>
+            <a:r>
+              <a:rPr lang="en-US" dirty="0" smtClean="0">
                 <a:latin typeface="Courier New" panose="02070309020205020404" pitchFamily="49" charset="0"/>
                 <a:cs typeface="Courier New" panose="02070309020205020404" pitchFamily="49" charset="0"/>
               </a:rPr>
@@ -11169,7 +11129,7 @@
                 <a:latin typeface="Courier New" panose="02070309020205020404" pitchFamily="49" charset="0"/>
                 <a:cs typeface="Courier New" panose="02070309020205020404" pitchFamily="49" charset="0"/>
               </a:rPr>
-              <a:t>grace.img</a:t>
+              <a:t>grace.sif</a:t>
             </a:r>
             <a:endParaRPr lang="nl-BE" b="1" dirty="0">
               <a:solidFill>
@@ -11667,94 +11627,6 @@
           </a:p>
         </p:txBody>
       </p:sp>
-      <p:grpSp>
-        <p:nvGrpSpPr>
-          <p:cNvPr id="5" name="Group 4"/>
-          <p:cNvGrpSpPr/>
-          <p:nvPr/>
-        </p:nvGrpSpPr>
-        <p:grpSpPr>
-          <a:xfrm>
-            <a:off x="4770784" y="1984206"/>
-            <a:ext cx="2649514" cy="400110"/>
-            <a:chOff x="4778735" y="3518807"/>
-            <a:chExt cx="2649514" cy="400110"/>
-          </a:xfrm>
-        </p:grpSpPr>
-        <p:sp>
-          <p:nvSpPr>
-            <p:cNvPr id="6" name="TextBox 5"/>
-            <p:cNvSpPr txBox="1"/>
-            <p:nvPr/>
-          </p:nvSpPr>
-          <p:spPr>
-            <a:xfrm>
-              <a:off x="5151664" y="3518807"/>
-              <a:ext cx="2276585" cy="400110"/>
-            </a:xfrm>
-            <a:prstGeom prst="rect">
-              <a:avLst/>
-            </a:prstGeom>
-            <a:noFill/>
-            <a:ln>
-              <a:solidFill>
-                <a:schemeClr val="tx1"/>
-              </a:solidFill>
-            </a:ln>
-          </p:spPr>
-          <p:txBody>
-            <a:bodyPr wrap="none" rtlCol="0">
-              <a:spAutoFit/>
-            </a:bodyPr>
-            <a:lstStyle/>
-            <a:p>
-              <a:r>
-                <a:rPr lang="en-US" sz="2000" dirty="0" smtClean="0"/>
-                <a:t>Not on RHEL 6.x, 7.x</a:t>
-              </a:r>
-              <a:endParaRPr lang="nl-BE" sz="2000" dirty="0"/>
-            </a:p>
-          </p:txBody>
-        </p:sp>
-        <p:cxnSp>
-          <p:nvCxnSpPr>
-            <p:cNvPr id="7" name="Straight Arrow Connector 6"/>
-            <p:cNvCxnSpPr>
-              <a:stCxn id="6" idx="1"/>
-            </p:cNvCxnSpPr>
-            <p:nvPr/>
-          </p:nvCxnSpPr>
-          <p:spPr>
-            <a:xfrm flipH="1">
-              <a:off x="4778735" y="3718862"/>
-              <a:ext cx="372929" cy="137521"/>
-            </a:xfrm>
-            <a:prstGeom prst="straightConnector1">
-              <a:avLst/>
-            </a:prstGeom>
-            <a:ln w="12700">
-              <a:solidFill>
-                <a:schemeClr val="tx1"/>
-              </a:solidFill>
-              <a:tailEnd type="stealth" w="lg" len="lg"/>
-            </a:ln>
-          </p:spPr>
-          <p:style>
-            <a:lnRef idx="1">
-              <a:schemeClr val="accent1"/>
-            </a:lnRef>
-            <a:fillRef idx="0">
-              <a:schemeClr val="accent1"/>
-            </a:fillRef>
-            <a:effectRef idx="0">
-              <a:schemeClr val="accent1"/>
-            </a:effectRef>
-            <a:fontRef idx="minor">
-              <a:schemeClr val="tx1"/>
-            </a:fontRef>
-          </p:style>
-        </p:cxnSp>
-      </p:grpSp>
     </p:spTree>
     <p:extLst>
       <p:ext uri="{BB962C8B-B14F-4D97-AF65-F5344CB8AC3E}">
@@ -11869,7 +11741,7 @@
                             </p:stCondLst>
                             <p:childTnLst>
                               <p:par>
-                                <p:cTn id="11" presetID="1" presetClass="entr" presetSubtype="0" fill="hold" nodeType="clickEffect">
+                                <p:cTn id="11" presetID="1" presetClass="entr" presetSubtype="0" fill="hold" grpId="0" nodeType="clickEffect">
                                   <p:stCondLst>
                                     <p:cond delay="0"/>
                                   </p:stCondLst>
@@ -11877,51 +11749,6 @@
                                     <p:set>
                                       <p:cBhvr>
                                         <p:cTn id="12" dur="1" fill="hold">
-                                          <p:stCondLst>
-                                            <p:cond delay="0"/>
-                                          </p:stCondLst>
-                                        </p:cTn>
-                                        <p:tgtEl>
-                                          <p:spTgt spid="5"/>
-                                        </p:tgtEl>
-                                        <p:attrNameLst>
-                                          <p:attrName>style.visibility</p:attrName>
-                                        </p:attrNameLst>
-                                      </p:cBhvr>
-                                      <p:to>
-                                        <p:strVal val="visible"/>
-                                      </p:to>
-                                    </p:set>
-                                  </p:childTnLst>
-                                </p:cTn>
-                              </p:par>
-                            </p:childTnLst>
-                          </p:cTn>
-                        </p:par>
-                      </p:childTnLst>
-                    </p:cTn>
-                  </p:par>
-                  <p:par>
-                    <p:cTn id="13" fill="hold">
-                      <p:stCondLst>
-                        <p:cond delay="indefinite"/>
-                      </p:stCondLst>
-                      <p:childTnLst>
-                        <p:par>
-                          <p:cTn id="14" fill="hold">
-                            <p:stCondLst>
-                              <p:cond delay="0"/>
-                            </p:stCondLst>
-                            <p:childTnLst>
-                              <p:par>
-                                <p:cTn id="15" presetID="1" presetClass="entr" presetSubtype="0" fill="hold" grpId="0" nodeType="clickEffect">
-                                  <p:stCondLst>
-                                    <p:cond delay="0"/>
-                                  </p:stCondLst>
-                                  <p:childTnLst>
-                                    <p:set>
-                                      <p:cBhvr>
-                                        <p:cTn id="16" dur="1" fill="hold">
                                           <p:stCondLst>
                                             <p:cond delay="0"/>
                                           </p:stCondLst>
@@ -11945,14 +11772,14 @@
                                 </p:cTn>
                               </p:par>
                               <p:par>
-                                <p:cTn id="17" presetID="1" presetClass="entr" presetSubtype="0" fill="hold" grpId="0" nodeType="withEffect">
+                                <p:cTn id="13" presetID="1" presetClass="entr" presetSubtype="0" fill="hold" grpId="0" nodeType="withEffect">
                                   <p:stCondLst>
                                     <p:cond delay="0"/>
                                   </p:stCondLst>
                                   <p:childTnLst>
                                     <p:set>
                                       <p:cBhvr>
-                                        <p:cTn id="18" dur="1" fill="hold">
+                                        <p:cTn id="14" dur="1" fill="hold">
                                           <p:stCondLst>
                                             <p:cond delay="0"/>
                                           </p:stCondLst>
@@ -11982,19 +11809,81 @@
                     </p:cTn>
                   </p:par>
                   <p:par>
-                    <p:cTn id="19" fill="hold">
+                    <p:cTn id="15" fill="hold">
                       <p:stCondLst>
                         <p:cond delay="indefinite"/>
                       </p:stCondLst>
                       <p:childTnLst>
                         <p:par>
-                          <p:cTn id="20" fill="hold">
+                          <p:cTn id="16" fill="hold">
                             <p:stCondLst>
                               <p:cond delay="0"/>
                             </p:stCondLst>
                             <p:childTnLst>
                               <p:par>
-                                <p:cTn id="21" presetID="1" presetClass="entr" presetSubtype="0" fill="hold" grpId="0" nodeType="clickEffect">
+                                <p:cTn id="17" presetID="1" presetClass="entr" presetSubtype="0" fill="hold" grpId="0" nodeType="clickEffect">
+                                  <p:stCondLst>
+                                    <p:cond delay="0"/>
+                                  </p:stCondLst>
+                                  <p:childTnLst>
+                                    <p:set>
+                                      <p:cBhvr>
+                                        <p:cTn id="18" dur="1" fill="hold">
+                                          <p:stCondLst>
+                                            <p:cond delay="0"/>
+                                          </p:stCondLst>
+                                        </p:cTn>
+                                        <p:tgtEl>
+                                          <p:spTgt spid="3">
+                                            <p:txEl>
+                                              <p:pRg st="4" end="4"/>
+                                            </p:txEl>
+                                          </p:spTgt>
+                                        </p:tgtEl>
+                                        <p:attrNameLst>
+                                          <p:attrName>style.visibility</p:attrName>
+                                        </p:attrNameLst>
+                                      </p:cBhvr>
+                                      <p:to>
+                                        <p:strVal val="visible"/>
+                                      </p:to>
+                                    </p:set>
+                                  </p:childTnLst>
+                                </p:cTn>
+                              </p:par>
+                              <p:par>
+                                <p:cTn id="19" presetID="1" presetClass="entr" presetSubtype="0" fill="hold" grpId="0" nodeType="withEffect">
+                                  <p:stCondLst>
+                                    <p:cond delay="0"/>
+                                  </p:stCondLst>
+                                  <p:childTnLst>
+                                    <p:set>
+                                      <p:cBhvr>
+                                        <p:cTn id="20" dur="1" fill="hold">
+                                          <p:stCondLst>
+                                            <p:cond delay="0"/>
+                                          </p:stCondLst>
+                                        </p:cTn>
+                                        <p:tgtEl>
+                                          <p:spTgt spid="3">
+                                            <p:txEl>
+                                              <p:pRg st="5" end="5"/>
+                                            </p:txEl>
+                                          </p:spTgt>
+                                        </p:tgtEl>
+                                        <p:attrNameLst>
+                                          <p:attrName>style.visibility</p:attrName>
+                                        </p:attrNameLst>
+                                      </p:cBhvr>
+                                      <p:to>
+                                        <p:strVal val="visible"/>
+                                      </p:to>
+                                    </p:set>
+                                  </p:childTnLst>
+                                </p:cTn>
+                              </p:par>
+                              <p:par>
+                                <p:cTn id="21" presetID="1" presetClass="entr" presetSubtype="0" fill="hold" grpId="0" nodeType="withEffect">
                                   <p:stCondLst>
                                     <p:cond delay="0"/>
                                   </p:stCondLst>
@@ -12009,7 +11898,7 @@
                                         <p:tgtEl>
                                           <p:spTgt spid="3">
                                             <p:txEl>
-                                              <p:pRg st="4" end="4"/>
+                                              <p:pRg st="6" end="6"/>
                                             </p:txEl>
                                           </p:spTgt>
                                         </p:tgtEl>
@@ -12040,7 +11929,7 @@
                                         <p:tgtEl>
                                           <p:spTgt spid="3">
                                             <p:txEl>
-                                              <p:pRg st="5" end="5"/>
+                                              <p:pRg st="7" end="7"/>
                                             </p:txEl>
                                           </p:spTgt>
                                         </p:tgtEl>
@@ -12064,68 +11953,6 @@
                                     <p:set>
                                       <p:cBhvr>
                                         <p:cTn id="26" dur="1" fill="hold">
-                                          <p:stCondLst>
-                                            <p:cond delay="0"/>
-                                          </p:stCondLst>
-                                        </p:cTn>
-                                        <p:tgtEl>
-                                          <p:spTgt spid="3">
-                                            <p:txEl>
-                                              <p:pRg st="6" end="6"/>
-                                            </p:txEl>
-                                          </p:spTgt>
-                                        </p:tgtEl>
-                                        <p:attrNameLst>
-                                          <p:attrName>style.visibility</p:attrName>
-                                        </p:attrNameLst>
-                                      </p:cBhvr>
-                                      <p:to>
-                                        <p:strVal val="visible"/>
-                                      </p:to>
-                                    </p:set>
-                                  </p:childTnLst>
-                                </p:cTn>
-                              </p:par>
-                              <p:par>
-                                <p:cTn id="27" presetID="1" presetClass="entr" presetSubtype="0" fill="hold" grpId="0" nodeType="withEffect">
-                                  <p:stCondLst>
-                                    <p:cond delay="0"/>
-                                  </p:stCondLst>
-                                  <p:childTnLst>
-                                    <p:set>
-                                      <p:cBhvr>
-                                        <p:cTn id="28" dur="1" fill="hold">
-                                          <p:stCondLst>
-                                            <p:cond delay="0"/>
-                                          </p:stCondLst>
-                                        </p:cTn>
-                                        <p:tgtEl>
-                                          <p:spTgt spid="3">
-                                            <p:txEl>
-                                              <p:pRg st="7" end="7"/>
-                                            </p:txEl>
-                                          </p:spTgt>
-                                        </p:tgtEl>
-                                        <p:attrNameLst>
-                                          <p:attrName>style.visibility</p:attrName>
-                                        </p:attrNameLst>
-                                      </p:cBhvr>
-                                      <p:to>
-                                        <p:strVal val="visible"/>
-                                      </p:to>
-                                    </p:set>
-                                  </p:childTnLst>
-                                </p:cTn>
-                              </p:par>
-                              <p:par>
-                                <p:cTn id="29" presetID="1" presetClass="entr" presetSubtype="0" fill="hold" grpId="0" nodeType="withEffect">
-                                  <p:stCondLst>
-                                    <p:cond delay="0"/>
-                                  </p:stCondLst>
-                                  <p:childTnLst>
-                                    <p:set>
-                                      <p:cBhvr>
-                                        <p:cTn id="30" dur="1" fill="hold">
                                           <p:stCondLst>
                                             <p:cond delay="0"/>
                                           </p:stCondLst>
@@ -13410,35 +13237,7 @@
                 <a:latin typeface="Courier New" panose="02070309020205020404" pitchFamily="49" charset="0"/>
                 <a:cs typeface="Courier New" panose="02070309020205020404" pitchFamily="49" charset="0"/>
               </a:rPr>
-              <a:t> </a:t>
-            </a:r>
-            <a:r>
-              <a:rPr lang="en-US" smtClean="0">
-                <a:latin typeface="Courier New" panose="02070309020205020404" pitchFamily="49" charset="0"/>
-                <a:cs typeface="Courier New" panose="02070309020205020404" pitchFamily="49" charset="0"/>
-              </a:rPr>
-              <a:t>in 1 </a:t>
-            </a:r>
-            <a:r>
-              <a:rPr lang="en-US" dirty="0" smtClean="0">
-                <a:latin typeface="Courier New" panose="02070309020205020404" pitchFamily="49" charset="0"/>
-                <a:cs typeface="Courier New" panose="02070309020205020404" pitchFamily="49" charset="0"/>
-              </a:rPr>
-              <a:t>2 4 8 16 </a:t>
-            </a:r>
-            <a:r>
-              <a:rPr lang="en-US" smtClean="0">
-                <a:latin typeface="Courier New" panose="02070309020205020404" pitchFamily="49" charset="0"/>
-                <a:cs typeface="Courier New" panose="02070309020205020404" pitchFamily="49" charset="0"/>
-              </a:rPr>
-              <a:t>24 28; </a:t>
-            </a:r>
-            <a:r>
-              <a:rPr lang="en-US" dirty="0" smtClean="0">
-                <a:latin typeface="Courier New" panose="02070309020205020404" pitchFamily="49" charset="0"/>
-                <a:cs typeface="Courier New" panose="02070309020205020404" pitchFamily="49" charset="0"/>
-              </a:rPr>
-              <a:t>do</a:t>
+              <a:t> in 1 2 4 8 16 24 28; do</a:t>
             </a:r>
           </a:p>
           <a:p>
@@ -13484,14 +13283,14 @@
               <a:t>exec </a:t>
             </a:r>
             <a:r>
-              <a:rPr lang="en-US" dirty="0" err="1">
-                <a:latin typeface="Courier New" panose="02070309020205020404" pitchFamily="49" charset="0"/>
-                <a:cs typeface="Courier New" panose="02070309020205020404" pitchFamily="49" charset="0"/>
-              </a:rPr>
-              <a:t>xenial_openmpi.img</a:t>
-            </a:r>
-            <a:r>
-              <a:rPr lang="en-US" dirty="0">
+              <a:rPr lang="en-US" dirty="0" err="1" smtClean="0">
+                <a:latin typeface="Courier New" panose="02070309020205020404" pitchFamily="49" charset="0"/>
+                <a:cs typeface="Courier New" panose="02070309020205020404" pitchFamily="49" charset="0"/>
+              </a:rPr>
+              <a:t>xenial_openmpi.sif</a:t>
+            </a:r>
+            <a:r>
+              <a:rPr lang="en-US" dirty="0" smtClean="0">
                 <a:latin typeface="Courier New" panose="02070309020205020404" pitchFamily="49" charset="0"/>
                 <a:cs typeface="Courier New" panose="02070309020205020404" pitchFamily="49" charset="0"/>
               </a:rPr>
@@ -15805,18 +15604,25 @@
               <a:t>    singularity exec </a:t>
             </a:r>
             <a:r>
-              <a:rPr lang="en-US" dirty="0" err="1">
-                <a:latin typeface="Courier New" panose="02070309020205020404" pitchFamily="49" charset="0"/>
-                <a:cs typeface="Courier New" panose="02070309020205020404" pitchFamily="49" charset="0"/>
-              </a:rPr>
-              <a:t>xenial_openmpi.img</a:t>
+              <a:rPr lang="en-US" dirty="0" err="1" smtClean="0">
+                <a:latin typeface="Courier New" panose="02070309020205020404" pitchFamily="49" charset="0"/>
+                <a:cs typeface="Courier New" panose="02070309020205020404" pitchFamily="49" charset="0"/>
+              </a:rPr>
+              <a:t>xenial_openmpi.sif</a:t>
+            </a:r>
+            <a:r>
+              <a:rPr lang="en-US" dirty="0" smtClean="0">
+                <a:latin typeface="Courier New" panose="02070309020205020404" pitchFamily="49" charset="0"/>
+                <a:cs typeface="Courier New" panose="02070309020205020404" pitchFamily="49" charset="0"/>
+              </a:rPr>
+              <a:t> </a:t>
             </a:r>
             <a:r>
               <a:rPr lang="en-US" dirty="0">
                 <a:latin typeface="Courier New" panose="02070309020205020404" pitchFamily="49" charset="0"/>
                 <a:cs typeface="Courier New" panose="02070309020205020404" pitchFamily="49" charset="0"/>
               </a:rPr>
-              <a:t> pi_mpi.exe 100000000</a:t>
+              <a:t>pi_mpi.exe 100000000</a:t>
             </a:r>
           </a:p>
         </p:txBody>
@@ -19038,7 +18844,7 @@
                 <a:latin typeface="Courier New" panose="02070309020205020404" pitchFamily="49" charset="0"/>
                 <a:cs typeface="Courier New" panose="02070309020205020404" pitchFamily="49" charset="0"/>
               </a:rPr>
-              <a:t>alpino.simg</a:t>
+              <a:t>alpino.sif</a:t>
             </a:r>
             <a:r>
               <a:rPr lang="en-US" b="1" dirty="0" smtClean="0">
@@ -19048,7 +18854,17 @@
                 <a:latin typeface="Courier New" panose="02070309020205020404" pitchFamily="49" charset="0"/>
                 <a:cs typeface="Courier New" panose="02070309020205020404" pitchFamily="49" charset="0"/>
               </a:rPr>
-              <a:t>              \</a:t>
+              <a:t>              </a:t>
+            </a:r>
+            <a:r>
+              <a:rPr lang="en-US" b="1" dirty="0" smtClean="0">
+                <a:solidFill>
+                  <a:schemeClr val="bg1"/>
+                </a:solidFill>
+                <a:latin typeface="Courier New" panose="02070309020205020404" pitchFamily="49" charset="0"/>
+                <a:cs typeface="Courier New" panose="02070309020205020404" pitchFamily="49" charset="0"/>
+              </a:rPr>
+              <a:t>\</a:t>
             </a:r>
           </a:p>
           <a:p>
@@ -24912,6 +24728,14 @@
           </a:p>
           <a:p>
             <a:pPr lvl="1"/>
+            <a:r>
+              <a:rPr lang="en-US" dirty="0" smtClean="0"/>
+              <a:t>disco: 19.04, </a:t>
+            </a:r>
+            <a:r>
+              <a:rPr lang="en-US" dirty="0" smtClean="0"/>
+              <a:t>bionic: 18.04, </a:t>
+            </a:r>
             <a:r>
               <a:rPr lang="en-US" dirty="0" err="1" smtClean="0"/>
               <a:t>xenial</a:t>

</xml_diff>

<commit_message>
Add slide on remote builds
</commit_message>
<xml_diff>
--- a/Virtualization/singularity.pptx
+++ b/Virtualization/singularity.pptx
@@ -5,7 +5,7 @@
     <p:sldMasterId id="2147483660" r:id="rId1"/>
   </p:sldMasterIdLst>
   <p:notesMasterIdLst>
-    <p:notesMasterId r:id="rId45"/>
+    <p:notesMasterId r:id="rId46"/>
   </p:notesMasterIdLst>
   <p:sldIdLst>
     <p:sldId id="256" r:id="rId2"/>
@@ -26,31 +26,32 @@
     <p:sldId id="267" r:id="rId17"/>
     <p:sldId id="293" r:id="rId18"/>
     <p:sldId id="268" r:id="rId19"/>
-    <p:sldId id="292" r:id="rId20"/>
-    <p:sldId id="275" r:id="rId21"/>
-    <p:sldId id="269" r:id="rId22"/>
-    <p:sldId id="278" r:id="rId23"/>
-    <p:sldId id="271" r:id="rId24"/>
-    <p:sldId id="289" r:id="rId25"/>
-    <p:sldId id="282" r:id="rId26"/>
-    <p:sldId id="283" r:id="rId27"/>
-    <p:sldId id="284" r:id="rId28"/>
-    <p:sldId id="279" r:id="rId29"/>
-    <p:sldId id="280" r:id="rId30"/>
-    <p:sldId id="281" r:id="rId31"/>
-    <p:sldId id="296" r:id="rId32"/>
-    <p:sldId id="297" r:id="rId33"/>
-    <p:sldId id="298" r:id="rId34"/>
-    <p:sldId id="299" r:id="rId35"/>
-    <p:sldId id="300" r:id="rId36"/>
-    <p:sldId id="285" r:id="rId37"/>
-    <p:sldId id="286" r:id="rId38"/>
-    <p:sldId id="287" r:id="rId39"/>
-    <p:sldId id="272" r:id="rId40"/>
-    <p:sldId id="276" r:id="rId41"/>
-    <p:sldId id="270" r:id="rId42"/>
-    <p:sldId id="277" r:id="rId43"/>
-    <p:sldId id="291" r:id="rId44"/>
+    <p:sldId id="302" r:id="rId20"/>
+    <p:sldId id="292" r:id="rId21"/>
+    <p:sldId id="275" r:id="rId22"/>
+    <p:sldId id="269" r:id="rId23"/>
+    <p:sldId id="278" r:id="rId24"/>
+    <p:sldId id="271" r:id="rId25"/>
+    <p:sldId id="289" r:id="rId26"/>
+    <p:sldId id="282" r:id="rId27"/>
+    <p:sldId id="283" r:id="rId28"/>
+    <p:sldId id="284" r:id="rId29"/>
+    <p:sldId id="279" r:id="rId30"/>
+    <p:sldId id="280" r:id="rId31"/>
+    <p:sldId id="281" r:id="rId32"/>
+    <p:sldId id="296" r:id="rId33"/>
+    <p:sldId id="297" r:id="rId34"/>
+    <p:sldId id="298" r:id="rId35"/>
+    <p:sldId id="299" r:id="rId36"/>
+    <p:sldId id="300" r:id="rId37"/>
+    <p:sldId id="285" r:id="rId38"/>
+    <p:sldId id="286" r:id="rId39"/>
+    <p:sldId id="287" r:id="rId40"/>
+    <p:sldId id="272" r:id="rId41"/>
+    <p:sldId id="276" r:id="rId42"/>
+    <p:sldId id="270" r:id="rId43"/>
+    <p:sldId id="277" r:id="rId44"/>
+    <p:sldId id="291" r:id="rId45"/>
   </p:sldIdLst>
   <p:sldSz cx="9144000" cy="6858000" type="screen4x3"/>
   <p:notesSz cx="6858000" cy="9144000"/>
@@ -180,6 +181,7 @@
             <p14:sldId id="267"/>
             <p14:sldId id="293"/>
             <p14:sldId id="268"/>
+            <p14:sldId id="302"/>
             <p14:sldId id="292"/>
           </p14:sldIdLst>
         </p14:section>
@@ -7471,13 +7473,7 @@
               <a:rPr lang="en-US" dirty="0" smtClean="0">
                 <a:cs typeface="Courier New" panose="02070309020205020404" pitchFamily="49" charset="0"/>
               </a:rPr>
-              <a:t>Build </a:t>
-            </a:r>
-            <a:r>
-              <a:rPr lang="en-US" dirty="0" smtClean="0">
-                <a:cs typeface="Courier New" panose="02070309020205020404" pitchFamily="49" charset="0"/>
-              </a:rPr>
-              <a:t>done with </a:t>
+              <a:t>Build done with </a:t>
             </a:r>
             <a:r>
               <a:rPr lang="en-US" dirty="0" err="1" smtClean="0">
@@ -7593,17 +7589,7 @@
                 <a:latin typeface="Courier New" panose="02070309020205020404" pitchFamily="49" charset="0"/>
                 <a:cs typeface="Courier New" panose="02070309020205020404" pitchFamily="49" charset="0"/>
               </a:rPr>
-              <a:t> </a:t>
-            </a:r>
-            <a:r>
-              <a:rPr lang="en-US" b="1" dirty="0" smtClean="0">
-                <a:solidFill>
-                  <a:schemeClr val="bg1"/>
-                </a:solidFill>
-                <a:latin typeface="Courier New" panose="02070309020205020404" pitchFamily="49" charset="0"/>
-                <a:cs typeface="Courier New" panose="02070309020205020404" pitchFamily="49" charset="0"/>
-              </a:rPr>
-              <a:t>grace.def</a:t>
+              <a:t> grace.def</a:t>
             </a:r>
             <a:endParaRPr lang="nl-BE" b="1" dirty="0">
               <a:solidFill>
@@ -9415,7 +9401,117 @@
           <a:p>
             <a:r>
               <a:rPr lang="en-US" dirty="0" smtClean="0"/>
-              <a:t>Other options</a:t>
+              <a:t>Remote builds</a:t>
+            </a:r>
+            <a:endParaRPr lang="en-US" dirty="0"/>
+          </a:p>
+        </p:txBody>
+      </p:sp>
+      <p:sp>
+        <p:nvSpPr>
+          <p:cNvPr id="3" name="Content Placeholder 2"/>
+          <p:cNvSpPr>
+            <a:spLocks noGrp="1"/>
+          </p:cNvSpPr>
+          <p:nvPr>
+            <p:ph idx="1"/>
+          </p:nvPr>
+        </p:nvSpPr>
+        <p:spPr/>
+        <p:txBody>
+          <a:bodyPr/>
+          <a:lstStyle/>
+          <a:p>
+            <a:r>
+              <a:rPr lang="en-US" dirty="0" smtClean="0"/>
+              <a:t>Requires account at Sylabs.io</a:t>
+            </a:r>
+          </a:p>
+          <a:p>
+            <a:r>
+              <a:rPr lang="en-US" dirty="0" smtClean="0"/>
+              <a:t>Build using </a:t>
+            </a:r>
+            <a:r>
+              <a:rPr lang="en-US" dirty="0"/>
+              <a:t>web </a:t>
+            </a:r>
+            <a:r>
+              <a:rPr lang="en-US" dirty="0" smtClean="0"/>
+              <a:t>browser</a:t>
+            </a:r>
+          </a:p>
+          <a:p>
+            <a:pPr lvl="1"/>
+            <a:r>
+              <a:rPr lang="en-US" dirty="0" smtClean="0">
+                <a:hlinkClick r:id="rId2"/>
+              </a:rPr>
+              <a:t>https</a:t>
+            </a:r>
+            <a:r>
+              <a:rPr lang="en-US" dirty="0">
+                <a:hlinkClick r:id="rId2"/>
+              </a:rPr>
+              <a:t>://</a:t>
+            </a:r>
+            <a:r>
+              <a:rPr lang="en-US" dirty="0" smtClean="0">
+                <a:hlinkClick r:id="rId2"/>
+              </a:rPr>
+              <a:t>cloud.sylabs.io/builder</a:t>
+            </a:r>
+            <a:r>
+              <a:rPr lang="en-US" dirty="0" smtClean="0"/>
+              <a:t> </a:t>
+            </a:r>
+          </a:p>
+          <a:p>
+            <a:pPr lvl="1"/>
+            <a:r>
+              <a:rPr lang="en-US" dirty="0" smtClean="0"/>
+              <a:t>requires Singularity definition file</a:t>
+            </a:r>
+          </a:p>
+          <a:p>
+            <a:r>
+              <a:rPr lang="en-US" dirty="0" smtClean="0"/>
+              <a:t>Build using command line</a:t>
+            </a:r>
+          </a:p>
+          <a:p>
+            <a:pPr lvl="1"/>
+            <a:r>
+              <a:rPr lang="en-US" dirty="0" smtClean="0"/>
+              <a:t>create application token at Sylabs.io, install in </a:t>
+            </a:r>
+            <a:r>
+              <a:rPr lang="en-US" dirty="0" smtClean="0">
+                <a:latin typeface="Courier New" panose="02070309020205020404" pitchFamily="49" charset="0"/>
+                <a:cs typeface="Courier New" panose="02070309020205020404" pitchFamily="49" charset="0"/>
+              </a:rPr>
+              <a:t>~/.singularity/</a:t>
+            </a:r>
+            <a:r>
+              <a:rPr lang="en-US" dirty="0" err="1" smtClean="0">
+                <a:latin typeface="Courier New" panose="02070309020205020404" pitchFamily="49" charset="0"/>
+                <a:cs typeface="Courier New" panose="02070309020205020404" pitchFamily="49" charset="0"/>
+              </a:rPr>
+              <a:t>sylabs</a:t>
+            </a:r>
+            <a:r>
+              <a:rPr lang="en-US" dirty="0" smtClean="0">
+                <a:latin typeface="Courier New" panose="02070309020205020404" pitchFamily="49" charset="0"/>
+                <a:cs typeface="Courier New" panose="02070309020205020404" pitchFamily="49" charset="0"/>
+              </a:rPr>
+              <a:t>-token</a:t>
+            </a:r>
+          </a:p>
+          <a:p>
+            <a:pPr lvl="1"/>
+            <a:r>
+              <a:rPr lang="en-US" dirty="0" smtClean="0"/>
+              <a:t>build using</a:t>
             </a:r>
             <a:endParaRPr lang="en-US" dirty="0"/>
           </a:p>
@@ -9444,34 +9540,130 @@
           </a:p>
         </p:txBody>
       </p:sp>
-      <p:pic>
-        <p:nvPicPr>
-          <p:cNvPr id="5" name="Picture 4"/>
-          <p:cNvPicPr>
-            <a:picLocks noChangeAspect="1"/>
-          </p:cNvPicPr>
+      <p:sp>
+        <p:nvSpPr>
+          <p:cNvPr id="5" name="TextBox 4"/>
+          <p:cNvSpPr txBox="1"/>
           <p:nvPr/>
-        </p:nvPicPr>
-        <p:blipFill>
-          <a:blip r:embed="rId2"/>
-          <a:stretch>
-            <a:fillRect/>
-          </a:stretch>
-        </p:blipFill>
+        </p:nvSpPr>
         <p:spPr>
           <a:xfrm>
-            <a:off x="2503998" y="1441451"/>
-            <a:ext cx="5162550" cy="4914900"/>
+            <a:off x="791937" y="5294620"/>
+            <a:ext cx="6939720" cy="369332"/>
           </a:xfrm>
           <a:prstGeom prst="rect">
             <a:avLst/>
           </a:prstGeom>
+          <a:solidFill>
+            <a:schemeClr val="tx1"/>
+          </a:solidFill>
         </p:spPr>
-      </p:pic>
+        <p:txBody>
+          <a:bodyPr wrap="none" rtlCol="0">
+            <a:spAutoFit/>
+          </a:bodyPr>
+          <a:lstStyle/>
+          <a:p>
+            <a:r>
+              <a:rPr lang="en-US" b="1" dirty="0" smtClean="0">
+                <a:solidFill>
+                  <a:schemeClr val="bg1"/>
+                </a:solidFill>
+                <a:latin typeface="Courier New" panose="02070309020205020404" pitchFamily="49" charset="0"/>
+                <a:cs typeface="Courier New" panose="02070309020205020404" pitchFamily="49" charset="0"/>
+              </a:rPr>
+              <a:t>$ </a:t>
+            </a:r>
+            <a:r>
+              <a:rPr lang="en-US" b="1" dirty="0" smtClean="0">
+                <a:solidFill>
+                  <a:schemeClr val="bg1"/>
+                </a:solidFill>
+                <a:latin typeface="Courier New" panose="02070309020205020404" pitchFamily="49" charset="0"/>
+                <a:cs typeface="Courier New" panose="02070309020205020404" pitchFamily="49" charset="0"/>
+              </a:rPr>
+              <a:t>singularity build  -remote  </a:t>
+            </a:r>
+            <a:r>
+              <a:rPr lang="en-US" b="1" dirty="0" err="1" smtClean="0">
+                <a:solidFill>
+                  <a:schemeClr val="bg1"/>
+                </a:solidFill>
+                <a:latin typeface="Courier New" panose="02070309020205020404" pitchFamily="49" charset="0"/>
+                <a:cs typeface="Courier New" panose="02070309020205020404" pitchFamily="49" charset="0"/>
+              </a:rPr>
+              <a:t>grace.sif</a:t>
+            </a:r>
+            <a:r>
+              <a:rPr lang="en-US" b="1" dirty="0" smtClean="0">
+                <a:solidFill>
+                  <a:schemeClr val="bg1"/>
+                </a:solidFill>
+                <a:latin typeface="Courier New" panose="02070309020205020404" pitchFamily="49" charset="0"/>
+                <a:cs typeface="Courier New" panose="02070309020205020404" pitchFamily="49" charset="0"/>
+              </a:rPr>
+              <a:t> grace.def</a:t>
+            </a:r>
+            <a:endParaRPr lang="nl-BE" b="1" dirty="0">
+              <a:solidFill>
+                <a:schemeClr val="bg1"/>
+              </a:solidFill>
+              <a:latin typeface="Courier New" panose="02070309020205020404" pitchFamily="49" charset="0"/>
+              <a:cs typeface="Courier New" panose="02070309020205020404" pitchFamily="49" charset="0"/>
+            </a:endParaRPr>
+          </a:p>
+        </p:txBody>
+      </p:sp>
+      <p:sp>
+        <p:nvSpPr>
+          <p:cNvPr id="6" name="TextBox 5"/>
+          <p:cNvSpPr txBox="1"/>
+          <p:nvPr/>
+        </p:nvSpPr>
+        <p:spPr>
+          <a:xfrm>
+            <a:off x="4690976" y="5901244"/>
+            <a:ext cx="2592313" cy="461665"/>
+          </a:xfrm>
+          <a:prstGeom prst="rect">
+            <a:avLst/>
+          </a:prstGeom>
+          <a:noFill/>
+          <a:ln>
+            <a:solidFill>
+              <a:schemeClr val="tx1"/>
+            </a:solidFill>
+          </a:ln>
+        </p:spPr>
+        <p:txBody>
+          <a:bodyPr wrap="none" rtlCol="0">
+            <a:spAutoFit/>
+          </a:bodyPr>
+          <a:lstStyle/>
+          <a:p>
+            <a:r>
+              <a:rPr lang="en-US" sz="2400" dirty="0" smtClean="0"/>
+              <a:t>No </a:t>
+            </a:r>
+            <a:r>
+              <a:rPr lang="en-US" sz="2400" dirty="0" err="1" smtClean="0">
+                <a:latin typeface="Courier New" panose="02070309020205020404" pitchFamily="49" charset="0"/>
+                <a:cs typeface="Courier New" panose="02070309020205020404" pitchFamily="49" charset="0"/>
+              </a:rPr>
+              <a:t>sudo</a:t>
+            </a:r>
+            <a:r>
+              <a:rPr lang="en-US" sz="2400" dirty="0" smtClean="0"/>
+              <a:t> required!</a:t>
+            </a:r>
+            <a:endParaRPr lang="en-US" sz="2400" dirty="0"/>
+          </a:p>
+        </p:txBody>
+      </p:sp>
     </p:spTree>
     <p:extLst>
       <p:ext uri="{BB962C8B-B14F-4D97-AF65-F5344CB8AC3E}">
-        <p14:creationId xmlns:p14="http://schemas.microsoft.com/office/powerpoint/2010/main" val="527262112"/>
+        <p14:creationId xmlns:p14="http://schemas.microsoft.com/office/powerpoint/2010/main" val="3531829577"/>
       </p:ext>
     </p:extLst>
   </p:cSld>
@@ -9481,9 +9673,383 @@
   <p:timing>
     <p:tnLst>
       <p:par>
-        <p:cTn id="1" dur="indefinite" restart="never" nodeType="tmRoot"/>
+        <p:cTn id="1" dur="indefinite" restart="never" nodeType="tmRoot">
+          <p:childTnLst>
+            <p:seq concurrent="1" nextAc="seek">
+              <p:cTn id="2" dur="indefinite" nodeType="mainSeq">
+                <p:childTnLst>
+                  <p:par>
+                    <p:cTn id="3" fill="hold">
+                      <p:stCondLst>
+                        <p:cond delay="indefinite"/>
+                        <p:cond evt="onBegin" delay="0">
+                          <p:tn val="2"/>
+                        </p:cond>
+                      </p:stCondLst>
+                      <p:childTnLst>
+                        <p:par>
+                          <p:cTn id="4" fill="hold">
+                            <p:stCondLst>
+                              <p:cond delay="0"/>
+                            </p:stCondLst>
+                            <p:childTnLst>
+                              <p:par>
+                                <p:cTn id="5" presetID="1" presetClass="entr" presetSubtype="0" fill="hold" grpId="0" nodeType="withEffect">
+                                  <p:stCondLst>
+                                    <p:cond delay="0"/>
+                                  </p:stCondLst>
+                                  <p:childTnLst>
+                                    <p:set>
+                                      <p:cBhvr>
+                                        <p:cTn id="6" dur="1" fill="hold">
+                                          <p:stCondLst>
+                                            <p:cond delay="0"/>
+                                          </p:stCondLst>
+                                        </p:cTn>
+                                        <p:tgtEl>
+                                          <p:spTgt spid="3">
+                                            <p:txEl>
+                                              <p:pRg st="0" end="0"/>
+                                            </p:txEl>
+                                          </p:spTgt>
+                                        </p:tgtEl>
+                                        <p:attrNameLst>
+                                          <p:attrName>style.visibility</p:attrName>
+                                        </p:attrNameLst>
+                                      </p:cBhvr>
+                                      <p:to>
+                                        <p:strVal val="visible"/>
+                                      </p:to>
+                                    </p:set>
+                                  </p:childTnLst>
+                                </p:cTn>
+                              </p:par>
+                            </p:childTnLst>
+                          </p:cTn>
+                        </p:par>
+                      </p:childTnLst>
+                    </p:cTn>
+                  </p:par>
+                  <p:par>
+                    <p:cTn id="7" fill="hold">
+                      <p:stCondLst>
+                        <p:cond delay="indefinite"/>
+                      </p:stCondLst>
+                      <p:childTnLst>
+                        <p:par>
+                          <p:cTn id="8" fill="hold">
+                            <p:stCondLst>
+                              <p:cond delay="0"/>
+                            </p:stCondLst>
+                            <p:childTnLst>
+                              <p:par>
+                                <p:cTn id="9" presetID="1" presetClass="entr" presetSubtype="0" fill="hold" grpId="0" nodeType="clickEffect">
+                                  <p:stCondLst>
+                                    <p:cond delay="0"/>
+                                  </p:stCondLst>
+                                  <p:childTnLst>
+                                    <p:set>
+                                      <p:cBhvr>
+                                        <p:cTn id="10" dur="1" fill="hold">
+                                          <p:stCondLst>
+                                            <p:cond delay="0"/>
+                                          </p:stCondLst>
+                                        </p:cTn>
+                                        <p:tgtEl>
+                                          <p:spTgt spid="3">
+                                            <p:txEl>
+                                              <p:pRg st="1" end="1"/>
+                                            </p:txEl>
+                                          </p:spTgt>
+                                        </p:tgtEl>
+                                        <p:attrNameLst>
+                                          <p:attrName>style.visibility</p:attrName>
+                                        </p:attrNameLst>
+                                      </p:cBhvr>
+                                      <p:to>
+                                        <p:strVal val="visible"/>
+                                      </p:to>
+                                    </p:set>
+                                  </p:childTnLst>
+                                </p:cTn>
+                              </p:par>
+                              <p:par>
+                                <p:cTn id="11" presetID="1" presetClass="entr" presetSubtype="0" fill="hold" grpId="0" nodeType="withEffect">
+                                  <p:stCondLst>
+                                    <p:cond delay="0"/>
+                                  </p:stCondLst>
+                                  <p:childTnLst>
+                                    <p:set>
+                                      <p:cBhvr>
+                                        <p:cTn id="12" dur="1" fill="hold">
+                                          <p:stCondLst>
+                                            <p:cond delay="0"/>
+                                          </p:stCondLst>
+                                        </p:cTn>
+                                        <p:tgtEl>
+                                          <p:spTgt spid="3">
+                                            <p:txEl>
+                                              <p:pRg st="2" end="2"/>
+                                            </p:txEl>
+                                          </p:spTgt>
+                                        </p:tgtEl>
+                                        <p:attrNameLst>
+                                          <p:attrName>style.visibility</p:attrName>
+                                        </p:attrNameLst>
+                                      </p:cBhvr>
+                                      <p:to>
+                                        <p:strVal val="visible"/>
+                                      </p:to>
+                                    </p:set>
+                                  </p:childTnLst>
+                                </p:cTn>
+                              </p:par>
+                              <p:par>
+                                <p:cTn id="13" presetID="1" presetClass="entr" presetSubtype="0" fill="hold" grpId="0" nodeType="withEffect">
+                                  <p:stCondLst>
+                                    <p:cond delay="0"/>
+                                  </p:stCondLst>
+                                  <p:childTnLst>
+                                    <p:set>
+                                      <p:cBhvr>
+                                        <p:cTn id="14" dur="1" fill="hold">
+                                          <p:stCondLst>
+                                            <p:cond delay="0"/>
+                                          </p:stCondLst>
+                                        </p:cTn>
+                                        <p:tgtEl>
+                                          <p:spTgt spid="3">
+                                            <p:txEl>
+                                              <p:pRg st="3" end="3"/>
+                                            </p:txEl>
+                                          </p:spTgt>
+                                        </p:tgtEl>
+                                        <p:attrNameLst>
+                                          <p:attrName>style.visibility</p:attrName>
+                                        </p:attrNameLst>
+                                      </p:cBhvr>
+                                      <p:to>
+                                        <p:strVal val="visible"/>
+                                      </p:to>
+                                    </p:set>
+                                  </p:childTnLst>
+                                </p:cTn>
+                              </p:par>
+                            </p:childTnLst>
+                          </p:cTn>
+                        </p:par>
+                      </p:childTnLst>
+                    </p:cTn>
+                  </p:par>
+                  <p:par>
+                    <p:cTn id="15" fill="hold">
+                      <p:stCondLst>
+                        <p:cond delay="indefinite"/>
+                      </p:stCondLst>
+                      <p:childTnLst>
+                        <p:par>
+                          <p:cTn id="16" fill="hold">
+                            <p:stCondLst>
+                              <p:cond delay="0"/>
+                            </p:stCondLst>
+                            <p:childTnLst>
+                              <p:par>
+                                <p:cTn id="17" presetID="1" presetClass="entr" presetSubtype="0" fill="hold" grpId="0" nodeType="clickEffect">
+                                  <p:stCondLst>
+                                    <p:cond delay="0"/>
+                                  </p:stCondLst>
+                                  <p:childTnLst>
+                                    <p:set>
+                                      <p:cBhvr>
+                                        <p:cTn id="18" dur="1" fill="hold">
+                                          <p:stCondLst>
+                                            <p:cond delay="0"/>
+                                          </p:stCondLst>
+                                        </p:cTn>
+                                        <p:tgtEl>
+                                          <p:spTgt spid="3">
+                                            <p:txEl>
+                                              <p:pRg st="4" end="4"/>
+                                            </p:txEl>
+                                          </p:spTgt>
+                                        </p:tgtEl>
+                                        <p:attrNameLst>
+                                          <p:attrName>style.visibility</p:attrName>
+                                        </p:attrNameLst>
+                                      </p:cBhvr>
+                                      <p:to>
+                                        <p:strVal val="visible"/>
+                                      </p:to>
+                                    </p:set>
+                                  </p:childTnLst>
+                                </p:cTn>
+                              </p:par>
+                              <p:par>
+                                <p:cTn id="19" presetID="1" presetClass="entr" presetSubtype="0" fill="hold" grpId="0" nodeType="withEffect">
+                                  <p:stCondLst>
+                                    <p:cond delay="0"/>
+                                  </p:stCondLst>
+                                  <p:childTnLst>
+                                    <p:set>
+                                      <p:cBhvr>
+                                        <p:cTn id="20" dur="1" fill="hold">
+                                          <p:stCondLst>
+                                            <p:cond delay="0"/>
+                                          </p:stCondLst>
+                                        </p:cTn>
+                                        <p:tgtEl>
+                                          <p:spTgt spid="3">
+                                            <p:txEl>
+                                              <p:pRg st="5" end="5"/>
+                                            </p:txEl>
+                                          </p:spTgt>
+                                        </p:tgtEl>
+                                        <p:attrNameLst>
+                                          <p:attrName>style.visibility</p:attrName>
+                                        </p:attrNameLst>
+                                      </p:cBhvr>
+                                      <p:to>
+                                        <p:strVal val="visible"/>
+                                      </p:to>
+                                    </p:set>
+                                  </p:childTnLst>
+                                </p:cTn>
+                              </p:par>
+                              <p:par>
+                                <p:cTn id="21" presetID="1" presetClass="entr" presetSubtype="0" fill="hold" grpId="0" nodeType="withEffect">
+                                  <p:stCondLst>
+                                    <p:cond delay="0"/>
+                                  </p:stCondLst>
+                                  <p:childTnLst>
+                                    <p:set>
+                                      <p:cBhvr>
+                                        <p:cTn id="22" dur="1" fill="hold">
+                                          <p:stCondLst>
+                                            <p:cond delay="0"/>
+                                          </p:stCondLst>
+                                        </p:cTn>
+                                        <p:tgtEl>
+                                          <p:spTgt spid="3">
+                                            <p:txEl>
+                                              <p:pRg st="6" end="6"/>
+                                            </p:txEl>
+                                          </p:spTgt>
+                                        </p:tgtEl>
+                                        <p:attrNameLst>
+                                          <p:attrName>style.visibility</p:attrName>
+                                        </p:attrNameLst>
+                                      </p:cBhvr>
+                                      <p:to>
+                                        <p:strVal val="visible"/>
+                                      </p:to>
+                                    </p:set>
+                                  </p:childTnLst>
+                                </p:cTn>
+                              </p:par>
+                              <p:par>
+                                <p:cTn id="23" presetID="1" presetClass="entr" presetSubtype="0" fill="hold" grpId="0" nodeType="withEffect">
+                                  <p:stCondLst>
+                                    <p:cond delay="0"/>
+                                  </p:stCondLst>
+                                  <p:childTnLst>
+                                    <p:set>
+                                      <p:cBhvr>
+                                        <p:cTn id="24" dur="1" fill="hold">
+                                          <p:stCondLst>
+                                            <p:cond delay="0"/>
+                                          </p:stCondLst>
+                                        </p:cTn>
+                                        <p:tgtEl>
+                                          <p:spTgt spid="5"/>
+                                        </p:tgtEl>
+                                        <p:attrNameLst>
+                                          <p:attrName>style.visibility</p:attrName>
+                                        </p:attrNameLst>
+                                      </p:cBhvr>
+                                      <p:to>
+                                        <p:strVal val="visible"/>
+                                      </p:to>
+                                    </p:set>
+                                  </p:childTnLst>
+                                </p:cTn>
+                              </p:par>
+                            </p:childTnLst>
+                          </p:cTn>
+                        </p:par>
+                      </p:childTnLst>
+                    </p:cTn>
+                  </p:par>
+                  <p:par>
+                    <p:cTn id="25" fill="hold">
+                      <p:stCondLst>
+                        <p:cond delay="indefinite"/>
+                      </p:stCondLst>
+                      <p:childTnLst>
+                        <p:par>
+                          <p:cTn id="26" fill="hold">
+                            <p:stCondLst>
+                              <p:cond delay="0"/>
+                            </p:stCondLst>
+                            <p:childTnLst>
+                              <p:par>
+                                <p:cTn id="27" presetID="1" presetClass="entr" presetSubtype="0" fill="hold" grpId="0" nodeType="clickEffect">
+                                  <p:stCondLst>
+                                    <p:cond delay="0"/>
+                                  </p:stCondLst>
+                                  <p:childTnLst>
+                                    <p:set>
+                                      <p:cBhvr>
+                                        <p:cTn id="28" dur="1" fill="hold">
+                                          <p:stCondLst>
+                                            <p:cond delay="0"/>
+                                          </p:stCondLst>
+                                        </p:cTn>
+                                        <p:tgtEl>
+                                          <p:spTgt spid="6"/>
+                                        </p:tgtEl>
+                                        <p:attrNameLst>
+                                          <p:attrName>style.visibility</p:attrName>
+                                        </p:attrNameLst>
+                                      </p:cBhvr>
+                                      <p:to>
+                                        <p:strVal val="visible"/>
+                                      </p:to>
+                                    </p:set>
+                                  </p:childTnLst>
+                                </p:cTn>
+                              </p:par>
+                            </p:childTnLst>
+                          </p:cTn>
+                        </p:par>
+                      </p:childTnLst>
+                    </p:cTn>
+                  </p:par>
+                </p:childTnLst>
+              </p:cTn>
+              <p:prevCondLst>
+                <p:cond evt="onPrev" delay="0">
+                  <p:tgtEl>
+                    <p:sldTgt/>
+                  </p:tgtEl>
+                </p:cond>
+              </p:prevCondLst>
+              <p:nextCondLst>
+                <p:cond evt="onNext" delay="0">
+                  <p:tgtEl>
+                    <p:sldTgt/>
+                  </p:tgtEl>
+                </p:cond>
+              </p:nextCondLst>
+            </p:seq>
+          </p:childTnLst>
+        </p:cTn>
       </p:par>
     </p:tnLst>
+    <p:bldLst>
+      <p:bldP spid="3" grpId="0" uiExpand="1" build="p"/>
+      <p:bldP spid="5" grpId="0" animBg="1"/>
+      <p:bldP spid="6" grpId="0" animBg="1"/>
+    </p:bldLst>
   </p:timing>
 </p:sld>
 </file>
@@ -9624,28 +10190,9 @@
           <a:p>
             <a:r>
               <a:rPr lang="en-US" dirty="0" smtClean="0"/>
-              <a:t>Using images</a:t>
-            </a:r>
-            <a:endParaRPr lang="nl-BE" dirty="0"/>
-          </a:p>
-        </p:txBody>
-      </p:sp>
-      <p:sp>
-        <p:nvSpPr>
-          <p:cNvPr id="3" name="Text Placeholder 2"/>
-          <p:cNvSpPr>
-            <a:spLocks noGrp="1"/>
-          </p:cNvSpPr>
-          <p:nvPr>
-            <p:ph type="body" idx="1"/>
-          </p:nvPr>
-        </p:nvSpPr>
-        <p:spPr/>
-        <p:txBody>
-          <a:bodyPr/>
-          <a:lstStyle/>
-          <a:p>
-            <a:endParaRPr lang="nl-BE"/>
+              <a:t>Other options</a:t>
+            </a:r>
+            <a:endParaRPr lang="en-US" dirty="0"/>
           </a:p>
         </p:txBody>
       </p:sp>
@@ -9672,10 +10219,34 @@
           </a:p>
         </p:txBody>
       </p:sp>
+      <p:pic>
+        <p:nvPicPr>
+          <p:cNvPr id="5" name="Picture 4"/>
+          <p:cNvPicPr>
+            <a:picLocks noChangeAspect="1"/>
+          </p:cNvPicPr>
+          <p:nvPr/>
+        </p:nvPicPr>
+        <p:blipFill>
+          <a:blip r:embed="rId2"/>
+          <a:stretch>
+            <a:fillRect/>
+          </a:stretch>
+        </p:blipFill>
+        <p:spPr>
+          <a:xfrm>
+            <a:off x="2503998" y="1441451"/>
+            <a:ext cx="5162550" cy="4914900"/>
+          </a:xfrm>
+          <a:prstGeom prst="rect">
+            <a:avLst/>
+          </a:prstGeom>
+        </p:spPr>
+      </p:pic>
     </p:spTree>
     <p:extLst>
       <p:ext uri="{BB962C8B-B14F-4D97-AF65-F5344CB8AC3E}">
-        <p14:creationId xmlns:p14="http://schemas.microsoft.com/office/powerpoint/2010/main" val="276782416"/>
+        <p14:creationId xmlns:p14="http://schemas.microsoft.com/office/powerpoint/2010/main" val="527262112"/>
       </p:ext>
     </p:extLst>
   </p:cSld>
@@ -9726,15 +10297,109 @@
           <a:p>
             <a:r>
               <a:rPr lang="en-US" dirty="0" smtClean="0"/>
-              <a:t>Run </a:t>
-            </a:r>
+              <a:t>Using images</a:t>
+            </a:r>
+            <a:endParaRPr lang="nl-BE" dirty="0"/>
+          </a:p>
+        </p:txBody>
+      </p:sp>
+      <p:sp>
+        <p:nvSpPr>
+          <p:cNvPr id="3" name="Text Placeholder 2"/>
+          <p:cNvSpPr>
+            <a:spLocks noGrp="1"/>
+          </p:cNvSpPr>
+          <p:nvPr>
+            <p:ph type="body" idx="1"/>
+          </p:nvPr>
+        </p:nvSpPr>
+        <p:spPr/>
+        <p:txBody>
+          <a:bodyPr/>
+          <a:lstStyle/>
+          <a:p>
+            <a:endParaRPr lang="nl-BE"/>
+          </a:p>
+        </p:txBody>
+      </p:sp>
+      <p:sp>
+        <p:nvSpPr>
+          <p:cNvPr id="4" name="Slide Number Placeholder 3"/>
+          <p:cNvSpPr>
+            <a:spLocks noGrp="1"/>
+          </p:cNvSpPr>
+          <p:nvPr>
+            <p:ph type="sldNum" sz="quarter" idx="12"/>
+          </p:nvPr>
+        </p:nvSpPr>
+        <p:spPr/>
+        <p:txBody>
+          <a:bodyPr/>
+          <a:lstStyle/>
+          <a:p>
+            <a:fld id="{AEFF399F-E3B5-4890-BC79-9BC8D4DF3F2D}" type="slidenum">
+              <a:rPr lang="nl-BE" smtClean="0"/>
+              <a:t>21</a:t>
+            </a:fld>
+            <a:endParaRPr lang="nl-BE"/>
+          </a:p>
+        </p:txBody>
+      </p:sp>
+    </p:spTree>
+    <p:extLst>
+      <p:ext uri="{BB962C8B-B14F-4D97-AF65-F5344CB8AC3E}">
+        <p14:creationId xmlns:p14="http://schemas.microsoft.com/office/powerpoint/2010/main" val="276782416"/>
+      </p:ext>
+    </p:extLst>
+  </p:cSld>
+  <p:clrMapOvr>
+    <a:masterClrMapping/>
+  </p:clrMapOvr>
+  <p:timing>
+    <p:tnLst>
+      <p:par>
+        <p:cTn id="1" dur="indefinite" restart="never" nodeType="tmRoot"/>
+      </p:par>
+    </p:tnLst>
+  </p:timing>
+</p:sld>
+</file>
+
+<file path=ppt/slides/slide22.xml><?xml version="1.0" encoding="utf-8"?>
+<p:sld xmlns:a="http://schemas.openxmlformats.org/drawingml/2006/main" xmlns:r="http://schemas.openxmlformats.org/officeDocument/2006/relationships" xmlns:p="http://schemas.openxmlformats.org/presentationml/2006/main">
+  <p:cSld>
+    <p:spTree>
+      <p:nvGrpSpPr>
+        <p:cNvPr id="1" name=""/>
+        <p:cNvGrpSpPr/>
+        <p:nvPr/>
+      </p:nvGrpSpPr>
+      <p:grpSpPr>
+        <a:xfrm>
+          <a:off x="0" y="0"/>
+          <a:ext cx="0" cy="0"/>
+          <a:chOff x="0" y="0"/>
+          <a:chExt cx="0" cy="0"/>
+        </a:xfrm>
+      </p:grpSpPr>
+      <p:sp>
+        <p:nvSpPr>
+          <p:cNvPr id="2" name="Title 1"/>
+          <p:cNvSpPr>
+            <a:spLocks noGrp="1"/>
+          </p:cNvSpPr>
+          <p:nvPr>
+            <p:ph type="title"/>
+          </p:nvPr>
+        </p:nvSpPr>
+        <p:spPr/>
+        <p:txBody>
+          <a:bodyPr/>
+          <a:lstStyle/>
+          <a:p>
             <a:r>
               <a:rPr lang="en-US" dirty="0" smtClean="0"/>
-              <a:t>container/execute </a:t>
-            </a:r>
-            <a:r>
-              <a:rPr lang="en-US" dirty="0" smtClean="0"/>
-              <a:t>commands</a:t>
+              <a:t>Run container/execute commands</a:t>
             </a:r>
             <a:endParaRPr lang="nl-BE" dirty="0"/>
           </a:p>
@@ -10095,7 +10760,7 @@
           <a:p>
             <a:fld id="{AEFF399F-E3B5-4890-BC79-9BC8D4DF3F2D}" type="slidenum">
               <a:rPr lang="nl-BE" smtClean="0"/>
-              <a:t>21</a:t>
+              <a:t>22</a:t>
             </a:fld>
             <a:endParaRPr lang="nl-BE"/>
           </a:p>
@@ -10492,7 +11157,7 @@
 </p:sld>
 </file>
 
-<file path=ppt/slides/slide22.xml><?xml version="1.0" encoding="utf-8"?>
+<file path=ppt/slides/slide23.xml><?xml version="1.0" encoding="utf-8"?>
 <p:sld xmlns:a="http://schemas.openxmlformats.org/drawingml/2006/main" xmlns:r="http://schemas.openxmlformats.org/officeDocument/2006/relationships" xmlns:p="http://schemas.openxmlformats.org/presentationml/2006/main">
   <p:cSld>
     <p:spTree>
@@ -10593,7 +11258,7 @@
           <a:p>
             <a:fld id="{AEFF399F-E3B5-4890-BC79-9BC8D4DF3F2D}" type="slidenum">
               <a:rPr lang="nl-BE" smtClean="0"/>
-              <a:t>22</a:t>
+              <a:t>23</a:t>
             </a:fld>
             <a:endParaRPr lang="nl-BE"/>
           </a:p>
@@ -10937,7 +11602,7 @@
 </p:sld>
 </file>
 
-<file path=ppt/slides/slide23.xml><?xml version="1.0" encoding="utf-8"?>
+<file path=ppt/slides/slide24.xml><?xml version="1.0" encoding="utf-8"?>
 <p:sld xmlns:a="http://schemas.openxmlformats.org/drawingml/2006/main" xmlns:r="http://schemas.openxmlformats.org/officeDocument/2006/relationships" xmlns:p="http://schemas.openxmlformats.org/presentationml/2006/main">
   <p:cSld>
     <p:spTree>
@@ -11158,7 +11823,7 @@
           <a:p>
             <a:fld id="{AEFF399F-E3B5-4890-BC79-9BC8D4DF3F2D}" type="slidenum">
               <a:rPr lang="nl-BE" smtClean="0"/>
-              <a:t>23</a:t>
+              <a:t>24</a:t>
             </a:fld>
             <a:endParaRPr lang="nl-BE"/>
           </a:p>
@@ -11419,7 +12084,7 @@
 </p:sld>
 </file>
 
-<file path=ppt/slides/slide24.xml><?xml version="1.0" encoding="utf-8"?>
+<file path=ppt/slides/slide25.xml><?xml version="1.0" encoding="utf-8"?>
 <p:sld xmlns:a="http://schemas.openxmlformats.org/drawingml/2006/main" xmlns:r="http://schemas.openxmlformats.org/officeDocument/2006/relationships" xmlns:p="http://schemas.openxmlformats.org/presentationml/2006/main">
   <p:cSld>
     <p:spTree>
@@ -11621,7 +12286,7 @@
           <a:p>
             <a:fld id="{AEFF399F-E3B5-4890-BC79-9BC8D4DF3F2D}" type="slidenum">
               <a:rPr lang="nl-BE" smtClean="0"/>
-              <a:t>24</a:t>
+              <a:t>25</a:t>
             </a:fld>
             <a:endParaRPr lang="nl-BE"/>
           </a:p>
@@ -12009,108 +12674,6 @@
 </p:sld>
 </file>
 
-<file path=ppt/slides/slide25.xml><?xml version="1.0" encoding="utf-8"?>
-<p:sld xmlns:a="http://schemas.openxmlformats.org/drawingml/2006/main" xmlns:r="http://schemas.openxmlformats.org/officeDocument/2006/relationships" xmlns:p="http://schemas.openxmlformats.org/presentationml/2006/main">
-  <p:cSld>
-    <p:spTree>
-      <p:nvGrpSpPr>
-        <p:cNvPr id="1" name=""/>
-        <p:cNvGrpSpPr/>
-        <p:nvPr/>
-      </p:nvGrpSpPr>
-      <p:grpSpPr>
-        <a:xfrm>
-          <a:off x="0" y="0"/>
-          <a:ext cx="0" cy="0"/>
-          <a:chOff x="0" y="0"/>
-          <a:chExt cx="0" cy="0"/>
-        </a:xfrm>
-      </p:grpSpPr>
-      <p:sp>
-        <p:nvSpPr>
-          <p:cNvPr id="2" name="Title 1"/>
-          <p:cNvSpPr>
-            <a:spLocks noGrp="1"/>
-          </p:cNvSpPr>
-          <p:nvPr>
-            <p:ph type="title"/>
-          </p:nvPr>
-        </p:nvSpPr>
-        <p:spPr/>
-        <p:txBody>
-          <a:bodyPr/>
-          <a:lstStyle/>
-          <a:p>
-            <a:r>
-              <a:rPr lang="en-US" dirty="0" smtClean="0"/>
-              <a:t>Multithreaded applications</a:t>
-            </a:r>
-            <a:endParaRPr lang="nl-BE" dirty="0"/>
-          </a:p>
-        </p:txBody>
-      </p:sp>
-      <p:sp>
-        <p:nvSpPr>
-          <p:cNvPr id="3" name="Text Placeholder 2"/>
-          <p:cNvSpPr>
-            <a:spLocks noGrp="1"/>
-          </p:cNvSpPr>
-          <p:nvPr>
-            <p:ph type="body" idx="1"/>
-          </p:nvPr>
-        </p:nvSpPr>
-        <p:spPr/>
-        <p:txBody>
-          <a:bodyPr/>
-          <a:lstStyle/>
-          <a:p>
-            <a:endParaRPr lang="nl-BE"/>
-          </a:p>
-        </p:txBody>
-      </p:sp>
-      <p:sp>
-        <p:nvSpPr>
-          <p:cNvPr id="4" name="Slide Number Placeholder 3"/>
-          <p:cNvSpPr>
-            <a:spLocks noGrp="1"/>
-          </p:cNvSpPr>
-          <p:nvPr>
-            <p:ph type="sldNum" sz="quarter" idx="12"/>
-          </p:nvPr>
-        </p:nvSpPr>
-        <p:spPr/>
-        <p:txBody>
-          <a:bodyPr/>
-          <a:lstStyle/>
-          <a:p>
-            <a:fld id="{AEFF399F-E3B5-4890-BC79-9BC8D4DF3F2D}" type="slidenum">
-              <a:rPr lang="nl-BE" smtClean="0"/>
-              <a:t>25</a:t>
-            </a:fld>
-            <a:endParaRPr lang="nl-BE"/>
-          </a:p>
-        </p:txBody>
-      </p:sp>
-    </p:spTree>
-    <p:extLst>
-      <p:ext uri="{BB962C8B-B14F-4D97-AF65-F5344CB8AC3E}">
-        <p14:creationId xmlns:p14="http://schemas.microsoft.com/office/powerpoint/2010/main" val="2233734622"/>
-      </p:ext>
-    </p:extLst>
-  </p:cSld>
-  <p:clrMapOvr>
-    <a:masterClrMapping/>
-  </p:clrMapOvr>
-  <p:timing>
-    <p:tnLst>
-      <p:par>
-        <p:cTn id="1" dur="indefinite" restart="never" nodeType="tmRoot"/>
-      </p:par>
-    </p:tnLst>
-  </p:timing>
-</p:sld>
-</file>
-
 <file path=ppt/slides/slide26.xml><?xml version="1.0" encoding="utf-8"?>
 <p:sld xmlns:a="http://schemas.openxmlformats.org/drawingml/2006/main" xmlns:r="http://schemas.openxmlformats.org/officeDocument/2006/relationships" xmlns:p="http://schemas.openxmlformats.org/presentationml/2006/main">
   <p:cSld>
@@ -12145,9 +12708,28 @@
           <a:p>
             <a:r>
               <a:rPr lang="en-US" dirty="0" smtClean="0"/>
-              <a:t>Example recipe file</a:t>
+              <a:t>Multithreaded applications</a:t>
             </a:r>
             <a:endParaRPr lang="nl-BE" dirty="0"/>
+          </a:p>
+        </p:txBody>
+      </p:sp>
+      <p:sp>
+        <p:nvSpPr>
+          <p:cNvPr id="3" name="Text Placeholder 2"/>
+          <p:cNvSpPr>
+            <a:spLocks noGrp="1"/>
+          </p:cNvSpPr>
+          <p:nvPr>
+            <p:ph type="body" idx="1"/>
+          </p:nvPr>
+        </p:nvSpPr>
+        <p:spPr/>
+        <p:txBody>
+          <a:bodyPr/>
+          <a:lstStyle/>
+          <a:p>
+            <a:endParaRPr lang="nl-BE"/>
           </a:p>
         </p:txBody>
       </p:sp>
@@ -12169,6 +12751,89 @@
             <a:fld id="{AEFF399F-E3B5-4890-BC79-9BC8D4DF3F2D}" type="slidenum">
               <a:rPr lang="nl-BE" smtClean="0"/>
               <a:t>26</a:t>
+            </a:fld>
+            <a:endParaRPr lang="nl-BE"/>
+          </a:p>
+        </p:txBody>
+      </p:sp>
+    </p:spTree>
+    <p:extLst>
+      <p:ext uri="{BB962C8B-B14F-4D97-AF65-F5344CB8AC3E}">
+        <p14:creationId xmlns:p14="http://schemas.microsoft.com/office/powerpoint/2010/main" val="2233734622"/>
+      </p:ext>
+    </p:extLst>
+  </p:cSld>
+  <p:clrMapOvr>
+    <a:masterClrMapping/>
+  </p:clrMapOvr>
+  <p:timing>
+    <p:tnLst>
+      <p:par>
+        <p:cTn id="1" dur="indefinite" restart="never" nodeType="tmRoot"/>
+      </p:par>
+    </p:tnLst>
+  </p:timing>
+</p:sld>
+</file>
+
+<file path=ppt/slides/slide27.xml><?xml version="1.0" encoding="utf-8"?>
+<p:sld xmlns:a="http://schemas.openxmlformats.org/drawingml/2006/main" xmlns:r="http://schemas.openxmlformats.org/officeDocument/2006/relationships" xmlns:p="http://schemas.openxmlformats.org/presentationml/2006/main">
+  <p:cSld>
+    <p:spTree>
+      <p:nvGrpSpPr>
+        <p:cNvPr id="1" name=""/>
+        <p:cNvGrpSpPr/>
+        <p:nvPr/>
+      </p:nvGrpSpPr>
+      <p:grpSpPr>
+        <a:xfrm>
+          <a:off x="0" y="0"/>
+          <a:ext cx="0" cy="0"/>
+          <a:chOff x="0" y="0"/>
+          <a:chExt cx="0" cy="0"/>
+        </a:xfrm>
+      </p:grpSpPr>
+      <p:sp>
+        <p:nvSpPr>
+          <p:cNvPr id="2" name="Title 1"/>
+          <p:cNvSpPr>
+            <a:spLocks noGrp="1"/>
+          </p:cNvSpPr>
+          <p:nvPr>
+            <p:ph type="title"/>
+          </p:nvPr>
+        </p:nvSpPr>
+        <p:spPr/>
+        <p:txBody>
+          <a:bodyPr/>
+          <a:lstStyle/>
+          <a:p>
+            <a:r>
+              <a:rPr lang="en-US" dirty="0" smtClean="0"/>
+              <a:t>Example recipe file</a:t>
+            </a:r>
+            <a:endParaRPr lang="nl-BE" dirty="0"/>
+          </a:p>
+        </p:txBody>
+      </p:sp>
+      <p:sp>
+        <p:nvSpPr>
+          <p:cNvPr id="4" name="Slide Number Placeholder 3"/>
+          <p:cNvSpPr>
+            <a:spLocks noGrp="1"/>
+          </p:cNvSpPr>
+          <p:nvPr>
+            <p:ph type="sldNum" sz="quarter" idx="12"/>
+          </p:nvPr>
+        </p:nvSpPr>
+        <p:spPr/>
+        <p:txBody>
+          <a:bodyPr/>
+          <a:lstStyle/>
+          <a:p>
+            <a:fld id="{AEFF399F-E3B5-4890-BC79-9BC8D4DF3F2D}" type="slidenum">
+              <a:rPr lang="nl-BE" smtClean="0"/>
+              <a:t>27</a:t>
             </a:fld>
             <a:endParaRPr lang="nl-BE"/>
           </a:p>
@@ -13005,7 +13670,7 @@
 </p:sld>
 </file>
 
-<file path=ppt/slides/slide27.xml><?xml version="1.0" encoding="utf-8"?>
+<file path=ppt/slides/slide28.xml><?xml version="1.0" encoding="utf-8"?>
 <p:sld xmlns:a="http://schemas.openxmlformats.org/drawingml/2006/main" xmlns:r="http://schemas.openxmlformats.org/officeDocument/2006/relationships" xmlns:p="http://schemas.openxmlformats.org/presentationml/2006/main">
   <p:cSld>
     <p:spTree>
@@ -13093,7 +13758,7 @@
           <a:p>
             <a:fld id="{AEFF399F-E3B5-4890-BC79-9BC8D4DF3F2D}" type="slidenum">
               <a:rPr lang="nl-BE" smtClean="0"/>
-              <a:t>27</a:t>
+              <a:t>28</a:t>
             </a:fld>
             <a:endParaRPr lang="nl-BE"/>
           </a:p>
@@ -13294,14 +13959,7 @@
                 <a:latin typeface="Courier New" panose="02070309020205020404" pitchFamily="49" charset="0"/>
                 <a:cs typeface="Courier New" panose="02070309020205020404" pitchFamily="49" charset="0"/>
               </a:rPr>
-              <a:t> </a:t>
-            </a:r>
-            <a:r>
-              <a:rPr lang="en-US" dirty="0" smtClean="0">
-                <a:latin typeface="Courier New" panose="02070309020205020404" pitchFamily="49" charset="0"/>
-                <a:cs typeface="Courier New" panose="02070309020205020404" pitchFamily="49" charset="0"/>
-              </a:rPr>
-              <a:t>\</a:t>
+              <a:t> \</a:t>
             </a:r>
           </a:p>
           <a:p>
@@ -13461,108 +14119,6 @@
 </p:sld>
 </file>
 
-<file path=ppt/slides/slide28.xml><?xml version="1.0" encoding="utf-8"?>
-<p:sld xmlns:a="http://schemas.openxmlformats.org/drawingml/2006/main" xmlns:r="http://schemas.openxmlformats.org/officeDocument/2006/relationships" xmlns:p="http://schemas.openxmlformats.org/presentationml/2006/main">
-  <p:cSld>
-    <p:spTree>
-      <p:nvGrpSpPr>
-        <p:cNvPr id="1" name=""/>
-        <p:cNvGrpSpPr/>
-        <p:nvPr/>
-      </p:nvGrpSpPr>
-      <p:grpSpPr>
-        <a:xfrm>
-          <a:off x="0" y="0"/>
-          <a:ext cx="0" cy="0"/>
-          <a:chOff x="0" y="0"/>
-          <a:chExt cx="0" cy="0"/>
-        </a:xfrm>
-      </p:grpSpPr>
-      <p:sp>
-        <p:nvSpPr>
-          <p:cNvPr id="2" name="Title 1"/>
-          <p:cNvSpPr>
-            <a:spLocks noGrp="1"/>
-          </p:cNvSpPr>
-          <p:nvPr>
-            <p:ph type="title"/>
-          </p:nvPr>
-        </p:nvSpPr>
-        <p:spPr/>
-        <p:txBody>
-          <a:bodyPr/>
-          <a:lstStyle/>
-          <a:p>
-            <a:r>
-              <a:rPr lang="en-US" dirty="0" smtClean="0"/>
-              <a:t>Distributed applications</a:t>
-            </a:r>
-            <a:endParaRPr lang="nl-BE" dirty="0"/>
-          </a:p>
-        </p:txBody>
-      </p:sp>
-      <p:sp>
-        <p:nvSpPr>
-          <p:cNvPr id="3" name="Text Placeholder 2"/>
-          <p:cNvSpPr>
-            <a:spLocks noGrp="1"/>
-          </p:cNvSpPr>
-          <p:nvPr>
-            <p:ph type="body" idx="1"/>
-          </p:nvPr>
-        </p:nvSpPr>
-        <p:spPr/>
-        <p:txBody>
-          <a:bodyPr/>
-          <a:lstStyle/>
-          <a:p>
-            <a:endParaRPr lang="nl-BE"/>
-          </a:p>
-        </p:txBody>
-      </p:sp>
-      <p:sp>
-        <p:nvSpPr>
-          <p:cNvPr id="4" name="Slide Number Placeholder 3"/>
-          <p:cNvSpPr>
-            <a:spLocks noGrp="1"/>
-          </p:cNvSpPr>
-          <p:nvPr>
-            <p:ph type="sldNum" sz="quarter" idx="12"/>
-          </p:nvPr>
-        </p:nvSpPr>
-        <p:spPr/>
-        <p:txBody>
-          <a:bodyPr/>
-          <a:lstStyle/>
-          <a:p>
-            <a:fld id="{AEFF399F-E3B5-4890-BC79-9BC8D4DF3F2D}" type="slidenum">
-              <a:rPr lang="nl-BE" smtClean="0"/>
-              <a:t>28</a:t>
-            </a:fld>
-            <a:endParaRPr lang="nl-BE"/>
-          </a:p>
-        </p:txBody>
-      </p:sp>
-    </p:spTree>
-    <p:extLst>
-      <p:ext uri="{BB962C8B-B14F-4D97-AF65-F5344CB8AC3E}">
-        <p14:creationId xmlns:p14="http://schemas.microsoft.com/office/powerpoint/2010/main" val="3672421668"/>
-      </p:ext>
-    </p:extLst>
-  </p:cSld>
-  <p:clrMapOvr>
-    <a:masterClrMapping/>
-  </p:clrMapOvr>
-  <p:timing>
-    <p:tnLst>
-      <p:par>
-        <p:cTn id="1" dur="indefinite" restart="never" nodeType="tmRoot"/>
-      </p:par>
-    </p:tnLst>
-  </p:timing>
-</p:sld>
-</file>
-
 <file path=ppt/slides/slide29.xml><?xml version="1.0" encoding="utf-8"?>
 <p:sld xmlns:a="http://schemas.openxmlformats.org/drawingml/2006/main" xmlns:r="http://schemas.openxmlformats.org/officeDocument/2006/relationships" xmlns:p="http://schemas.openxmlformats.org/presentationml/2006/main">
   <p:cSld>
@@ -13597,9 +14153,28 @@
           <a:p>
             <a:r>
               <a:rPr lang="en-US" dirty="0" smtClean="0"/>
-              <a:t>Example recipe file</a:t>
+              <a:t>Distributed applications</a:t>
             </a:r>
             <a:endParaRPr lang="nl-BE" dirty="0"/>
+          </a:p>
+        </p:txBody>
+      </p:sp>
+      <p:sp>
+        <p:nvSpPr>
+          <p:cNvPr id="3" name="Text Placeholder 2"/>
+          <p:cNvSpPr>
+            <a:spLocks noGrp="1"/>
+          </p:cNvSpPr>
+          <p:nvPr>
+            <p:ph type="body" idx="1"/>
+          </p:nvPr>
+        </p:nvSpPr>
+        <p:spPr/>
+        <p:txBody>
+          <a:bodyPr/>
+          <a:lstStyle/>
+          <a:p>
+            <a:endParaRPr lang="nl-BE"/>
           </a:p>
         </p:txBody>
       </p:sp>
@@ -13621,6 +14196,469 @@
             <a:fld id="{AEFF399F-E3B5-4890-BC79-9BC8D4DF3F2D}" type="slidenum">
               <a:rPr lang="nl-BE" smtClean="0"/>
               <a:t>29</a:t>
+            </a:fld>
+            <a:endParaRPr lang="nl-BE"/>
+          </a:p>
+        </p:txBody>
+      </p:sp>
+    </p:spTree>
+    <p:extLst>
+      <p:ext uri="{BB962C8B-B14F-4D97-AF65-F5344CB8AC3E}">
+        <p14:creationId xmlns:p14="http://schemas.microsoft.com/office/powerpoint/2010/main" val="3672421668"/>
+      </p:ext>
+    </p:extLst>
+  </p:cSld>
+  <p:clrMapOvr>
+    <a:masterClrMapping/>
+  </p:clrMapOvr>
+  <p:timing>
+    <p:tnLst>
+      <p:par>
+        <p:cTn id="1" dur="indefinite" restart="never" nodeType="tmRoot"/>
+      </p:par>
+    </p:tnLst>
+  </p:timing>
+</p:sld>
+</file>
+
+<file path=ppt/slides/slide3.xml><?xml version="1.0" encoding="utf-8"?>
+<p:sld xmlns:a="http://schemas.openxmlformats.org/drawingml/2006/main" xmlns:r="http://schemas.openxmlformats.org/officeDocument/2006/relationships" xmlns:p="http://schemas.openxmlformats.org/presentationml/2006/main">
+  <p:cSld>
+    <p:spTree>
+      <p:nvGrpSpPr>
+        <p:cNvPr id="1" name=""/>
+        <p:cNvGrpSpPr/>
+        <p:nvPr/>
+      </p:nvGrpSpPr>
+      <p:grpSpPr>
+        <a:xfrm>
+          <a:off x="0" y="0"/>
+          <a:ext cx="0" cy="0"/>
+          <a:chOff x="0" y="0"/>
+          <a:chExt cx="0" cy="0"/>
+        </a:xfrm>
+      </p:grpSpPr>
+      <p:sp>
+        <p:nvSpPr>
+          <p:cNvPr id="2" name="Title 1"/>
+          <p:cNvSpPr>
+            <a:spLocks noGrp="1"/>
+          </p:cNvSpPr>
+          <p:nvPr>
+            <p:ph type="title"/>
+          </p:nvPr>
+        </p:nvSpPr>
+        <p:spPr/>
+        <p:txBody>
+          <a:bodyPr/>
+          <a:lstStyle/>
+          <a:p>
+            <a:r>
+              <a:rPr lang="en-US" dirty="0" smtClean="0"/>
+              <a:t>Introduction</a:t>
+            </a:r>
+            <a:endParaRPr lang="nl-BE" dirty="0"/>
+          </a:p>
+        </p:txBody>
+      </p:sp>
+      <p:sp>
+        <p:nvSpPr>
+          <p:cNvPr id="3" name="Content Placeholder 2"/>
+          <p:cNvSpPr>
+            <a:spLocks noGrp="1"/>
+          </p:cNvSpPr>
+          <p:nvPr>
+            <p:ph idx="1"/>
+          </p:nvPr>
+        </p:nvSpPr>
+        <p:spPr/>
+        <p:txBody>
+          <a:bodyPr/>
+          <a:lstStyle/>
+          <a:p>
+            <a:r>
+              <a:rPr lang="en-US" dirty="0" smtClean="0"/>
+              <a:t>Singularity developed </a:t>
+            </a:r>
+            <a:r>
+              <a:rPr lang="en-US" dirty="0"/>
+              <a:t>by Berkeley Lab</a:t>
+            </a:r>
+            <a:br>
+              <a:rPr lang="en-US" dirty="0"/>
+            </a:br>
+            <a:r>
+              <a:rPr lang="en-US" dirty="0">
+                <a:hlinkClick r:id="rId2"/>
+              </a:rPr>
+              <a:t>http://singularity.lbl.gov</a:t>
+            </a:r>
+            <a:r>
+              <a:rPr lang="en-US" dirty="0" smtClean="0">
+                <a:hlinkClick r:id="rId2"/>
+              </a:rPr>
+              <a:t>/</a:t>
+            </a:r>
+            <a:r>
+              <a:rPr lang="en-US" dirty="0" smtClean="0"/>
+              <a:t> </a:t>
+            </a:r>
+          </a:p>
+          <a:p>
+            <a:r>
+              <a:rPr lang="en-US" dirty="0" smtClean="0"/>
+              <a:t>Intended as HPC alternative to</a:t>
+            </a:r>
+          </a:p>
+          <a:p>
+            <a:pPr lvl="1"/>
+            <a:r>
+              <a:rPr lang="en-US" dirty="0"/>
+              <a:t>Docker</a:t>
+            </a:r>
+            <a:br>
+              <a:rPr lang="en-US" dirty="0"/>
+            </a:br>
+            <a:r>
+              <a:rPr lang="en-US" dirty="0">
+                <a:hlinkClick r:id="rId3"/>
+              </a:rPr>
+              <a:t>https://www.docker.com</a:t>
+            </a:r>
+            <a:r>
+              <a:rPr lang="en-US" dirty="0" smtClean="0">
+                <a:hlinkClick r:id="rId3"/>
+              </a:rPr>
+              <a:t>/</a:t>
+            </a:r>
+            <a:r>
+              <a:rPr lang="en-US" dirty="0" smtClean="0"/>
+              <a:t> </a:t>
+            </a:r>
+          </a:p>
+          <a:p>
+            <a:pPr lvl="1"/>
+            <a:r>
+              <a:rPr lang="en-US" dirty="0" smtClean="0"/>
+              <a:t>Shifter</a:t>
+            </a:r>
+            <a:r>
+              <a:rPr lang="en-US" dirty="0"/>
+              <a:t/>
+            </a:r>
+            <a:br>
+              <a:rPr lang="en-US" dirty="0"/>
+            </a:br>
+            <a:r>
+              <a:rPr lang="en-US" dirty="0">
+                <a:hlinkClick r:id="rId4"/>
+              </a:rPr>
+              <a:t>https://</a:t>
+            </a:r>
+            <a:r>
+              <a:rPr lang="en-US" dirty="0" smtClean="0">
+                <a:hlinkClick r:id="rId4"/>
+              </a:rPr>
+              <a:t>github.com/NERSC/shifter</a:t>
+            </a:r>
+            <a:r>
+              <a:rPr lang="en-US" dirty="0" smtClean="0"/>
+              <a:t> </a:t>
+            </a:r>
+            <a:endParaRPr lang="nl-BE" dirty="0"/>
+          </a:p>
+        </p:txBody>
+      </p:sp>
+      <p:sp>
+        <p:nvSpPr>
+          <p:cNvPr id="4" name="Slide Number Placeholder 3"/>
+          <p:cNvSpPr>
+            <a:spLocks noGrp="1"/>
+          </p:cNvSpPr>
+          <p:nvPr>
+            <p:ph type="sldNum" sz="quarter" idx="12"/>
+          </p:nvPr>
+        </p:nvSpPr>
+        <p:spPr/>
+        <p:txBody>
+          <a:bodyPr/>
+          <a:lstStyle/>
+          <a:p>
+            <a:fld id="{AEFF399F-E3B5-4890-BC79-9BC8D4DF3F2D}" type="slidenum">
+              <a:rPr lang="nl-BE" smtClean="0"/>
+              <a:t>3</a:t>
+            </a:fld>
+            <a:endParaRPr lang="nl-BE"/>
+          </a:p>
+        </p:txBody>
+      </p:sp>
+    </p:spTree>
+    <p:extLst>
+      <p:ext uri="{BB962C8B-B14F-4D97-AF65-F5344CB8AC3E}">
+        <p14:creationId xmlns:p14="http://schemas.microsoft.com/office/powerpoint/2010/main" val="658783311"/>
+      </p:ext>
+    </p:extLst>
+  </p:cSld>
+  <p:clrMapOvr>
+    <a:masterClrMapping/>
+  </p:clrMapOvr>
+  <p:timing>
+    <p:tnLst>
+      <p:par>
+        <p:cTn id="1" dur="indefinite" restart="never" nodeType="tmRoot">
+          <p:childTnLst>
+            <p:seq concurrent="1" nextAc="seek">
+              <p:cTn id="2" dur="indefinite" nodeType="mainSeq">
+                <p:childTnLst>
+                  <p:par>
+                    <p:cTn id="3" fill="hold">
+                      <p:stCondLst>
+                        <p:cond delay="indefinite"/>
+                        <p:cond evt="onBegin" delay="0">
+                          <p:tn val="2"/>
+                        </p:cond>
+                      </p:stCondLst>
+                      <p:childTnLst>
+                        <p:par>
+                          <p:cTn id="4" fill="hold">
+                            <p:stCondLst>
+                              <p:cond delay="0"/>
+                            </p:stCondLst>
+                            <p:childTnLst>
+                              <p:par>
+                                <p:cTn id="5" presetID="1" presetClass="entr" presetSubtype="0" fill="hold" grpId="0" nodeType="withEffect">
+                                  <p:stCondLst>
+                                    <p:cond delay="0"/>
+                                  </p:stCondLst>
+                                  <p:childTnLst>
+                                    <p:set>
+                                      <p:cBhvr>
+                                        <p:cTn id="6" dur="1" fill="hold">
+                                          <p:stCondLst>
+                                            <p:cond delay="0"/>
+                                          </p:stCondLst>
+                                        </p:cTn>
+                                        <p:tgtEl>
+                                          <p:spTgt spid="3">
+                                            <p:txEl>
+                                              <p:pRg st="0" end="0"/>
+                                            </p:txEl>
+                                          </p:spTgt>
+                                        </p:tgtEl>
+                                        <p:attrNameLst>
+                                          <p:attrName>style.visibility</p:attrName>
+                                        </p:attrNameLst>
+                                      </p:cBhvr>
+                                      <p:to>
+                                        <p:strVal val="visible"/>
+                                      </p:to>
+                                    </p:set>
+                                  </p:childTnLst>
+                                </p:cTn>
+                              </p:par>
+                            </p:childTnLst>
+                          </p:cTn>
+                        </p:par>
+                      </p:childTnLst>
+                    </p:cTn>
+                  </p:par>
+                  <p:par>
+                    <p:cTn id="7" fill="hold">
+                      <p:stCondLst>
+                        <p:cond delay="indefinite"/>
+                      </p:stCondLst>
+                      <p:childTnLst>
+                        <p:par>
+                          <p:cTn id="8" fill="hold">
+                            <p:stCondLst>
+                              <p:cond delay="0"/>
+                            </p:stCondLst>
+                            <p:childTnLst>
+                              <p:par>
+                                <p:cTn id="9" presetID="1" presetClass="entr" presetSubtype="0" fill="hold" grpId="0" nodeType="clickEffect">
+                                  <p:stCondLst>
+                                    <p:cond delay="0"/>
+                                  </p:stCondLst>
+                                  <p:childTnLst>
+                                    <p:set>
+                                      <p:cBhvr>
+                                        <p:cTn id="10" dur="1" fill="hold">
+                                          <p:stCondLst>
+                                            <p:cond delay="0"/>
+                                          </p:stCondLst>
+                                        </p:cTn>
+                                        <p:tgtEl>
+                                          <p:spTgt spid="3">
+                                            <p:txEl>
+                                              <p:pRg st="1" end="1"/>
+                                            </p:txEl>
+                                          </p:spTgt>
+                                        </p:tgtEl>
+                                        <p:attrNameLst>
+                                          <p:attrName>style.visibility</p:attrName>
+                                        </p:attrNameLst>
+                                      </p:cBhvr>
+                                      <p:to>
+                                        <p:strVal val="visible"/>
+                                      </p:to>
+                                    </p:set>
+                                  </p:childTnLst>
+                                </p:cTn>
+                              </p:par>
+                              <p:par>
+                                <p:cTn id="11" presetID="1" presetClass="entr" presetSubtype="0" fill="hold" grpId="0" nodeType="withEffect">
+                                  <p:stCondLst>
+                                    <p:cond delay="0"/>
+                                  </p:stCondLst>
+                                  <p:childTnLst>
+                                    <p:set>
+                                      <p:cBhvr>
+                                        <p:cTn id="12" dur="1" fill="hold">
+                                          <p:stCondLst>
+                                            <p:cond delay="0"/>
+                                          </p:stCondLst>
+                                        </p:cTn>
+                                        <p:tgtEl>
+                                          <p:spTgt spid="3">
+                                            <p:txEl>
+                                              <p:pRg st="2" end="2"/>
+                                            </p:txEl>
+                                          </p:spTgt>
+                                        </p:tgtEl>
+                                        <p:attrNameLst>
+                                          <p:attrName>style.visibility</p:attrName>
+                                        </p:attrNameLst>
+                                      </p:cBhvr>
+                                      <p:to>
+                                        <p:strVal val="visible"/>
+                                      </p:to>
+                                    </p:set>
+                                  </p:childTnLst>
+                                </p:cTn>
+                              </p:par>
+                              <p:par>
+                                <p:cTn id="13" presetID="1" presetClass="entr" presetSubtype="0" fill="hold" grpId="0" nodeType="withEffect">
+                                  <p:stCondLst>
+                                    <p:cond delay="0"/>
+                                  </p:stCondLst>
+                                  <p:childTnLst>
+                                    <p:set>
+                                      <p:cBhvr>
+                                        <p:cTn id="14" dur="1" fill="hold">
+                                          <p:stCondLst>
+                                            <p:cond delay="0"/>
+                                          </p:stCondLst>
+                                        </p:cTn>
+                                        <p:tgtEl>
+                                          <p:spTgt spid="3">
+                                            <p:txEl>
+                                              <p:pRg st="3" end="3"/>
+                                            </p:txEl>
+                                          </p:spTgt>
+                                        </p:tgtEl>
+                                        <p:attrNameLst>
+                                          <p:attrName>style.visibility</p:attrName>
+                                        </p:attrNameLst>
+                                      </p:cBhvr>
+                                      <p:to>
+                                        <p:strVal val="visible"/>
+                                      </p:to>
+                                    </p:set>
+                                  </p:childTnLst>
+                                </p:cTn>
+                              </p:par>
+                            </p:childTnLst>
+                          </p:cTn>
+                        </p:par>
+                      </p:childTnLst>
+                    </p:cTn>
+                  </p:par>
+                </p:childTnLst>
+              </p:cTn>
+              <p:prevCondLst>
+                <p:cond evt="onPrev" delay="0">
+                  <p:tgtEl>
+                    <p:sldTgt/>
+                  </p:tgtEl>
+                </p:cond>
+              </p:prevCondLst>
+              <p:nextCondLst>
+                <p:cond evt="onNext" delay="0">
+                  <p:tgtEl>
+                    <p:sldTgt/>
+                  </p:tgtEl>
+                </p:cond>
+              </p:nextCondLst>
+            </p:seq>
+          </p:childTnLst>
+        </p:cTn>
+      </p:par>
+    </p:tnLst>
+    <p:bldLst>
+      <p:bldP spid="3" grpId="0" uiExpand="1" build="p"/>
+    </p:bldLst>
+  </p:timing>
+</p:sld>
+</file>
+
+<file path=ppt/slides/slide30.xml><?xml version="1.0" encoding="utf-8"?>
+<p:sld xmlns:a="http://schemas.openxmlformats.org/drawingml/2006/main" xmlns:r="http://schemas.openxmlformats.org/officeDocument/2006/relationships" xmlns:p="http://schemas.openxmlformats.org/presentationml/2006/main">
+  <p:cSld>
+    <p:spTree>
+      <p:nvGrpSpPr>
+        <p:cNvPr id="1" name=""/>
+        <p:cNvGrpSpPr/>
+        <p:nvPr/>
+      </p:nvGrpSpPr>
+      <p:grpSpPr>
+        <a:xfrm>
+          <a:off x="0" y="0"/>
+          <a:ext cx="0" cy="0"/>
+          <a:chOff x="0" y="0"/>
+          <a:chExt cx="0" cy="0"/>
+        </a:xfrm>
+      </p:grpSpPr>
+      <p:sp>
+        <p:nvSpPr>
+          <p:cNvPr id="2" name="Title 1"/>
+          <p:cNvSpPr>
+            <a:spLocks noGrp="1"/>
+          </p:cNvSpPr>
+          <p:nvPr>
+            <p:ph type="title"/>
+          </p:nvPr>
+        </p:nvSpPr>
+        <p:spPr/>
+        <p:txBody>
+          <a:bodyPr/>
+          <a:lstStyle/>
+          <a:p>
+            <a:r>
+              <a:rPr lang="en-US" dirty="0" smtClean="0"/>
+              <a:t>Example recipe file</a:t>
+            </a:r>
+            <a:endParaRPr lang="nl-BE" dirty="0"/>
+          </a:p>
+        </p:txBody>
+      </p:sp>
+      <p:sp>
+        <p:nvSpPr>
+          <p:cNvPr id="4" name="Slide Number Placeholder 3"/>
+          <p:cNvSpPr>
+            <a:spLocks noGrp="1"/>
+          </p:cNvSpPr>
+          <p:nvPr>
+            <p:ph type="sldNum" sz="quarter" idx="12"/>
+          </p:nvPr>
+        </p:nvSpPr>
+        <p:spPr/>
+        <p:txBody>
+          <a:bodyPr/>
+          <a:lstStyle/>
+          <a:p>
+            <a:fld id="{AEFF399F-E3B5-4890-BC79-9BC8D4DF3F2D}" type="slidenum">
+              <a:rPr lang="nl-BE" smtClean="0"/>
+              <a:t>30</a:t>
             </a:fld>
             <a:endParaRPr lang="nl-BE"/>
           </a:p>
@@ -14945,7 +15983,7 @@
 </p:sld>
 </file>
 
-<file path=ppt/slides/slide3.xml><?xml version="1.0" encoding="utf-8"?>
+<file path=ppt/slides/slide31.xml><?xml version="1.0" encoding="utf-8"?>
 <p:sld xmlns:a="http://schemas.openxmlformats.org/drawingml/2006/main" xmlns:r="http://schemas.openxmlformats.org/officeDocument/2006/relationships" xmlns:p="http://schemas.openxmlformats.org/presentationml/2006/main">
   <p:cSld>
     <p:spTree>
@@ -14979,386 +16017,6 @@
           <a:p>
             <a:r>
               <a:rPr lang="en-US" dirty="0" smtClean="0"/>
-              <a:t>Introduction</a:t>
-            </a:r>
-            <a:endParaRPr lang="nl-BE" dirty="0"/>
-          </a:p>
-        </p:txBody>
-      </p:sp>
-      <p:sp>
-        <p:nvSpPr>
-          <p:cNvPr id="3" name="Content Placeholder 2"/>
-          <p:cNvSpPr>
-            <a:spLocks noGrp="1"/>
-          </p:cNvSpPr>
-          <p:nvPr>
-            <p:ph idx="1"/>
-          </p:nvPr>
-        </p:nvSpPr>
-        <p:spPr/>
-        <p:txBody>
-          <a:bodyPr/>
-          <a:lstStyle/>
-          <a:p>
-            <a:r>
-              <a:rPr lang="en-US" dirty="0" smtClean="0"/>
-              <a:t>Singularity developed </a:t>
-            </a:r>
-            <a:r>
-              <a:rPr lang="en-US" dirty="0"/>
-              <a:t>by Berkeley Lab</a:t>
-            </a:r>
-            <a:br>
-              <a:rPr lang="en-US" dirty="0"/>
-            </a:br>
-            <a:r>
-              <a:rPr lang="en-US" dirty="0">
-                <a:hlinkClick r:id="rId2"/>
-              </a:rPr>
-              <a:t>http://singularity.lbl.gov</a:t>
-            </a:r>
-            <a:r>
-              <a:rPr lang="en-US" dirty="0" smtClean="0">
-                <a:hlinkClick r:id="rId2"/>
-              </a:rPr>
-              <a:t>/</a:t>
-            </a:r>
-            <a:r>
-              <a:rPr lang="en-US" dirty="0" smtClean="0"/>
-              <a:t> </a:t>
-            </a:r>
-          </a:p>
-          <a:p>
-            <a:r>
-              <a:rPr lang="en-US" dirty="0" smtClean="0"/>
-              <a:t>Intended as HPC alternative to</a:t>
-            </a:r>
-          </a:p>
-          <a:p>
-            <a:pPr lvl="1"/>
-            <a:r>
-              <a:rPr lang="en-US" dirty="0"/>
-              <a:t>Docker</a:t>
-            </a:r>
-            <a:br>
-              <a:rPr lang="en-US" dirty="0"/>
-            </a:br>
-            <a:r>
-              <a:rPr lang="en-US" dirty="0">
-                <a:hlinkClick r:id="rId3"/>
-              </a:rPr>
-              <a:t>https://www.docker.com</a:t>
-            </a:r>
-            <a:r>
-              <a:rPr lang="en-US" dirty="0" smtClean="0">
-                <a:hlinkClick r:id="rId3"/>
-              </a:rPr>
-              <a:t>/</a:t>
-            </a:r>
-            <a:r>
-              <a:rPr lang="en-US" dirty="0" smtClean="0"/>
-              <a:t> </a:t>
-            </a:r>
-          </a:p>
-          <a:p>
-            <a:pPr lvl="1"/>
-            <a:r>
-              <a:rPr lang="en-US" dirty="0" smtClean="0"/>
-              <a:t>Shifter</a:t>
-            </a:r>
-            <a:r>
-              <a:rPr lang="en-US" dirty="0"/>
-              <a:t/>
-            </a:r>
-            <a:br>
-              <a:rPr lang="en-US" dirty="0"/>
-            </a:br>
-            <a:r>
-              <a:rPr lang="en-US" dirty="0">
-                <a:hlinkClick r:id="rId4"/>
-              </a:rPr>
-              <a:t>https://</a:t>
-            </a:r>
-            <a:r>
-              <a:rPr lang="en-US" dirty="0" smtClean="0">
-                <a:hlinkClick r:id="rId4"/>
-              </a:rPr>
-              <a:t>github.com/NERSC/shifter</a:t>
-            </a:r>
-            <a:r>
-              <a:rPr lang="en-US" dirty="0" smtClean="0"/>
-              <a:t> </a:t>
-            </a:r>
-            <a:endParaRPr lang="nl-BE" dirty="0"/>
-          </a:p>
-        </p:txBody>
-      </p:sp>
-      <p:sp>
-        <p:nvSpPr>
-          <p:cNvPr id="4" name="Slide Number Placeholder 3"/>
-          <p:cNvSpPr>
-            <a:spLocks noGrp="1"/>
-          </p:cNvSpPr>
-          <p:nvPr>
-            <p:ph type="sldNum" sz="quarter" idx="12"/>
-          </p:nvPr>
-        </p:nvSpPr>
-        <p:spPr/>
-        <p:txBody>
-          <a:bodyPr/>
-          <a:lstStyle/>
-          <a:p>
-            <a:fld id="{AEFF399F-E3B5-4890-BC79-9BC8D4DF3F2D}" type="slidenum">
-              <a:rPr lang="nl-BE" smtClean="0"/>
-              <a:t>3</a:t>
-            </a:fld>
-            <a:endParaRPr lang="nl-BE"/>
-          </a:p>
-        </p:txBody>
-      </p:sp>
-    </p:spTree>
-    <p:extLst>
-      <p:ext uri="{BB962C8B-B14F-4D97-AF65-F5344CB8AC3E}">
-        <p14:creationId xmlns:p14="http://schemas.microsoft.com/office/powerpoint/2010/main" val="658783311"/>
-      </p:ext>
-    </p:extLst>
-  </p:cSld>
-  <p:clrMapOvr>
-    <a:masterClrMapping/>
-  </p:clrMapOvr>
-  <p:timing>
-    <p:tnLst>
-      <p:par>
-        <p:cTn id="1" dur="indefinite" restart="never" nodeType="tmRoot">
-          <p:childTnLst>
-            <p:seq concurrent="1" nextAc="seek">
-              <p:cTn id="2" dur="indefinite" nodeType="mainSeq">
-                <p:childTnLst>
-                  <p:par>
-                    <p:cTn id="3" fill="hold">
-                      <p:stCondLst>
-                        <p:cond delay="indefinite"/>
-                        <p:cond evt="onBegin" delay="0">
-                          <p:tn val="2"/>
-                        </p:cond>
-                      </p:stCondLst>
-                      <p:childTnLst>
-                        <p:par>
-                          <p:cTn id="4" fill="hold">
-                            <p:stCondLst>
-                              <p:cond delay="0"/>
-                            </p:stCondLst>
-                            <p:childTnLst>
-                              <p:par>
-                                <p:cTn id="5" presetID="1" presetClass="entr" presetSubtype="0" fill="hold" grpId="0" nodeType="withEffect">
-                                  <p:stCondLst>
-                                    <p:cond delay="0"/>
-                                  </p:stCondLst>
-                                  <p:childTnLst>
-                                    <p:set>
-                                      <p:cBhvr>
-                                        <p:cTn id="6" dur="1" fill="hold">
-                                          <p:stCondLst>
-                                            <p:cond delay="0"/>
-                                          </p:stCondLst>
-                                        </p:cTn>
-                                        <p:tgtEl>
-                                          <p:spTgt spid="3">
-                                            <p:txEl>
-                                              <p:pRg st="0" end="0"/>
-                                            </p:txEl>
-                                          </p:spTgt>
-                                        </p:tgtEl>
-                                        <p:attrNameLst>
-                                          <p:attrName>style.visibility</p:attrName>
-                                        </p:attrNameLst>
-                                      </p:cBhvr>
-                                      <p:to>
-                                        <p:strVal val="visible"/>
-                                      </p:to>
-                                    </p:set>
-                                  </p:childTnLst>
-                                </p:cTn>
-                              </p:par>
-                            </p:childTnLst>
-                          </p:cTn>
-                        </p:par>
-                      </p:childTnLst>
-                    </p:cTn>
-                  </p:par>
-                  <p:par>
-                    <p:cTn id="7" fill="hold">
-                      <p:stCondLst>
-                        <p:cond delay="indefinite"/>
-                      </p:stCondLst>
-                      <p:childTnLst>
-                        <p:par>
-                          <p:cTn id="8" fill="hold">
-                            <p:stCondLst>
-                              <p:cond delay="0"/>
-                            </p:stCondLst>
-                            <p:childTnLst>
-                              <p:par>
-                                <p:cTn id="9" presetID="1" presetClass="entr" presetSubtype="0" fill="hold" grpId="0" nodeType="clickEffect">
-                                  <p:stCondLst>
-                                    <p:cond delay="0"/>
-                                  </p:stCondLst>
-                                  <p:childTnLst>
-                                    <p:set>
-                                      <p:cBhvr>
-                                        <p:cTn id="10" dur="1" fill="hold">
-                                          <p:stCondLst>
-                                            <p:cond delay="0"/>
-                                          </p:stCondLst>
-                                        </p:cTn>
-                                        <p:tgtEl>
-                                          <p:spTgt spid="3">
-                                            <p:txEl>
-                                              <p:pRg st="1" end="1"/>
-                                            </p:txEl>
-                                          </p:spTgt>
-                                        </p:tgtEl>
-                                        <p:attrNameLst>
-                                          <p:attrName>style.visibility</p:attrName>
-                                        </p:attrNameLst>
-                                      </p:cBhvr>
-                                      <p:to>
-                                        <p:strVal val="visible"/>
-                                      </p:to>
-                                    </p:set>
-                                  </p:childTnLst>
-                                </p:cTn>
-                              </p:par>
-                              <p:par>
-                                <p:cTn id="11" presetID="1" presetClass="entr" presetSubtype="0" fill="hold" grpId="0" nodeType="withEffect">
-                                  <p:stCondLst>
-                                    <p:cond delay="0"/>
-                                  </p:stCondLst>
-                                  <p:childTnLst>
-                                    <p:set>
-                                      <p:cBhvr>
-                                        <p:cTn id="12" dur="1" fill="hold">
-                                          <p:stCondLst>
-                                            <p:cond delay="0"/>
-                                          </p:stCondLst>
-                                        </p:cTn>
-                                        <p:tgtEl>
-                                          <p:spTgt spid="3">
-                                            <p:txEl>
-                                              <p:pRg st="2" end="2"/>
-                                            </p:txEl>
-                                          </p:spTgt>
-                                        </p:tgtEl>
-                                        <p:attrNameLst>
-                                          <p:attrName>style.visibility</p:attrName>
-                                        </p:attrNameLst>
-                                      </p:cBhvr>
-                                      <p:to>
-                                        <p:strVal val="visible"/>
-                                      </p:to>
-                                    </p:set>
-                                  </p:childTnLst>
-                                </p:cTn>
-                              </p:par>
-                              <p:par>
-                                <p:cTn id="13" presetID="1" presetClass="entr" presetSubtype="0" fill="hold" grpId="0" nodeType="withEffect">
-                                  <p:stCondLst>
-                                    <p:cond delay="0"/>
-                                  </p:stCondLst>
-                                  <p:childTnLst>
-                                    <p:set>
-                                      <p:cBhvr>
-                                        <p:cTn id="14" dur="1" fill="hold">
-                                          <p:stCondLst>
-                                            <p:cond delay="0"/>
-                                          </p:stCondLst>
-                                        </p:cTn>
-                                        <p:tgtEl>
-                                          <p:spTgt spid="3">
-                                            <p:txEl>
-                                              <p:pRg st="3" end="3"/>
-                                            </p:txEl>
-                                          </p:spTgt>
-                                        </p:tgtEl>
-                                        <p:attrNameLst>
-                                          <p:attrName>style.visibility</p:attrName>
-                                        </p:attrNameLst>
-                                      </p:cBhvr>
-                                      <p:to>
-                                        <p:strVal val="visible"/>
-                                      </p:to>
-                                    </p:set>
-                                  </p:childTnLst>
-                                </p:cTn>
-                              </p:par>
-                            </p:childTnLst>
-                          </p:cTn>
-                        </p:par>
-                      </p:childTnLst>
-                    </p:cTn>
-                  </p:par>
-                </p:childTnLst>
-              </p:cTn>
-              <p:prevCondLst>
-                <p:cond evt="onPrev" delay="0">
-                  <p:tgtEl>
-                    <p:sldTgt/>
-                  </p:tgtEl>
-                </p:cond>
-              </p:prevCondLst>
-              <p:nextCondLst>
-                <p:cond evt="onNext" delay="0">
-                  <p:tgtEl>
-                    <p:sldTgt/>
-                  </p:tgtEl>
-                </p:cond>
-              </p:nextCondLst>
-            </p:seq>
-          </p:childTnLst>
-        </p:cTn>
-      </p:par>
-    </p:tnLst>
-    <p:bldLst>
-      <p:bldP spid="3" grpId="0" uiExpand="1" build="p"/>
-    </p:bldLst>
-  </p:timing>
-</p:sld>
-</file>
-
-<file path=ppt/slides/slide30.xml><?xml version="1.0" encoding="utf-8"?>
-<p:sld xmlns:a="http://schemas.openxmlformats.org/drawingml/2006/main" xmlns:r="http://schemas.openxmlformats.org/officeDocument/2006/relationships" xmlns:p="http://schemas.openxmlformats.org/presentationml/2006/main">
-  <p:cSld>
-    <p:spTree>
-      <p:nvGrpSpPr>
-        <p:cNvPr id="1" name=""/>
-        <p:cNvGrpSpPr/>
-        <p:nvPr/>
-      </p:nvGrpSpPr>
-      <p:grpSpPr>
-        <a:xfrm>
-          <a:off x="0" y="0"/>
-          <a:ext cx="0" cy="0"/>
-          <a:chOff x="0" y="0"/>
-          <a:chExt cx="0" cy="0"/>
-        </a:xfrm>
-      </p:grpSpPr>
-      <p:sp>
-        <p:nvSpPr>
-          <p:cNvPr id="2" name="Title 1"/>
-          <p:cNvSpPr>
-            <a:spLocks noGrp="1"/>
-          </p:cNvSpPr>
-          <p:nvPr>
-            <p:ph type="title"/>
-          </p:nvPr>
-        </p:nvSpPr>
-        <p:spPr/>
-        <p:txBody>
-          <a:bodyPr/>
-          <a:lstStyle/>
-          <a:p>
-            <a:r>
-              <a:rPr lang="en-US" dirty="0" smtClean="0"/>
               <a:t>Running MPI application</a:t>
             </a:r>
             <a:endParaRPr lang="nl-BE" dirty="0"/>
@@ -15405,7 +16063,7 @@
           <a:p>
             <a:fld id="{AEFF399F-E3B5-4890-BC79-9BC8D4DF3F2D}" type="slidenum">
               <a:rPr lang="nl-BE" smtClean="0"/>
-              <a:t>30</a:t>
+              <a:t>31</a:t>
             </a:fld>
             <a:endParaRPr lang="nl-BE"/>
           </a:p>
@@ -15761,108 +16419,6 @@
 </p:sld>
 </file>
 
-<file path=ppt/slides/slide31.xml><?xml version="1.0" encoding="utf-8"?>
-<p:sld xmlns:a="http://schemas.openxmlformats.org/drawingml/2006/main" xmlns:r="http://schemas.openxmlformats.org/officeDocument/2006/relationships" xmlns:p="http://schemas.openxmlformats.org/presentationml/2006/main">
-  <p:cSld>
-    <p:spTree>
-      <p:nvGrpSpPr>
-        <p:cNvPr id="1" name=""/>
-        <p:cNvGrpSpPr/>
-        <p:nvPr/>
-      </p:nvGrpSpPr>
-      <p:grpSpPr>
-        <a:xfrm>
-          <a:off x="0" y="0"/>
-          <a:ext cx="0" cy="0"/>
-          <a:chOff x="0" y="0"/>
-          <a:chExt cx="0" cy="0"/>
-        </a:xfrm>
-      </p:grpSpPr>
-      <p:sp>
-        <p:nvSpPr>
-          <p:cNvPr id="2" name="Title 1"/>
-          <p:cNvSpPr>
-            <a:spLocks noGrp="1"/>
-          </p:cNvSpPr>
-          <p:nvPr>
-            <p:ph type="title"/>
-          </p:nvPr>
-        </p:nvSpPr>
-        <p:spPr/>
-        <p:txBody>
-          <a:bodyPr/>
-          <a:lstStyle/>
-          <a:p>
-            <a:r>
-              <a:rPr lang="en-US" dirty="0" smtClean="0"/>
-              <a:t>Services</a:t>
-            </a:r>
-            <a:endParaRPr lang="en-US" dirty="0"/>
-          </a:p>
-        </p:txBody>
-      </p:sp>
-      <p:sp>
-        <p:nvSpPr>
-          <p:cNvPr id="3" name="Text Placeholder 2"/>
-          <p:cNvSpPr>
-            <a:spLocks noGrp="1"/>
-          </p:cNvSpPr>
-          <p:nvPr>
-            <p:ph type="body" idx="1"/>
-          </p:nvPr>
-        </p:nvSpPr>
-        <p:spPr/>
-        <p:txBody>
-          <a:bodyPr/>
-          <a:lstStyle/>
-          <a:p>
-            <a:endParaRPr lang="en-US"/>
-          </a:p>
-        </p:txBody>
-      </p:sp>
-      <p:sp>
-        <p:nvSpPr>
-          <p:cNvPr id="4" name="Slide Number Placeholder 3"/>
-          <p:cNvSpPr>
-            <a:spLocks noGrp="1"/>
-          </p:cNvSpPr>
-          <p:nvPr>
-            <p:ph type="sldNum" sz="quarter" idx="12"/>
-          </p:nvPr>
-        </p:nvSpPr>
-        <p:spPr/>
-        <p:txBody>
-          <a:bodyPr/>
-          <a:lstStyle/>
-          <a:p>
-            <a:fld id="{AEFF399F-E3B5-4890-BC79-9BC8D4DF3F2D}" type="slidenum">
-              <a:rPr lang="nl-BE" smtClean="0"/>
-              <a:t>31</a:t>
-            </a:fld>
-            <a:endParaRPr lang="nl-BE"/>
-          </a:p>
-        </p:txBody>
-      </p:sp>
-    </p:spTree>
-    <p:extLst>
-      <p:ext uri="{BB962C8B-B14F-4D97-AF65-F5344CB8AC3E}">
-        <p14:creationId xmlns:p14="http://schemas.microsoft.com/office/powerpoint/2010/main" val="1160171864"/>
-      </p:ext>
-    </p:extLst>
-  </p:cSld>
-  <p:clrMapOvr>
-    <a:masterClrMapping/>
-  </p:clrMapOvr>
-  <p:timing>
-    <p:tnLst>
-      <p:par>
-        <p:cTn id="1" dur="indefinite" restart="never" nodeType="tmRoot"/>
-      </p:par>
-    </p:tnLst>
-  </p:timing>
-</p:sld>
-</file>
-
 <file path=ppt/slides/slide32.xml><?xml version="1.0" encoding="utf-8"?>
 <p:sld xmlns:a="http://schemas.openxmlformats.org/drawingml/2006/main" xmlns:r="http://schemas.openxmlformats.org/officeDocument/2006/relationships" xmlns:p="http://schemas.openxmlformats.org/presentationml/2006/main">
   <p:cSld>
@@ -15897,6 +16453,108 @@
           <a:p>
             <a:r>
               <a:rPr lang="en-US" dirty="0" smtClean="0"/>
+              <a:t>Services</a:t>
+            </a:r>
+            <a:endParaRPr lang="en-US" dirty="0"/>
+          </a:p>
+        </p:txBody>
+      </p:sp>
+      <p:sp>
+        <p:nvSpPr>
+          <p:cNvPr id="3" name="Text Placeholder 2"/>
+          <p:cNvSpPr>
+            <a:spLocks noGrp="1"/>
+          </p:cNvSpPr>
+          <p:nvPr>
+            <p:ph type="body" idx="1"/>
+          </p:nvPr>
+        </p:nvSpPr>
+        <p:spPr/>
+        <p:txBody>
+          <a:bodyPr/>
+          <a:lstStyle/>
+          <a:p>
+            <a:endParaRPr lang="en-US"/>
+          </a:p>
+        </p:txBody>
+      </p:sp>
+      <p:sp>
+        <p:nvSpPr>
+          <p:cNvPr id="4" name="Slide Number Placeholder 3"/>
+          <p:cNvSpPr>
+            <a:spLocks noGrp="1"/>
+          </p:cNvSpPr>
+          <p:nvPr>
+            <p:ph type="sldNum" sz="quarter" idx="12"/>
+          </p:nvPr>
+        </p:nvSpPr>
+        <p:spPr/>
+        <p:txBody>
+          <a:bodyPr/>
+          <a:lstStyle/>
+          <a:p>
+            <a:fld id="{AEFF399F-E3B5-4890-BC79-9BC8D4DF3F2D}" type="slidenum">
+              <a:rPr lang="nl-BE" smtClean="0"/>
+              <a:t>32</a:t>
+            </a:fld>
+            <a:endParaRPr lang="nl-BE"/>
+          </a:p>
+        </p:txBody>
+      </p:sp>
+    </p:spTree>
+    <p:extLst>
+      <p:ext uri="{BB962C8B-B14F-4D97-AF65-F5344CB8AC3E}">
+        <p14:creationId xmlns:p14="http://schemas.microsoft.com/office/powerpoint/2010/main" val="1160171864"/>
+      </p:ext>
+    </p:extLst>
+  </p:cSld>
+  <p:clrMapOvr>
+    <a:masterClrMapping/>
+  </p:clrMapOvr>
+  <p:timing>
+    <p:tnLst>
+      <p:par>
+        <p:cTn id="1" dur="indefinite" restart="never" nodeType="tmRoot"/>
+      </p:par>
+    </p:tnLst>
+  </p:timing>
+</p:sld>
+</file>
+
+<file path=ppt/slides/slide33.xml><?xml version="1.0" encoding="utf-8"?>
+<p:sld xmlns:a="http://schemas.openxmlformats.org/drawingml/2006/main" xmlns:r="http://schemas.openxmlformats.org/officeDocument/2006/relationships" xmlns:p="http://schemas.openxmlformats.org/presentationml/2006/main">
+  <p:cSld>
+    <p:spTree>
+      <p:nvGrpSpPr>
+        <p:cNvPr id="1" name=""/>
+        <p:cNvGrpSpPr/>
+        <p:nvPr/>
+      </p:nvGrpSpPr>
+      <p:grpSpPr>
+        <a:xfrm>
+          <a:off x="0" y="0"/>
+          <a:ext cx="0" cy="0"/>
+          <a:chOff x="0" y="0"/>
+          <a:chExt cx="0" cy="0"/>
+        </a:xfrm>
+      </p:grpSpPr>
+      <p:sp>
+        <p:nvSpPr>
+          <p:cNvPr id="2" name="Title 1"/>
+          <p:cNvSpPr>
+            <a:spLocks noGrp="1"/>
+          </p:cNvSpPr>
+          <p:nvPr>
+            <p:ph type="title"/>
+          </p:nvPr>
+        </p:nvSpPr>
+        <p:spPr/>
+        <p:txBody>
+          <a:bodyPr/>
+          <a:lstStyle/>
+          <a:p>
+            <a:r>
+              <a:rPr lang="en-US" dirty="0" smtClean="0"/>
               <a:t>Server processes</a:t>
             </a:r>
             <a:endParaRPr lang="en-US" dirty="0"/>
@@ -16006,7 +16664,7 @@
           <a:p>
             <a:fld id="{AEFF399F-E3B5-4890-BC79-9BC8D4DF3F2D}" type="slidenum">
               <a:rPr lang="nl-BE" smtClean="0"/>
-              <a:t>32</a:t>
+              <a:t>33</a:t>
             </a:fld>
             <a:endParaRPr lang="nl-BE"/>
           </a:p>
@@ -16615,7 +17273,7 @@
 </p:sld>
 </file>
 
-<file path=ppt/slides/slide33.xml><?xml version="1.0" encoding="utf-8"?>
+<file path=ppt/slides/slide34.xml><?xml version="1.0" encoding="utf-8"?>
 <p:sld xmlns:a="http://schemas.openxmlformats.org/drawingml/2006/main" xmlns:r="http://schemas.openxmlformats.org/officeDocument/2006/relationships" xmlns:p="http://schemas.openxmlformats.org/presentationml/2006/main">
   <p:cSld>
     <p:spTree>
@@ -16672,7 +17330,7 @@
           <a:p>
             <a:fld id="{AEFF399F-E3B5-4890-BC79-9BC8D4DF3F2D}" type="slidenum">
               <a:rPr lang="nl-BE" smtClean="0"/>
-              <a:t>33</a:t>
+              <a:t>34</a:t>
             </a:fld>
             <a:endParaRPr lang="nl-BE"/>
           </a:p>
@@ -17633,7 +18291,7 @@
 </p:sld>
 </file>
 
-<file path=ppt/slides/slide34.xml><?xml version="1.0" encoding="utf-8"?>
+<file path=ppt/slides/slide35.xml><?xml version="1.0" encoding="utf-8"?>
 <p:sld xmlns:a="http://schemas.openxmlformats.org/drawingml/2006/main" xmlns:r="http://schemas.openxmlformats.org/officeDocument/2006/relationships" xmlns:p="http://schemas.openxmlformats.org/presentationml/2006/main">
   <p:cSld>
     <p:spTree>
@@ -17690,7 +18348,7 @@
           <a:p>
             <a:fld id="{AEFF399F-E3B5-4890-BC79-9BC8D4DF3F2D}" type="slidenum">
               <a:rPr lang="nl-BE" smtClean="0"/>
-              <a:t>34</a:t>
+              <a:t>35</a:t>
             </a:fld>
             <a:endParaRPr lang="nl-BE"/>
           </a:p>
@@ -18612,7 +19270,7 @@
 </p:sld>
 </file>
 
-<file path=ppt/slides/slide35.xml><?xml version="1.0" encoding="utf-8"?>
+<file path=ppt/slides/slide36.xml><?xml version="1.0" encoding="utf-8"?>
 <p:sld xmlns:a="http://schemas.openxmlformats.org/drawingml/2006/main" xmlns:r="http://schemas.openxmlformats.org/officeDocument/2006/relationships" xmlns:p="http://schemas.openxmlformats.org/presentationml/2006/main">
   <p:cSld>
     <p:spTree>
@@ -18722,7 +19380,7 @@
           <a:p>
             <a:fld id="{AEFF399F-E3B5-4890-BC79-9BC8D4DF3F2D}" type="slidenum">
               <a:rPr lang="nl-BE" smtClean="0"/>
-              <a:t>35</a:t>
+              <a:t>36</a:t>
             </a:fld>
             <a:endParaRPr lang="nl-BE" dirty="0"/>
           </a:p>
@@ -18854,17 +19512,7 @@
                 <a:latin typeface="Courier New" panose="02070309020205020404" pitchFamily="49" charset="0"/>
                 <a:cs typeface="Courier New" panose="02070309020205020404" pitchFamily="49" charset="0"/>
               </a:rPr>
-              <a:t>              </a:t>
-            </a:r>
-            <a:r>
-              <a:rPr lang="en-US" b="1" dirty="0" smtClean="0">
-                <a:solidFill>
-                  <a:schemeClr val="bg1"/>
-                </a:solidFill>
-                <a:latin typeface="Courier New" panose="02070309020205020404" pitchFamily="49" charset="0"/>
-                <a:cs typeface="Courier New" panose="02070309020205020404" pitchFamily="49" charset="0"/>
-              </a:rPr>
-              <a:t>\</a:t>
+              <a:t>              \</a:t>
             </a:r>
           </a:p>
           <a:p>
@@ -19545,7 +20193,7 @@
 </p:sld>
 </file>
 
-<file path=ppt/slides/slide36.xml><?xml version="1.0" encoding="utf-8"?>
+<file path=ppt/slides/slide37.xml><?xml version="1.0" encoding="utf-8"?>
 <p:sld xmlns:a="http://schemas.openxmlformats.org/drawingml/2006/main" xmlns:r="http://schemas.openxmlformats.org/officeDocument/2006/relationships" xmlns:p="http://schemas.openxmlformats.org/presentationml/2006/main">
   <p:cSld>
     <p:spTree>
@@ -19621,7 +20269,7 @@
           <a:p>
             <a:fld id="{AEFF399F-E3B5-4890-BC79-9BC8D4DF3F2D}" type="slidenum">
               <a:rPr lang="nl-BE" smtClean="0"/>
-              <a:t>36</a:t>
+              <a:t>37</a:t>
             </a:fld>
             <a:endParaRPr lang="nl-BE"/>
           </a:p>
@@ -19647,7 +20295,7 @@
 </p:sld>
 </file>
 
-<file path=ppt/slides/slide37.xml><?xml version="1.0" encoding="utf-8"?>
+<file path=ppt/slides/slide38.xml><?xml version="1.0" encoding="utf-8"?>
 <p:sld xmlns:a="http://schemas.openxmlformats.org/drawingml/2006/main" xmlns:r="http://schemas.openxmlformats.org/officeDocument/2006/relationships" xmlns:p="http://schemas.openxmlformats.org/presentationml/2006/main">
   <p:cSld>
     <p:spTree>
@@ -19871,7 +20519,7 @@
           <a:p>
             <a:fld id="{AEFF399F-E3B5-4890-BC79-9BC8D4DF3F2D}" type="slidenum">
               <a:rPr lang="nl-BE" smtClean="0"/>
-              <a:t>37</a:t>
+              <a:t>38</a:t>
             </a:fld>
             <a:endParaRPr lang="nl-BE"/>
           </a:p>
@@ -20407,7 +21055,7 @@
 </p:sld>
 </file>
 
-<file path=ppt/slides/slide38.xml><?xml version="1.0" encoding="utf-8"?>
+<file path=ppt/slides/slide39.xml><?xml version="1.0" encoding="utf-8"?>
 <p:sld xmlns:a="http://schemas.openxmlformats.org/drawingml/2006/main" xmlns:r="http://schemas.openxmlformats.org/officeDocument/2006/relationships" xmlns:p="http://schemas.openxmlformats.org/presentationml/2006/main">
   <p:cSld>
     <p:spTree>
@@ -20553,7 +21201,7 @@
           <a:p>
             <a:fld id="{AEFF399F-E3B5-4890-BC79-9BC8D4DF3F2D}" type="slidenum">
               <a:rPr lang="nl-BE" smtClean="0"/>
-              <a:t>38</a:t>
+              <a:t>39</a:t>
             </a:fld>
             <a:endParaRPr lang="nl-BE"/>
           </a:p>
@@ -20800,108 +21448,6 @@
     <p:bldLst>
       <p:bldP spid="3" grpId="0" uiExpand="1" build="p" bldLvl="2"/>
     </p:bldLst>
-  </p:timing>
-</p:sld>
-</file>
-
-<file path=ppt/slides/slide39.xml><?xml version="1.0" encoding="utf-8"?>
-<p:sld xmlns:a="http://schemas.openxmlformats.org/drawingml/2006/main" xmlns:r="http://schemas.openxmlformats.org/officeDocument/2006/relationships" xmlns:p="http://schemas.openxmlformats.org/presentationml/2006/main">
-  <p:cSld>
-    <p:spTree>
-      <p:nvGrpSpPr>
-        <p:cNvPr id="1" name=""/>
-        <p:cNvGrpSpPr/>
-        <p:nvPr/>
-      </p:nvGrpSpPr>
-      <p:grpSpPr>
-        <a:xfrm>
-          <a:off x="0" y="0"/>
-          <a:ext cx="0" cy="0"/>
-          <a:chOff x="0" y="0"/>
-          <a:chExt cx="0" cy="0"/>
-        </a:xfrm>
-      </p:grpSpPr>
-      <p:sp>
-        <p:nvSpPr>
-          <p:cNvPr id="2" name="Title 1"/>
-          <p:cNvSpPr>
-            <a:spLocks noGrp="1"/>
-          </p:cNvSpPr>
-          <p:nvPr>
-            <p:ph type="title"/>
-          </p:nvPr>
-        </p:nvSpPr>
-        <p:spPr/>
-        <p:txBody>
-          <a:bodyPr/>
-          <a:lstStyle/>
-          <a:p>
-            <a:r>
-              <a:rPr lang="en-US" dirty="0" smtClean="0"/>
-              <a:t>Conclusions</a:t>
-            </a:r>
-            <a:endParaRPr lang="nl-BE" dirty="0"/>
-          </a:p>
-        </p:txBody>
-      </p:sp>
-      <p:sp>
-        <p:nvSpPr>
-          <p:cNvPr id="3" name="Text Placeholder 2"/>
-          <p:cNvSpPr>
-            <a:spLocks noGrp="1"/>
-          </p:cNvSpPr>
-          <p:nvPr>
-            <p:ph type="body" idx="1"/>
-          </p:nvPr>
-        </p:nvSpPr>
-        <p:spPr/>
-        <p:txBody>
-          <a:bodyPr/>
-          <a:lstStyle/>
-          <a:p>
-            <a:endParaRPr lang="nl-BE"/>
-          </a:p>
-        </p:txBody>
-      </p:sp>
-      <p:sp>
-        <p:nvSpPr>
-          <p:cNvPr id="4" name="Slide Number Placeholder 3"/>
-          <p:cNvSpPr>
-            <a:spLocks noGrp="1"/>
-          </p:cNvSpPr>
-          <p:nvPr>
-            <p:ph type="sldNum" sz="quarter" idx="12"/>
-          </p:nvPr>
-        </p:nvSpPr>
-        <p:spPr/>
-        <p:txBody>
-          <a:bodyPr/>
-          <a:lstStyle/>
-          <a:p>
-            <a:fld id="{AEFF399F-E3B5-4890-BC79-9BC8D4DF3F2D}" type="slidenum">
-              <a:rPr lang="nl-BE" smtClean="0"/>
-              <a:t>39</a:t>
-            </a:fld>
-            <a:endParaRPr lang="nl-BE"/>
-          </a:p>
-        </p:txBody>
-      </p:sp>
-    </p:spTree>
-    <p:extLst>
-      <p:ext uri="{BB962C8B-B14F-4D97-AF65-F5344CB8AC3E}">
-        <p14:creationId xmlns:p14="http://schemas.microsoft.com/office/powerpoint/2010/main" val="2192721825"/>
-      </p:ext>
-    </p:extLst>
-  </p:cSld>
-  <p:clrMapOvr>
-    <a:masterClrMapping/>
-  </p:clrMapOvr>
-  <p:timing>
-    <p:tnLst>
-      <p:par>
-        <p:cTn id="1" dur="indefinite" restart="never" nodeType="tmRoot"/>
-      </p:par>
-    </p:tnLst>
   </p:timing>
 </p:sld>
 </file>
@@ -21568,12 +22114,12 @@
       </p:sp>
       <p:sp>
         <p:nvSpPr>
-          <p:cNvPr id="3" name="Content Placeholder 2"/>
+          <p:cNvPr id="3" name="Text Placeholder 2"/>
           <p:cNvSpPr>
             <a:spLocks noGrp="1"/>
           </p:cNvSpPr>
           <p:nvPr>
-            <p:ph idx="1"/>
+            <p:ph type="body" idx="1"/>
           </p:nvPr>
         </p:nvSpPr>
         <p:spPr/>
@@ -21581,81 +22127,7 @@
           <a:bodyPr/>
           <a:lstStyle/>
           <a:p>
-            <a:r>
-              <a:rPr lang="en-US" dirty="0" smtClean="0"/>
-              <a:t>Singularity advantages</a:t>
-            </a:r>
-          </a:p>
-          <a:p>
-            <a:pPr lvl="1"/>
-            <a:r>
-              <a:rPr lang="en-US" dirty="0" smtClean="0"/>
-              <a:t>Portability</a:t>
-            </a:r>
-          </a:p>
-          <a:p>
-            <a:pPr lvl="1"/>
-            <a:r>
-              <a:rPr lang="en-US" dirty="0" smtClean="0"/>
-              <a:t>Reproducibility: recipes under version control</a:t>
-            </a:r>
-          </a:p>
-          <a:p>
-            <a:pPr lvl="1"/>
-            <a:r>
-              <a:rPr lang="en-US" dirty="0" smtClean="0"/>
-              <a:t>Easily create images</a:t>
-            </a:r>
-          </a:p>
-          <a:p>
-            <a:pPr lvl="1"/>
-            <a:r>
-              <a:rPr lang="en-US" dirty="0" smtClean="0"/>
-              <a:t>Integrate images into existing workflows</a:t>
-            </a:r>
-          </a:p>
-          <a:p>
-            <a:pPr lvl="1"/>
-            <a:r>
-              <a:rPr lang="en-US" dirty="0" smtClean="0"/>
-              <a:t>No privilege escalation</a:t>
-            </a:r>
-          </a:p>
-          <a:p>
-            <a:pPr lvl="2"/>
-            <a:r>
-              <a:rPr lang="en-US" dirty="0" smtClean="0"/>
-              <a:t>Create as root</a:t>
-            </a:r>
-          </a:p>
-          <a:p>
-            <a:pPr lvl="2"/>
-            <a:r>
-              <a:rPr lang="en-US" dirty="0" smtClean="0"/>
-              <a:t>Run as user, no </a:t>
-            </a:r>
-            <a:r>
-              <a:rPr lang="en-US" dirty="0" err="1" smtClean="0"/>
-              <a:t>sudo</a:t>
-            </a:r>
-            <a:r>
-              <a:rPr lang="en-US" dirty="0" smtClean="0"/>
-              <a:t> possible</a:t>
-            </a:r>
-          </a:p>
-          <a:p>
-            <a:pPr lvl="1"/>
-            <a:r>
-              <a:rPr lang="en-US" dirty="0" smtClean="0"/>
-              <a:t>Quite reasonable performance/overhead</a:t>
-            </a:r>
-          </a:p>
-          <a:p>
-            <a:r>
-              <a:rPr lang="en-US" dirty="0" smtClean="0"/>
-              <a:t>No excuse to run crappy/suboptimal software!</a:t>
-            </a:r>
-            <a:endParaRPr lang="nl-BE" dirty="0"/>
+            <a:endParaRPr lang="nl-BE"/>
           </a:p>
         </p:txBody>
       </p:sp>
@@ -21677,6 +22149,182 @@
             <a:fld id="{AEFF399F-E3B5-4890-BC79-9BC8D4DF3F2D}" type="slidenum">
               <a:rPr lang="nl-BE" smtClean="0"/>
               <a:t>40</a:t>
+            </a:fld>
+            <a:endParaRPr lang="nl-BE"/>
+          </a:p>
+        </p:txBody>
+      </p:sp>
+    </p:spTree>
+    <p:extLst>
+      <p:ext uri="{BB962C8B-B14F-4D97-AF65-F5344CB8AC3E}">
+        <p14:creationId xmlns:p14="http://schemas.microsoft.com/office/powerpoint/2010/main" val="2192721825"/>
+      </p:ext>
+    </p:extLst>
+  </p:cSld>
+  <p:clrMapOvr>
+    <a:masterClrMapping/>
+  </p:clrMapOvr>
+  <p:timing>
+    <p:tnLst>
+      <p:par>
+        <p:cTn id="1" dur="indefinite" restart="never" nodeType="tmRoot"/>
+      </p:par>
+    </p:tnLst>
+  </p:timing>
+</p:sld>
+</file>
+
+<file path=ppt/slides/slide41.xml><?xml version="1.0" encoding="utf-8"?>
+<p:sld xmlns:a="http://schemas.openxmlformats.org/drawingml/2006/main" xmlns:r="http://schemas.openxmlformats.org/officeDocument/2006/relationships" xmlns:p="http://schemas.openxmlformats.org/presentationml/2006/main">
+  <p:cSld>
+    <p:spTree>
+      <p:nvGrpSpPr>
+        <p:cNvPr id="1" name=""/>
+        <p:cNvGrpSpPr/>
+        <p:nvPr/>
+      </p:nvGrpSpPr>
+      <p:grpSpPr>
+        <a:xfrm>
+          <a:off x="0" y="0"/>
+          <a:ext cx="0" cy="0"/>
+          <a:chOff x="0" y="0"/>
+          <a:chExt cx="0" cy="0"/>
+        </a:xfrm>
+      </p:grpSpPr>
+      <p:sp>
+        <p:nvSpPr>
+          <p:cNvPr id="2" name="Title 1"/>
+          <p:cNvSpPr>
+            <a:spLocks noGrp="1"/>
+          </p:cNvSpPr>
+          <p:nvPr>
+            <p:ph type="title"/>
+          </p:nvPr>
+        </p:nvSpPr>
+        <p:spPr/>
+        <p:txBody>
+          <a:bodyPr/>
+          <a:lstStyle/>
+          <a:p>
+            <a:r>
+              <a:rPr lang="en-US" dirty="0" smtClean="0"/>
+              <a:t>Conclusions</a:t>
+            </a:r>
+            <a:endParaRPr lang="nl-BE" dirty="0"/>
+          </a:p>
+        </p:txBody>
+      </p:sp>
+      <p:sp>
+        <p:nvSpPr>
+          <p:cNvPr id="3" name="Content Placeholder 2"/>
+          <p:cNvSpPr>
+            <a:spLocks noGrp="1"/>
+          </p:cNvSpPr>
+          <p:nvPr>
+            <p:ph idx="1"/>
+          </p:nvPr>
+        </p:nvSpPr>
+        <p:spPr/>
+        <p:txBody>
+          <a:bodyPr/>
+          <a:lstStyle/>
+          <a:p>
+            <a:r>
+              <a:rPr lang="en-US" dirty="0" smtClean="0"/>
+              <a:t>Singularity advantages</a:t>
+            </a:r>
+          </a:p>
+          <a:p>
+            <a:pPr lvl="1"/>
+            <a:r>
+              <a:rPr lang="en-US" dirty="0" smtClean="0"/>
+              <a:t>Portability</a:t>
+            </a:r>
+          </a:p>
+          <a:p>
+            <a:pPr lvl="1"/>
+            <a:r>
+              <a:rPr lang="en-US" dirty="0" smtClean="0"/>
+              <a:t>Reproducibility: recipes under version control</a:t>
+            </a:r>
+          </a:p>
+          <a:p>
+            <a:pPr lvl="1"/>
+            <a:r>
+              <a:rPr lang="en-US" dirty="0" smtClean="0"/>
+              <a:t>Easily create images</a:t>
+            </a:r>
+          </a:p>
+          <a:p>
+            <a:pPr lvl="1"/>
+            <a:r>
+              <a:rPr lang="en-US" dirty="0" smtClean="0"/>
+              <a:t>Integrate images into existing workflows</a:t>
+            </a:r>
+          </a:p>
+          <a:p>
+            <a:pPr lvl="1"/>
+            <a:r>
+              <a:rPr lang="en-US" dirty="0" smtClean="0"/>
+              <a:t>No privilege escalation</a:t>
+            </a:r>
+          </a:p>
+          <a:p>
+            <a:pPr lvl="2"/>
+            <a:r>
+              <a:rPr lang="en-US" dirty="0" smtClean="0"/>
+              <a:t>Create as root</a:t>
+            </a:r>
+          </a:p>
+          <a:p>
+            <a:pPr lvl="2"/>
+            <a:r>
+              <a:rPr lang="en-US" dirty="0" smtClean="0"/>
+              <a:t>Run as user, no </a:t>
+            </a:r>
+            <a:r>
+              <a:rPr lang="en-US" dirty="0" err="1" smtClean="0"/>
+              <a:t>sudo</a:t>
+            </a:r>
+            <a:r>
+              <a:rPr lang="en-US" dirty="0" smtClean="0"/>
+              <a:t> possible</a:t>
+            </a:r>
+          </a:p>
+          <a:p>
+            <a:pPr lvl="1"/>
+            <a:r>
+              <a:rPr lang="en-US" dirty="0" smtClean="0"/>
+              <a:t>Quite reasonable performance/overhead</a:t>
+            </a:r>
+          </a:p>
+          <a:p>
+            <a:r>
+              <a:rPr lang="en-US" dirty="0" smtClean="0"/>
+              <a:t>No excuse to run crappy/suboptimal software!</a:t>
+            </a:r>
+            <a:endParaRPr lang="nl-BE" dirty="0"/>
+          </a:p>
+        </p:txBody>
+      </p:sp>
+      <p:sp>
+        <p:nvSpPr>
+          <p:cNvPr id="4" name="Slide Number Placeholder 3"/>
+          <p:cNvSpPr>
+            <a:spLocks noGrp="1"/>
+          </p:cNvSpPr>
+          <p:nvPr>
+            <p:ph type="sldNum" sz="quarter" idx="12"/>
+          </p:nvPr>
+        </p:nvSpPr>
+        <p:spPr/>
+        <p:txBody>
+          <a:bodyPr/>
+          <a:lstStyle/>
+          <a:p>
+            <a:fld id="{AEFF399F-E3B5-4890-BC79-9BC8D4DF3F2D}" type="slidenum">
+              <a:rPr lang="nl-BE" smtClean="0"/>
+              <a:t>41</a:t>
             </a:fld>
             <a:endParaRPr lang="nl-BE"/>
           </a:p>
@@ -22185,7 +22833,7 @@
 </p:sld>
 </file>
 
-<file path=ppt/slides/slide41.xml><?xml version="1.0" encoding="utf-8"?>
+<file path=ppt/slides/slide42.xml><?xml version="1.0" encoding="utf-8"?>
 <p:sld xmlns:a="http://schemas.openxmlformats.org/drawingml/2006/main" xmlns:r="http://schemas.openxmlformats.org/officeDocument/2006/relationships" xmlns:p="http://schemas.openxmlformats.org/presentationml/2006/main">
   <p:cSld>
     <p:spTree>
@@ -22389,7 +23037,7 @@
           <a:p>
             <a:fld id="{AEFF399F-E3B5-4890-BC79-9BC8D4DF3F2D}" type="slidenum">
               <a:rPr lang="nl-BE" smtClean="0"/>
-              <a:t>41</a:t>
+              <a:t>42</a:t>
             </a:fld>
             <a:endParaRPr lang="nl-BE"/>
           </a:p>
@@ -22720,206 +23368,6 @@
 </p:sld>
 </file>
 
-<file path=ppt/slides/slide42.xml><?xml version="1.0" encoding="utf-8"?>
-<p:sld xmlns:a="http://schemas.openxmlformats.org/drawingml/2006/main" xmlns:r="http://schemas.openxmlformats.org/officeDocument/2006/relationships" xmlns:p="http://schemas.openxmlformats.org/presentationml/2006/main">
-  <p:cSld>
-    <p:spTree>
-      <p:nvGrpSpPr>
-        <p:cNvPr id="1" name=""/>
-        <p:cNvGrpSpPr/>
-        <p:nvPr/>
-      </p:nvGrpSpPr>
-      <p:grpSpPr>
-        <a:xfrm>
-          <a:off x="0" y="0"/>
-          <a:ext cx="0" cy="0"/>
-          <a:chOff x="0" y="0"/>
-          <a:chExt cx="0" cy="0"/>
-        </a:xfrm>
-      </p:grpSpPr>
-      <p:sp>
-        <p:nvSpPr>
-          <p:cNvPr id="2" name="Title 1"/>
-          <p:cNvSpPr>
-            <a:spLocks noGrp="1"/>
-          </p:cNvSpPr>
-          <p:nvPr>
-            <p:ph type="title"/>
-          </p:nvPr>
-        </p:nvSpPr>
-        <p:spPr/>
-        <p:txBody>
-          <a:bodyPr/>
-          <a:lstStyle/>
-          <a:p>
-            <a:r>
-              <a:rPr lang="en-US" dirty="0" smtClean="0"/>
-              <a:t>References</a:t>
-            </a:r>
-            <a:endParaRPr lang="nl-BE" dirty="0"/>
-          </a:p>
-        </p:txBody>
-      </p:sp>
-      <p:sp>
-        <p:nvSpPr>
-          <p:cNvPr id="3" name="Content Placeholder 2"/>
-          <p:cNvSpPr>
-            <a:spLocks noGrp="1"/>
-          </p:cNvSpPr>
-          <p:nvPr>
-            <p:ph idx="1"/>
-          </p:nvPr>
-        </p:nvSpPr>
-        <p:spPr/>
-        <p:txBody>
-          <a:bodyPr>
-            <a:normAutofit/>
-          </a:bodyPr>
-          <a:lstStyle/>
-          <a:p>
-            <a:r>
-              <a:rPr lang="en-US" dirty="0" smtClean="0"/>
-              <a:t>Singularity </a:t>
-            </a:r>
-            <a:r>
-              <a:rPr lang="en-US" dirty="0"/>
-              <a:t>documentation</a:t>
-            </a:r>
-            <a:br>
-              <a:rPr lang="en-US" dirty="0"/>
-            </a:br>
-            <a:r>
-              <a:rPr lang="en-US" dirty="0">
-                <a:hlinkClick r:id="rId2"/>
-              </a:rPr>
-              <a:t>https://www.sylabs.io/docs</a:t>
-            </a:r>
-            <a:r>
-              <a:rPr lang="en-US" dirty="0" smtClean="0">
-                <a:hlinkClick r:id="rId2"/>
-              </a:rPr>
-              <a:t>/</a:t>
-            </a:r>
-            <a:r>
-              <a:rPr lang="en-US" dirty="0" smtClean="0"/>
-              <a:t> </a:t>
-            </a:r>
-          </a:p>
-          <a:p>
-            <a:pPr lvl="1"/>
-            <a:r>
-              <a:rPr lang="en-US" dirty="0"/>
-              <a:t>User </a:t>
-            </a:r>
-            <a:r>
-              <a:rPr lang="en-US" dirty="0" smtClean="0"/>
-              <a:t>guide</a:t>
-            </a:r>
-          </a:p>
-          <a:p>
-            <a:pPr lvl="1"/>
-            <a:r>
-              <a:rPr lang="en-US" dirty="0"/>
-              <a:t>Admin </a:t>
-            </a:r>
-            <a:r>
-              <a:rPr lang="en-US" dirty="0" smtClean="0"/>
-              <a:t>guide</a:t>
-            </a:r>
-          </a:p>
-          <a:p>
-            <a:r>
-              <a:rPr lang="en-US" dirty="0" smtClean="0"/>
-              <a:t>Singularity </a:t>
-            </a:r>
-            <a:r>
-              <a:rPr lang="en-US" dirty="0"/>
-              <a:t>GitHub repository</a:t>
-            </a:r>
-            <a:br>
-              <a:rPr lang="en-US" dirty="0"/>
-            </a:br>
-            <a:r>
-              <a:rPr lang="en-US" dirty="0">
-                <a:hlinkClick r:id="rId3"/>
-              </a:rPr>
-              <a:t>https://</a:t>
-            </a:r>
-            <a:r>
-              <a:rPr lang="en-US" dirty="0" smtClean="0">
-                <a:hlinkClick r:id="rId3"/>
-              </a:rPr>
-              <a:t>github.com/singularityware/singularity</a:t>
-            </a:r>
-            <a:r>
-              <a:rPr lang="en-US" dirty="0" smtClean="0"/>
-              <a:t> </a:t>
-            </a:r>
-          </a:p>
-          <a:p>
-            <a:r>
-              <a:rPr lang="en-US" dirty="0" err="1" smtClean="0">
-                <a:hlinkClick r:id="rId4"/>
-              </a:rPr>
-              <a:t>HPCWired</a:t>
-            </a:r>
-            <a:r>
-              <a:rPr lang="en-US" dirty="0" smtClean="0">
-                <a:hlinkClick r:id="rId4"/>
-              </a:rPr>
-              <a:t> article</a:t>
-            </a:r>
-            <a:r>
-              <a:rPr lang="en-US" dirty="0" smtClean="0"/>
-              <a:t> discussing singularity versus Docker/Shifter</a:t>
-            </a:r>
-            <a:endParaRPr lang="nl-BE" dirty="0"/>
-          </a:p>
-        </p:txBody>
-      </p:sp>
-      <p:sp>
-        <p:nvSpPr>
-          <p:cNvPr id="4" name="Slide Number Placeholder 3"/>
-          <p:cNvSpPr>
-            <a:spLocks noGrp="1"/>
-          </p:cNvSpPr>
-          <p:nvPr>
-            <p:ph type="sldNum" sz="quarter" idx="12"/>
-          </p:nvPr>
-        </p:nvSpPr>
-        <p:spPr/>
-        <p:txBody>
-          <a:bodyPr/>
-          <a:lstStyle/>
-          <a:p>
-            <a:fld id="{AEFF399F-E3B5-4890-BC79-9BC8D4DF3F2D}" type="slidenum">
-              <a:rPr lang="nl-BE" smtClean="0"/>
-              <a:t>42</a:t>
-            </a:fld>
-            <a:endParaRPr lang="nl-BE"/>
-          </a:p>
-        </p:txBody>
-      </p:sp>
-    </p:spTree>
-    <p:extLst>
-      <p:ext uri="{BB962C8B-B14F-4D97-AF65-F5344CB8AC3E}">
-        <p14:creationId xmlns:p14="http://schemas.microsoft.com/office/powerpoint/2010/main" val="3984500910"/>
-      </p:ext>
-    </p:extLst>
-  </p:cSld>
-  <p:clrMapOvr>
-    <a:masterClrMapping/>
-  </p:clrMapOvr>
-  <p:timing>
-    <p:tnLst>
-      <p:par>
-        <p:cTn id="1" dur="indefinite" restart="never" nodeType="tmRoot"/>
-      </p:par>
-    </p:tnLst>
-  </p:timing>
-</p:sld>
-</file>
-
 <file path=ppt/slides/slide43.xml><?xml version="1.0" encoding="utf-8"?>
 <p:sld xmlns:a="http://schemas.openxmlformats.org/drawingml/2006/main" xmlns:r="http://schemas.openxmlformats.org/officeDocument/2006/relationships" xmlns:p="http://schemas.openxmlformats.org/presentationml/2006/main">
   <p:cSld>
@@ -22954,6 +23402,206 @@
           <a:p>
             <a:r>
               <a:rPr lang="en-US" dirty="0" smtClean="0"/>
+              <a:t>References</a:t>
+            </a:r>
+            <a:endParaRPr lang="nl-BE" dirty="0"/>
+          </a:p>
+        </p:txBody>
+      </p:sp>
+      <p:sp>
+        <p:nvSpPr>
+          <p:cNvPr id="3" name="Content Placeholder 2"/>
+          <p:cNvSpPr>
+            <a:spLocks noGrp="1"/>
+          </p:cNvSpPr>
+          <p:nvPr>
+            <p:ph idx="1"/>
+          </p:nvPr>
+        </p:nvSpPr>
+        <p:spPr/>
+        <p:txBody>
+          <a:bodyPr>
+            <a:normAutofit/>
+          </a:bodyPr>
+          <a:lstStyle/>
+          <a:p>
+            <a:r>
+              <a:rPr lang="en-US" dirty="0" smtClean="0"/>
+              <a:t>Singularity </a:t>
+            </a:r>
+            <a:r>
+              <a:rPr lang="en-US" dirty="0"/>
+              <a:t>documentation</a:t>
+            </a:r>
+            <a:br>
+              <a:rPr lang="en-US" dirty="0"/>
+            </a:br>
+            <a:r>
+              <a:rPr lang="en-US" dirty="0">
+                <a:hlinkClick r:id="rId2"/>
+              </a:rPr>
+              <a:t>https://www.sylabs.io/docs</a:t>
+            </a:r>
+            <a:r>
+              <a:rPr lang="en-US" dirty="0" smtClean="0">
+                <a:hlinkClick r:id="rId2"/>
+              </a:rPr>
+              <a:t>/</a:t>
+            </a:r>
+            <a:r>
+              <a:rPr lang="en-US" dirty="0" smtClean="0"/>
+              <a:t> </a:t>
+            </a:r>
+          </a:p>
+          <a:p>
+            <a:pPr lvl="1"/>
+            <a:r>
+              <a:rPr lang="en-US" dirty="0"/>
+              <a:t>User </a:t>
+            </a:r>
+            <a:r>
+              <a:rPr lang="en-US" dirty="0" smtClean="0"/>
+              <a:t>guide</a:t>
+            </a:r>
+          </a:p>
+          <a:p>
+            <a:pPr lvl="1"/>
+            <a:r>
+              <a:rPr lang="en-US" dirty="0"/>
+              <a:t>Admin </a:t>
+            </a:r>
+            <a:r>
+              <a:rPr lang="en-US" dirty="0" smtClean="0"/>
+              <a:t>guide</a:t>
+            </a:r>
+          </a:p>
+          <a:p>
+            <a:r>
+              <a:rPr lang="en-US" dirty="0" smtClean="0"/>
+              <a:t>Singularity </a:t>
+            </a:r>
+            <a:r>
+              <a:rPr lang="en-US" dirty="0"/>
+              <a:t>GitHub repository</a:t>
+            </a:r>
+            <a:br>
+              <a:rPr lang="en-US" dirty="0"/>
+            </a:br>
+            <a:r>
+              <a:rPr lang="en-US" dirty="0">
+                <a:hlinkClick r:id="rId3"/>
+              </a:rPr>
+              <a:t>https://</a:t>
+            </a:r>
+            <a:r>
+              <a:rPr lang="en-US" dirty="0" smtClean="0">
+                <a:hlinkClick r:id="rId3"/>
+              </a:rPr>
+              <a:t>github.com/singularityware/singularity</a:t>
+            </a:r>
+            <a:r>
+              <a:rPr lang="en-US" dirty="0" smtClean="0"/>
+              <a:t> </a:t>
+            </a:r>
+          </a:p>
+          <a:p>
+            <a:r>
+              <a:rPr lang="en-US" dirty="0" err="1" smtClean="0">
+                <a:hlinkClick r:id="rId4"/>
+              </a:rPr>
+              <a:t>HPCWired</a:t>
+            </a:r>
+            <a:r>
+              <a:rPr lang="en-US" dirty="0" smtClean="0">
+                <a:hlinkClick r:id="rId4"/>
+              </a:rPr>
+              <a:t> article</a:t>
+            </a:r>
+            <a:r>
+              <a:rPr lang="en-US" dirty="0" smtClean="0"/>
+              <a:t> discussing singularity versus Docker/Shifter</a:t>
+            </a:r>
+            <a:endParaRPr lang="nl-BE" dirty="0"/>
+          </a:p>
+        </p:txBody>
+      </p:sp>
+      <p:sp>
+        <p:nvSpPr>
+          <p:cNvPr id="4" name="Slide Number Placeholder 3"/>
+          <p:cNvSpPr>
+            <a:spLocks noGrp="1"/>
+          </p:cNvSpPr>
+          <p:nvPr>
+            <p:ph type="sldNum" sz="quarter" idx="12"/>
+          </p:nvPr>
+        </p:nvSpPr>
+        <p:spPr/>
+        <p:txBody>
+          <a:bodyPr/>
+          <a:lstStyle/>
+          <a:p>
+            <a:fld id="{AEFF399F-E3B5-4890-BC79-9BC8D4DF3F2D}" type="slidenum">
+              <a:rPr lang="nl-BE" smtClean="0"/>
+              <a:t>43</a:t>
+            </a:fld>
+            <a:endParaRPr lang="nl-BE"/>
+          </a:p>
+        </p:txBody>
+      </p:sp>
+    </p:spTree>
+    <p:extLst>
+      <p:ext uri="{BB962C8B-B14F-4D97-AF65-F5344CB8AC3E}">
+        <p14:creationId xmlns:p14="http://schemas.microsoft.com/office/powerpoint/2010/main" val="3984500910"/>
+      </p:ext>
+    </p:extLst>
+  </p:cSld>
+  <p:clrMapOvr>
+    <a:masterClrMapping/>
+  </p:clrMapOvr>
+  <p:timing>
+    <p:tnLst>
+      <p:par>
+        <p:cTn id="1" dur="indefinite" restart="never" nodeType="tmRoot"/>
+      </p:par>
+    </p:tnLst>
+  </p:timing>
+</p:sld>
+</file>
+
+<file path=ppt/slides/slide44.xml><?xml version="1.0" encoding="utf-8"?>
+<p:sld xmlns:a="http://schemas.openxmlformats.org/drawingml/2006/main" xmlns:r="http://schemas.openxmlformats.org/officeDocument/2006/relationships" xmlns:p="http://schemas.openxmlformats.org/presentationml/2006/main">
+  <p:cSld>
+    <p:spTree>
+      <p:nvGrpSpPr>
+        <p:cNvPr id="1" name=""/>
+        <p:cNvGrpSpPr/>
+        <p:nvPr/>
+      </p:nvGrpSpPr>
+      <p:grpSpPr>
+        <a:xfrm>
+          <a:off x="0" y="0"/>
+          <a:ext cx="0" cy="0"/>
+          <a:chOff x="0" y="0"/>
+          <a:chExt cx="0" cy="0"/>
+        </a:xfrm>
+      </p:grpSpPr>
+      <p:sp>
+        <p:nvSpPr>
+          <p:cNvPr id="2" name="Title 1"/>
+          <p:cNvSpPr>
+            <a:spLocks noGrp="1"/>
+          </p:cNvSpPr>
+          <p:nvPr>
+            <p:ph type="title"/>
+          </p:nvPr>
+        </p:nvSpPr>
+        <p:spPr/>
+        <p:txBody>
+          <a:bodyPr/>
+          <a:lstStyle/>
+          <a:p>
+            <a:r>
+              <a:rPr lang="en-US" dirty="0" smtClean="0"/>
               <a:t>Create empty image</a:t>
             </a:r>
             <a:endParaRPr lang="nl-BE" dirty="0"/>
@@ -23232,7 +23880,7 @@
           <a:p>
             <a:fld id="{AEFF399F-E3B5-4890-BC79-9BC8D4DF3F2D}" type="slidenum">
               <a:rPr lang="nl-BE" smtClean="0"/>
-              <a:t>43</a:t>
+              <a:t>44</a:t>
             </a:fld>
             <a:endParaRPr lang="nl-BE"/>
           </a:p>
@@ -24730,11 +25378,7 @@
             <a:pPr lvl="1"/>
             <a:r>
               <a:rPr lang="en-US" dirty="0" smtClean="0"/>
-              <a:t>disco: 19.04, </a:t>
-            </a:r>
-            <a:r>
-              <a:rPr lang="en-US" dirty="0" smtClean="0"/>
-              <a:t>bionic: 18.04, </a:t>
+              <a:t>disco: 19.04, bionic: 18.04, </a:t>
             </a:r>
             <a:r>
               <a:rPr lang="en-US" dirty="0" err="1" smtClean="0"/>

</xml_diff>